<commit_message>
updated GUI and PPT
</commit_message>
<xml_diff>
--- a/Water Pump Demo Arduino and Gui instructions.pptx
+++ b/Water Pump Demo Arduino and Gui instructions.pptx
@@ -113,13 +113,18 @@
       </a:defRPr>
     </a:lvl9pPr>
   </p:defaultTextStyle>
+  <p:extLst>
+    <p:ext uri="{EFAFB233-063F-42B5-8137-9DF3F51BA10A}">
+      <p15:sldGuideLst xmlns:p15="http://schemas.microsoft.com/office/powerpoint/2012/main"/>
+    </p:ext>
+  </p:extLst>
 </p:presentation>
 </file>
 
 <file path=ppt/revisionInfo.xml><?xml version="1.0" encoding="utf-8"?>
 <p1510:revInfo xmlns:a="http://schemas.openxmlformats.org/drawingml/2006/main" xmlns:r="http://schemas.openxmlformats.org/officeDocument/2006/relationships" xmlns:p1510="http://schemas.microsoft.com/office/powerpoint/2015/10/main">
   <p1510:revLst>
-    <p1510:client id="{2574B24F-E2A1-49B4-965A-816A9A283E65}" v="90" dt="2025-06-17T23:11:33.854"/>
+    <p1510:client id="{2574B24F-E2A1-49B4-965A-816A9A283E65}" v="100" dt="2025-06-18T21:40:18.985"/>
   </p1510:revLst>
 </p1510:revInfo>
 </file>
@@ -129,7 +134,7 @@
   <pc:docChgLst>
     <pc:chgData name="George Hariman" userId="944226f4-c0bd-444e-8152-728ae792d6b1" providerId="ADAL" clId="{2574B24F-E2A1-49B4-965A-816A9A283E65}"/>
     <pc:docChg chg="undo custSel addSld delSld modSld sldOrd">
-      <pc:chgData name="George Hariman" userId="944226f4-c0bd-444e-8152-728ae792d6b1" providerId="ADAL" clId="{2574B24F-E2A1-49B4-965A-816A9A283E65}" dt="2025-06-17T23:27:32.496" v="2525" actId="313"/>
+      <pc:chgData name="George Hariman" userId="944226f4-c0bd-444e-8152-728ae792d6b1" providerId="ADAL" clId="{2574B24F-E2A1-49B4-965A-816A9A283E65}" dt="2025-06-18T21:40:18.985" v="2863" actId="164"/>
       <pc:docMkLst>
         <pc:docMk/>
       </pc:docMkLst>
@@ -396,7 +401,7 @@
         </pc:picChg>
       </pc:sldChg>
       <pc:sldChg chg="addSp delSp modSp new mod">
-        <pc:chgData name="George Hariman" userId="944226f4-c0bd-444e-8152-728ae792d6b1" providerId="ADAL" clId="{2574B24F-E2A1-49B4-965A-816A9A283E65}" dt="2025-06-17T23:08:56.651" v="2418" actId="164"/>
+        <pc:chgData name="George Hariman" userId="944226f4-c0bd-444e-8152-728ae792d6b1" providerId="ADAL" clId="{2574B24F-E2A1-49B4-965A-816A9A283E65}" dt="2025-06-18T21:38:57.210" v="2851" actId="164"/>
         <pc:sldMkLst>
           <pc:docMk/>
           <pc:sldMk cId="3341469045" sldId="258"/>
@@ -410,7 +415,7 @@
           </ac:spMkLst>
         </pc:spChg>
         <pc:spChg chg="add mod topLvl">
-          <ac:chgData name="George Hariman" userId="944226f4-c0bd-444e-8152-728ae792d6b1" providerId="ADAL" clId="{2574B24F-E2A1-49B4-965A-816A9A283E65}" dt="2025-06-17T23:08:56.651" v="2418" actId="164"/>
+          <ac:chgData name="George Hariman" userId="944226f4-c0bd-444e-8152-728ae792d6b1" providerId="ADAL" clId="{2574B24F-E2A1-49B4-965A-816A9A283E65}" dt="2025-06-18T21:38:57.210" v="2851" actId="164"/>
           <ac:spMkLst>
             <pc:docMk/>
             <pc:sldMk cId="3341469045" sldId="258"/>
@@ -418,15 +423,23 @@
           </ac:spMkLst>
         </pc:spChg>
         <pc:spChg chg="add mod ord topLvl">
-          <ac:chgData name="George Hariman" userId="944226f4-c0bd-444e-8152-728ae792d6b1" providerId="ADAL" clId="{2574B24F-E2A1-49B4-965A-816A9A283E65}" dt="2025-06-17T23:08:56.651" v="2418" actId="164"/>
+          <ac:chgData name="George Hariman" userId="944226f4-c0bd-444e-8152-728ae792d6b1" providerId="ADAL" clId="{2574B24F-E2A1-49B4-965A-816A9A283E65}" dt="2025-06-18T21:38:57.210" v="2851" actId="164"/>
           <ac:spMkLst>
             <pc:docMk/>
             <pc:sldMk cId="3341469045" sldId="258"/>
             <ac:spMk id="8" creationId="{86F1D908-0535-46A6-2615-0F72D87469BA}"/>
           </ac:spMkLst>
         </pc:spChg>
+        <pc:spChg chg="add mod">
+          <ac:chgData name="George Hariman" userId="944226f4-c0bd-444e-8152-728ae792d6b1" providerId="ADAL" clId="{2574B24F-E2A1-49B4-965A-816A9A283E65}" dt="2025-06-18T21:38:57.210" v="2851" actId="164"/>
+          <ac:spMkLst>
+            <pc:docMk/>
+            <pc:sldMk cId="3341469045" sldId="258"/>
+            <ac:spMk id="18" creationId="{D6A37C3E-DE5C-329D-BE66-117E6C1C406C}"/>
+          </ac:spMkLst>
+        </pc:spChg>
         <pc:spChg chg="add mod topLvl">
-          <ac:chgData name="George Hariman" userId="944226f4-c0bd-444e-8152-728ae792d6b1" providerId="ADAL" clId="{2574B24F-E2A1-49B4-965A-816A9A283E65}" dt="2025-06-17T23:08:56.651" v="2418" actId="164"/>
+          <ac:chgData name="George Hariman" userId="944226f4-c0bd-444e-8152-728ae792d6b1" providerId="ADAL" clId="{2574B24F-E2A1-49B4-965A-816A9A283E65}" dt="2025-06-18T21:38:57.210" v="2851" actId="164"/>
           <ac:spMkLst>
             <pc:docMk/>
             <pc:sldMk cId="3341469045" sldId="258"/>
@@ -434,7 +447,7 @@
           </ac:spMkLst>
         </pc:spChg>
         <pc:spChg chg="add mod topLvl">
-          <ac:chgData name="George Hariman" userId="944226f4-c0bd-444e-8152-728ae792d6b1" providerId="ADAL" clId="{2574B24F-E2A1-49B4-965A-816A9A283E65}" dt="2025-06-17T23:08:56.651" v="2418" actId="164"/>
+          <ac:chgData name="George Hariman" userId="944226f4-c0bd-444e-8152-728ae792d6b1" providerId="ADAL" clId="{2574B24F-E2A1-49B4-965A-816A9A283E65}" dt="2025-06-18T21:38:57.210" v="2851" actId="164"/>
           <ac:spMkLst>
             <pc:docMk/>
             <pc:sldMk cId="3341469045" sldId="258"/>
@@ -442,7 +455,7 @@
           </ac:spMkLst>
         </pc:spChg>
         <pc:spChg chg="add mod topLvl">
-          <ac:chgData name="George Hariman" userId="944226f4-c0bd-444e-8152-728ae792d6b1" providerId="ADAL" clId="{2574B24F-E2A1-49B4-965A-816A9A283E65}" dt="2025-06-17T23:08:56.651" v="2418" actId="164"/>
+          <ac:chgData name="George Hariman" userId="944226f4-c0bd-444e-8152-728ae792d6b1" providerId="ADAL" clId="{2574B24F-E2A1-49B4-965A-816A9A283E65}" dt="2025-06-18T21:38:57.210" v="2851" actId="164"/>
           <ac:spMkLst>
             <pc:docMk/>
             <pc:sldMk cId="3341469045" sldId="258"/>
@@ -450,15 +463,15 @@
           </ac:spMkLst>
         </pc:spChg>
         <pc:spChg chg="add mod topLvl">
-          <ac:chgData name="George Hariman" userId="944226f4-c0bd-444e-8152-728ae792d6b1" providerId="ADAL" clId="{2574B24F-E2A1-49B4-965A-816A9A283E65}" dt="2025-06-17T23:08:56.651" v="2418" actId="164"/>
+          <ac:chgData name="George Hariman" userId="944226f4-c0bd-444e-8152-728ae792d6b1" providerId="ADAL" clId="{2574B24F-E2A1-49B4-965A-816A9A283E65}" dt="2025-06-18T21:38:57.210" v="2851" actId="164"/>
           <ac:spMkLst>
             <pc:docMk/>
             <pc:sldMk cId="3341469045" sldId="258"/>
             <ac:spMk id="35" creationId="{F3ECA9D0-22C8-CA8E-AC32-9FB4E5C13DE4}"/>
           </ac:spMkLst>
         </pc:spChg>
-        <pc:spChg chg="add mod">
-          <ac:chgData name="George Hariman" userId="944226f4-c0bd-444e-8152-728ae792d6b1" providerId="ADAL" clId="{2574B24F-E2A1-49B4-965A-816A9A283E65}" dt="2025-06-17T23:08:56.651" v="2418" actId="164"/>
+        <pc:spChg chg="add mod topLvl">
+          <ac:chgData name="George Hariman" userId="944226f4-c0bd-444e-8152-728ae792d6b1" providerId="ADAL" clId="{2574B24F-E2A1-49B4-965A-816A9A283E65}" dt="2025-06-18T21:38:57.210" v="2851" actId="164"/>
           <ac:spMkLst>
             <pc:docMk/>
             <pc:sldMk cId="3341469045" sldId="258"/>
@@ -481,12 +494,36 @@
             <ac:grpSpMk id="32" creationId="{211CC7D5-BA24-7583-93B8-3238659A4989}"/>
           </ac:grpSpMkLst>
         </pc:grpChg>
+        <pc:grpChg chg="del">
+          <ac:chgData name="George Hariman" userId="944226f4-c0bd-444e-8152-728ae792d6b1" providerId="ADAL" clId="{2574B24F-E2A1-49B4-965A-816A9A283E65}" dt="2025-06-18T21:36:42.252" v="2742" actId="165"/>
+          <ac:grpSpMkLst>
+            <pc:docMk/>
+            <pc:sldMk cId="3341469045" sldId="258"/>
+            <ac:grpSpMk id="39" creationId="{96CAD638-D26B-8996-BC32-948254566898}"/>
+          </ac:grpSpMkLst>
+        </pc:grpChg>
+        <pc:picChg chg="add del mod ord">
+          <ac:chgData name="George Hariman" userId="944226f4-c0bd-444e-8152-728ae792d6b1" providerId="ADAL" clId="{2574B24F-E2A1-49B4-965A-816A9A283E65}" dt="2025-06-18T21:35:28.646" v="2722" actId="478"/>
+          <ac:picMkLst>
+            <pc:docMk/>
+            <pc:sldMk cId="3341469045" sldId="258"/>
+            <ac:picMk id="4" creationId="{2719DFB4-DE45-A185-69DC-F66B48C0E020}"/>
+          </ac:picMkLst>
+        </pc:picChg>
         <pc:picChg chg="add del mod">
           <ac:chgData name="George Hariman" userId="944226f4-c0bd-444e-8152-728ae792d6b1" providerId="ADAL" clId="{2574B24F-E2A1-49B4-965A-816A9A283E65}" dt="2025-06-17T22:05:15.356" v="800" actId="478"/>
           <ac:picMkLst>
             <pc:docMk/>
             <pc:sldMk cId="3341469045" sldId="258"/>
             <ac:picMk id="4" creationId="{D9518653-2CCF-B21C-047B-D24909E2F9D0}"/>
+          </ac:picMkLst>
+        </pc:picChg>
+        <pc:picChg chg="add mod ord">
+          <ac:chgData name="George Hariman" userId="944226f4-c0bd-444e-8152-728ae792d6b1" providerId="ADAL" clId="{2574B24F-E2A1-49B4-965A-816A9A283E65}" dt="2025-06-18T21:35:42.557" v="2731" actId="1076"/>
+          <ac:picMkLst>
+            <pc:docMk/>
+            <pc:sldMk cId="3341469045" sldId="258"/>
+            <ac:picMk id="6" creationId="{562F4C93-91CC-D9F9-5BB5-4E88D0ED11C7}"/>
           </ac:picMkLst>
         </pc:picChg>
         <pc:picChg chg="add del mod">
@@ -497,16 +534,24 @@
             <ac:picMk id="6" creationId="{715C288D-3496-F13A-5027-1C9E136E89FD}"/>
           </ac:picMkLst>
         </pc:picChg>
-        <pc:picChg chg="add mod topLvl">
-          <ac:chgData name="George Hariman" userId="944226f4-c0bd-444e-8152-728ae792d6b1" providerId="ADAL" clId="{2574B24F-E2A1-49B4-965A-816A9A283E65}" dt="2025-06-17T23:08:56.651" v="2418" actId="164"/>
+        <pc:picChg chg="add del mod topLvl">
+          <ac:chgData name="George Hariman" userId="944226f4-c0bd-444e-8152-728ae792d6b1" providerId="ADAL" clId="{2574B24F-E2A1-49B4-965A-816A9A283E65}" dt="2025-06-18T21:35:45.601" v="2732" actId="478"/>
           <ac:picMkLst>
             <pc:docMk/>
             <pc:sldMk cId="3341469045" sldId="258"/>
             <ac:picMk id="10" creationId="{ADEA51C6-72BB-6120-0769-C39557877E1F}"/>
           </ac:picMkLst>
         </pc:picChg>
+        <pc:picChg chg="add mod ord topLvl">
+          <ac:chgData name="George Hariman" userId="944226f4-c0bd-444e-8152-728ae792d6b1" providerId="ADAL" clId="{2574B24F-E2A1-49B4-965A-816A9A283E65}" dt="2025-06-18T21:38:43.486" v="2849" actId="165"/>
+          <ac:picMkLst>
+            <pc:docMk/>
+            <pc:sldMk cId="3341469045" sldId="258"/>
+            <ac:picMk id="11" creationId="{9E3FBE24-06F3-51DC-0B08-AACA26EC054D}"/>
+          </ac:picMkLst>
+        </pc:picChg>
         <pc:picChg chg="add mod topLvl">
-          <ac:chgData name="George Hariman" userId="944226f4-c0bd-444e-8152-728ae792d6b1" providerId="ADAL" clId="{2574B24F-E2A1-49B4-965A-816A9A283E65}" dt="2025-06-17T23:08:56.651" v="2418" actId="164"/>
+          <ac:chgData name="George Hariman" userId="944226f4-c0bd-444e-8152-728ae792d6b1" providerId="ADAL" clId="{2574B24F-E2A1-49B4-965A-816A9A283E65}" dt="2025-06-18T21:38:57.210" v="2851" actId="164"/>
           <ac:picMkLst>
             <pc:docMk/>
             <pc:sldMk cId="3341469045" sldId="258"/>
@@ -514,15 +559,15 @@
           </ac:picMkLst>
         </pc:picChg>
         <pc:picChg chg="add mod topLvl">
-          <ac:chgData name="George Hariman" userId="944226f4-c0bd-444e-8152-728ae792d6b1" providerId="ADAL" clId="{2574B24F-E2A1-49B4-965A-816A9A283E65}" dt="2025-06-17T23:08:27.949" v="2413" actId="165"/>
+          <ac:chgData name="George Hariman" userId="944226f4-c0bd-444e-8152-728ae792d6b1" providerId="ADAL" clId="{2574B24F-E2A1-49B4-965A-816A9A283E65}" dt="2025-06-18T21:38:57.210" v="2851" actId="164"/>
           <ac:picMkLst>
             <pc:docMk/>
             <pc:sldMk cId="3341469045" sldId="258"/>
             <ac:picMk id="14" creationId="{78097711-6AA8-A566-49D0-8DB889328F84}"/>
           </ac:picMkLst>
         </pc:picChg>
-        <pc:picChg chg="add mod topLvl">
-          <ac:chgData name="George Hariman" userId="944226f4-c0bd-444e-8152-728ae792d6b1" providerId="ADAL" clId="{2574B24F-E2A1-49B4-965A-816A9A283E65}" dt="2025-06-17T23:08:56.651" v="2418" actId="164"/>
+        <pc:picChg chg="add del mod topLvl">
+          <ac:chgData name="George Hariman" userId="944226f4-c0bd-444e-8152-728ae792d6b1" providerId="ADAL" clId="{2574B24F-E2A1-49B4-965A-816A9A283E65}" dt="2025-06-18T21:35:00.241" v="2715" actId="478"/>
           <ac:picMkLst>
             <pc:docMk/>
             <pc:sldMk cId="3341469045" sldId="258"/>
@@ -530,7 +575,7 @@
           </ac:picMkLst>
         </pc:picChg>
         <pc:cxnChg chg="add mod topLvl">
-          <ac:chgData name="George Hariman" userId="944226f4-c0bd-444e-8152-728ae792d6b1" providerId="ADAL" clId="{2574B24F-E2A1-49B4-965A-816A9A283E65}" dt="2025-06-17T23:04:43.800" v="2356" actId="14100"/>
+          <ac:chgData name="George Hariman" userId="944226f4-c0bd-444e-8152-728ae792d6b1" providerId="ADAL" clId="{2574B24F-E2A1-49B4-965A-816A9A283E65}" dt="2025-06-18T21:35:45.601" v="2732" actId="478"/>
           <ac:cxnSpMkLst>
             <pc:docMk/>
             <pc:sldMk cId="3341469045" sldId="258"/>
@@ -538,7 +583,7 @@
           </ac:cxnSpMkLst>
         </pc:cxnChg>
         <pc:cxnChg chg="add mod topLvl">
-          <ac:chgData name="George Hariman" userId="944226f4-c0bd-444e-8152-728ae792d6b1" providerId="ADAL" clId="{2574B24F-E2A1-49B4-965A-816A9A283E65}" dt="2025-06-17T23:08:44.314" v="2417" actId="14100"/>
+          <ac:chgData name="George Hariman" userId="944226f4-c0bd-444e-8152-728ae792d6b1" providerId="ADAL" clId="{2574B24F-E2A1-49B4-965A-816A9A283E65}" dt="2025-06-18T21:38:05.235" v="2759" actId="14100"/>
           <ac:cxnSpMkLst>
             <pc:docMk/>
             <pc:sldMk cId="3341469045" sldId="258"/>
@@ -546,7 +591,7 @@
           </ac:cxnSpMkLst>
         </pc:cxnChg>
         <pc:cxnChg chg="add mod">
-          <ac:chgData name="George Hariman" userId="944226f4-c0bd-444e-8152-728ae792d6b1" providerId="ADAL" clId="{2574B24F-E2A1-49B4-965A-816A9A283E65}" dt="2025-06-17T22:15:46.811" v="1698" actId="14100"/>
+          <ac:chgData name="George Hariman" userId="944226f4-c0bd-444e-8152-728ae792d6b1" providerId="ADAL" clId="{2574B24F-E2A1-49B4-965A-816A9A283E65}" dt="2025-06-18T21:38:07.334" v="2760" actId="14100"/>
           <ac:cxnSpMkLst>
             <pc:docMk/>
             <pc:sldMk cId="3341469045" sldId="258"/>
@@ -555,7 +600,7 @@
         </pc:cxnChg>
       </pc:sldChg>
       <pc:sldChg chg="addSp delSp modSp add mod ord">
-        <pc:chgData name="George Hariman" userId="944226f4-c0bd-444e-8152-728ae792d6b1" providerId="ADAL" clId="{2574B24F-E2A1-49B4-965A-816A9A283E65}" dt="2025-06-17T23:21:57.675" v="2496" actId="1076"/>
+        <pc:chgData name="George Hariman" userId="944226f4-c0bd-444e-8152-728ae792d6b1" providerId="ADAL" clId="{2574B24F-E2A1-49B4-965A-816A9A283E65}" dt="2025-06-18T21:37:49.265" v="2757" actId="165"/>
         <pc:sldMkLst>
           <pc:docMk/>
           <pc:sldMk cId="1143546009" sldId="259"/>
@@ -577,7 +622,7 @@
           </ac:spMkLst>
         </pc:spChg>
         <pc:spChg chg="mod topLvl">
-          <ac:chgData name="George Hariman" userId="944226f4-c0bd-444e-8152-728ae792d6b1" providerId="ADAL" clId="{2574B24F-E2A1-49B4-965A-816A9A283E65}" dt="2025-06-17T23:10:01.957" v="2434" actId="20577"/>
+          <ac:chgData name="George Hariman" userId="944226f4-c0bd-444e-8152-728ae792d6b1" providerId="ADAL" clId="{2574B24F-E2A1-49B4-965A-816A9A283E65}" dt="2025-06-18T21:37:49.265" v="2757" actId="165"/>
           <ac:spMkLst>
             <pc:docMk/>
             <pc:sldMk cId="1143546009" sldId="259"/>
@@ -609,7 +654,7 @@
           </ac:spMkLst>
         </pc:spChg>
         <pc:spChg chg="add mod topLvl">
-          <ac:chgData name="George Hariman" userId="944226f4-c0bd-444e-8152-728ae792d6b1" providerId="ADAL" clId="{2574B24F-E2A1-49B4-965A-816A9A283E65}" dt="2025-06-17T23:06:07.048" v="2372" actId="164"/>
+          <ac:chgData name="George Hariman" userId="944226f4-c0bd-444e-8152-728ae792d6b1" providerId="ADAL" clId="{2574B24F-E2A1-49B4-965A-816A9A283E65}" dt="2025-06-18T21:37:49.265" v="2757" actId="165"/>
           <ac:spMkLst>
             <pc:docMk/>
             <pc:sldMk cId="1143546009" sldId="259"/>
@@ -624,8 +669,8 @@
             <ac:spMk id="19" creationId="{B4FD8C37-87FE-EB61-803A-B5A1AB9911A5}"/>
           </ac:spMkLst>
         </pc:spChg>
-        <pc:spChg chg="add mod">
-          <ac:chgData name="George Hariman" userId="944226f4-c0bd-444e-8152-728ae792d6b1" providerId="ADAL" clId="{2574B24F-E2A1-49B4-965A-816A9A283E65}" dt="2025-06-17T23:06:07.048" v="2372" actId="164"/>
+        <pc:spChg chg="add mod topLvl">
+          <ac:chgData name="George Hariman" userId="944226f4-c0bd-444e-8152-728ae792d6b1" providerId="ADAL" clId="{2574B24F-E2A1-49B4-965A-816A9A283E65}" dt="2025-06-18T21:37:49.265" v="2757" actId="165"/>
           <ac:spMkLst>
             <pc:docMk/>
             <pc:sldMk cId="1143546009" sldId="259"/>
@@ -649,19 +694,27 @@
           </ac:grpSpMkLst>
         </pc:grpChg>
         <pc:grpChg chg="add del mod">
-          <ac:chgData name="George Hariman" userId="944226f4-c0bd-444e-8152-728ae792d6b1" providerId="ADAL" clId="{2574B24F-E2A1-49B4-965A-816A9A283E65}" dt="2025-06-17T23:21:57.675" v="2496" actId="1076"/>
+          <ac:chgData name="George Hariman" userId="944226f4-c0bd-444e-8152-728ae792d6b1" providerId="ADAL" clId="{2574B24F-E2A1-49B4-965A-816A9A283E65}" dt="2025-06-18T21:37:49.265" v="2757" actId="165"/>
           <ac:grpSpMkLst>
             <pc:docMk/>
             <pc:sldMk cId="1143546009" sldId="259"/>
             <ac:grpSpMk id="22" creationId="{8B4793E7-34A5-4A47-ECC1-84B6F0CD910E}"/>
           </ac:grpSpMkLst>
         </pc:grpChg>
-        <pc:picChg chg="mod topLvl">
-          <ac:chgData name="George Hariman" userId="944226f4-c0bd-444e-8152-728ae792d6b1" providerId="ADAL" clId="{2574B24F-E2A1-49B4-965A-816A9A283E65}" dt="2025-06-17T23:06:07.048" v="2372" actId="164"/>
+        <pc:picChg chg="add del mod topLvl">
+          <ac:chgData name="George Hariman" userId="944226f4-c0bd-444e-8152-728ae792d6b1" providerId="ADAL" clId="{2574B24F-E2A1-49B4-965A-816A9A283E65}" dt="2025-06-18T21:37:49.265" v="2757" actId="165"/>
           <ac:picMkLst>
             <pc:docMk/>
             <pc:sldMk cId="1143546009" sldId="259"/>
             <ac:picMk id="4" creationId="{80C8457A-CCB9-6D4D-1D55-A087DCFA8D43}"/>
+          </ac:picMkLst>
+        </pc:picChg>
+        <pc:picChg chg="add del mod ord">
+          <ac:chgData name="George Hariman" userId="944226f4-c0bd-444e-8152-728ae792d6b1" providerId="ADAL" clId="{2574B24F-E2A1-49B4-965A-816A9A283E65}" dt="2025-06-18T21:37:47.790" v="2755" actId="22"/>
+          <ac:picMkLst>
+            <pc:docMk/>
+            <pc:sldMk cId="1143546009" sldId="259"/>
+            <ac:picMk id="5" creationId="{CB03AB68-BCC6-D8FC-6F32-1925F8FFB15E}"/>
           </ac:picMkLst>
         </pc:picChg>
         <pc:picChg chg="del mod topLvl">
@@ -696,8 +749,8 @@
             <ac:cxnSpMk id="10" creationId="{67BFA2B7-9132-4C85-BB85-F2D4BD1BEEAB}"/>
           </ac:cxnSpMkLst>
         </pc:cxnChg>
-        <pc:cxnChg chg="add mod">
-          <ac:chgData name="George Hariman" userId="944226f4-c0bd-444e-8152-728ae792d6b1" providerId="ADAL" clId="{2574B24F-E2A1-49B4-965A-816A9A283E65}" dt="2025-06-17T22:04:56.068" v="792" actId="14100"/>
+        <pc:cxnChg chg="add mod topLvl">
+          <ac:chgData name="George Hariman" userId="944226f4-c0bd-444e-8152-728ae792d6b1" providerId="ADAL" clId="{2574B24F-E2A1-49B4-965A-816A9A283E65}" dt="2025-06-18T21:37:49.265" v="2757" actId="165"/>
           <ac:cxnSpMkLst>
             <pc:docMk/>
             <pc:sldMk cId="1143546009" sldId="259"/>
@@ -706,7 +759,7 @@
         </pc:cxnChg>
       </pc:sldChg>
       <pc:sldChg chg="addSp delSp modSp add mod">
-        <pc:chgData name="George Hariman" userId="944226f4-c0bd-444e-8152-728ae792d6b1" providerId="ADAL" clId="{2574B24F-E2A1-49B4-965A-816A9A283E65}" dt="2025-06-17T23:27:32.496" v="2525" actId="313"/>
+        <pc:chgData name="George Hariman" userId="944226f4-c0bd-444e-8152-728ae792d6b1" providerId="ADAL" clId="{2574B24F-E2A1-49B4-965A-816A9A283E65}" dt="2025-06-18T21:34:39.350" v="2714" actId="1076"/>
         <pc:sldMkLst>
           <pc:docMk/>
           <pc:sldMk cId="208232504" sldId="260"/>
@@ -720,7 +773,7 @@
           </ac:spMkLst>
         </pc:spChg>
         <pc:spChg chg="add mod topLvl">
-          <ac:chgData name="George Hariman" userId="944226f4-c0bd-444e-8152-728ae792d6b1" providerId="ADAL" clId="{2574B24F-E2A1-49B4-965A-816A9A283E65}" dt="2025-06-17T22:37:21.947" v="2067" actId="164"/>
+          <ac:chgData name="George Hariman" userId="944226f4-c0bd-444e-8152-728ae792d6b1" providerId="ADAL" clId="{2574B24F-E2A1-49B4-965A-816A9A283E65}" dt="2025-06-18T21:34:34.070" v="2712" actId="1076"/>
           <ac:spMkLst>
             <pc:docMk/>
             <pc:sldMk cId="208232504" sldId="260"/>
@@ -728,7 +781,7 @@
           </ac:spMkLst>
         </pc:spChg>
         <pc:spChg chg="mod topLvl">
-          <ac:chgData name="George Hariman" userId="944226f4-c0bd-444e-8152-728ae792d6b1" providerId="ADAL" clId="{2574B24F-E2A1-49B4-965A-816A9A283E65}" dt="2025-06-17T22:37:21.947" v="2067" actId="164"/>
+          <ac:chgData name="George Hariman" userId="944226f4-c0bd-444e-8152-728ae792d6b1" providerId="ADAL" clId="{2574B24F-E2A1-49B4-965A-816A9A283E65}" dt="2025-06-18T21:32:30.751" v="2694" actId="165"/>
           <ac:spMkLst>
             <pc:docMk/>
             <pc:sldMk cId="208232504" sldId="260"/>
@@ -744,7 +797,7 @@
           </ac:spMkLst>
         </pc:spChg>
         <pc:spChg chg="add mod topLvl">
-          <ac:chgData name="George Hariman" userId="944226f4-c0bd-444e-8152-728ae792d6b1" providerId="ADAL" clId="{2574B24F-E2A1-49B4-965A-816A9A283E65}" dt="2025-06-17T22:37:21.947" v="2067" actId="164"/>
+          <ac:chgData name="George Hariman" userId="944226f4-c0bd-444e-8152-728ae792d6b1" providerId="ADAL" clId="{2574B24F-E2A1-49B4-965A-816A9A283E65}" dt="2025-06-18T21:32:30.751" v="2694" actId="165"/>
           <ac:spMkLst>
             <pc:docMk/>
             <pc:sldMk cId="208232504" sldId="260"/>
@@ -752,7 +805,7 @@
           </ac:spMkLst>
         </pc:spChg>
         <pc:spChg chg="add mod topLvl">
-          <ac:chgData name="George Hariman" userId="944226f4-c0bd-444e-8152-728ae792d6b1" providerId="ADAL" clId="{2574B24F-E2A1-49B4-965A-816A9A283E65}" dt="2025-06-17T22:37:21.947" v="2067" actId="164"/>
+          <ac:chgData name="George Hariman" userId="944226f4-c0bd-444e-8152-728ae792d6b1" providerId="ADAL" clId="{2574B24F-E2A1-49B4-965A-816A9A283E65}" dt="2025-06-18T21:33:40.921" v="2705" actId="1076"/>
           <ac:spMkLst>
             <pc:docMk/>
             <pc:sldMk cId="208232504" sldId="260"/>
@@ -760,7 +813,7 @@
           </ac:spMkLst>
         </pc:spChg>
         <pc:spChg chg="add mod topLvl">
-          <ac:chgData name="George Hariman" userId="944226f4-c0bd-444e-8152-728ae792d6b1" providerId="ADAL" clId="{2574B24F-E2A1-49B4-965A-816A9A283E65}" dt="2025-06-17T22:37:21.947" v="2067" actId="164"/>
+          <ac:chgData name="George Hariman" userId="944226f4-c0bd-444e-8152-728ae792d6b1" providerId="ADAL" clId="{2574B24F-E2A1-49B4-965A-816A9A283E65}" dt="2025-06-18T21:32:30.751" v="2694" actId="165"/>
           <ac:spMkLst>
             <pc:docMk/>
             <pc:sldMk cId="208232504" sldId="260"/>
@@ -768,7 +821,7 @@
           </ac:spMkLst>
         </pc:spChg>
         <pc:spChg chg="add mod topLvl">
-          <ac:chgData name="George Hariman" userId="944226f4-c0bd-444e-8152-728ae792d6b1" providerId="ADAL" clId="{2574B24F-E2A1-49B4-965A-816A9A283E65}" dt="2025-06-17T22:37:21.947" v="2067" actId="164"/>
+          <ac:chgData name="George Hariman" userId="944226f4-c0bd-444e-8152-728ae792d6b1" providerId="ADAL" clId="{2574B24F-E2A1-49B4-965A-816A9A283E65}" dt="2025-06-18T21:34:36.469" v="2713" actId="1076"/>
           <ac:spMkLst>
             <pc:docMk/>
             <pc:sldMk cId="208232504" sldId="260"/>
@@ -776,7 +829,7 @@
           </ac:spMkLst>
         </pc:spChg>
         <pc:spChg chg="add mod topLvl">
-          <ac:chgData name="George Hariman" userId="944226f4-c0bd-444e-8152-728ae792d6b1" providerId="ADAL" clId="{2574B24F-E2A1-49B4-965A-816A9A283E65}" dt="2025-06-17T23:27:32.496" v="2525" actId="313"/>
+          <ac:chgData name="George Hariman" userId="944226f4-c0bd-444e-8152-728ae792d6b1" providerId="ADAL" clId="{2574B24F-E2A1-49B4-965A-816A9A283E65}" dt="2025-06-18T21:32:30.751" v="2694" actId="165"/>
           <ac:spMkLst>
             <pc:docMk/>
             <pc:sldMk cId="208232504" sldId="260"/>
@@ -799,16 +852,16 @@
             <ac:spMk id="25" creationId="{A39DD927-6AD8-9CB8-A60A-779F8C5432BF}"/>
           </ac:spMkLst>
         </pc:spChg>
-        <pc:spChg chg="add mod">
-          <ac:chgData name="George Hariman" userId="944226f4-c0bd-444e-8152-728ae792d6b1" providerId="ADAL" clId="{2574B24F-E2A1-49B4-965A-816A9A283E65}" dt="2025-06-17T22:37:21.947" v="2067" actId="164"/>
+        <pc:spChg chg="add mod topLvl">
+          <ac:chgData name="George Hariman" userId="944226f4-c0bd-444e-8152-728ae792d6b1" providerId="ADAL" clId="{2574B24F-E2A1-49B4-965A-816A9A283E65}" dt="2025-06-18T21:34:39.350" v="2714" actId="1076"/>
           <ac:spMkLst>
             <pc:docMk/>
             <pc:sldMk cId="208232504" sldId="260"/>
             <ac:spMk id="27" creationId="{3CAB54F4-F106-0E19-5DC9-5E03548FEE89}"/>
           </ac:spMkLst>
         </pc:spChg>
-        <pc:spChg chg="add mod">
-          <ac:chgData name="George Hariman" userId="944226f4-c0bd-444e-8152-728ae792d6b1" providerId="ADAL" clId="{2574B24F-E2A1-49B4-965A-816A9A283E65}" dt="2025-06-17T22:37:21.947" v="2067" actId="164"/>
+        <pc:spChg chg="add mod topLvl">
+          <ac:chgData name="George Hariman" userId="944226f4-c0bd-444e-8152-728ae792d6b1" providerId="ADAL" clId="{2574B24F-E2A1-49B4-965A-816A9A283E65}" dt="2025-06-18T21:32:30.751" v="2694" actId="165"/>
           <ac:spMkLst>
             <pc:docMk/>
             <pc:sldMk cId="208232504" sldId="260"/>
@@ -823,20 +876,36 @@
             <ac:grpSpMk id="26" creationId="{FEAC962A-70E1-6BB4-23CF-BCD756B39E20}"/>
           </ac:grpSpMkLst>
         </pc:grpChg>
-        <pc:picChg chg="add mod topLvl">
-          <ac:chgData name="George Hariman" userId="944226f4-c0bd-444e-8152-728ae792d6b1" providerId="ADAL" clId="{2574B24F-E2A1-49B4-965A-816A9A283E65}" dt="2025-06-17T22:37:07.499" v="2061" actId="165"/>
+        <pc:picChg chg="add del mod topLvl">
+          <ac:chgData name="George Hariman" userId="944226f4-c0bd-444e-8152-728ae792d6b1" providerId="ADAL" clId="{2574B24F-E2A1-49B4-965A-816A9A283E65}" dt="2025-06-18T21:34:17.749" v="2706" actId="478"/>
           <ac:picMkLst>
             <pc:docMk/>
             <pc:sldMk cId="208232504" sldId="260"/>
             <ac:picMk id="4" creationId="{C954ECB2-F50B-C6C0-E8E3-29D536AA1A0F}"/>
           </ac:picMkLst>
         </pc:picChg>
-        <pc:picChg chg="add mod topLvl">
-          <ac:chgData name="George Hariman" userId="944226f4-c0bd-444e-8152-728ae792d6b1" providerId="ADAL" clId="{2574B24F-E2A1-49B4-965A-816A9A283E65}" dt="2025-06-17T22:37:21.947" v="2067" actId="164"/>
+        <pc:picChg chg="add mod ord">
+          <ac:chgData name="George Hariman" userId="944226f4-c0bd-444e-8152-728ae792d6b1" providerId="ADAL" clId="{2574B24F-E2A1-49B4-965A-816A9A283E65}" dt="2025-06-18T21:33:38.922" v="2704" actId="1076"/>
+          <ac:picMkLst>
+            <pc:docMk/>
+            <pc:sldMk cId="208232504" sldId="260"/>
+            <ac:picMk id="6" creationId="{F86E19F3-C24D-8ABA-168C-6E4844D64370}"/>
+          </ac:picMkLst>
+        </pc:picChg>
+        <pc:picChg chg="add del mod topLvl">
+          <ac:chgData name="George Hariman" userId="944226f4-c0bd-444e-8152-728ae792d6b1" providerId="ADAL" clId="{2574B24F-E2A1-49B4-965A-816A9A283E65}" dt="2025-06-18T21:33:11.392" v="2695" actId="478"/>
           <ac:picMkLst>
             <pc:docMk/>
             <pc:sldMk cId="208232504" sldId="260"/>
             <ac:picMk id="9" creationId="{73699B15-8D9D-1C1B-5CB6-175C4CB81992}"/>
+          </ac:picMkLst>
+        </pc:picChg>
+        <pc:picChg chg="add mod ord">
+          <ac:chgData name="George Hariman" userId="944226f4-c0bd-444e-8152-728ae792d6b1" providerId="ADAL" clId="{2574B24F-E2A1-49B4-965A-816A9A283E65}" dt="2025-06-18T21:34:31.092" v="2711" actId="14100"/>
+          <ac:picMkLst>
+            <pc:docMk/>
+            <pc:sldMk cId="208232504" sldId="260"/>
+            <ac:picMk id="10" creationId="{5ED0079E-1CAC-E276-2D02-8205761130D1}"/>
           </ac:picMkLst>
         </pc:picChg>
         <pc:picChg chg="del">
@@ -1195,8 +1264,8 @@
           </ac:spMkLst>
         </pc:spChg>
       </pc:sldChg>
-      <pc:sldChg chg="delSp modSp add mod ord">
-        <pc:chgData name="George Hariman" userId="944226f4-c0bd-444e-8152-728ae792d6b1" providerId="ADAL" clId="{2574B24F-E2A1-49B4-965A-816A9A283E65}" dt="2025-06-17T23:22:17.564" v="2524" actId="20577"/>
+      <pc:sldChg chg="addSp delSp modSp add mod ord">
+        <pc:chgData name="George Hariman" userId="944226f4-c0bd-444e-8152-728ae792d6b1" providerId="ADAL" clId="{2574B24F-E2A1-49B4-965A-816A9A283E65}" dt="2025-06-18T21:40:18.985" v="2863" actId="164"/>
         <pc:sldMkLst>
           <pc:docMk/>
           <pc:sldMk cId="2371463180" sldId="265"/>
@@ -1209,12 +1278,44 @@
             <ac:spMk id="2" creationId="{5E4BF864-D7E8-6A70-DEA3-B1BA9BA87E87}"/>
           </ac:spMkLst>
         </pc:spChg>
+        <pc:spChg chg="mod topLvl">
+          <ac:chgData name="George Hariman" userId="944226f4-c0bd-444e-8152-728ae792d6b1" providerId="ADAL" clId="{2574B24F-E2A1-49B4-965A-816A9A283E65}" dt="2025-06-18T21:40:18.985" v="2863" actId="164"/>
+          <ac:spMkLst>
+            <pc:docMk/>
+            <pc:sldMk cId="2371463180" sldId="265"/>
+            <ac:spMk id="3" creationId="{5C11C663-907F-081C-F270-A1DF46F7C474}"/>
+          </ac:spMkLst>
+        </pc:spChg>
         <pc:spChg chg="del">
           <ac:chgData name="George Hariman" userId="944226f4-c0bd-444e-8152-728ae792d6b1" providerId="ADAL" clId="{2574B24F-E2A1-49B4-965A-816A9A283E65}" dt="2025-06-17T23:22:04.445" v="2501" actId="478"/>
           <ac:spMkLst>
             <pc:docMk/>
             <pc:sldMk cId="2371463180" sldId="265"/>
             <ac:spMk id="7" creationId="{861EACE3-1E1E-73BC-6F68-844FBD082299}"/>
+          </ac:spMkLst>
+        </pc:spChg>
+        <pc:spChg chg="mod topLvl">
+          <ac:chgData name="George Hariman" userId="944226f4-c0bd-444e-8152-728ae792d6b1" providerId="ADAL" clId="{2574B24F-E2A1-49B4-965A-816A9A283E65}" dt="2025-06-18T21:40:18.985" v="2863" actId="164"/>
+          <ac:spMkLst>
+            <pc:docMk/>
+            <pc:sldMk cId="2371463180" sldId="265"/>
+            <ac:spMk id="8" creationId="{DAE24CCC-84AE-1B01-D170-2100AE80576D}"/>
+          </ac:spMkLst>
+        </pc:spChg>
+        <pc:spChg chg="mod topLvl">
+          <ac:chgData name="George Hariman" userId="944226f4-c0bd-444e-8152-728ae792d6b1" providerId="ADAL" clId="{2574B24F-E2A1-49B4-965A-816A9A283E65}" dt="2025-06-18T21:40:18.985" v="2863" actId="164"/>
+          <ac:spMkLst>
+            <pc:docMk/>
+            <pc:sldMk cId="2371463180" sldId="265"/>
+            <ac:spMk id="11" creationId="{CF63C8C7-05FC-947B-8C0D-BFAC1B61180E}"/>
+          </ac:spMkLst>
+        </pc:spChg>
+        <pc:spChg chg="mod topLvl">
+          <ac:chgData name="George Hariman" userId="944226f4-c0bd-444e-8152-728ae792d6b1" providerId="ADAL" clId="{2574B24F-E2A1-49B4-965A-816A9A283E65}" dt="2025-06-18T21:40:18.985" v="2863" actId="164"/>
+          <ac:spMkLst>
+            <pc:docMk/>
+            <pc:sldMk cId="2371463180" sldId="265"/>
+            <ac:spMk id="12" creationId="{6BB596CD-5F8C-5A7E-F7A2-6842AAF565A8}"/>
           </ac:spMkLst>
         </pc:spChg>
         <pc:spChg chg="del">
@@ -1233,8 +1334,24 @@
             <ac:spMk id="20" creationId="{95979E6E-9643-7183-3141-A345D713B504}"/>
           </ac:spMkLst>
         </pc:spChg>
-        <pc:grpChg chg="mod">
-          <ac:chgData name="George Hariman" userId="944226f4-c0bd-444e-8152-728ae792d6b1" providerId="ADAL" clId="{2574B24F-E2A1-49B4-965A-816A9A283E65}" dt="2025-06-17T23:22:12.854" v="2506" actId="1076"/>
+        <pc:spChg chg="mod topLvl">
+          <ac:chgData name="George Hariman" userId="944226f4-c0bd-444e-8152-728ae792d6b1" providerId="ADAL" clId="{2574B24F-E2A1-49B4-965A-816A9A283E65}" dt="2025-06-18T21:40:18.985" v="2863" actId="164"/>
+          <ac:spMkLst>
+            <pc:docMk/>
+            <pc:sldMk cId="2371463180" sldId="265"/>
+            <ac:spMk id="21" creationId="{2E6ABB5A-9541-8B5D-A825-B71EBE6D9DEB}"/>
+          </ac:spMkLst>
+        </pc:spChg>
+        <pc:grpChg chg="add mod">
+          <ac:chgData name="George Hariman" userId="944226f4-c0bd-444e-8152-728ae792d6b1" providerId="ADAL" clId="{2574B24F-E2A1-49B4-965A-816A9A283E65}" dt="2025-06-18T21:40:18.985" v="2863" actId="164"/>
+          <ac:grpSpMkLst>
+            <pc:docMk/>
+            <pc:sldMk cId="2371463180" sldId="265"/>
+            <ac:grpSpMk id="7" creationId="{9634B18E-F8DB-F3E7-CEFF-C3936B83DBA3}"/>
+          </ac:grpSpMkLst>
+        </pc:grpChg>
+        <pc:grpChg chg="del mod">
+          <ac:chgData name="George Hariman" userId="944226f4-c0bd-444e-8152-728ae792d6b1" providerId="ADAL" clId="{2574B24F-E2A1-49B4-965A-816A9A283E65}" dt="2025-06-18T21:39:48.547" v="2852" actId="165"/>
           <ac:grpSpMkLst>
             <pc:docMk/>
             <pc:sldMk cId="2371463180" sldId="265"/>
@@ -1249,14 +1366,30 @@
             <ac:picMk id="4" creationId="{915A12AE-957D-3FE2-2B15-2DE7E2EF55C7}"/>
           </ac:picMkLst>
         </pc:picChg>
-        <pc:picChg chg="mod">
-          <ac:chgData name="George Hariman" userId="944226f4-c0bd-444e-8152-728ae792d6b1" providerId="ADAL" clId="{2574B24F-E2A1-49B4-965A-816A9A283E65}" dt="2025-06-17T23:22:09.942" v="2505" actId="1076"/>
+        <pc:picChg chg="add mod ord">
+          <ac:chgData name="George Hariman" userId="944226f4-c0bd-444e-8152-728ae792d6b1" providerId="ADAL" clId="{2574B24F-E2A1-49B4-965A-816A9A283E65}" dt="2025-06-18T21:40:18.985" v="2863" actId="164"/>
+          <ac:picMkLst>
+            <pc:docMk/>
+            <pc:sldMk cId="2371463180" sldId="265"/>
+            <ac:picMk id="5" creationId="{380AE12E-7E03-2B74-D97C-6B664C3A3C33}"/>
+          </ac:picMkLst>
+        </pc:picChg>
+        <pc:picChg chg="del mod topLvl">
+          <ac:chgData name="George Hariman" userId="944226f4-c0bd-444e-8152-728ae792d6b1" providerId="ADAL" clId="{2574B24F-E2A1-49B4-965A-816A9A283E65}" dt="2025-06-18T21:39:50.005" v="2853" actId="478"/>
           <ac:picMkLst>
             <pc:docMk/>
             <pc:sldMk cId="2371463180" sldId="265"/>
             <ac:picMk id="6" creationId="{7BD6556F-F278-17C4-7FD9-639190DE1D67}"/>
           </ac:picMkLst>
         </pc:picChg>
+        <pc:cxnChg chg="mod topLvl">
+          <ac:chgData name="George Hariman" userId="944226f4-c0bd-444e-8152-728ae792d6b1" providerId="ADAL" clId="{2574B24F-E2A1-49B4-965A-816A9A283E65}" dt="2025-06-18T21:40:18.985" v="2863" actId="164"/>
+          <ac:cxnSpMkLst>
+            <pc:docMk/>
+            <pc:sldMk cId="2371463180" sldId="265"/>
+            <ac:cxnSpMk id="9" creationId="{32E6A42F-7E8F-F533-4C0E-578BCCD4C635}"/>
+          </ac:cxnSpMkLst>
+        </pc:cxnChg>
         <pc:cxnChg chg="del">
           <ac:chgData name="George Hariman" userId="944226f4-c0bd-444e-8152-728ae792d6b1" providerId="ADAL" clId="{2574B24F-E2A1-49B4-965A-816A9A283E65}" dt="2025-06-17T23:22:07.037" v="2503" actId="478"/>
           <ac:cxnSpMkLst>
@@ -3229,7 +3362,7 @@
           <a:p>
             <a:fld id="{2B0A73C7-85E1-4631-82BB-A7046A93EA7F}" type="datetimeFigureOut">
               <a:rPr lang="en-US" smtClean="0"/>
-              <a:t>6/17/2025</a:t>
+              <a:t>6/18/2025</a:t>
             </a:fld>
             <a:endParaRPr lang="en-US"/>
           </a:p>
@@ -7474,10 +7607,10 @@
       </p:sp>
       <p:grpSp>
         <p:nvGrpSpPr>
-          <p:cNvPr id="39" name="Group 38">
+          <p:cNvPr id="19" name="Group 18">
             <a:extLst>
               <a:ext uri="{FF2B5EF4-FFF2-40B4-BE49-F238E27FC236}">
-                <a16:creationId xmlns:a16="http://schemas.microsoft.com/office/drawing/2014/main" id="{96CAD638-D26B-8996-BC32-948254566898}"/>
+                <a16:creationId xmlns:a16="http://schemas.microsoft.com/office/drawing/2014/main" id="{D4C46FB2-536D-1062-387B-F9B68855A2C7}"/>
               </a:ext>
             </a:extLst>
           </p:cNvPr>
@@ -7486,12 +7619,72 @@
         </p:nvGrpSpPr>
         <p:grpSpPr>
           <a:xfrm>
-            <a:off x="360459" y="767244"/>
-            <a:ext cx="11631291" cy="5915306"/>
-            <a:chOff x="360459" y="767244"/>
-            <a:chExt cx="11631291" cy="5915306"/>
+            <a:off x="467362" y="767244"/>
+            <a:ext cx="11652208" cy="5800704"/>
+            <a:chOff x="467362" y="767244"/>
+            <a:chExt cx="11652208" cy="5800704"/>
           </a:xfrm>
         </p:grpSpPr>
+        <p:pic>
+          <p:nvPicPr>
+            <p:cNvPr id="11" name="Picture 10">
+              <a:extLst>
+                <a:ext uri="{FF2B5EF4-FFF2-40B4-BE49-F238E27FC236}">
+                  <a16:creationId xmlns:a16="http://schemas.microsoft.com/office/drawing/2014/main" id="{9E3FBE24-06F3-51DC-0B08-AACA26EC054D}"/>
+                </a:ext>
+              </a:extLst>
+            </p:cNvPr>
+            <p:cNvPicPr>
+              <a:picLocks noChangeAspect="1"/>
+            </p:cNvPicPr>
+            <p:nvPr/>
+          </p:nvPicPr>
+          <p:blipFill>
+            <a:blip r:embed="rId2"/>
+            <a:stretch>
+              <a:fillRect/>
+            </a:stretch>
+          </p:blipFill>
+          <p:spPr>
+            <a:xfrm>
+              <a:off x="6019393" y="789549"/>
+              <a:ext cx="2960067" cy="3123689"/>
+            </a:xfrm>
+            <a:prstGeom prst="rect">
+              <a:avLst/>
+            </a:prstGeom>
+          </p:spPr>
+        </p:pic>
+        <p:pic>
+          <p:nvPicPr>
+            <p:cNvPr id="6" name="Picture 5">
+              <a:extLst>
+                <a:ext uri="{FF2B5EF4-FFF2-40B4-BE49-F238E27FC236}">
+                  <a16:creationId xmlns:a16="http://schemas.microsoft.com/office/drawing/2014/main" id="{562F4C93-91CC-D9F9-5BB5-4E88D0ED11C7}"/>
+                </a:ext>
+              </a:extLst>
+            </p:cNvPr>
+            <p:cNvPicPr>
+              <a:picLocks noChangeAspect="1"/>
+            </p:cNvPicPr>
+            <p:nvPr/>
+          </p:nvPicPr>
+          <p:blipFill>
+            <a:blip r:embed="rId3"/>
+            <a:stretch>
+              <a:fillRect/>
+            </a:stretch>
+          </p:blipFill>
+          <p:spPr>
+            <a:xfrm>
+              <a:off x="476254" y="3942530"/>
+              <a:ext cx="5109372" cy="2625418"/>
+            </a:xfrm>
+            <a:prstGeom prst="rect">
+              <a:avLst/>
+            </a:prstGeom>
+          </p:spPr>
+        </p:pic>
         <p:sp>
           <p:nvSpPr>
             <p:cNvPr id="7" name="TextBox 6">
@@ -7548,42 +7741,6 @@
         </p:sp>
         <p:pic>
           <p:nvPicPr>
-            <p:cNvPr id="10" name="Picture 9">
-              <a:extLst>
-                <a:ext uri="{FF2B5EF4-FFF2-40B4-BE49-F238E27FC236}">
-                  <a16:creationId xmlns:a16="http://schemas.microsoft.com/office/drawing/2014/main" id="{ADEA51C6-72BB-6120-0769-C39557877E1F}"/>
-                </a:ext>
-              </a:extLst>
-            </p:cNvPr>
-            <p:cNvPicPr>
-              <a:picLocks noChangeAspect="1"/>
-            </p:cNvPicPr>
-            <p:nvPr/>
-          </p:nvPicPr>
-          <p:blipFill>
-            <a:blip r:embed="rId2" cstate="email">
-              <a:extLst>
-                <a:ext uri="{28A0092B-C50C-407E-A947-70E740481C1C}">
-                  <a14:useLocalDpi xmlns:a14="http://schemas.microsoft.com/office/drawing/2010/main"/>
-                </a:ext>
-              </a:extLst>
-            </a:blip>
-            <a:stretch>
-              <a:fillRect/>
-            </a:stretch>
-          </p:blipFill>
-          <p:spPr>
-            <a:xfrm>
-              <a:off x="6311330" y="1059275"/>
-              <a:ext cx="5415579" cy="2426916"/>
-            </a:xfrm>
-            <a:prstGeom prst="rect">
-              <a:avLst/>
-            </a:prstGeom>
-          </p:spPr>
-        </p:pic>
-        <p:pic>
-          <p:nvPicPr>
             <p:cNvPr id="12" name="Picture 11">
               <a:extLst>
                 <a:ext uri="{FF2B5EF4-FFF2-40B4-BE49-F238E27FC236}">
@@ -7597,7 +7754,7 @@
             <p:nvPr/>
           </p:nvPicPr>
           <p:blipFill>
-            <a:blip r:embed="rId3" cstate="email">
+            <a:blip r:embed="rId4" cstate="email">
               <a:extLst>
                 <a:ext uri="{28A0092B-C50C-407E-A947-70E740481C1C}">
                   <a14:useLocalDpi xmlns:a14="http://schemas.microsoft.com/office/drawing/2010/main"/>
@@ -7633,7 +7790,7 @@
             <p:nvPr/>
           </p:nvPicPr>
           <p:blipFill>
-            <a:blip r:embed="rId4" cstate="email">
+            <a:blip r:embed="rId5" cstate="email">
               <a:extLst>
                 <a:ext uri="{28A0092B-C50C-407E-A947-70E740481C1C}">
                   <a14:useLocalDpi xmlns:a14="http://schemas.microsoft.com/office/drawing/2010/main"/>
@@ -7646,7 +7803,7 @@
           </p:blipFill>
           <p:spPr>
             <a:xfrm>
-              <a:off x="8893899" y="1513091"/>
+              <a:off x="9021719" y="1001813"/>
               <a:ext cx="3097851" cy="1100978"/>
             </a:xfrm>
             <a:prstGeom prst="rect">
@@ -7665,7 +7822,6 @@
             </p:cNvPr>
             <p:cNvCxnSpPr>
               <a:cxnSpLocks/>
-              <a:endCxn id="10" idx="1"/>
             </p:cNvCxnSpPr>
             <p:nvPr/>
           </p:nvCxnSpPr>
@@ -7699,42 +7855,6 @@
             </a:fontRef>
           </p:style>
         </p:cxnSp>
-        <p:pic>
-          <p:nvPicPr>
-            <p:cNvPr id="20" name="Picture 19">
-              <a:extLst>
-                <a:ext uri="{FF2B5EF4-FFF2-40B4-BE49-F238E27FC236}">
-                  <a16:creationId xmlns:a16="http://schemas.microsoft.com/office/drawing/2014/main" id="{B009955A-14C2-1C7B-011C-BAC8F8DA9855}"/>
-                </a:ext>
-              </a:extLst>
-            </p:cNvPr>
-            <p:cNvPicPr>
-              <a:picLocks noChangeAspect="1"/>
-            </p:cNvPicPr>
-            <p:nvPr/>
-          </p:nvPicPr>
-          <p:blipFill>
-            <a:blip r:embed="rId5" cstate="email">
-              <a:extLst>
-                <a:ext uri="{28A0092B-C50C-407E-A947-70E740481C1C}">
-                  <a14:useLocalDpi xmlns:a14="http://schemas.microsoft.com/office/drawing/2010/main"/>
-                </a:ext>
-              </a:extLst>
-            </a:blip>
-            <a:stretch>
-              <a:fillRect/>
-            </a:stretch>
-          </p:blipFill>
-          <p:spPr>
-            <a:xfrm>
-              <a:off x="360459" y="4000537"/>
-              <a:ext cx="5950868" cy="2682013"/>
-            </a:xfrm>
-            <a:prstGeom prst="rect">
-              <a:avLst/>
-            </a:prstGeom>
-          </p:spPr>
-        </p:pic>
         <p:sp>
           <p:nvSpPr>
             <p:cNvPr id="21" name="Oval 20">
@@ -7749,7 +7869,7 @@
           </p:nvSpPr>
           <p:spPr>
             <a:xfrm>
-              <a:off x="6532880" y="2571791"/>
+              <a:off x="6336234" y="2601288"/>
               <a:ext cx="727587" cy="471948"/>
             </a:xfrm>
             <a:prstGeom prst="ellipse">
@@ -7917,8 +8037,8 @@
           </p:nvCxnSpPr>
           <p:spPr>
             <a:xfrm flipV="1">
-              <a:off x="8780206" y="1615440"/>
-              <a:ext cx="180914" cy="468999"/>
+              <a:off x="8780206" y="1052052"/>
+              <a:ext cx="235975" cy="1032387"/>
             </a:xfrm>
             <a:prstGeom prst="line">
               <a:avLst/>
@@ -7959,9 +8079,9 @@
             <p:nvPr/>
           </p:nvCxnSpPr>
           <p:spPr>
-            <a:xfrm>
-              <a:off x="8788400" y="2194560"/>
-              <a:ext cx="274320" cy="396240"/>
+            <a:xfrm flipV="1">
+              <a:off x="8788400" y="2064774"/>
+              <a:ext cx="227781" cy="129786"/>
             </a:xfrm>
             <a:prstGeom prst="line">
               <a:avLst/>
@@ -8055,7 +8175,7 @@
           </p:nvSpPr>
           <p:spPr>
             <a:xfrm>
-              <a:off x="6872748" y="1268361"/>
+              <a:off x="6725264" y="1179871"/>
               <a:ext cx="462117" cy="245807"/>
             </a:xfrm>
             <a:prstGeom prst="roundRect">
@@ -8189,7 +8309,7 @@
           </p:nvSpPr>
           <p:spPr>
             <a:xfrm>
-              <a:off x="10082981" y="2315496"/>
+              <a:off x="10220632" y="1794386"/>
               <a:ext cx="653845" cy="172065"/>
             </a:xfrm>
             <a:prstGeom prst="roundRect">
@@ -8239,6 +8359,74 @@
                 <a:latin typeface="+mn-ea"/>
                 <a:cs typeface="メイリオ" panose="020B0604030504040204" pitchFamily="50" charset="-128"/>
               </a:endParaRPr>
+            </a:p>
+          </p:txBody>
+        </p:sp>
+        <p:sp>
+          <p:nvSpPr>
+            <p:cNvPr id="18" name="TextBox 17">
+              <a:extLst>
+                <a:ext uri="{FF2B5EF4-FFF2-40B4-BE49-F238E27FC236}">
+                  <a16:creationId xmlns:a16="http://schemas.microsoft.com/office/drawing/2014/main" id="{D6A37C3E-DE5C-329D-BE66-117E6C1C406C}"/>
+                </a:ext>
+              </a:extLst>
+            </p:cNvPr>
+            <p:cNvSpPr txBox="1"/>
+            <p:nvPr/>
+          </p:nvSpPr>
+          <p:spPr>
+            <a:xfrm>
+              <a:off x="8209935" y="2536722"/>
+              <a:ext cx="3539687" cy="646331"/>
+            </a:xfrm>
+            <a:prstGeom prst="rect">
+              <a:avLst/>
+            </a:prstGeom>
+            <a:noFill/>
+          </p:spPr>
+          <p:txBody>
+            <a:bodyPr wrap="none" rtlCol="0">
+              <a:spAutoFit/>
+            </a:bodyPr>
+            <a:lstStyle/>
+            <a:p>
+              <a:pPr>
+                <a:spcBef>
+                  <a:spcPts val="400"/>
+                </a:spcBef>
+              </a:pPr>
+              <a:r>
+                <a:rPr kumimoji="1" lang="en-US" sz="1800" dirty="0">
+                  <a:solidFill>
+                    <a:schemeClr val="tx2"/>
+                  </a:solidFill>
+                  <a:latin typeface="+mn-ea"/>
+                  <a:ea typeface="+mn-ea"/>
+                  <a:cs typeface="メイリオ" panose="020B0604030504040204" pitchFamily="50" charset="-128"/>
+                </a:rPr>
+                <a:t>Note: Arduino code baud rate</a:t>
+              </a:r>
+              <a:br>
+                <a:rPr kumimoji="1" lang="en-US" sz="1800" dirty="0">
+                  <a:solidFill>
+                    <a:schemeClr val="tx2"/>
+                  </a:solidFill>
+                  <a:latin typeface="+mn-ea"/>
+                  <a:ea typeface="+mn-ea"/>
+                  <a:cs typeface="メイリオ" panose="020B0604030504040204" pitchFamily="50" charset="-128"/>
+                </a:rPr>
+              </a:br>
+              <a:r>
+                <a:rPr kumimoji="1" lang="en-US" sz="1800" dirty="0">
+                  <a:solidFill>
+                    <a:schemeClr val="tx2"/>
+                  </a:solidFill>
+                  <a:latin typeface="+mn-ea"/>
+                  <a:ea typeface="+mn-ea"/>
+                  <a:cs typeface="メイリオ" panose="020B0604030504040204" pitchFamily="50" charset="-128"/>
+                </a:rPr>
+                <a:t>currently set at 9600</a:t>
+              </a:r>
             </a:p>
           </p:txBody>
         </p:sp>
@@ -8309,10 +8497,10 @@
       </p:sp>
       <p:grpSp>
         <p:nvGrpSpPr>
-          <p:cNvPr id="22" name="Group 21">
+          <p:cNvPr id="7" name="Group 6">
             <a:extLst>
               <a:ext uri="{FF2B5EF4-FFF2-40B4-BE49-F238E27FC236}">
-                <a16:creationId xmlns:a16="http://schemas.microsoft.com/office/drawing/2014/main" id="{0FB8D146-BE66-39C6-FCB0-0A1054290227}"/>
+                <a16:creationId xmlns:a16="http://schemas.microsoft.com/office/drawing/2014/main" id="{9634B18E-F8DB-F3E7-CEFF-C3936B83DBA3}"/>
               </a:ext>
             </a:extLst>
           </p:cNvPr>
@@ -8321,18 +8509,18 @@
         </p:nvGrpSpPr>
         <p:grpSpPr>
           <a:xfrm>
-            <a:off x="432618" y="1882877"/>
-            <a:ext cx="11651227" cy="2984090"/>
-            <a:chOff x="540773" y="3662516"/>
-            <a:chExt cx="11651227" cy="2984090"/>
+            <a:off x="0" y="1686232"/>
+            <a:ext cx="12192001" cy="3772005"/>
+            <a:chOff x="0" y="1686232"/>
+            <a:chExt cx="12192001" cy="3772005"/>
           </a:xfrm>
         </p:grpSpPr>
         <p:pic>
           <p:nvPicPr>
-            <p:cNvPr id="6" name="Picture 5">
+            <p:cNvPr id="5" name="Picture 4">
               <a:extLst>
                 <a:ext uri="{FF2B5EF4-FFF2-40B4-BE49-F238E27FC236}">
-                  <a16:creationId xmlns:a16="http://schemas.microsoft.com/office/drawing/2014/main" id="{7BD6556F-F278-17C4-7FD9-639190DE1D67}"/>
+                  <a16:creationId xmlns:a16="http://schemas.microsoft.com/office/drawing/2014/main" id="{380AE12E-7E03-2B74-D97C-6B664C3A3C33}"/>
                 </a:ext>
               </a:extLst>
             </p:cNvPr>
@@ -8342,21 +8530,15 @@
             <p:nvPr/>
           </p:nvPicPr>
           <p:blipFill>
-            <a:blip r:embed="rId2" cstate="email">
-              <a:extLst>
-                <a:ext uri="{28A0092B-C50C-407E-A947-70E740481C1C}">
-                  <a14:useLocalDpi xmlns:a14="http://schemas.microsoft.com/office/drawing/2010/main"/>
-                </a:ext>
-              </a:extLst>
-            </a:blip>
+            <a:blip r:embed="rId2"/>
             <a:stretch>
               <a:fillRect/>
             </a:stretch>
           </p:blipFill>
           <p:spPr>
             <a:xfrm>
-              <a:off x="3246558" y="4043660"/>
-              <a:ext cx="5768691" cy="2602946"/>
+              <a:off x="2619075" y="2046933"/>
+              <a:ext cx="6554423" cy="3411304"/>
             </a:xfrm>
             <a:prstGeom prst="rect">
               <a:avLst/>
@@ -8377,7 +8559,7 @@
           </p:nvSpPr>
           <p:spPr>
             <a:xfrm>
-              <a:off x="3259393" y="3662516"/>
+              <a:off x="2512143" y="1686232"/>
               <a:ext cx="1970026" cy="369332"/>
             </a:xfrm>
             <a:prstGeom prst="rect">
@@ -8431,7 +8613,7 @@
           </p:nvSpPr>
           <p:spPr>
             <a:xfrm>
-              <a:off x="540773" y="5279923"/>
+              <a:off x="0" y="3500284"/>
               <a:ext cx="2664542" cy="1251625"/>
             </a:xfrm>
             <a:prstGeom prst="rect">
@@ -8509,7 +8691,7 @@
           </p:nvCxnSpPr>
           <p:spPr>
             <a:xfrm>
-              <a:off x="2910348" y="6174659"/>
+              <a:off x="2458066" y="3982065"/>
               <a:ext cx="855407" cy="0"/>
             </a:xfrm>
             <a:prstGeom prst="straightConnector1">
@@ -8551,7 +8733,7 @@
           </p:nvSpPr>
           <p:spPr>
             <a:xfrm>
-              <a:off x="8524567" y="5201265"/>
+              <a:off x="8524568" y="3578942"/>
               <a:ext cx="806246" cy="1091379"/>
             </a:xfrm>
             <a:prstGeom prst="rightBrace">
@@ -8603,7 +8785,7 @@
           </p:nvSpPr>
           <p:spPr>
             <a:xfrm>
-              <a:off x="9527458" y="5009535"/>
+              <a:off x="9527459" y="3387212"/>
               <a:ext cx="2664542" cy="1477328"/>
             </a:xfrm>
             <a:prstGeom prst="rect">
@@ -8703,7 +8885,7 @@
           </p:nvSpPr>
           <p:spPr>
             <a:xfrm>
-              <a:off x="3254477" y="4247535"/>
+              <a:off x="2713704" y="2467896"/>
               <a:ext cx="589935" cy="255639"/>
             </a:xfrm>
             <a:prstGeom prst="roundRect">
@@ -8793,6 +8975,66 @@
           <a:chExt cx="0" cy="0"/>
         </a:xfrm>
       </p:grpSpPr>
+      <p:pic>
+        <p:nvPicPr>
+          <p:cNvPr id="10" name="Picture 9">
+            <a:extLst>
+              <a:ext uri="{FF2B5EF4-FFF2-40B4-BE49-F238E27FC236}">
+                <a16:creationId xmlns:a16="http://schemas.microsoft.com/office/drawing/2014/main" id="{5ED0079E-1CAC-E276-2D02-8205761130D1}"/>
+              </a:ext>
+            </a:extLst>
+          </p:cNvPr>
+          <p:cNvPicPr>
+            <a:picLocks noChangeAspect="1"/>
+          </p:cNvPicPr>
+          <p:nvPr/>
+        </p:nvPicPr>
+        <p:blipFill>
+          <a:blip r:embed="rId2"/>
+          <a:stretch>
+            <a:fillRect/>
+          </a:stretch>
+        </p:blipFill>
+        <p:spPr>
+          <a:xfrm>
+            <a:off x="702703" y="848248"/>
+            <a:ext cx="5796420" cy="2966487"/>
+          </a:xfrm>
+          <a:prstGeom prst="rect">
+            <a:avLst/>
+          </a:prstGeom>
+        </p:spPr>
+      </p:pic>
+      <p:pic>
+        <p:nvPicPr>
+          <p:cNvPr id="6" name="Picture 5">
+            <a:extLst>
+              <a:ext uri="{FF2B5EF4-FFF2-40B4-BE49-F238E27FC236}">
+                <a16:creationId xmlns:a16="http://schemas.microsoft.com/office/drawing/2014/main" id="{F86E19F3-C24D-8ABA-168C-6E4844D64370}"/>
+              </a:ext>
+            </a:extLst>
+          </p:cNvPr>
+          <p:cNvPicPr>
+            <a:picLocks noChangeAspect="1"/>
+          </p:cNvPicPr>
+          <p:nvPr/>
+        </p:nvPicPr>
+        <p:blipFill>
+          <a:blip r:embed="rId3"/>
+          <a:stretch>
+            <a:fillRect/>
+          </a:stretch>
+        </p:blipFill>
+        <p:spPr>
+          <a:xfrm>
+            <a:off x="745207" y="3906195"/>
+            <a:ext cx="5753915" cy="2951805"/>
+          </a:xfrm>
+          <a:prstGeom prst="rect">
+            <a:avLst/>
+          </a:prstGeom>
+        </p:spPr>
+      </p:pic>
       <p:sp>
         <p:nvSpPr>
           <p:cNvPr id="2" name="Title 1">
@@ -8821,723 +9063,644 @@
           </a:p>
         </p:txBody>
       </p:sp>
-      <p:grpSp>
-        <p:nvGrpSpPr>
-          <p:cNvPr id="29" name="Group 28">
+      <p:sp>
+        <p:nvSpPr>
+          <p:cNvPr id="7" name="TextBox 6">
             <a:extLst>
               <a:ext uri="{FF2B5EF4-FFF2-40B4-BE49-F238E27FC236}">
-                <a16:creationId xmlns:a16="http://schemas.microsoft.com/office/drawing/2014/main" id="{D720BCC5-E9BF-DEAF-A5A2-09D1BC3F5233}"/>
+                <a16:creationId xmlns:a16="http://schemas.microsoft.com/office/drawing/2014/main" id="{0D06B1EE-082A-209E-9716-1D4B5E60F804}"/>
               </a:ext>
             </a:extLst>
           </p:cNvPr>
-          <p:cNvGrpSpPr/>
+          <p:cNvSpPr txBox="1"/>
           <p:nvPr/>
-        </p:nvGrpSpPr>
-        <p:grpSpPr>
+        </p:nvSpPr>
+        <p:spPr>
           <a:xfrm>
             <a:off x="658761" y="757084"/>
-            <a:ext cx="11208775" cy="5919018"/>
-            <a:chOff x="658761" y="757084"/>
-            <a:chExt cx="11208775" cy="5919018"/>
+            <a:ext cx="1188339" cy="369332"/>
           </a:xfrm>
-        </p:grpSpPr>
-        <p:sp>
-          <p:nvSpPr>
-            <p:cNvPr id="7" name="TextBox 6">
-              <a:extLst>
-                <a:ext uri="{FF2B5EF4-FFF2-40B4-BE49-F238E27FC236}">
-                  <a16:creationId xmlns:a16="http://schemas.microsoft.com/office/drawing/2014/main" id="{0D06B1EE-082A-209E-9716-1D4B5E60F804}"/>
-                </a:ext>
-              </a:extLst>
-            </p:cNvPr>
-            <p:cNvSpPr txBox="1"/>
-            <p:nvPr/>
-          </p:nvSpPr>
-          <p:spPr>
-            <a:xfrm>
-              <a:off x="658761" y="757084"/>
-              <a:ext cx="1188339" cy="369332"/>
-            </a:xfrm>
-            <a:prstGeom prst="rect">
+          <a:prstGeom prst="rect">
+            <a:avLst/>
+          </a:prstGeom>
+          <a:noFill/>
+        </p:spPr>
+        <p:txBody>
+          <a:bodyPr wrap="none" rtlCol="0">
+            <a:spAutoFit/>
+          </a:bodyPr>
+          <a:lstStyle/>
+          <a:p>
+            <a:pPr>
+              <a:spcBef>
+                <a:spcPts val="400"/>
+              </a:spcBef>
+            </a:pPr>
+            <a:r>
+              <a:rPr lang="en-US" dirty="0">
+                <a:solidFill>
+                  <a:schemeClr val="tx2"/>
+                </a:solidFill>
+                <a:latin typeface="+mn-ea"/>
+                <a:cs typeface="メイリオ" panose="020B0604030504040204" pitchFamily="50" charset="-128"/>
+              </a:rPr>
+              <a:t>Main Tab</a:t>
+            </a:r>
+            <a:endParaRPr kumimoji="1" lang="en-US" sz="1800" dirty="0">
+              <a:solidFill>
+                <a:schemeClr val="tx2"/>
+              </a:solidFill>
+              <a:latin typeface="+mn-ea"/>
+              <a:ea typeface="+mn-ea"/>
+              <a:cs typeface="メイリオ" panose="020B0604030504040204" pitchFamily="50" charset="-128"/>
+            </a:endParaRPr>
+          </a:p>
+        </p:txBody>
+      </p:sp>
+      <p:sp>
+        <p:nvSpPr>
+          <p:cNvPr id="5" name="Rectangle 4">
+            <a:extLst>
+              <a:ext uri="{FF2B5EF4-FFF2-40B4-BE49-F238E27FC236}">
+                <a16:creationId xmlns:a16="http://schemas.microsoft.com/office/drawing/2014/main" id="{19EE73C8-D819-8B55-60C8-8DB89892D618}"/>
+              </a:ext>
+            </a:extLst>
+          </p:cNvPr>
+          <p:cNvSpPr/>
+          <p:nvPr/>
+        </p:nvSpPr>
+        <p:spPr>
+          <a:xfrm>
+            <a:off x="2212258" y="2054943"/>
+            <a:ext cx="3913239" cy="294968"/>
+          </a:xfrm>
+          <a:prstGeom prst="rect">
+            <a:avLst/>
+          </a:prstGeom>
+          <a:noFill/>
+          <a:ln w="38100">
+            <a:solidFill>
+              <a:srgbClr val="00B050"/>
+            </a:solidFill>
+          </a:ln>
+        </p:spPr>
+        <p:style>
+          <a:lnRef idx="2">
+            <a:schemeClr val="accent1">
+              <a:shade val="50000"/>
+            </a:schemeClr>
+          </a:lnRef>
+          <a:fillRef idx="1">
+            <a:schemeClr val="accent1"/>
+          </a:fillRef>
+          <a:effectRef idx="0">
+            <a:schemeClr val="accent1"/>
+          </a:effectRef>
+          <a:fontRef idx="minor">
+            <a:schemeClr val="lt1"/>
+          </a:fontRef>
+        </p:style>
+        <p:txBody>
+          <a:bodyPr rot="0" spcFirstLastPara="0" vertOverflow="overflow" horzOverflow="overflow" vert="horz" wrap="square" lIns="91440" tIns="45720" rIns="91440" bIns="45720" numCol="1" spcCol="0" rtlCol="0" fromWordArt="0" anchor="t" anchorCtr="0" forceAA="0" compatLnSpc="1">
+            <a:prstTxWarp prst="textNoShape">
               <a:avLst/>
-            </a:prstGeom>
-            <a:noFill/>
-          </p:spPr>
-          <p:txBody>
-            <a:bodyPr wrap="none" rtlCol="0">
-              <a:spAutoFit/>
-            </a:bodyPr>
-            <a:lstStyle/>
-            <a:p>
-              <a:pPr>
-                <a:spcBef>
-                  <a:spcPts val="400"/>
-                </a:spcBef>
-              </a:pPr>
-              <a:r>
-                <a:rPr lang="en-US" dirty="0">
-                  <a:solidFill>
-                    <a:schemeClr val="tx2"/>
-                  </a:solidFill>
-                  <a:latin typeface="+mn-ea"/>
-                  <a:cs typeface="メイリオ" panose="020B0604030504040204" pitchFamily="50" charset="-128"/>
-                </a:rPr>
-                <a:t>Main Tab</a:t>
-              </a:r>
-              <a:endParaRPr kumimoji="1" lang="en-US" sz="1800" dirty="0">
+            </a:prstTxWarp>
+            <a:noAutofit/>
+          </a:bodyPr>
+          <a:lstStyle/>
+          <a:p>
+            <a:pPr algn="ctr">
+              <a:spcBef>
+                <a:spcPts val="400"/>
+              </a:spcBef>
+            </a:pPr>
+            <a:endParaRPr kumimoji="1" lang="en-US" sz="1400" dirty="0">
+              <a:solidFill>
+                <a:schemeClr val="tx2"/>
+              </a:solidFill>
+              <a:latin typeface="+mn-ea"/>
+              <a:cs typeface="メイリオ" panose="020B0604030504040204" pitchFamily="50" charset="-128"/>
+            </a:endParaRPr>
+          </a:p>
+        </p:txBody>
+      </p:sp>
+      <p:sp>
+        <p:nvSpPr>
+          <p:cNvPr id="11" name="TextBox 10">
+            <a:extLst>
+              <a:ext uri="{FF2B5EF4-FFF2-40B4-BE49-F238E27FC236}">
+                <a16:creationId xmlns:a16="http://schemas.microsoft.com/office/drawing/2014/main" id="{2A0C8B57-675C-1DB0-7662-70EDC635D666}"/>
+              </a:ext>
+            </a:extLst>
+          </p:cNvPr>
+          <p:cNvSpPr txBox="1"/>
+          <p:nvPr/>
+        </p:nvSpPr>
+        <p:spPr>
+          <a:xfrm>
+            <a:off x="742335" y="3908322"/>
+            <a:ext cx="1246047" cy="369332"/>
+          </a:xfrm>
+          <a:prstGeom prst="rect">
+            <a:avLst/>
+          </a:prstGeom>
+          <a:noFill/>
+        </p:spPr>
+        <p:txBody>
+          <a:bodyPr wrap="none" rtlCol="0">
+            <a:spAutoFit/>
+          </a:bodyPr>
+          <a:lstStyle/>
+          <a:p>
+            <a:pPr>
+              <a:spcBef>
+                <a:spcPts val="400"/>
+              </a:spcBef>
+            </a:pPr>
+            <a:r>
+              <a:rPr lang="en-US" dirty="0">
+                <a:solidFill>
+                  <a:schemeClr val="tx2"/>
+                </a:solidFill>
+                <a:latin typeface="+mn-ea"/>
+                <a:cs typeface="メイリオ" panose="020B0604030504040204" pitchFamily="50" charset="-128"/>
+              </a:rPr>
+              <a:t>MISC Tab</a:t>
+            </a:r>
+            <a:endParaRPr kumimoji="1" lang="en-US" sz="1800" dirty="0">
+              <a:solidFill>
+                <a:schemeClr val="tx2"/>
+              </a:solidFill>
+              <a:latin typeface="+mn-ea"/>
+              <a:ea typeface="+mn-ea"/>
+              <a:cs typeface="メイリオ" panose="020B0604030504040204" pitchFamily="50" charset="-128"/>
+            </a:endParaRPr>
+          </a:p>
+        </p:txBody>
+      </p:sp>
+      <p:sp>
+        <p:nvSpPr>
+          <p:cNvPr id="13" name="Rectangle 12">
+            <a:extLst>
+              <a:ext uri="{FF2B5EF4-FFF2-40B4-BE49-F238E27FC236}">
+                <a16:creationId xmlns:a16="http://schemas.microsoft.com/office/drawing/2014/main" id="{2E1D9537-265B-1388-9A22-9F99FDC70F46}"/>
+              </a:ext>
+            </a:extLst>
+          </p:cNvPr>
+          <p:cNvSpPr/>
+          <p:nvPr/>
+        </p:nvSpPr>
+        <p:spPr>
+          <a:xfrm>
+            <a:off x="1174955" y="4989871"/>
+            <a:ext cx="4272116" cy="294968"/>
+          </a:xfrm>
+          <a:prstGeom prst="rect">
+            <a:avLst/>
+          </a:prstGeom>
+          <a:noFill/>
+          <a:ln w="38100">
+            <a:solidFill>
+              <a:srgbClr val="00B050"/>
+            </a:solidFill>
+          </a:ln>
+        </p:spPr>
+        <p:style>
+          <a:lnRef idx="2">
+            <a:schemeClr val="accent1">
+              <a:shade val="50000"/>
+            </a:schemeClr>
+          </a:lnRef>
+          <a:fillRef idx="1">
+            <a:schemeClr val="accent1"/>
+          </a:fillRef>
+          <a:effectRef idx="0">
+            <a:schemeClr val="accent1"/>
+          </a:effectRef>
+          <a:fontRef idx="minor">
+            <a:schemeClr val="lt1"/>
+          </a:fontRef>
+        </p:style>
+        <p:txBody>
+          <a:bodyPr rot="0" spcFirstLastPara="0" vertOverflow="overflow" horzOverflow="overflow" vert="horz" wrap="square" lIns="91440" tIns="45720" rIns="91440" bIns="45720" numCol="1" spcCol="0" rtlCol="0" fromWordArt="0" anchor="t" anchorCtr="0" forceAA="0" compatLnSpc="1">
+            <a:prstTxWarp prst="textNoShape">
+              <a:avLst/>
+            </a:prstTxWarp>
+            <a:noAutofit/>
+          </a:bodyPr>
+          <a:lstStyle/>
+          <a:p>
+            <a:pPr algn="ctr">
+              <a:spcBef>
+                <a:spcPts val="400"/>
+              </a:spcBef>
+            </a:pPr>
+            <a:endParaRPr kumimoji="1" lang="en-US" sz="1400" dirty="0">
+              <a:solidFill>
+                <a:schemeClr val="tx2"/>
+              </a:solidFill>
+              <a:latin typeface="+mn-ea"/>
+              <a:cs typeface="メイリオ" panose="020B0604030504040204" pitchFamily="50" charset="-128"/>
+            </a:endParaRPr>
+          </a:p>
+        </p:txBody>
+      </p:sp>
+      <p:sp>
+        <p:nvSpPr>
+          <p:cNvPr id="15" name="Rectangle 14">
+            <a:extLst>
+              <a:ext uri="{FF2B5EF4-FFF2-40B4-BE49-F238E27FC236}">
+                <a16:creationId xmlns:a16="http://schemas.microsoft.com/office/drawing/2014/main" id="{8F92EF18-82BF-1E5B-46AD-90CE9BBEA5A7}"/>
+              </a:ext>
+            </a:extLst>
+          </p:cNvPr>
+          <p:cNvSpPr/>
+          <p:nvPr/>
+        </p:nvSpPr>
+        <p:spPr>
+          <a:xfrm>
+            <a:off x="1160207" y="5624052"/>
+            <a:ext cx="4272116" cy="294968"/>
+          </a:xfrm>
+          <a:prstGeom prst="rect">
+            <a:avLst/>
+          </a:prstGeom>
+          <a:noFill/>
+          <a:ln w="38100">
+            <a:solidFill>
+              <a:srgbClr val="FFC000"/>
+            </a:solidFill>
+          </a:ln>
+        </p:spPr>
+        <p:style>
+          <a:lnRef idx="2">
+            <a:schemeClr val="accent1">
+              <a:shade val="50000"/>
+            </a:schemeClr>
+          </a:lnRef>
+          <a:fillRef idx="1">
+            <a:schemeClr val="accent1"/>
+          </a:fillRef>
+          <a:effectRef idx="0">
+            <a:schemeClr val="accent1"/>
+          </a:effectRef>
+          <a:fontRef idx="minor">
+            <a:schemeClr val="lt1"/>
+          </a:fontRef>
+        </p:style>
+        <p:txBody>
+          <a:bodyPr rot="0" spcFirstLastPara="0" vertOverflow="overflow" horzOverflow="overflow" vert="horz" wrap="square" lIns="91440" tIns="45720" rIns="91440" bIns="45720" numCol="1" spcCol="0" rtlCol="0" fromWordArt="0" anchor="t" anchorCtr="0" forceAA="0" compatLnSpc="1">
+            <a:prstTxWarp prst="textNoShape">
+              <a:avLst/>
+            </a:prstTxWarp>
+            <a:noAutofit/>
+          </a:bodyPr>
+          <a:lstStyle/>
+          <a:p>
+            <a:pPr algn="ctr">
+              <a:spcBef>
+                <a:spcPts val="400"/>
+              </a:spcBef>
+            </a:pPr>
+            <a:endParaRPr kumimoji="1" lang="en-US" sz="1400" dirty="0">
+              <a:solidFill>
+                <a:schemeClr val="tx2"/>
+              </a:solidFill>
+              <a:latin typeface="+mn-ea"/>
+              <a:cs typeface="メイリオ" panose="020B0604030504040204" pitchFamily="50" charset="-128"/>
+            </a:endParaRPr>
+          </a:p>
+        </p:txBody>
+      </p:sp>
+      <p:sp>
+        <p:nvSpPr>
+          <p:cNvPr id="17" name="Rectangle 16">
+            <a:extLst>
+              <a:ext uri="{FF2B5EF4-FFF2-40B4-BE49-F238E27FC236}">
+                <a16:creationId xmlns:a16="http://schemas.microsoft.com/office/drawing/2014/main" id="{AEFE8A87-C3D1-80C9-269E-2BE37DF4FB9F}"/>
+              </a:ext>
+            </a:extLst>
+          </p:cNvPr>
+          <p:cNvSpPr/>
+          <p:nvPr/>
+        </p:nvSpPr>
+        <p:spPr>
+          <a:xfrm>
+            <a:off x="2187679" y="2993923"/>
+            <a:ext cx="3878825" cy="294968"/>
+          </a:xfrm>
+          <a:prstGeom prst="rect">
+            <a:avLst/>
+          </a:prstGeom>
+          <a:noFill/>
+          <a:ln w="38100">
+            <a:solidFill>
+              <a:srgbClr val="FFC000"/>
+            </a:solidFill>
+          </a:ln>
+        </p:spPr>
+        <p:style>
+          <a:lnRef idx="2">
+            <a:schemeClr val="accent1">
+              <a:shade val="50000"/>
+            </a:schemeClr>
+          </a:lnRef>
+          <a:fillRef idx="1">
+            <a:schemeClr val="accent1"/>
+          </a:fillRef>
+          <a:effectRef idx="0">
+            <a:schemeClr val="accent1"/>
+          </a:effectRef>
+          <a:fontRef idx="minor">
+            <a:schemeClr val="lt1"/>
+          </a:fontRef>
+        </p:style>
+        <p:txBody>
+          <a:bodyPr rot="0" spcFirstLastPara="0" vertOverflow="overflow" horzOverflow="overflow" vert="horz" wrap="square" lIns="91440" tIns="45720" rIns="91440" bIns="45720" numCol="1" spcCol="0" rtlCol="0" fromWordArt="0" anchor="t" anchorCtr="0" forceAA="0" compatLnSpc="1">
+            <a:prstTxWarp prst="textNoShape">
+              <a:avLst/>
+            </a:prstTxWarp>
+            <a:noAutofit/>
+          </a:bodyPr>
+          <a:lstStyle/>
+          <a:p>
+            <a:pPr algn="ctr">
+              <a:spcBef>
+                <a:spcPts val="400"/>
+              </a:spcBef>
+            </a:pPr>
+            <a:endParaRPr kumimoji="1" lang="en-US" sz="1400" dirty="0">
+              <a:solidFill>
+                <a:schemeClr val="tx2"/>
+              </a:solidFill>
+              <a:latin typeface="+mn-ea"/>
+              <a:cs typeface="メイリオ" panose="020B0604030504040204" pitchFamily="50" charset="-128"/>
+            </a:endParaRPr>
+          </a:p>
+        </p:txBody>
+      </p:sp>
+      <p:sp>
+        <p:nvSpPr>
+          <p:cNvPr id="18" name="TextBox 17">
+            <a:extLst>
+              <a:ext uri="{FF2B5EF4-FFF2-40B4-BE49-F238E27FC236}">
+                <a16:creationId xmlns:a16="http://schemas.microsoft.com/office/drawing/2014/main" id="{6BBC815C-2AC7-A202-CF1A-A08C93633EC4}"/>
+              </a:ext>
+            </a:extLst>
+          </p:cNvPr>
+          <p:cNvSpPr txBox="1"/>
+          <p:nvPr/>
+        </p:nvSpPr>
+        <p:spPr>
+          <a:xfrm>
+            <a:off x="7295537" y="953729"/>
+            <a:ext cx="4237702" cy="5611793"/>
+          </a:xfrm>
+          <a:prstGeom prst="rect">
+            <a:avLst/>
+          </a:prstGeom>
+          <a:noFill/>
+        </p:spPr>
+        <p:txBody>
+          <a:bodyPr wrap="square" rtlCol="0">
+            <a:spAutoFit/>
+          </a:bodyPr>
+          <a:lstStyle/>
+          <a:p>
+            <a:pPr>
+              <a:spcBef>
+                <a:spcPts val="400"/>
+              </a:spcBef>
+            </a:pPr>
+            <a:r>
+              <a:rPr kumimoji="1" lang="en-US" sz="1800" dirty="0">
                 <a:solidFill>
                   <a:schemeClr val="tx2"/>
                 </a:solidFill>
                 <a:latin typeface="+mn-ea"/>
                 <a:ea typeface="+mn-ea"/>
                 <a:cs typeface="メイリオ" panose="020B0604030504040204" pitchFamily="50" charset="-128"/>
-              </a:endParaRPr>
-            </a:p>
-          </p:txBody>
-        </p:sp>
-        <p:pic>
-          <p:nvPicPr>
-            <p:cNvPr id="4" name="Picture 3">
-              <a:extLst>
-                <a:ext uri="{FF2B5EF4-FFF2-40B4-BE49-F238E27FC236}">
-                  <a16:creationId xmlns:a16="http://schemas.microsoft.com/office/drawing/2014/main" id="{C954ECB2-F50B-C6C0-E8E3-29D536AA1A0F}"/>
-                </a:ext>
-              </a:extLst>
-            </p:cNvPr>
-            <p:cNvPicPr>
-              <a:picLocks noChangeAspect="1"/>
-            </p:cNvPicPr>
-            <p:nvPr/>
-          </p:nvPicPr>
-          <p:blipFill>
-            <a:blip r:embed="rId2" cstate="email">
-              <a:extLst>
-                <a:ext uri="{28A0092B-C50C-407E-A947-70E740481C1C}">
-                  <a14:useLocalDpi xmlns:a14="http://schemas.microsoft.com/office/drawing/2010/main"/>
-                </a:ext>
-              </a:extLst>
-            </a:blip>
-            <a:stretch>
-              <a:fillRect/>
-            </a:stretch>
-          </p:blipFill>
-          <p:spPr>
-            <a:xfrm>
-              <a:off x="731587" y="1126011"/>
-              <a:ext cx="5913270" cy="2679073"/>
-            </a:xfrm>
-            <a:prstGeom prst="rect">
-              <a:avLst/>
-            </a:prstGeom>
-          </p:spPr>
-        </p:pic>
-        <p:sp>
-          <p:nvSpPr>
-            <p:cNvPr id="5" name="Rectangle 4">
-              <a:extLst>
-                <a:ext uri="{FF2B5EF4-FFF2-40B4-BE49-F238E27FC236}">
-                  <a16:creationId xmlns:a16="http://schemas.microsoft.com/office/drawing/2014/main" id="{19EE73C8-D819-8B55-60C8-8DB89892D618}"/>
-                </a:ext>
-              </a:extLst>
-            </p:cNvPr>
-            <p:cNvSpPr/>
-            <p:nvPr/>
-          </p:nvSpPr>
-          <p:spPr>
-            <a:xfrm>
-              <a:off x="2222090" y="2251588"/>
-              <a:ext cx="3913239" cy="294968"/>
-            </a:xfrm>
-            <a:prstGeom prst="rect">
-              <a:avLst/>
-            </a:prstGeom>
-            <a:noFill/>
-            <a:ln w="38100">
-              <a:solidFill>
-                <a:srgbClr val="00B050"/>
-              </a:solidFill>
-            </a:ln>
-          </p:spPr>
-          <p:style>
-            <a:lnRef idx="2">
-              <a:schemeClr val="accent1">
-                <a:shade val="50000"/>
-              </a:schemeClr>
-            </a:lnRef>
-            <a:fillRef idx="1">
-              <a:schemeClr val="accent1"/>
-            </a:fillRef>
-            <a:effectRef idx="0">
-              <a:schemeClr val="accent1"/>
-            </a:effectRef>
-            <a:fontRef idx="minor">
-              <a:schemeClr val="lt1"/>
-            </a:fontRef>
-          </p:style>
-          <p:txBody>
-            <a:bodyPr rot="0" spcFirstLastPara="0" vertOverflow="overflow" horzOverflow="overflow" vert="horz" wrap="square" lIns="91440" tIns="45720" rIns="91440" bIns="45720" numCol="1" spcCol="0" rtlCol="0" fromWordArt="0" anchor="t" anchorCtr="0" forceAA="0" compatLnSpc="1">
-              <a:prstTxWarp prst="textNoShape">
-                <a:avLst/>
-              </a:prstTxWarp>
-              <a:noAutofit/>
-            </a:bodyPr>
-            <a:lstStyle/>
-            <a:p>
-              <a:pPr algn="ctr">
-                <a:spcBef>
-                  <a:spcPts val="400"/>
-                </a:spcBef>
-              </a:pPr>
-              <a:endParaRPr kumimoji="1" lang="en-US" sz="1400" dirty="0">
+              </a:rPr>
+              <a:t>The MISC Tab has a multiplier for the Flow Rate, and number of Poles for the RPM.</a:t>
+            </a:r>
+          </a:p>
+          <a:p>
+            <a:pPr>
+              <a:spcBef>
+                <a:spcPts val="400"/>
+              </a:spcBef>
+            </a:pPr>
+            <a:r>
+              <a:rPr lang="en-US" dirty="0">
                 <a:solidFill>
                   <a:schemeClr val="tx2"/>
                 </a:solidFill>
                 <a:latin typeface="+mn-ea"/>
                 <a:cs typeface="メイリオ" panose="020B0604030504040204" pitchFamily="50" charset="-128"/>
-              </a:endParaRPr>
-            </a:p>
-          </p:txBody>
-        </p:sp>
-        <p:pic>
-          <p:nvPicPr>
-            <p:cNvPr id="9" name="Picture 8">
-              <a:extLst>
-                <a:ext uri="{FF2B5EF4-FFF2-40B4-BE49-F238E27FC236}">
-                  <a16:creationId xmlns:a16="http://schemas.microsoft.com/office/drawing/2014/main" id="{73699B15-8D9D-1C1B-5CB6-175C4CB81992}"/>
-                </a:ext>
-              </a:extLst>
-            </p:cNvPr>
-            <p:cNvPicPr>
-              <a:picLocks noChangeAspect="1"/>
-            </p:cNvPicPr>
-            <p:nvPr/>
-          </p:nvPicPr>
-          <p:blipFill>
-            <a:blip r:embed="rId3" cstate="email">
-              <a:extLst>
-                <a:ext uri="{28A0092B-C50C-407E-A947-70E740481C1C}">
-                  <a14:useLocalDpi xmlns:a14="http://schemas.microsoft.com/office/drawing/2010/main"/>
-                </a:ext>
-              </a:extLst>
-            </a:blip>
-            <a:stretch>
-              <a:fillRect/>
-            </a:stretch>
-          </p:blipFill>
-          <p:spPr>
-            <a:xfrm>
-              <a:off x="725236" y="4055715"/>
-              <a:ext cx="5824664" cy="2620387"/>
-            </a:xfrm>
-            <a:prstGeom prst="rect">
-              <a:avLst/>
-            </a:prstGeom>
-          </p:spPr>
-        </p:pic>
-        <p:sp>
-          <p:nvSpPr>
-            <p:cNvPr id="11" name="TextBox 10">
-              <a:extLst>
-                <a:ext uri="{FF2B5EF4-FFF2-40B4-BE49-F238E27FC236}">
-                  <a16:creationId xmlns:a16="http://schemas.microsoft.com/office/drawing/2014/main" id="{2A0C8B57-675C-1DB0-7662-70EDC635D666}"/>
-                </a:ext>
-              </a:extLst>
-            </p:cNvPr>
-            <p:cNvSpPr txBox="1"/>
-            <p:nvPr/>
-          </p:nvSpPr>
-          <p:spPr>
-            <a:xfrm>
-              <a:off x="742335" y="3908322"/>
-              <a:ext cx="1246047" cy="369332"/>
-            </a:xfrm>
-            <a:prstGeom prst="rect">
-              <a:avLst/>
-            </a:prstGeom>
-            <a:noFill/>
-          </p:spPr>
-          <p:txBody>
-            <a:bodyPr wrap="none" rtlCol="0">
-              <a:spAutoFit/>
-            </a:bodyPr>
-            <a:lstStyle/>
-            <a:p>
-              <a:pPr>
-                <a:spcBef>
-                  <a:spcPts val="400"/>
-                </a:spcBef>
-              </a:pPr>
-              <a:r>
-                <a:rPr lang="en-US" dirty="0">
-                  <a:solidFill>
-                    <a:schemeClr val="tx2"/>
-                  </a:solidFill>
-                  <a:latin typeface="+mn-ea"/>
-                  <a:cs typeface="メイリオ" panose="020B0604030504040204" pitchFamily="50" charset="-128"/>
-                </a:rPr>
-                <a:t>MISC Tab</a:t>
-              </a:r>
-              <a:endParaRPr kumimoji="1" lang="en-US" sz="1800" dirty="0">
+              </a:rPr>
+              <a:t>This is mainly used during initial development.</a:t>
+            </a:r>
+          </a:p>
+          <a:p>
+            <a:pPr>
+              <a:spcBef>
+                <a:spcPts val="400"/>
+              </a:spcBef>
+            </a:pPr>
+            <a:endParaRPr kumimoji="1" lang="en-US" sz="1800" dirty="0">
+              <a:solidFill>
+                <a:schemeClr val="tx2"/>
+              </a:solidFill>
+              <a:latin typeface="+mn-ea"/>
+              <a:ea typeface="+mn-ea"/>
+              <a:cs typeface="メイリオ" panose="020B0604030504040204" pitchFamily="50" charset="-128"/>
+            </a:endParaRPr>
+          </a:p>
+          <a:p>
+            <a:pPr>
+              <a:spcBef>
+                <a:spcPts val="400"/>
+              </a:spcBef>
+            </a:pPr>
+            <a:r>
+              <a:rPr lang="en-US" dirty="0">
+                <a:solidFill>
+                  <a:schemeClr val="tx2"/>
+                </a:solidFill>
+                <a:latin typeface="+mn-ea"/>
+                <a:cs typeface="メイリオ" panose="020B0604030504040204" pitchFamily="50" charset="-128"/>
+              </a:rPr>
+              <a:t>The value reported on the Flow Rate in the Main Tab are pulse counted from Arduino and multiplied by the ratio in the MISC Tab. Similarly the RPM is adjusted based on the entered number of Poles.</a:t>
+            </a:r>
+          </a:p>
+          <a:p>
+            <a:pPr>
+              <a:spcBef>
+                <a:spcPts val="400"/>
+              </a:spcBef>
+            </a:pPr>
+            <a:endParaRPr lang="en-US" dirty="0">
+              <a:solidFill>
+                <a:schemeClr val="tx2"/>
+              </a:solidFill>
+              <a:latin typeface="+mn-ea"/>
+              <a:cs typeface="メイリオ" panose="020B0604030504040204" pitchFamily="50" charset="-128"/>
+            </a:endParaRPr>
+          </a:p>
+          <a:p>
+            <a:pPr>
+              <a:spcBef>
+                <a:spcPts val="400"/>
+              </a:spcBef>
+            </a:pPr>
+            <a:r>
+              <a:rPr kumimoji="1" lang="en-US" sz="1800" dirty="0">
                 <a:solidFill>
                   <a:schemeClr val="tx2"/>
                 </a:solidFill>
                 <a:latin typeface="+mn-ea"/>
                 <a:ea typeface="+mn-ea"/>
                 <a:cs typeface="メイリオ" panose="020B0604030504040204" pitchFamily="50" charset="-128"/>
-              </a:endParaRPr>
-            </a:p>
-          </p:txBody>
-        </p:sp>
-        <p:sp>
-          <p:nvSpPr>
-            <p:cNvPr id="13" name="Rectangle 12">
-              <a:extLst>
-                <a:ext uri="{FF2B5EF4-FFF2-40B4-BE49-F238E27FC236}">
-                  <a16:creationId xmlns:a16="http://schemas.microsoft.com/office/drawing/2014/main" id="{2E1D9537-265B-1388-9A22-9F99FDC70F46}"/>
-                </a:ext>
-              </a:extLst>
-            </p:cNvPr>
-            <p:cNvSpPr/>
-            <p:nvPr/>
-          </p:nvSpPr>
-          <p:spPr>
-            <a:xfrm>
-              <a:off x="1184787" y="5058697"/>
-              <a:ext cx="4272116" cy="294968"/>
-            </a:xfrm>
-            <a:prstGeom prst="rect">
+              </a:rPr>
+              <a:t>Change the number in MISC Tab, to adjust accordingly to get the correct conversion from pulses (Hz) to L/min and RPM shown in Main Tab</a:t>
+            </a:r>
+          </a:p>
+        </p:txBody>
+      </p:sp>
+      <p:sp>
+        <p:nvSpPr>
+          <p:cNvPr id="27" name="Rectangle: Rounded Corners 26">
+            <a:extLst>
+              <a:ext uri="{FF2B5EF4-FFF2-40B4-BE49-F238E27FC236}">
+                <a16:creationId xmlns:a16="http://schemas.microsoft.com/office/drawing/2014/main" id="{3CAB54F4-F106-0E19-5DC9-5E03548FEE89}"/>
+              </a:ext>
+            </a:extLst>
+          </p:cNvPr>
+          <p:cNvSpPr/>
+          <p:nvPr/>
+        </p:nvSpPr>
+        <p:spPr>
+          <a:xfrm>
+            <a:off x="766916" y="1209368"/>
+            <a:ext cx="589935" cy="255639"/>
+          </a:xfrm>
+          <a:prstGeom prst="roundRect">
+            <a:avLst/>
+          </a:prstGeom>
+          <a:noFill/>
+          <a:ln w="57150">
+            <a:solidFill>
+              <a:srgbClr val="FF0000"/>
+            </a:solidFill>
+          </a:ln>
+        </p:spPr>
+        <p:style>
+          <a:lnRef idx="2">
+            <a:schemeClr val="accent1">
+              <a:shade val="50000"/>
+            </a:schemeClr>
+          </a:lnRef>
+          <a:fillRef idx="1">
+            <a:schemeClr val="accent1"/>
+          </a:fillRef>
+          <a:effectRef idx="0">
+            <a:schemeClr val="accent1"/>
+          </a:effectRef>
+          <a:fontRef idx="minor">
+            <a:schemeClr val="lt1"/>
+          </a:fontRef>
+        </p:style>
+        <p:txBody>
+          <a:bodyPr rot="0" spcFirstLastPara="0" vertOverflow="overflow" horzOverflow="overflow" vert="horz" wrap="square" lIns="91440" tIns="45720" rIns="91440" bIns="45720" numCol="1" spcCol="0" rtlCol="0" fromWordArt="0" anchor="t" anchorCtr="0" forceAA="0" compatLnSpc="1">
+            <a:prstTxWarp prst="textNoShape">
               <a:avLst/>
-            </a:prstGeom>
-            <a:noFill/>
-            <a:ln w="38100">
+            </a:prstTxWarp>
+            <a:noAutofit/>
+          </a:bodyPr>
+          <a:lstStyle/>
+          <a:p>
+            <a:pPr algn="ctr">
+              <a:spcBef>
+                <a:spcPts val="400"/>
+              </a:spcBef>
+            </a:pPr>
+            <a:endParaRPr kumimoji="1" lang="en-US" sz="1400" dirty="0">
               <a:solidFill>
-                <a:srgbClr val="00B050"/>
+                <a:schemeClr val="tx2"/>
               </a:solidFill>
-            </a:ln>
-          </p:spPr>
-          <p:style>
-            <a:lnRef idx="2">
-              <a:schemeClr val="accent1">
-                <a:shade val="50000"/>
-              </a:schemeClr>
-            </a:lnRef>
-            <a:fillRef idx="1">
-              <a:schemeClr val="accent1"/>
-            </a:fillRef>
-            <a:effectRef idx="0">
-              <a:schemeClr val="accent1"/>
-            </a:effectRef>
-            <a:fontRef idx="minor">
-              <a:schemeClr val="lt1"/>
-            </a:fontRef>
-          </p:style>
-          <p:txBody>
-            <a:bodyPr rot="0" spcFirstLastPara="0" vertOverflow="overflow" horzOverflow="overflow" vert="horz" wrap="square" lIns="91440" tIns="45720" rIns="91440" bIns="45720" numCol="1" spcCol="0" rtlCol="0" fromWordArt="0" anchor="t" anchorCtr="0" forceAA="0" compatLnSpc="1">
-              <a:prstTxWarp prst="textNoShape">
-                <a:avLst/>
-              </a:prstTxWarp>
-              <a:noAutofit/>
-            </a:bodyPr>
-            <a:lstStyle/>
-            <a:p>
-              <a:pPr algn="ctr">
-                <a:spcBef>
-                  <a:spcPts val="400"/>
-                </a:spcBef>
-              </a:pPr>
-              <a:endParaRPr kumimoji="1" lang="en-US" sz="1400" dirty="0">
-                <a:solidFill>
-                  <a:schemeClr val="tx2"/>
-                </a:solidFill>
-                <a:latin typeface="+mn-ea"/>
-                <a:cs typeface="メイリオ" panose="020B0604030504040204" pitchFamily="50" charset="-128"/>
-              </a:endParaRPr>
-            </a:p>
-          </p:txBody>
-        </p:sp>
-        <p:sp>
-          <p:nvSpPr>
-            <p:cNvPr id="15" name="Rectangle 14">
-              <a:extLst>
-                <a:ext uri="{FF2B5EF4-FFF2-40B4-BE49-F238E27FC236}">
-                  <a16:creationId xmlns:a16="http://schemas.microsoft.com/office/drawing/2014/main" id="{8F92EF18-82BF-1E5B-46AD-90CE9BBEA5A7}"/>
-                </a:ext>
-              </a:extLst>
-            </p:cNvPr>
-            <p:cNvSpPr/>
-            <p:nvPr/>
-          </p:nvSpPr>
-          <p:spPr>
-            <a:xfrm>
-              <a:off x="1160207" y="5624052"/>
-              <a:ext cx="4272116" cy="294968"/>
-            </a:xfrm>
-            <a:prstGeom prst="rect">
+              <a:latin typeface="+mn-ea"/>
+              <a:cs typeface="メイリオ" panose="020B0604030504040204" pitchFamily="50" charset="-128"/>
+            </a:endParaRPr>
+          </a:p>
+        </p:txBody>
+      </p:sp>
+      <p:sp>
+        <p:nvSpPr>
+          <p:cNvPr id="28" name="Rectangle: Rounded Corners 27">
+            <a:extLst>
+              <a:ext uri="{FF2B5EF4-FFF2-40B4-BE49-F238E27FC236}">
+                <a16:creationId xmlns:a16="http://schemas.microsoft.com/office/drawing/2014/main" id="{F4840324-A71B-A359-ED83-C05C67F44A42}"/>
+              </a:ext>
+            </a:extLst>
+          </p:cNvPr>
+          <p:cNvSpPr/>
+          <p:nvPr/>
+        </p:nvSpPr>
+        <p:spPr>
+          <a:xfrm>
+            <a:off x="1814052" y="4272116"/>
+            <a:ext cx="589935" cy="255639"/>
+          </a:xfrm>
+          <a:prstGeom prst="roundRect">
+            <a:avLst/>
+          </a:prstGeom>
+          <a:noFill/>
+          <a:ln w="57150">
+            <a:solidFill>
+              <a:srgbClr val="FF0000"/>
+            </a:solidFill>
+          </a:ln>
+        </p:spPr>
+        <p:style>
+          <a:lnRef idx="2">
+            <a:schemeClr val="accent1">
+              <a:shade val="50000"/>
+            </a:schemeClr>
+          </a:lnRef>
+          <a:fillRef idx="1">
+            <a:schemeClr val="accent1"/>
+          </a:fillRef>
+          <a:effectRef idx="0">
+            <a:schemeClr val="accent1"/>
+          </a:effectRef>
+          <a:fontRef idx="minor">
+            <a:schemeClr val="lt1"/>
+          </a:fontRef>
+        </p:style>
+        <p:txBody>
+          <a:bodyPr rot="0" spcFirstLastPara="0" vertOverflow="overflow" horzOverflow="overflow" vert="horz" wrap="square" lIns="91440" tIns="45720" rIns="91440" bIns="45720" numCol="1" spcCol="0" rtlCol="0" fromWordArt="0" anchor="t" anchorCtr="0" forceAA="0" compatLnSpc="1">
+            <a:prstTxWarp prst="textNoShape">
               <a:avLst/>
-            </a:prstGeom>
-            <a:noFill/>
-            <a:ln w="38100">
+            </a:prstTxWarp>
+            <a:noAutofit/>
+          </a:bodyPr>
+          <a:lstStyle/>
+          <a:p>
+            <a:pPr algn="ctr">
+              <a:spcBef>
+                <a:spcPts val="400"/>
+              </a:spcBef>
+            </a:pPr>
+            <a:endParaRPr kumimoji="1" lang="en-US" sz="1400" dirty="0">
               <a:solidFill>
-                <a:srgbClr val="FFC000"/>
+                <a:schemeClr val="tx2"/>
               </a:solidFill>
-            </a:ln>
-          </p:spPr>
-          <p:style>
-            <a:lnRef idx="2">
-              <a:schemeClr val="accent1">
-                <a:shade val="50000"/>
-              </a:schemeClr>
-            </a:lnRef>
-            <a:fillRef idx="1">
-              <a:schemeClr val="accent1"/>
-            </a:fillRef>
-            <a:effectRef idx="0">
-              <a:schemeClr val="accent1"/>
-            </a:effectRef>
-            <a:fontRef idx="minor">
-              <a:schemeClr val="lt1"/>
-            </a:fontRef>
-          </p:style>
-          <p:txBody>
-            <a:bodyPr rot="0" spcFirstLastPara="0" vertOverflow="overflow" horzOverflow="overflow" vert="horz" wrap="square" lIns="91440" tIns="45720" rIns="91440" bIns="45720" numCol="1" spcCol="0" rtlCol="0" fromWordArt="0" anchor="t" anchorCtr="0" forceAA="0" compatLnSpc="1">
-              <a:prstTxWarp prst="textNoShape">
-                <a:avLst/>
-              </a:prstTxWarp>
-              <a:noAutofit/>
-            </a:bodyPr>
-            <a:lstStyle/>
-            <a:p>
-              <a:pPr algn="ctr">
-                <a:spcBef>
-                  <a:spcPts val="400"/>
-                </a:spcBef>
-              </a:pPr>
-              <a:endParaRPr kumimoji="1" lang="en-US" sz="1400" dirty="0">
-                <a:solidFill>
-                  <a:schemeClr val="tx2"/>
-                </a:solidFill>
-                <a:latin typeface="+mn-ea"/>
-                <a:cs typeface="メイリオ" panose="020B0604030504040204" pitchFamily="50" charset="-128"/>
-              </a:endParaRPr>
-            </a:p>
-          </p:txBody>
-        </p:sp>
-        <p:sp>
-          <p:nvSpPr>
-            <p:cNvPr id="17" name="Rectangle 16">
-              <a:extLst>
-                <a:ext uri="{FF2B5EF4-FFF2-40B4-BE49-F238E27FC236}">
-                  <a16:creationId xmlns:a16="http://schemas.microsoft.com/office/drawing/2014/main" id="{AEFE8A87-C3D1-80C9-269E-2BE37DF4FB9F}"/>
-                </a:ext>
-              </a:extLst>
-            </p:cNvPr>
-            <p:cNvSpPr/>
-            <p:nvPr/>
-          </p:nvSpPr>
-          <p:spPr>
-            <a:xfrm>
-              <a:off x="2217175" y="3220065"/>
-              <a:ext cx="3878825" cy="294968"/>
-            </a:xfrm>
-            <a:prstGeom prst="rect">
-              <a:avLst/>
-            </a:prstGeom>
-            <a:noFill/>
-            <a:ln w="38100">
-              <a:solidFill>
-                <a:srgbClr val="FFC000"/>
-              </a:solidFill>
-            </a:ln>
-          </p:spPr>
-          <p:style>
-            <a:lnRef idx="2">
-              <a:schemeClr val="accent1">
-                <a:shade val="50000"/>
-              </a:schemeClr>
-            </a:lnRef>
-            <a:fillRef idx="1">
-              <a:schemeClr val="accent1"/>
-            </a:fillRef>
-            <a:effectRef idx="0">
-              <a:schemeClr val="accent1"/>
-            </a:effectRef>
-            <a:fontRef idx="minor">
-              <a:schemeClr val="lt1"/>
-            </a:fontRef>
-          </p:style>
-          <p:txBody>
-            <a:bodyPr rot="0" spcFirstLastPara="0" vertOverflow="overflow" horzOverflow="overflow" vert="horz" wrap="square" lIns="91440" tIns="45720" rIns="91440" bIns="45720" numCol="1" spcCol="0" rtlCol="0" fromWordArt="0" anchor="t" anchorCtr="0" forceAA="0" compatLnSpc="1">
-              <a:prstTxWarp prst="textNoShape">
-                <a:avLst/>
-              </a:prstTxWarp>
-              <a:noAutofit/>
-            </a:bodyPr>
-            <a:lstStyle/>
-            <a:p>
-              <a:pPr algn="ctr">
-                <a:spcBef>
-                  <a:spcPts val="400"/>
-                </a:spcBef>
-              </a:pPr>
-              <a:endParaRPr kumimoji="1" lang="en-US" sz="1400" dirty="0">
-                <a:solidFill>
-                  <a:schemeClr val="tx2"/>
-                </a:solidFill>
-                <a:latin typeface="+mn-ea"/>
-                <a:cs typeface="メイリオ" panose="020B0604030504040204" pitchFamily="50" charset="-128"/>
-              </a:endParaRPr>
-            </a:p>
-          </p:txBody>
-        </p:sp>
-        <p:sp>
-          <p:nvSpPr>
-            <p:cNvPr id="18" name="TextBox 17">
-              <a:extLst>
-                <a:ext uri="{FF2B5EF4-FFF2-40B4-BE49-F238E27FC236}">
-                  <a16:creationId xmlns:a16="http://schemas.microsoft.com/office/drawing/2014/main" id="{6BBC815C-2AC7-A202-CF1A-A08C93633EC4}"/>
-                </a:ext>
-              </a:extLst>
-            </p:cNvPr>
-            <p:cNvSpPr txBox="1"/>
-            <p:nvPr/>
-          </p:nvSpPr>
-          <p:spPr>
-            <a:xfrm>
-              <a:off x="7629834" y="1651819"/>
-              <a:ext cx="4237702" cy="4452501"/>
-            </a:xfrm>
-            <a:prstGeom prst="rect">
-              <a:avLst/>
-            </a:prstGeom>
-            <a:noFill/>
-          </p:spPr>
-          <p:txBody>
-            <a:bodyPr wrap="square" rtlCol="0">
-              <a:spAutoFit/>
-            </a:bodyPr>
-            <a:lstStyle/>
-            <a:p>
-              <a:pPr>
-                <a:spcBef>
-                  <a:spcPts val="400"/>
-                </a:spcBef>
-              </a:pPr>
-              <a:r>
-                <a:rPr kumimoji="1" lang="en-US" sz="1800" dirty="0">
-                  <a:solidFill>
-                    <a:schemeClr val="tx2"/>
-                  </a:solidFill>
-                  <a:latin typeface="+mn-ea"/>
-                  <a:ea typeface="+mn-ea"/>
-                  <a:cs typeface="メイリオ" panose="020B0604030504040204" pitchFamily="50" charset="-128"/>
-                </a:rPr>
-                <a:t>The MISC Tab has some “multipliers”.</a:t>
-              </a:r>
-            </a:p>
-            <a:p>
-              <a:pPr>
-                <a:spcBef>
-                  <a:spcPts val="400"/>
-                </a:spcBef>
-              </a:pPr>
-              <a:r>
-                <a:rPr lang="en-US" dirty="0">
-                  <a:solidFill>
-                    <a:schemeClr val="tx2"/>
-                  </a:solidFill>
-                  <a:latin typeface="+mn-ea"/>
-                  <a:cs typeface="メイリオ" panose="020B0604030504040204" pitchFamily="50" charset="-128"/>
-                </a:rPr>
-                <a:t>This is mainly used during initial development.</a:t>
-              </a:r>
-            </a:p>
-            <a:p>
-              <a:pPr>
-                <a:spcBef>
-                  <a:spcPts val="400"/>
-                </a:spcBef>
-              </a:pPr>
-              <a:endParaRPr kumimoji="1" lang="en-US" sz="1800" dirty="0">
-                <a:solidFill>
-                  <a:schemeClr val="tx2"/>
-                </a:solidFill>
-                <a:latin typeface="+mn-ea"/>
-                <a:ea typeface="+mn-ea"/>
-                <a:cs typeface="メイリオ" panose="020B0604030504040204" pitchFamily="50" charset="-128"/>
-              </a:endParaRPr>
-            </a:p>
-            <a:p>
-              <a:pPr>
-                <a:spcBef>
-                  <a:spcPts val="400"/>
-                </a:spcBef>
-              </a:pPr>
-              <a:r>
-                <a:rPr lang="en-US" dirty="0">
-                  <a:solidFill>
-                    <a:schemeClr val="tx2"/>
-                  </a:solidFill>
-                  <a:latin typeface="+mn-ea"/>
-                  <a:cs typeface="メイリオ" panose="020B0604030504040204" pitchFamily="50" charset="-128"/>
-                </a:rPr>
-                <a:t>The value reported on the Flow Rate and Motor RPM in the Main Tab are pulse counted from Arduino and multiplied by the ratio in the MISC Tab.</a:t>
-              </a:r>
-            </a:p>
-            <a:p>
-              <a:pPr>
-                <a:spcBef>
-                  <a:spcPts val="400"/>
-                </a:spcBef>
-              </a:pPr>
-              <a:r>
-                <a:rPr kumimoji="1" lang="en-US" sz="1800" dirty="0">
-                  <a:solidFill>
-                    <a:schemeClr val="tx2"/>
-                  </a:solidFill>
-                  <a:latin typeface="+mn-ea"/>
-                  <a:ea typeface="+mn-ea"/>
-                  <a:cs typeface="メイリオ" panose="020B0604030504040204" pitchFamily="50" charset="-128"/>
-                </a:rPr>
-                <a:t>Change the number in MISC Tab, to adjust accordingly to get the correct conversion from pulses (Hz) to L/min and RPM shown in Main Tab</a:t>
-              </a:r>
-            </a:p>
-          </p:txBody>
-        </p:sp>
-        <p:sp>
-          <p:nvSpPr>
-            <p:cNvPr id="27" name="Rectangle: Rounded Corners 26">
-              <a:extLst>
-                <a:ext uri="{FF2B5EF4-FFF2-40B4-BE49-F238E27FC236}">
-                  <a16:creationId xmlns:a16="http://schemas.microsoft.com/office/drawing/2014/main" id="{3CAB54F4-F106-0E19-5DC9-5E03548FEE89}"/>
-                </a:ext>
-              </a:extLst>
-            </p:cNvPr>
-            <p:cNvSpPr/>
-            <p:nvPr/>
-          </p:nvSpPr>
-          <p:spPr>
-            <a:xfrm>
-              <a:off x="757084" y="1376516"/>
-              <a:ext cx="589935" cy="255639"/>
-            </a:xfrm>
-            <a:prstGeom prst="roundRect">
-              <a:avLst/>
-            </a:prstGeom>
-            <a:noFill/>
-            <a:ln w="57150">
-              <a:solidFill>
-                <a:srgbClr val="FF0000"/>
-              </a:solidFill>
-            </a:ln>
-          </p:spPr>
-          <p:style>
-            <a:lnRef idx="2">
-              <a:schemeClr val="accent1">
-                <a:shade val="50000"/>
-              </a:schemeClr>
-            </a:lnRef>
-            <a:fillRef idx="1">
-              <a:schemeClr val="accent1"/>
-            </a:fillRef>
-            <a:effectRef idx="0">
-              <a:schemeClr val="accent1"/>
-            </a:effectRef>
-            <a:fontRef idx="minor">
-              <a:schemeClr val="lt1"/>
-            </a:fontRef>
-          </p:style>
-          <p:txBody>
-            <a:bodyPr rot="0" spcFirstLastPara="0" vertOverflow="overflow" horzOverflow="overflow" vert="horz" wrap="square" lIns="91440" tIns="45720" rIns="91440" bIns="45720" numCol="1" spcCol="0" rtlCol="0" fromWordArt="0" anchor="t" anchorCtr="0" forceAA="0" compatLnSpc="1">
-              <a:prstTxWarp prst="textNoShape">
-                <a:avLst/>
-              </a:prstTxWarp>
-              <a:noAutofit/>
-            </a:bodyPr>
-            <a:lstStyle/>
-            <a:p>
-              <a:pPr algn="ctr">
-                <a:spcBef>
-                  <a:spcPts val="400"/>
-                </a:spcBef>
-              </a:pPr>
-              <a:endParaRPr kumimoji="1" lang="en-US" sz="1400" dirty="0">
-                <a:solidFill>
-                  <a:schemeClr val="tx2"/>
-                </a:solidFill>
-                <a:latin typeface="+mn-ea"/>
-                <a:cs typeface="メイリオ" panose="020B0604030504040204" pitchFamily="50" charset="-128"/>
-              </a:endParaRPr>
-            </a:p>
-          </p:txBody>
-        </p:sp>
-        <p:sp>
-          <p:nvSpPr>
-            <p:cNvPr id="28" name="Rectangle: Rounded Corners 27">
-              <a:extLst>
-                <a:ext uri="{FF2B5EF4-FFF2-40B4-BE49-F238E27FC236}">
-                  <a16:creationId xmlns:a16="http://schemas.microsoft.com/office/drawing/2014/main" id="{F4840324-A71B-A359-ED83-C05C67F44A42}"/>
-                </a:ext>
-              </a:extLst>
-            </p:cNvPr>
-            <p:cNvSpPr/>
-            <p:nvPr/>
-          </p:nvSpPr>
-          <p:spPr>
-            <a:xfrm>
-              <a:off x="1814052" y="4272116"/>
-              <a:ext cx="589935" cy="255639"/>
-            </a:xfrm>
-            <a:prstGeom prst="roundRect">
-              <a:avLst/>
-            </a:prstGeom>
-            <a:noFill/>
-            <a:ln w="57150">
-              <a:solidFill>
-                <a:srgbClr val="FF0000"/>
-              </a:solidFill>
-            </a:ln>
-          </p:spPr>
-          <p:style>
-            <a:lnRef idx="2">
-              <a:schemeClr val="accent1">
-                <a:shade val="50000"/>
-              </a:schemeClr>
-            </a:lnRef>
-            <a:fillRef idx="1">
-              <a:schemeClr val="accent1"/>
-            </a:fillRef>
-            <a:effectRef idx="0">
-              <a:schemeClr val="accent1"/>
-            </a:effectRef>
-            <a:fontRef idx="minor">
-              <a:schemeClr val="lt1"/>
-            </a:fontRef>
-          </p:style>
-          <p:txBody>
-            <a:bodyPr rot="0" spcFirstLastPara="0" vertOverflow="overflow" horzOverflow="overflow" vert="horz" wrap="square" lIns="91440" tIns="45720" rIns="91440" bIns="45720" numCol="1" spcCol="0" rtlCol="0" fromWordArt="0" anchor="t" anchorCtr="0" forceAA="0" compatLnSpc="1">
-              <a:prstTxWarp prst="textNoShape">
-                <a:avLst/>
-              </a:prstTxWarp>
-              <a:noAutofit/>
-            </a:bodyPr>
-            <a:lstStyle/>
-            <a:p>
-              <a:pPr algn="ctr">
-                <a:spcBef>
-                  <a:spcPts val="400"/>
-                </a:spcBef>
-              </a:pPr>
-              <a:endParaRPr kumimoji="1" lang="en-US" sz="1400" dirty="0">
-                <a:solidFill>
-                  <a:schemeClr val="tx2"/>
-                </a:solidFill>
-                <a:latin typeface="+mn-ea"/>
-                <a:cs typeface="メイリオ" panose="020B0604030504040204" pitchFamily="50" charset="-128"/>
-              </a:endParaRPr>
-            </a:p>
-          </p:txBody>
-        </p:sp>
-      </p:grpSp>
+              <a:latin typeface="+mn-ea"/>
+              <a:cs typeface="メイリオ" panose="020B0604030504040204" pitchFamily="50" charset="-128"/>
+            </a:endParaRPr>
+          </a:p>
+        </p:txBody>
+      </p:sp>
     </p:spTree>
     <p:extLst>
       <p:ext uri="{BB962C8B-B14F-4D97-AF65-F5344CB8AC3E}">

</xml_diff>

<commit_message>
update the PPT instructions to have the misc tab multiplier be adjusted first before COM connection
</commit_message>
<xml_diff>
--- a/Water Pump Demo Arduino and Gui instructions.pptx
+++ b/Water Pump Demo Arduino and Gui instructions.pptx
@@ -9,10 +9,10 @@
     <p:sldId id="256" r:id="rId3"/>
     <p:sldId id="257" r:id="rId4"/>
     <p:sldId id="261" r:id="rId5"/>
-    <p:sldId id="259" r:id="rId6"/>
-    <p:sldId id="258" r:id="rId7"/>
-    <p:sldId id="265" r:id="rId8"/>
-    <p:sldId id="260" r:id="rId9"/>
+    <p:sldId id="260" r:id="rId6"/>
+    <p:sldId id="259" r:id="rId7"/>
+    <p:sldId id="258" r:id="rId8"/>
+    <p:sldId id="265" r:id="rId9"/>
     <p:sldId id="262" r:id="rId10"/>
     <p:sldId id="263" r:id="rId11"/>
   </p:sldIdLst>
@@ -121,14 +121,6 @@
 </p:presentation>
 </file>
 
-<file path=ppt/revisionInfo.xml><?xml version="1.0" encoding="utf-8"?>
-<p1510:revInfo xmlns:a="http://schemas.openxmlformats.org/drawingml/2006/main" xmlns:r="http://schemas.openxmlformats.org/officeDocument/2006/relationships" xmlns:p1510="http://schemas.microsoft.com/office/powerpoint/2015/10/main">
-  <p1510:revLst>
-    <p1510:client id="{2574B24F-E2A1-49B4-965A-816A9A283E65}" v="100" dt="2025-06-18T21:40:18.985"/>
-  </p1510:revLst>
-</p1510:revInfo>
-</file>
-
 <file path=ppt/changesInfos/changesInfo1.xml><?xml version="1.0" encoding="utf-8"?>
 <pc:chgInfo xmlns:a="http://schemas.openxmlformats.org/drawingml/2006/main" xmlns:r="http://schemas.openxmlformats.org/officeDocument/2006/relationships" xmlns:ac="http://schemas.microsoft.com/office/drawing/2013/main/command" xmlns:pc="http://schemas.microsoft.com/office/powerpoint/2013/main/command">
   <pc:docChgLst>
@@ -144,22 +136,6 @@
           <pc:docMk/>
           <pc:sldMk cId="1800593104" sldId="256"/>
         </pc:sldMkLst>
-        <pc:spChg chg="del mod ord">
-          <ac:chgData name="George Hariman" userId="944226f4-c0bd-444e-8152-728ae792d6b1" providerId="ADAL" clId="{2574B24F-E2A1-49B4-965A-816A9A283E65}" dt="2025-06-17T21:54:00.403" v="2" actId="700"/>
-          <ac:spMkLst>
-            <pc:docMk/>
-            <pc:sldMk cId="1800593104" sldId="256"/>
-            <ac:spMk id="2" creationId="{A7F6FCB6-B2C5-CB4A-23DD-2B0FF19B8D23}"/>
-          </ac:spMkLst>
-        </pc:spChg>
-        <pc:spChg chg="del mod">
-          <ac:chgData name="George Hariman" userId="944226f4-c0bd-444e-8152-728ae792d6b1" providerId="ADAL" clId="{2574B24F-E2A1-49B4-965A-816A9A283E65}" dt="2025-06-17T21:54:00.403" v="2" actId="700"/>
-          <ac:spMkLst>
-            <pc:docMk/>
-            <pc:sldMk cId="1800593104" sldId="256"/>
-            <ac:spMk id="3" creationId="{4DCA1A39-4A1B-7879-C6DC-B52152EFE0B0}"/>
-          </ac:spMkLst>
-        </pc:spChg>
         <pc:spChg chg="add mod ord">
           <ac:chgData name="George Hariman" userId="944226f4-c0bd-444e-8152-728ae792d6b1" providerId="ADAL" clId="{2574B24F-E2A1-49B4-965A-816A9A283E65}" dt="2025-06-17T22:37:59.576" v="2071" actId="20577"/>
           <ac:spMkLst>
@@ -216,22 +192,6 @@
             <ac:spMk id="36" creationId="{EA64A9E9-A333-6437-3863-AED0AEECE158}"/>
           </ac:spMkLst>
         </pc:spChg>
-        <pc:grpChg chg="add del mod">
-          <ac:chgData name="George Hariman" userId="944226f4-c0bd-444e-8152-728ae792d6b1" providerId="ADAL" clId="{2574B24F-E2A1-49B4-965A-816A9A283E65}" dt="2025-06-17T22:38:18.300" v="2076" actId="165"/>
-          <ac:grpSpMkLst>
-            <pc:docMk/>
-            <pc:sldMk cId="1800593104" sldId="256"/>
-            <ac:grpSpMk id="34" creationId="{BC3506C0-177E-E972-C6FB-82D047D51FA7}"/>
-          </ac:grpSpMkLst>
-        </pc:grpChg>
-        <pc:grpChg chg="add del mod">
-          <ac:chgData name="George Hariman" userId="944226f4-c0bd-444e-8152-728ae792d6b1" providerId="ADAL" clId="{2574B24F-E2A1-49B4-965A-816A9A283E65}" dt="2025-06-17T22:39:13.622" v="2154" actId="165"/>
-          <ac:grpSpMkLst>
-            <pc:docMk/>
-            <pc:sldMk cId="1800593104" sldId="256"/>
-            <ac:grpSpMk id="37" creationId="{9FAB20D3-379D-DE79-840C-084C00EE1876}"/>
-          </ac:grpSpMkLst>
-        </pc:grpChg>
         <pc:grpChg chg="add mod">
           <ac:chgData name="George Hariman" userId="944226f4-c0bd-444e-8152-728ae792d6b1" providerId="ADAL" clId="{2574B24F-E2A1-49B4-965A-816A9A283E65}" dt="2025-06-17T23:09:20.247" v="2422" actId="1076"/>
           <ac:grpSpMkLst>
@@ -309,14 +269,6 @@
             <pc:docMk/>
             <pc:sldMk cId="2969960632" sldId="257"/>
             <ac:spMk id="2" creationId="{23AC7BDC-BFED-4A2D-45A7-38DF244D2DC8}"/>
-          </ac:spMkLst>
-        </pc:spChg>
-        <pc:spChg chg="add del mod">
-          <ac:chgData name="George Hariman" userId="944226f4-c0bd-444e-8152-728ae792d6b1" providerId="ADAL" clId="{2574B24F-E2A1-49B4-965A-816A9A283E65}" dt="2025-06-17T22:27:55.980" v="1725"/>
-          <ac:spMkLst>
-            <pc:docMk/>
-            <pc:sldMk cId="2969960632" sldId="257"/>
-            <ac:spMk id="3" creationId="{5C6E1206-2855-3A6F-B6E7-66DA6D178630}"/>
           </ac:spMkLst>
         </pc:spChg>
         <pc:spChg chg="add mod">
@@ -478,68 +430,12 @@
             <ac:spMk id="37" creationId="{B993709A-08EF-B4F0-E3E4-B02E703C1C79}"/>
           </ac:spMkLst>
         </pc:spChg>
-        <pc:grpChg chg="add del mod">
-          <ac:chgData name="George Hariman" userId="944226f4-c0bd-444e-8152-728ae792d6b1" providerId="ADAL" clId="{2574B24F-E2A1-49B4-965A-816A9A283E65}" dt="2025-06-17T22:15:03.317" v="1681" actId="165"/>
-          <ac:grpSpMkLst>
-            <pc:docMk/>
-            <pc:sldMk cId="3341469045" sldId="258"/>
-            <ac:grpSpMk id="22" creationId="{00978DD6-8AED-24A4-B9D4-BD180F2C3308}"/>
-          </ac:grpSpMkLst>
-        </pc:grpChg>
-        <pc:grpChg chg="add del mod">
-          <ac:chgData name="George Hariman" userId="944226f4-c0bd-444e-8152-728ae792d6b1" providerId="ADAL" clId="{2574B24F-E2A1-49B4-965A-816A9A283E65}" dt="2025-06-17T23:04:53.913" v="2357" actId="165"/>
-          <ac:grpSpMkLst>
-            <pc:docMk/>
-            <pc:sldMk cId="3341469045" sldId="258"/>
-            <ac:grpSpMk id="32" creationId="{211CC7D5-BA24-7583-93B8-3238659A4989}"/>
-          </ac:grpSpMkLst>
-        </pc:grpChg>
-        <pc:grpChg chg="del">
-          <ac:chgData name="George Hariman" userId="944226f4-c0bd-444e-8152-728ae792d6b1" providerId="ADAL" clId="{2574B24F-E2A1-49B4-965A-816A9A283E65}" dt="2025-06-18T21:36:42.252" v="2742" actId="165"/>
-          <ac:grpSpMkLst>
-            <pc:docMk/>
-            <pc:sldMk cId="3341469045" sldId="258"/>
-            <ac:grpSpMk id="39" creationId="{96CAD638-D26B-8996-BC32-948254566898}"/>
-          </ac:grpSpMkLst>
-        </pc:grpChg>
-        <pc:picChg chg="add del mod ord">
-          <ac:chgData name="George Hariman" userId="944226f4-c0bd-444e-8152-728ae792d6b1" providerId="ADAL" clId="{2574B24F-E2A1-49B4-965A-816A9A283E65}" dt="2025-06-18T21:35:28.646" v="2722" actId="478"/>
-          <ac:picMkLst>
-            <pc:docMk/>
-            <pc:sldMk cId="3341469045" sldId="258"/>
-            <ac:picMk id="4" creationId="{2719DFB4-DE45-A185-69DC-F66B48C0E020}"/>
-          </ac:picMkLst>
-        </pc:picChg>
-        <pc:picChg chg="add del mod">
-          <ac:chgData name="George Hariman" userId="944226f4-c0bd-444e-8152-728ae792d6b1" providerId="ADAL" clId="{2574B24F-E2A1-49B4-965A-816A9A283E65}" dt="2025-06-17T22:05:15.356" v="800" actId="478"/>
-          <ac:picMkLst>
-            <pc:docMk/>
-            <pc:sldMk cId="3341469045" sldId="258"/>
-            <ac:picMk id="4" creationId="{D9518653-2CCF-B21C-047B-D24909E2F9D0}"/>
-          </ac:picMkLst>
-        </pc:picChg>
         <pc:picChg chg="add mod ord">
           <ac:chgData name="George Hariman" userId="944226f4-c0bd-444e-8152-728ae792d6b1" providerId="ADAL" clId="{2574B24F-E2A1-49B4-965A-816A9A283E65}" dt="2025-06-18T21:35:42.557" v="2731" actId="1076"/>
           <ac:picMkLst>
             <pc:docMk/>
             <pc:sldMk cId="3341469045" sldId="258"/>
             <ac:picMk id="6" creationId="{562F4C93-91CC-D9F9-5BB5-4E88D0ED11C7}"/>
-          </ac:picMkLst>
-        </pc:picChg>
-        <pc:picChg chg="add del mod">
-          <ac:chgData name="George Hariman" userId="944226f4-c0bd-444e-8152-728ae792d6b1" providerId="ADAL" clId="{2574B24F-E2A1-49B4-965A-816A9A283E65}" dt="2025-06-17T22:05:15.855" v="801" actId="478"/>
-          <ac:picMkLst>
-            <pc:docMk/>
-            <pc:sldMk cId="3341469045" sldId="258"/>
-            <ac:picMk id="6" creationId="{715C288D-3496-F13A-5027-1C9E136E89FD}"/>
-          </ac:picMkLst>
-        </pc:picChg>
-        <pc:picChg chg="add del mod topLvl">
-          <ac:chgData name="George Hariman" userId="944226f4-c0bd-444e-8152-728ae792d6b1" providerId="ADAL" clId="{2574B24F-E2A1-49B4-965A-816A9A283E65}" dt="2025-06-18T21:35:45.601" v="2732" actId="478"/>
-          <ac:picMkLst>
-            <pc:docMk/>
-            <pc:sldMk cId="3341469045" sldId="258"/>
-            <ac:picMk id="10" creationId="{ADEA51C6-72BB-6120-0769-C39557877E1F}"/>
           </ac:picMkLst>
         </pc:picChg>
         <pc:picChg chg="add mod ord topLvl">
@@ -564,14 +460,6 @@
             <pc:docMk/>
             <pc:sldMk cId="3341469045" sldId="258"/>
             <ac:picMk id="14" creationId="{78097711-6AA8-A566-49D0-8DB889328F84}"/>
-          </ac:picMkLst>
-        </pc:picChg>
-        <pc:picChg chg="add del mod topLvl">
-          <ac:chgData name="George Hariman" userId="944226f4-c0bd-444e-8152-728ae792d6b1" providerId="ADAL" clId="{2574B24F-E2A1-49B4-965A-816A9A283E65}" dt="2025-06-18T21:35:00.241" v="2715" actId="478"/>
-          <ac:picMkLst>
-            <pc:docMk/>
-            <pc:sldMk cId="3341469045" sldId="258"/>
-            <ac:picMk id="20" creationId="{B009955A-14C2-1C7B-011C-BAC8F8DA9855}"/>
           </ac:picMkLst>
         </pc:picChg>
         <pc:cxnChg chg="add mod topLvl">
@@ -613,44 +501,12 @@
             <ac:spMk id="2" creationId="{12FC13A1-51AE-D5EB-EF9A-25B3F58208D5}"/>
           </ac:spMkLst>
         </pc:spChg>
-        <pc:spChg chg="add del mod topLvl">
-          <ac:chgData name="George Hariman" userId="944226f4-c0bd-444e-8152-728ae792d6b1" providerId="ADAL" clId="{2574B24F-E2A1-49B4-965A-816A9A283E65}" dt="2025-06-17T23:21:49.975" v="2492" actId="478"/>
-          <ac:spMkLst>
-            <pc:docMk/>
-            <pc:sldMk cId="1143546009" sldId="259"/>
-            <ac:spMk id="3" creationId="{1F136FF2-6D86-F869-8FEB-14B9CA7D181D}"/>
-          </ac:spMkLst>
-        </pc:spChg>
         <pc:spChg chg="mod topLvl">
           <ac:chgData name="George Hariman" userId="944226f4-c0bd-444e-8152-728ae792d6b1" providerId="ADAL" clId="{2574B24F-E2A1-49B4-965A-816A9A283E65}" dt="2025-06-18T21:37:49.265" v="2757" actId="165"/>
           <ac:spMkLst>
             <pc:docMk/>
             <pc:sldMk cId="1143546009" sldId="259"/>
             <ac:spMk id="7" creationId="{2BD12CFA-1CD3-95F8-A967-E49813C5EA33}"/>
-          </ac:spMkLst>
-        </pc:spChg>
-        <pc:spChg chg="del mod topLvl">
-          <ac:chgData name="George Hariman" userId="944226f4-c0bd-444e-8152-728ae792d6b1" providerId="ADAL" clId="{2574B24F-E2A1-49B4-965A-816A9A283E65}" dt="2025-06-17T23:21:44.162" v="2487" actId="478"/>
-          <ac:spMkLst>
-            <pc:docMk/>
-            <pc:sldMk cId="1143546009" sldId="259"/>
-            <ac:spMk id="8" creationId="{C1483460-37EF-63E9-53CB-258AD0953317}"/>
-          </ac:spMkLst>
-        </pc:spChg>
-        <pc:spChg chg="add del mod topLvl">
-          <ac:chgData name="George Hariman" userId="944226f4-c0bd-444e-8152-728ae792d6b1" providerId="ADAL" clId="{2574B24F-E2A1-49B4-965A-816A9A283E65}" dt="2025-06-17T23:21:52.515" v="2494" actId="478"/>
-          <ac:spMkLst>
-            <pc:docMk/>
-            <pc:sldMk cId="1143546009" sldId="259"/>
-            <ac:spMk id="11" creationId="{E38E63D8-AEBC-F817-D1E0-411193D176EB}"/>
-          </ac:spMkLst>
-        </pc:spChg>
-        <pc:spChg chg="add del mod topLvl">
-          <ac:chgData name="George Hariman" userId="944226f4-c0bd-444e-8152-728ae792d6b1" providerId="ADAL" clId="{2574B24F-E2A1-49B4-965A-816A9A283E65}" dt="2025-06-17T23:21:53.612" v="2495" actId="478"/>
-          <ac:spMkLst>
-            <pc:docMk/>
-            <pc:sldMk cId="1143546009" sldId="259"/>
-            <ac:spMk id="12" creationId="{7316DFE2-CC03-79F1-C50E-A5DB8157BDCB}"/>
           </ac:spMkLst>
         </pc:spChg>
         <pc:spChg chg="add mod topLvl">
@@ -661,14 +517,6 @@
             <ac:spMk id="13" creationId="{806DD5E2-6A89-A0A6-B3A0-7603EF3685B1}"/>
           </ac:spMkLst>
         </pc:spChg>
-        <pc:spChg chg="add mod">
-          <ac:chgData name="George Hariman" userId="944226f4-c0bd-444e-8152-728ae792d6b1" providerId="ADAL" clId="{2574B24F-E2A1-49B4-965A-816A9A283E65}" dt="2025-06-17T23:05:04.756" v="2358"/>
-          <ac:spMkLst>
-            <pc:docMk/>
-            <pc:sldMk cId="1143546009" sldId="259"/>
-            <ac:spMk id="19" creationId="{B4FD8C37-87FE-EB61-803A-B5A1AB9911A5}"/>
-          </ac:spMkLst>
-        </pc:spChg>
         <pc:spChg chg="add mod topLvl">
           <ac:chgData name="George Hariman" userId="944226f4-c0bd-444e-8152-728ae792d6b1" providerId="ADAL" clId="{2574B24F-E2A1-49B4-965A-816A9A283E65}" dt="2025-06-18T21:37:49.265" v="2757" actId="165"/>
           <ac:spMkLst>
@@ -677,22 +525,6 @@
             <ac:spMk id="20" creationId="{D0602795-57C0-E3D1-95CA-F5FA1C3D1CCF}"/>
           </ac:spMkLst>
         </pc:spChg>
-        <pc:spChg chg="add del mod">
-          <ac:chgData name="George Hariman" userId="944226f4-c0bd-444e-8152-728ae792d6b1" providerId="ADAL" clId="{2574B24F-E2A1-49B4-965A-816A9A283E65}" dt="2025-06-17T23:21:48.558" v="2491" actId="478"/>
-          <ac:spMkLst>
-            <pc:docMk/>
-            <pc:sldMk cId="1143546009" sldId="259"/>
-            <ac:spMk id="21" creationId="{1AD4B1E2-246C-25FC-3615-C1FE9B765F00}"/>
-          </ac:spMkLst>
-        </pc:spChg>
-        <pc:grpChg chg="add del mod">
-          <ac:chgData name="George Hariman" userId="944226f4-c0bd-444e-8152-728ae792d6b1" providerId="ADAL" clId="{2574B24F-E2A1-49B4-965A-816A9A283E65}" dt="2025-06-17T23:05:54.143" v="2365" actId="165"/>
-          <ac:grpSpMkLst>
-            <pc:docMk/>
-            <pc:sldMk cId="1143546009" sldId="259"/>
-            <ac:grpSpMk id="17" creationId="{572AEC98-A54F-1A84-2091-920814513F9F}"/>
-          </ac:grpSpMkLst>
-        </pc:grpChg>
         <pc:grpChg chg="add del mod">
           <ac:chgData name="George Hariman" userId="944226f4-c0bd-444e-8152-728ae792d6b1" providerId="ADAL" clId="{2574B24F-E2A1-49B4-965A-816A9A283E65}" dt="2025-06-18T21:37:49.265" v="2757" actId="165"/>
           <ac:grpSpMkLst>
@@ -709,46 +541,6 @@
             <ac:picMk id="4" creationId="{80C8457A-CCB9-6D4D-1D55-A087DCFA8D43}"/>
           </ac:picMkLst>
         </pc:picChg>
-        <pc:picChg chg="add del mod ord">
-          <ac:chgData name="George Hariman" userId="944226f4-c0bd-444e-8152-728ae792d6b1" providerId="ADAL" clId="{2574B24F-E2A1-49B4-965A-816A9A283E65}" dt="2025-06-18T21:37:47.790" v="2755" actId="22"/>
-          <ac:picMkLst>
-            <pc:docMk/>
-            <pc:sldMk cId="1143546009" sldId="259"/>
-            <ac:picMk id="5" creationId="{CB03AB68-BCC6-D8FC-6F32-1925F8FFB15E}"/>
-          </ac:picMkLst>
-        </pc:picChg>
-        <pc:picChg chg="del mod topLvl">
-          <ac:chgData name="George Hariman" userId="944226f4-c0bd-444e-8152-728ae792d6b1" providerId="ADAL" clId="{2574B24F-E2A1-49B4-965A-816A9A283E65}" dt="2025-06-17T23:21:47.227" v="2490" actId="478"/>
-          <ac:picMkLst>
-            <pc:docMk/>
-            <pc:sldMk cId="1143546009" sldId="259"/>
-            <ac:picMk id="6" creationId="{BC25ECD3-0A83-8B73-196D-130A1013B83B}"/>
-          </ac:picMkLst>
-        </pc:picChg>
-        <pc:picChg chg="add mod">
-          <ac:chgData name="George Hariman" userId="944226f4-c0bd-444e-8152-728ae792d6b1" providerId="ADAL" clId="{2574B24F-E2A1-49B4-965A-816A9A283E65}" dt="2025-06-17T23:05:04.756" v="2358"/>
-          <ac:picMkLst>
-            <pc:docMk/>
-            <pc:sldMk cId="1143546009" sldId="259"/>
-            <ac:picMk id="18" creationId="{71B56BB6-1B32-6B42-5D93-392C027B0F38}"/>
-          </ac:picMkLst>
-        </pc:picChg>
-        <pc:cxnChg chg="add del mod topLvl">
-          <ac:chgData name="George Hariman" userId="944226f4-c0bd-444e-8152-728ae792d6b1" providerId="ADAL" clId="{2574B24F-E2A1-49B4-965A-816A9A283E65}" dt="2025-06-17T23:21:51.275" v="2493" actId="478"/>
-          <ac:cxnSpMkLst>
-            <pc:docMk/>
-            <pc:sldMk cId="1143546009" sldId="259"/>
-            <ac:cxnSpMk id="9" creationId="{E041A158-2CEF-4B84-30C7-82300FC8FFE9}"/>
-          </ac:cxnSpMkLst>
-        </pc:cxnChg>
-        <pc:cxnChg chg="add del mod">
-          <ac:chgData name="George Hariman" userId="944226f4-c0bd-444e-8152-728ae792d6b1" providerId="ADAL" clId="{2574B24F-E2A1-49B4-965A-816A9A283E65}" dt="2025-06-17T22:03:44.589" v="680" actId="478"/>
-          <ac:cxnSpMkLst>
-            <pc:docMk/>
-            <pc:sldMk cId="1143546009" sldId="259"/>
-            <ac:cxnSpMk id="10" creationId="{67BFA2B7-9132-4C85-BB85-F2D4BD1BEEAB}"/>
-          </ac:cxnSpMkLst>
-        </pc:cxnChg>
         <pc:cxnChg chg="add mod topLvl">
           <ac:chgData name="George Hariman" userId="944226f4-c0bd-444e-8152-728ae792d6b1" providerId="ADAL" clId="{2574B24F-E2A1-49B4-965A-816A9A283E65}" dt="2025-06-18T21:37:49.265" v="2757" actId="165"/>
           <ac:cxnSpMkLst>
@@ -786,14 +578,6 @@
             <pc:docMk/>
             <pc:sldMk cId="208232504" sldId="260"/>
             <ac:spMk id="7" creationId="{0D06B1EE-082A-209E-9716-1D4B5E60F804}"/>
-          </ac:spMkLst>
-        </pc:spChg>
-        <pc:spChg chg="del">
-          <ac:chgData name="George Hariman" userId="944226f4-c0bd-444e-8152-728ae792d6b1" providerId="ADAL" clId="{2574B24F-E2A1-49B4-965A-816A9A283E65}" dt="2025-06-17T22:08:19.831" v="836" actId="478"/>
-          <ac:spMkLst>
-            <pc:docMk/>
-            <pc:sldMk cId="208232504" sldId="260"/>
-            <ac:spMk id="8" creationId="{5BCB7EF5-4E6F-0989-2CF5-8668539BFE6A}"/>
           </ac:spMkLst>
         </pc:spChg>
         <pc:spChg chg="add mod topLvl">
@@ -836,22 +620,6 @@
             <ac:spMk id="18" creationId="{6BBC815C-2AC7-A202-CF1A-A08C93633EC4}"/>
           </ac:spMkLst>
         </pc:spChg>
-        <pc:spChg chg="del">
-          <ac:chgData name="George Hariman" userId="944226f4-c0bd-444e-8152-728ae792d6b1" providerId="ADAL" clId="{2574B24F-E2A1-49B4-965A-816A9A283E65}" dt="2025-06-17T22:08:19.831" v="836" actId="478"/>
-          <ac:spMkLst>
-            <pc:docMk/>
-            <pc:sldMk cId="208232504" sldId="260"/>
-            <ac:spMk id="21" creationId="{93BBE771-C411-5F97-D20E-BACDBFB56295}"/>
-          </ac:spMkLst>
-        </pc:spChg>
-        <pc:spChg chg="add del mod">
-          <ac:chgData name="George Hariman" userId="944226f4-c0bd-444e-8152-728ae792d6b1" providerId="ADAL" clId="{2574B24F-E2A1-49B4-965A-816A9A283E65}" dt="2025-06-17T22:11:39.451" v="1251" actId="478"/>
-          <ac:spMkLst>
-            <pc:docMk/>
-            <pc:sldMk cId="208232504" sldId="260"/>
-            <ac:spMk id="25" creationId="{A39DD927-6AD8-9CB8-A60A-779F8C5432BF}"/>
-          </ac:spMkLst>
-        </pc:spChg>
         <pc:spChg chg="add mod topLvl">
           <ac:chgData name="George Hariman" userId="944226f4-c0bd-444e-8152-728ae792d6b1" providerId="ADAL" clId="{2574B24F-E2A1-49B4-965A-816A9A283E65}" dt="2025-06-18T21:34:39.350" v="2714" actId="1076"/>
           <ac:spMkLst>
@@ -868,36 +636,12 @@
             <ac:spMk id="28" creationId="{F4840324-A71B-A359-ED83-C05C67F44A42}"/>
           </ac:spMkLst>
         </pc:spChg>
-        <pc:grpChg chg="add del mod">
-          <ac:chgData name="George Hariman" userId="944226f4-c0bd-444e-8152-728ae792d6b1" providerId="ADAL" clId="{2574B24F-E2A1-49B4-965A-816A9A283E65}" dt="2025-06-17T22:37:07.499" v="2061" actId="165"/>
-          <ac:grpSpMkLst>
-            <pc:docMk/>
-            <pc:sldMk cId="208232504" sldId="260"/>
-            <ac:grpSpMk id="26" creationId="{FEAC962A-70E1-6BB4-23CF-BCD756B39E20}"/>
-          </ac:grpSpMkLst>
-        </pc:grpChg>
-        <pc:picChg chg="add del mod topLvl">
-          <ac:chgData name="George Hariman" userId="944226f4-c0bd-444e-8152-728ae792d6b1" providerId="ADAL" clId="{2574B24F-E2A1-49B4-965A-816A9A283E65}" dt="2025-06-18T21:34:17.749" v="2706" actId="478"/>
-          <ac:picMkLst>
-            <pc:docMk/>
-            <pc:sldMk cId="208232504" sldId="260"/>
-            <ac:picMk id="4" creationId="{C954ECB2-F50B-C6C0-E8E3-29D536AA1A0F}"/>
-          </ac:picMkLst>
-        </pc:picChg>
         <pc:picChg chg="add mod ord">
           <ac:chgData name="George Hariman" userId="944226f4-c0bd-444e-8152-728ae792d6b1" providerId="ADAL" clId="{2574B24F-E2A1-49B4-965A-816A9A283E65}" dt="2025-06-18T21:33:38.922" v="2704" actId="1076"/>
           <ac:picMkLst>
             <pc:docMk/>
             <pc:sldMk cId="208232504" sldId="260"/>
             <ac:picMk id="6" creationId="{F86E19F3-C24D-8ABA-168C-6E4844D64370}"/>
-          </ac:picMkLst>
-        </pc:picChg>
-        <pc:picChg chg="add del mod topLvl">
-          <ac:chgData name="George Hariman" userId="944226f4-c0bd-444e-8152-728ae792d6b1" providerId="ADAL" clId="{2574B24F-E2A1-49B4-965A-816A9A283E65}" dt="2025-06-18T21:33:11.392" v="2695" actId="478"/>
-          <ac:picMkLst>
-            <pc:docMk/>
-            <pc:sldMk cId="208232504" sldId="260"/>
-            <ac:picMk id="9" creationId="{73699B15-8D9D-1C1B-5CB6-175C4CB81992}"/>
           </ac:picMkLst>
         </pc:picChg>
         <pc:picChg chg="add mod ord">
@@ -908,54 +652,6 @@
             <ac:picMk id="10" creationId="{5ED0079E-1CAC-E276-2D02-8205761130D1}"/>
           </ac:picMkLst>
         </pc:picChg>
-        <pc:picChg chg="del">
-          <ac:chgData name="George Hariman" userId="944226f4-c0bd-444e-8152-728ae792d6b1" providerId="ADAL" clId="{2574B24F-E2A1-49B4-965A-816A9A283E65}" dt="2025-06-17T22:08:19.831" v="836" actId="478"/>
-          <ac:picMkLst>
-            <pc:docMk/>
-            <pc:sldMk cId="208232504" sldId="260"/>
-            <ac:picMk id="10" creationId="{A6253E3C-1EF5-E465-9784-4575627930AA}"/>
-          </ac:picMkLst>
-        </pc:picChg>
-        <pc:picChg chg="del">
-          <ac:chgData name="George Hariman" userId="944226f4-c0bd-444e-8152-728ae792d6b1" providerId="ADAL" clId="{2574B24F-E2A1-49B4-965A-816A9A283E65}" dt="2025-06-17T22:08:19.831" v="836" actId="478"/>
-          <ac:picMkLst>
-            <pc:docMk/>
-            <pc:sldMk cId="208232504" sldId="260"/>
-            <ac:picMk id="12" creationId="{F8B5F295-8C30-A324-FCC7-11C089931A02}"/>
-          </ac:picMkLst>
-        </pc:picChg>
-        <pc:picChg chg="del">
-          <ac:chgData name="George Hariman" userId="944226f4-c0bd-444e-8152-728ae792d6b1" providerId="ADAL" clId="{2574B24F-E2A1-49B4-965A-816A9A283E65}" dt="2025-06-17T22:08:19.831" v="836" actId="478"/>
-          <ac:picMkLst>
-            <pc:docMk/>
-            <pc:sldMk cId="208232504" sldId="260"/>
-            <ac:picMk id="14" creationId="{4E718037-1981-4DDC-D16E-450913CE8104}"/>
-          </ac:picMkLst>
-        </pc:picChg>
-        <pc:picChg chg="del">
-          <ac:chgData name="George Hariman" userId="944226f4-c0bd-444e-8152-728ae792d6b1" providerId="ADAL" clId="{2574B24F-E2A1-49B4-965A-816A9A283E65}" dt="2025-06-17T22:08:19.831" v="836" actId="478"/>
-          <ac:picMkLst>
-            <pc:docMk/>
-            <pc:sldMk cId="208232504" sldId="260"/>
-            <ac:picMk id="20" creationId="{79F7E2AD-014A-CF09-8E26-5857EC79F850}"/>
-          </ac:picMkLst>
-        </pc:picChg>
-        <pc:cxnChg chg="del">
-          <ac:chgData name="George Hariman" userId="944226f4-c0bd-444e-8152-728ae792d6b1" providerId="ADAL" clId="{2574B24F-E2A1-49B4-965A-816A9A283E65}" dt="2025-06-17T22:08:19.831" v="836" actId="478"/>
-          <ac:cxnSpMkLst>
-            <pc:docMk/>
-            <pc:sldMk cId="208232504" sldId="260"/>
-            <ac:cxnSpMk id="16" creationId="{1C716A5C-E410-72F3-E924-FEE844906A5F}"/>
-          </ac:cxnSpMkLst>
-        </pc:cxnChg>
-        <pc:cxnChg chg="add del mod">
-          <ac:chgData name="George Hariman" userId="944226f4-c0bd-444e-8152-728ae792d6b1" providerId="ADAL" clId="{2574B24F-E2A1-49B4-965A-816A9A283E65}" dt="2025-06-17T22:11:18.018" v="1244" actId="478"/>
-          <ac:cxnSpMkLst>
-            <pc:docMk/>
-            <pc:sldMk cId="208232504" sldId="260"/>
-            <ac:cxnSpMk id="22" creationId="{54F09C54-CA3C-4846-2AF5-E70B87A9B9EB}"/>
-          </ac:cxnSpMkLst>
-        </pc:cxnChg>
       </pc:sldChg>
       <pc:sldChg chg="addSp delSp modSp add mod">
         <pc:chgData name="George Hariman" userId="944226f4-c0bd-444e-8152-728ae792d6b1" providerId="ADAL" clId="{2574B24F-E2A1-49B4-965A-816A9A283E65}" dt="2025-06-17T23:03:55.904" v="2339" actId="1076"/>
@@ -1051,14 +747,6 @@
             <ac:spMk id="27" creationId="{B2A7AB0B-58DF-F439-4A48-3A5F19EAB296}"/>
           </ac:spMkLst>
         </pc:spChg>
-        <pc:grpChg chg="add del mod">
-          <ac:chgData name="George Hariman" userId="944226f4-c0bd-444e-8152-728ae792d6b1" providerId="ADAL" clId="{2574B24F-E2A1-49B4-965A-816A9A283E65}" dt="2025-06-17T22:35:56.016" v="2031" actId="165"/>
-          <ac:grpSpMkLst>
-            <pc:docMk/>
-            <pc:sldMk cId="657922982" sldId="261"/>
-            <ac:grpSpMk id="20" creationId="{6506054C-8295-3AE4-AB7A-500E4ACA38ED}"/>
-          </ac:grpSpMkLst>
-        </pc:grpChg>
         <pc:grpChg chg="mod">
           <ac:chgData name="George Hariman" userId="944226f4-c0bd-444e-8152-728ae792d6b1" providerId="ADAL" clId="{2574B24F-E2A1-49B4-965A-816A9A283E65}" dt="2025-06-17T23:03:55.904" v="2339" actId="1076"/>
           <ac:grpSpMkLst>
@@ -1067,44 +755,12 @@
             <ac:grpSpMk id="31" creationId="{B3FC59B0-8C06-7A25-ADBC-FE49EFB47561}"/>
           </ac:grpSpMkLst>
         </pc:grpChg>
-        <pc:picChg chg="add del mod ord">
-          <ac:chgData name="George Hariman" userId="944226f4-c0bd-444e-8152-728ae792d6b1" providerId="ADAL" clId="{2574B24F-E2A1-49B4-965A-816A9A283E65}" dt="2025-06-17T22:33:34.054" v="1900" actId="478"/>
-          <ac:picMkLst>
-            <pc:docMk/>
-            <pc:sldMk cId="657922982" sldId="261"/>
-            <ac:picMk id="4" creationId="{A36E9619-3A3B-BB5C-FEAD-3BCD37A142C4}"/>
-          </ac:picMkLst>
-        </pc:picChg>
-        <pc:picChg chg="del">
-          <ac:chgData name="George Hariman" userId="944226f4-c0bd-444e-8152-728ae792d6b1" providerId="ADAL" clId="{2574B24F-E2A1-49B4-965A-816A9A283E65}" dt="2025-06-17T22:31:46.762" v="1770" actId="478"/>
-          <ac:picMkLst>
-            <pc:docMk/>
-            <pc:sldMk cId="657922982" sldId="261"/>
-            <ac:picMk id="5" creationId="{4BD997F9-2370-87A8-6393-C5CF0A3571D8}"/>
-          </ac:picMkLst>
-        </pc:picChg>
-        <pc:picChg chg="del">
-          <ac:chgData name="George Hariman" userId="944226f4-c0bd-444e-8152-728ae792d6b1" providerId="ADAL" clId="{2574B24F-E2A1-49B4-965A-816A9A283E65}" dt="2025-06-17T22:31:48.151" v="1772" actId="478"/>
-          <ac:picMkLst>
-            <pc:docMk/>
-            <pc:sldMk cId="657922982" sldId="261"/>
-            <ac:picMk id="8" creationId="{B8A22296-5682-B14D-1F26-200517DF8F6F}"/>
-          </ac:picMkLst>
-        </pc:picChg>
         <pc:picChg chg="add mod ord topLvl">
           <ac:chgData name="George Hariman" userId="944226f4-c0bd-444e-8152-728ae792d6b1" providerId="ADAL" clId="{2574B24F-E2A1-49B4-965A-816A9A283E65}" dt="2025-06-17T22:36:46.723" v="2056" actId="164"/>
           <ac:picMkLst>
             <pc:docMk/>
             <pc:sldMk cId="657922982" sldId="261"/>
             <ac:picMk id="10" creationId="{0519A932-252A-326C-7683-A84E9C6CF331}"/>
-          </ac:picMkLst>
-        </pc:picChg>
-        <pc:picChg chg="del">
-          <ac:chgData name="George Hariman" userId="944226f4-c0bd-444e-8152-728ae792d6b1" providerId="ADAL" clId="{2574B24F-E2A1-49B4-965A-816A9A283E65}" dt="2025-06-17T22:31:47.834" v="1771" actId="478"/>
-          <ac:picMkLst>
-            <pc:docMk/>
-            <pc:sldMk cId="657922982" sldId="261"/>
-            <ac:picMk id="11" creationId="{FB9A4276-1266-41A7-889E-6BBD2D9B0008}"/>
           </ac:picMkLst>
         </pc:picChg>
         <pc:picChg chg="add mod">
@@ -1115,14 +771,6 @@
             <ac:picMk id="23" creationId="{3746EB9D-0BE7-4E21-69E1-BEF8A1F89078}"/>
           </ac:picMkLst>
         </pc:picChg>
-        <pc:cxnChg chg="add del mod">
-          <ac:chgData name="George Hariman" userId="944226f4-c0bd-444e-8152-728ae792d6b1" providerId="ADAL" clId="{2574B24F-E2A1-49B4-965A-816A9A283E65}" dt="2025-06-17T22:33:52.158" v="1907" actId="11529"/>
-          <ac:cxnSpMkLst>
-            <pc:docMk/>
-            <pc:sldMk cId="657922982" sldId="261"/>
-            <ac:cxnSpMk id="17" creationId="{AB9CB912-05F2-730B-E8D5-D7AA5CEF506B}"/>
-          </ac:cxnSpMkLst>
-        </pc:cxnChg>
         <pc:cxnChg chg="add mod topLvl">
           <ac:chgData name="George Hariman" userId="944226f4-c0bd-444e-8152-728ae792d6b1" providerId="ADAL" clId="{2574B24F-E2A1-49B4-965A-816A9A283E65}" dt="2025-06-17T22:35:56.016" v="2031" actId="165"/>
           <ac:cxnSpMkLst>
@@ -1183,14 +831,6 @@
             <pc:docMk/>
             <pc:sldMk cId="1382637432" sldId="262"/>
             <ac:spMk id="6" creationId="{C3F20E03-91E4-AE2A-CD7D-6836D2A5E002}"/>
-          </ac:spMkLst>
-        </pc:spChg>
-        <pc:spChg chg="add del mod">
-          <ac:chgData name="George Hariman" userId="944226f4-c0bd-444e-8152-728ae792d6b1" providerId="ADAL" clId="{2574B24F-E2A1-49B4-965A-816A9A283E65}" dt="2025-06-17T23:11:10.999" v="2445"/>
-          <ac:spMkLst>
-            <pc:docMk/>
-            <pc:sldMk cId="1382637432" sldId="262"/>
-            <ac:spMk id="7" creationId="{448086EC-129E-B0D4-FE95-C7C3E3B40321}"/>
           </ac:spMkLst>
         </pc:spChg>
         <pc:spChg chg="add mod">
@@ -1286,14 +926,6 @@
             <ac:spMk id="3" creationId="{5C11C663-907F-081C-F270-A1DF46F7C474}"/>
           </ac:spMkLst>
         </pc:spChg>
-        <pc:spChg chg="del">
-          <ac:chgData name="George Hariman" userId="944226f4-c0bd-444e-8152-728ae792d6b1" providerId="ADAL" clId="{2574B24F-E2A1-49B4-965A-816A9A283E65}" dt="2025-06-17T23:22:04.445" v="2501" actId="478"/>
-          <ac:spMkLst>
-            <pc:docMk/>
-            <pc:sldMk cId="2371463180" sldId="265"/>
-            <ac:spMk id="7" creationId="{861EACE3-1E1E-73BC-6F68-844FBD082299}"/>
-          </ac:spMkLst>
-        </pc:spChg>
         <pc:spChg chg="mod topLvl">
           <ac:chgData name="George Hariman" userId="944226f4-c0bd-444e-8152-728ae792d6b1" providerId="ADAL" clId="{2574B24F-E2A1-49B4-965A-816A9A283E65}" dt="2025-06-18T21:40:18.985" v="2863" actId="164"/>
           <ac:spMkLst>
@@ -1318,22 +950,6 @@
             <ac:spMk id="12" creationId="{6BB596CD-5F8C-5A7E-F7A2-6842AAF565A8}"/>
           </ac:spMkLst>
         </pc:spChg>
-        <pc:spChg chg="del">
-          <ac:chgData name="George Hariman" userId="944226f4-c0bd-444e-8152-728ae792d6b1" providerId="ADAL" clId="{2574B24F-E2A1-49B4-965A-816A9A283E65}" dt="2025-06-17T23:22:05.796" v="2502" actId="478"/>
-          <ac:spMkLst>
-            <pc:docMk/>
-            <pc:sldMk cId="2371463180" sldId="265"/>
-            <ac:spMk id="13" creationId="{F00CF5A3-9C3B-7DF0-0A4D-1C96EACA4F7D}"/>
-          </ac:spMkLst>
-        </pc:spChg>
-        <pc:spChg chg="del">
-          <ac:chgData name="George Hariman" userId="944226f4-c0bd-444e-8152-728ae792d6b1" providerId="ADAL" clId="{2574B24F-E2A1-49B4-965A-816A9A283E65}" dt="2025-06-17T23:22:03.016" v="2500" actId="478"/>
-          <ac:spMkLst>
-            <pc:docMk/>
-            <pc:sldMk cId="2371463180" sldId="265"/>
-            <ac:spMk id="20" creationId="{95979E6E-9643-7183-3141-A345D713B504}"/>
-          </ac:spMkLst>
-        </pc:spChg>
         <pc:spChg chg="mod topLvl">
           <ac:chgData name="George Hariman" userId="944226f4-c0bd-444e-8152-728ae792d6b1" providerId="ADAL" clId="{2574B24F-E2A1-49B4-965A-816A9A283E65}" dt="2025-06-18T21:40:18.985" v="2863" actId="164"/>
           <ac:spMkLst>
@@ -1350,36 +966,12 @@
             <ac:grpSpMk id="7" creationId="{9634B18E-F8DB-F3E7-CEFF-C3936B83DBA3}"/>
           </ac:grpSpMkLst>
         </pc:grpChg>
-        <pc:grpChg chg="del mod">
-          <ac:chgData name="George Hariman" userId="944226f4-c0bd-444e-8152-728ae792d6b1" providerId="ADAL" clId="{2574B24F-E2A1-49B4-965A-816A9A283E65}" dt="2025-06-18T21:39:48.547" v="2852" actId="165"/>
-          <ac:grpSpMkLst>
-            <pc:docMk/>
-            <pc:sldMk cId="2371463180" sldId="265"/>
-            <ac:grpSpMk id="22" creationId="{0FB8D146-BE66-39C6-FCB0-0A1054290227}"/>
-          </ac:grpSpMkLst>
-        </pc:grpChg>
-        <pc:picChg chg="del">
-          <ac:chgData name="George Hariman" userId="944226f4-c0bd-444e-8152-728ae792d6b1" providerId="ADAL" clId="{2574B24F-E2A1-49B4-965A-816A9A283E65}" dt="2025-06-17T23:22:01.591" v="2499" actId="478"/>
-          <ac:picMkLst>
-            <pc:docMk/>
-            <pc:sldMk cId="2371463180" sldId="265"/>
-            <ac:picMk id="4" creationId="{915A12AE-957D-3FE2-2B15-2DE7E2EF55C7}"/>
-          </ac:picMkLst>
-        </pc:picChg>
         <pc:picChg chg="add mod ord">
           <ac:chgData name="George Hariman" userId="944226f4-c0bd-444e-8152-728ae792d6b1" providerId="ADAL" clId="{2574B24F-E2A1-49B4-965A-816A9A283E65}" dt="2025-06-18T21:40:18.985" v="2863" actId="164"/>
           <ac:picMkLst>
             <pc:docMk/>
             <pc:sldMk cId="2371463180" sldId="265"/>
             <ac:picMk id="5" creationId="{380AE12E-7E03-2B74-D97C-6B664C3A3C33}"/>
-          </ac:picMkLst>
-        </pc:picChg>
-        <pc:picChg chg="del mod topLvl">
-          <ac:chgData name="George Hariman" userId="944226f4-c0bd-444e-8152-728ae792d6b1" providerId="ADAL" clId="{2574B24F-E2A1-49B4-965A-816A9A283E65}" dt="2025-06-18T21:39:50.005" v="2853" actId="478"/>
-          <ac:picMkLst>
-            <pc:docMk/>
-            <pc:sldMk cId="2371463180" sldId="265"/>
-            <ac:picMk id="6" creationId="{7BD6556F-F278-17C4-7FD9-639190DE1D67}"/>
           </ac:picMkLst>
         </pc:picChg>
         <pc:cxnChg chg="mod topLvl">
@@ -1390,14 +982,38 @@
             <ac:cxnSpMk id="9" creationId="{32E6A42F-7E8F-F533-4C0E-578BCCD4C635}"/>
           </ac:cxnSpMkLst>
         </pc:cxnChg>
-        <pc:cxnChg chg="del">
-          <ac:chgData name="George Hariman" userId="944226f4-c0bd-444e-8152-728ae792d6b1" providerId="ADAL" clId="{2574B24F-E2A1-49B4-965A-816A9A283E65}" dt="2025-06-17T23:22:07.037" v="2503" actId="478"/>
-          <ac:cxnSpMkLst>
+      </pc:sldChg>
+    </pc:docChg>
+  </pc:docChgLst>
+  <pc:docChgLst>
+    <pc:chgData name="George Hariman" userId="944226f4-c0bd-444e-8152-728ae792d6b1" providerId="ADAL" clId="{A654A3A0-7EF7-4D79-935B-1C606555E407}"/>
+    <pc:docChg chg="modSld sldOrd">
+      <pc:chgData name="George Hariman" userId="944226f4-c0bd-444e-8152-728ae792d6b1" providerId="ADAL" clId="{A654A3A0-7EF7-4D79-935B-1C606555E407}" dt="2025-07-09T17:47:02.555" v="117" actId="13926"/>
+      <pc:docMkLst>
+        <pc:docMk/>
+      </pc:docMkLst>
+      <pc:sldChg chg="modSp mod ord">
+        <pc:chgData name="George Hariman" userId="944226f4-c0bd-444e-8152-728ae792d6b1" providerId="ADAL" clId="{A654A3A0-7EF7-4D79-935B-1C606555E407}" dt="2025-07-09T17:47:02.555" v="117" actId="13926"/>
+        <pc:sldMkLst>
+          <pc:docMk/>
+          <pc:sldMk cId="208232504" sldId="260"/>
+        </pc:sldMkLst>
+        <pc:spChg chg="mod">
+          <ac:chgData name="George Hariman" userId="944226f4-c0bd-444e-8152-728ae792d6b1" providerId="ADAL" clId="{A654A3A0-7EF7-4D79-935B-1C606555E407}" dt="2025-07-09T17:47:02.555" v="117" actId="13926"/>
+          <ac:spMkLst>
             <pc:docMk/>
-            <pc:sldMk cId="2371463180" sldId="265"/>
-            <ac:cxnSpMk id="14" creationId="{C865BFAA-31F4-E1E9-A2EB-106A0BF880DA}"/>
-          </ac:cxnSpMkLst>
-        </pc:cxnChg>
+            <pc:sldMk cId="208232504" sldId="260"/>
+            <ac:spMk id="2" creationId="{29363A13-4002-A891-1FB1-A716AE9764A3}"/>
+          </ac:spMkLst>
+        </pc:spChg>
+        <pc:spChg chg="mod">
+          <ac:chgData name="George Hariman" userId="944226f4-c0bd-444e-8152-728ae792d6b1" providerId="ADAL" clId="{A654A3A0-7EF7-4D79-935B-1C606555E407}" dt="2025-07-09T17:46:58.417" v="115" actId="20577"/>
+          <ac:spMkLst>
+            <pc:docMk/>
+            <pc:sldMk cId="208232504" sldId="260"/>
+            <ac:spMk id="18" creationId="{6BBC815C-2AC7-A202-CF1A-A08C93633EC4}"/>
+          </ac:spMkLst>
+        </pc:spChg>
       </pc:sldChg>
     </pc:docChg>
   </pc:docChgLst>
@@ -3362,7 +2978,7 @@
           <a:p>
             <a:fld id="{2B0A73C7-85E1-4631-82BB-A7046A93EA7F}" type="datetimeFigureOut">
               <a:rPr lang="en-US" smtClean="0"/>
-              <a:t>6/18/2025</a:t>
+              <a:t>7/9/2025</a:t>
             </a:fld>
             <a:endParaRPr lang="en-US"/>
           </a:p>
@@ -7228,6 +6844,776 @@
         <p:cNvPr id="1" name="">
           <a:extLst>
             <a:ext uri="{FF2B5EF4-FFF2-40B4-BE49-F238E27FC236}">
+              <a16:creationId xmlns:a16="http://schemas.microsoft.com/office/drawing/2014/main" id="{5A67EB2B-071C-BE99-5361-62EEA1268B5C}"/>
+            </a:ext>
+          </a:extLst>
+        </p:cNvPr>
+        <p:cNvGrpSpPr/>
+        <p:nvPr/>
+      </p:nvGrpSpPr>
+      <p:grpSpPr>
+        <a:xfrm>
+          <a:off x="0" y="0"/>
+          <a:ext cx="0" cy="0"/>
+          <a:chOff x="0" y="0"/>
+          <a:chExt cx="0" cy="0"/>
+        </a:xfrm>
+      </p:grpSpPr>
+      <p:pic>
+        <p:nvPicPr>
+          <p:cNvPr id="10" name="Picture 9">
+            <a:extLst>
+              <a:ext uri="{FF2B5EF4-FFF2-40B4-BE49-F238E27FC236}">
+                <a16:creationId xmlns:a16="http://schemas.microsoft.com/office/drawing/2014/main" id="{5ED0079E-1CAC-E276-2D02-8205761130D1}"/>
+              </a:ext>
+            </a:extLst>
+          </p:cNvPr>
+          <p:cNvPicPr>
+            <a:picLocks noChangeAspect="1"/>
+          </p:cNvPicPr>
+          <p:nvPr/>
+        </p:nvPicPr>
+        <p:blipFill>
+          <a:blip r:embed="rId2"/>
+          <a:stretch>
+            <a:fillRect/>
+          </a:stretch>
+        </p:blipFill>
+        <p:spPr>
+          <a:xfrm>
+            <a:off x="702703" y="848248"/>
+            <a:ext cx="5796420" cy="2966487"/>
+          </a:xfrm>
+          <a:prstGeom prst="rect">
+            <a:avLst/>
+          </a:prstGeom>
+        </p:spPr>
+      </p:pic>
+      <p:pic>
+        <p:nvPicPr>
+          <p:cNvPr id="6" name="Picture 5">
+            <a:extLst>
+              <a:ext uri="{FF2B5EF4-FFF2-40B4-BE49-F238E27FC236}">
+                <a16:creationId xmlns:a16="http://schemas.microsoft.com/office/drawing/2014/main" id="{F86E19F3-C24D-8ABA-168C-6E4844D64370}"/>
+              </a:ext>
+            </a:extLst>
+          </p:cNvPr>
+          <p:cNvPicPr>
+            <a:picLocks noChangeAspect="1"/>
+          </p:cNvPicPr>
+          <p:nvPr/>
+        </p:nvPicPr>
+        <p:blipFill>
+          <a:blip r:embed="rId3"/>
+          <a:stretch>
+            <a:fillRect/>
+          </a:stretch>
+        </p:blipFill>
+        <p:spPr>
+          <a:xfrm>
+            <a:off x="745207" y="3906195"/>
+            <a:ext cx="5753915" cy="2951805"/>
+          </a:xfrm>
+          <a:prstGeom prst="rect">
+            <a:avLst/>
+          </a:prstGeom>
+        </p:spPr>
+      </p:pic>
+      <p:sp>
+        <p:nvSpPr>
+          <p:cNvPr id="2" name="Title 1">
+            <a:extLst>
+              <a:ext uri="{FF2B5EF4-FFF2-40B4-BE49-F238E27FC236}">
+                <a16:creationId xmlns:a16="http://schemas.microsoft.com/office/drawing/2014/main" id="{29363A13-4002-A891-1FB1-A716AE9764A3}"/>
+              </a:ext>
+            </a:extLst>
+          </p:cNvPr>
+          <p:cNvSpPr>
+            <a:spLocks noGrp="1"/>
+          </p:cNvSpPr>
+          <p:nvPr>
+            <p:ph type="title"/>
+          </p:nvPr>
+        </p:nvSpPr>
+        <p:spPr/>
+        <p:txBody>
+          <a:bodyPr/>
+          <a:lstStyle/>
+          <a:p>
+            <a:r>
+              <a:rPr lang="en-US" dirty="0"/>
+              <a:t>GUI: MISC Control Tab (</a:t>
+            </a:r>
+            <a:r>
+              <a:rPr lang="en-US" dirty="0">
+                <a:solidFill>
+                  <a:srgbClr val="FF0000"/>
+                </a:solidFill>
+                <a:highlight>
+                  <a:srgbClr val="FFFF00"/>
+                </a:highlight>
+              </a:rPr>
+              <a:t>DO THIS FIRST to avoid GUI overflow</a:t>
+            </a:r>
+            <a:r>
+              <a:rPr lang="en-US" dirty="0"/>
+              <a:t>)</a:t>
+            </a:r>
+          </a:p>
+        </p:txBody>
+      </p:sp>
+      <p:sp>
+        <p:nvSpPr>
+          <p:cNvPr id="7" name="TextBox 6">
+            <a:extLst>
+              <a:ext uri="{FF2B5EF4-FFF2-40B4-BE49-F238E27FC236}">
+                <a16:creationId xmlns:a16="http://schemas.microsoft.com/office/drawing/2014/main" id="{0D06B1EE-082A-209E-9716-1D4B5E60F804}"/>
+              </a:ext>
+            </a:extLst>
+          </p:cNvPr>
+          <p:cNvSpPr txBox="1"/>
+          <p:nvPr/>
+        </p:nvSpPr>
+        <p:spPr>
+          <a:xfrm>
+            <a:off x="658761" y="757084"/>
+            <a:ext cx="1188339" cy="369332"/>
+          </a:xfrm>
+          <a:prstGeom prst="rect">
+            <a:avLst/>
+          </a:prstGeom>
+          <a:noFill/>
+        </p:spPr>
+        <p:txBody>
+          <a:bodyPr wrap="none" rtlCol="0">
+            <a:spAutoFit/>
+          </a:bodyPr>
+          <a:lstStyle/>
+          <a:p>
+            <a:pPr>
+              <a:spcBef>
+                <a:spcPts val="400"/>
+              </a:spcBef>
+            </a:pPr>
+            <a:r>
+              <a:rPr lang="en-US" dirty="0">
+                <a:solidFill>
+                  <a:schemeClr val="tx2"/>
+                </a:solidFill>
+                <a:latin typeface="+mn-ea"/>
+                <a:cs typeface="メイリオ" panose="020B0604030504040204" pitchFamily="50" charset="-128"/>
+              </a:rPr>
+              <a:t>Main Tab</a:t>
+            </a:r>
+            <a:endParaRPr kumimoji="1" lang="en-US" sz="1800" dirty="0">
+              <a:solidFill>
+                <a:schemeClr val="tx2"/>
+              </a:solidFill>
+              <a:latin typeface="+mn-ea"/>
+              <a:ea typeface="+mn-ea"/>
+              <a:cs typeface="メイリオ" panose="020B0604030504040204" pitchFamily="50" charset="-128"/>
+            </a:endParaRPr>
+          </a:p>
+        </p:txBody>
+      </p:sp>
+      <p:sp>
+        <p:nvSpPr>
+          <p:cNvPr id="5" name="Rectangle 4">
+            <a:extLst>
+              <a:ext uri="{FF2B5EF4-FFF2-40B4-BE49-F238E27FC236}">
+                <a16:creationId xmlns:a16="http://schemas.microsoft.com/office/drawing/2014/main" id="{19EE73C8-D819-8B55-60C8-8DB89892D618}"/>
+              </a:ext>
+            </a:extLst>
+          </p:cNvPr>
+          <p:cNvSpPr/>
+          <p:nvPr/>
+        </p:nvSpPr>
+        <p:spPr>
+          <a:xfrm>
+            <a:off x="2212258" y="2054943"/>
+            <a:ext cx="3913239" cy="294968"/>
+          </a:xfrm>
+          <a:prstGeom prst="rect">
+            <a:avLst/>
+          </a:prstGeom>
+          <a:noFill/>
+          <a:ln w="38100">
+            <a:solidFill>
+              <a:srgbClr val="00B050"/>
+            </a:solidFill>
+          </a:ln>
+        </p:spPr>
+        <p:style>
+          <a:lnRef idx="2">
+            <a:schemeClr val="accent1">
+              <a:shade val="50000"/>
+            </a:schemeClr>
+          </a:lnRef>
+          <a:fillRef idx="1">
+            <a:schemeClr val="accent1"/>
+          </a:fillRef>
+          <a:effectRef idx="0">
+            <a:schemeClr val="accent1"/>
+          </a:effectRef>
+          <a:fontRef idx="minor">
+            <a:schemeClr val="lt1"/>
+          </a:fontRef>
+        </p:style>
+        <p:txBody>
+          <a:bodyPr rot="0" spcFirstLastPara="0" vertOverflow="overflow" horzOverflow="overflow" vert="horz" wrap="square" lIns="91440" tIns="45720" rIns="91440" bIns="45720" numCol="1" spcCol="0" rtlCol="0" fromWordArt="0" anchor="t" anchorCtr="0" forceAA="0" compatLnSpc="1">
+            <a:prstTxWarp prst="textNoShape">
+              <a:avLst/>
+            </a:prstTxWarp>
+            <a:noAutofit/>
+          </a:bodyPr>
+          <a:lstStyle/>
+          <a:p>
+            <a:pPr algn="ctr">
+              <a:spcBef>
+                <a:spcPts val="400"/>
+              </a:spcBef>
+            </a:pPr>
+            <a:endParaRPr kumimoji="1" lang="en-US" sz="1400" dirty="0">
+              <a:solidFill>
+                <a:schemeClr val="tx2"/>
+              </a:solidFill>
+              <a:latin typeface="+mn-ea"/>
+              <a:cs typeface="メイリオ" panose="020B0604030504040204" pitchFamily="50" charset="-128"/>
+            </a:endParaRPr>
+          </a:p>
+        </p:txBody>
+      </p:sp>
+      <p:sp>
+        <p:nvSpPr>
+          <p:cNvPr id="11" name="TextBox 10">
+            <a:extLst>
+              <a:ext uri="{FF2B5EF4-FFF2-40B4-BE49-F238E27FC236}">
+                <a16:creationId xmlns:a16="http://schemas.microsoft.com/office/drawing/2014/main" id="{2A0C8B57-675C-1DB0-7662-70EDC635D666}"/>
+              </a:ext>
+            </a:extLst>
+          </p:cNvPr>
+          <p:cNvSpPr txBox="1"/>
+          <p:nvPr/>
+        </p:nvSpPr>
+        <p:spPr>
+          <a:xfrm>
+            <a:off x="742335" y="3908322"/>
+            <a:ext cx="1246047" cy="369332"/>
+          </a:xfrm>
+          <a:prstGeom prst="rect">
+            <a:avLst/>
+          </a:prstGeom>
+          <a:noFill/>
+        </p:spPr>
+        <p:txBody>
+          <a:bodyPr wrap="none" rtlCol="0">
+            <a:spAutoFit/>
+          </a:bodyPr>
+          <a:lstStyle/>
+          <a:p>
+            <a:pPr>
+              <a:spcBef>
+                <a:spcPts val="400"/>
+              </a:spcBef>
+            </a:pPr>
+            <a:r>
+              <a:rPr lang="en-US" dirty="0">
+                <a:solidFill>
+                  <a:schemeClr val="tx2"/>
+                </a:solidFill>
+                <a:latin typeface="+mn-ea"/>
+                <a:cs typeface="メイリオ" panose="020B0604030504040204" pitchFamily="50" charset="-128"/>
+              </a:rPr>
+              <a:t>MISC Tab</a:t>
+            </a:r>
+            <a:endParaRPr kumimoji="1" lang="en-US" sz="1800" dirty="0">
+              <a:solidFill>
+                <a:schemeClr val="tx2"/>
+              </a:solidFill>
+              <a:latin typeface="+mn-ea"/>
+              <a:ea typeface="+mn-ea"/>
+              <a:cs typeface="メイリオ" panose="020B0604030504040204" pitchFamily="50" charset="-128"/>
+            </a:endParaRPr>
+          </a:p>
+        </p:txBody>
+      </p:sp>
+      <p:sp>
+        <p:nvSpPr>
+          <p:cNvPr id="13" name="Rectangle 12">
+            <a:extLst>
+              <a:ext uri="{FF2B5EF4-FFF2-40B4-BE49-F238E27FC236}">
+                <a16:creationId xmlns:a16="http://schemas.microsoft.com/office/drawing/2014/main" id="{2E1D9537-265B-1388-9A22-9F99FDC70F46}"/>
+              </a:ext>
+            </a:extLst>
+          </p:cNvPr>
+          <p:cNvSpPr/>
+          <p:nvPr/>
+        </p:nvSpPr>
+        <p:spPr>
+          <a:xfrm>
+            <a:off x="1174955" y="4989871"/>
+            <a:ext cx="4272116" cy="294968"/>
+          </a:xfrm>
+          <a:prstGeom prst="rect">
+            <a:avLst/>
+          </a:prstGeom>
+          <a:noFill/>
+          <a:ln w="38100">
+            <a:solidFill>
+              <a:srgbClr val="00B050"/>
+            </a:solidFill>
+          </a:ln>
+        </p:spPr>
+        <p:style>
+          <a:lnRef idx="2">
+            <a:schemeClr val="accent1">
+              <a:shade val="50000"/>
+            </a:schemeClr>
+          </a:lnRef>
+          <a:fillRef idx="1">
+            <a:schemeClr val="accent1"/>
+          </a:fillRef>
+          <a:effectRef idx="0">
+            <a:schemeClr val="accent1"/>
+          </a:effectRef>
+          <a:fontRef idx="minor">
+            <a:schemeClr val="lt1"/>
+          </a:fontRef>
+        </p:style>
+        <p:txBody>
+          <a:bodyPr rot="0" spcFirstLastPara="0" vertOverflow="overflow" horzOverflow="overflow" vert="horz" wrap="square" lIns="91440" tIns="45720" rIns="91440" bIns="45720" numCol="1" spcCol="0" rtlCol="0" fromWordArt="0" anchor="t" anchorCtr="0" forceAA="0" compatLnSpc="1">
+            <a:prstTxWarp prst="textNoShape">
+              <a:avLst/>
+            </a:prstTxWarp>
+            <a:noAutofit/>
+          </a:bodyPr>
+          <a:lstStyle/>
+          <a:p>
+            <a:pPr algn="ctr">
+              <a:spcBef>
+                <a:spcPts val="400"/>
+              </a:spcBef>
+            </a:pPr>
+            <a:endParaRPr kumimoji="1" lang="en-US" sz="1400" dirty="0">
+              <a:solidFill>
+                <a:schemeClr val="tx2"/>
+              </a:solidFill>
+              <a:latin typeface="+mn-ea"/>
+              <a:cs typeface="メイリオ" panose="020B0604030504040204" pitchFamily="50" charset="-128"/>
+            </a:endParaRPr>
+          </a:p>
+        </p:txBody>
+      </p:sp>
+      <p:sp>
+        <p:nvSpPr>
+          <p:cNvPr id="15" name="Rectangle 14">
+            <a:extLst>
+              <a:ext uri="{FF2B5EF4-FFF2-40B4-BE49-F238E27FC236}">
+                <a16:creationId xmlns:a16="http://schemas.microsoft.com/office/drawing/2014/main" id="{8F92EF18-82BF-1E5B-46AD-90CE9BBEA5A7}"/>
+              </a:ext>
+            </a:extLst>
+          </p:cNvPr>
+          <p:cNvSpPr/>
+          <p:nvPr/>
+        </p:nvSpPr>
+        <p:spPr>
+          <a:xfrm>
+            <a:off x="1160207" y="5624052"/>
+            <a:ext cx="4272116" cy="294968"/>
+          </a:xfrm>
+          <a:prstGeom prst="rect">
+            <a:avLst/>
+          </a:prstGeom>
+          <a:noFill/>
+          <a:ln w="38100">
+            <a:solidFill>
+              <a:srgbClr val="FFC000"/>
+            </a:solidFill>
+          </a:ln>
+        </p:spPr>
+        <p:style>
+          <a:lnRef idx="2">
+            <a:schemeClr val="accent1">
+              <a:shade val="50000"/>
+            </a:schemeClr>
+          </a:lnRef>
+          <a:fillRef idx="1">
+            <a:schemeClr val="accent1"/>
+          </a:fillRef>
+          <a:effectRef idx="0">
+            <a:schemeClr val="accent1"/>
+          </a:effectRef>
+          <a:fontRef idx="minor">
+            <a:schemeClr val="lt1"/>
+          </a:fontRef>
+        </p:style>
+        <p:txBody>
+          <a:bodyPr rot="0" spcFirstLastPara="0" vertOverflow="overflow" horzOverflow="overflow" vert="horz" wrap="square" lIns="91440" tIns="45720" rIns="91440" bIns="45720" numCol="1" spcCol="0" rtlCol="0" fromWordArt="0" anchor="t" anchorCtr="0" forceAA="0" compatLnSpc="1">
+            <a:prstTxWarp prst="textNoShape">
+              <a:avLst/>
+            </a:prstTxWarp>
+            <a:noAutofit/>
+          </a:bodyPr>
+          <a:lstStyle/>
+          <a:p>
+            <a:pPr algn="ctr">
+              <a:spcBef>
+                <a:spcPts val="400"/>
+              </a:spcBef>
+            </a:pPr>
+            <a:endParaRPr kumimoji="1" lang="en-US" sz="1400" dirty="0">
+              <a:solidFill>
+                <a:schemeClr val="tx2"/>
+              </a:solidFill>
+              <a:latin typeface="+mn-ea"/>
+              <a:cs typeface="メイリオ" panose="020B0604030504040204" pitchFamily="50" charset="-128"/>
+            </a:endParaRPr>
+          </a:p>
+        </p:txBody>
+      </p:sp>
+      <p:sp>
+        <p:nvSpPr>
+          <p:cNvPr id="17" name="Rectangle 16">
+            <a:extLst>
+              <a:ext uri="{FF2B5EF4-FFF2-40B4-BE49-F238E27FC236}">
+                <a16:creationId xmlns:a16="http://schemas.microsoft.com/office/drawing/2014/main" id="{AEFE8A87-C3D1-80C9-269E-2BE37DF4FB9F}"/>
+              </a:ext>
+            </a:extLst>
+          </p:cNvPr>
+          <p:cNvSpPr/>
+          <p:nvPr/>
+        </p:nvSpPr>
+        <p:spPr>
+          <a:xfrm>
+            <a:off x="2187679" y="2993923"/>
+            <a:ext cx="3878825" cy="294968"/>
+          </a:xfrm>
+          <a:prstGeom prst="rect">
+            <a:avLst/>
+          </a:prstGeom>
+          <a:noFill/>
+          <a:ln w="38100">
+            <a:solidFill>
+              <a:srgbClr val="FFC000"/>
+            </a:solidFill>
+          </a:ln>
+        </p:spPr>
+        <p:style>
+          <a:lnRef idx="2">
+            <a:schemeClr val="accent1">
+              <a:shade val="50000"/>
+            </a:schemeClr>
+          </a:lnRef>
+          <a:fillRef idx="1">
+            <a:schemeClr val="accent1"/>
+          </a:fillRef>
+          <a:effectRef idx="0">
+            <a:schemeClr val="accent1"/>
+          </a:effectRef>
+          <a:fontRef idx="minor">
+            <a:schemeClr val="lt1"/>
+          </a:fontRef>
+        </p:style>
+        <p:txBody>
+          <a:bodyPr rot="0" spcFirstLastPara="0" vertOverflow="overflow" horzOverflow="overflow" vert="horz" wrap="square" lIns="91440" tIns="45720" rIns="91440" bIns="45720" numCol="1" spcCol="0" rtlCol="0" fromWordArt="0" anchor="t" anchorCtr="0" forceAA="0" compatLnSpc="1">
+            <a:prstTxWarp prst="textNoShape">
+              <a:avLst/>
+            </a:prstTxWarp>
+            <a:noAutofit/>
+          </a:bodyPr>
+          <a:lstStyle/>
+          <a:p>
+            <a:pPr algn="ctr">
+              <a:spcBef>
+                <a:spcPts val="400"/>
+              </a:spcBef>
+            </a:pPr>
+            <a:endParaRPr kumimoji="1" lang="en-US" sz="1400" dirty="0">
+              <a:solidFill>
+                <a:schemeClr val="tx2"/>
+              </a:solidFill>
+              <a:latin typeface="+mn-ea"/>
+              <a:cs typeface="メイリオ" panose="020B0604030504040204" pitchFamily="50" charset="-128"/>
+            </a:endParaRPr>
+          </a:p>
+        </p:txBody>
+      </p:sp>
+      <p:sp>
+        <p:nvSpPr>
+          <p:cNvPr id="18" name="TextBox 17">
+            <a:extLst>
+              <a:ext uri="{FF2B5EF4-FFF2-40B4-BE49-F238E27FC236}">
+                <a16:creationId xmlns:a16="http://schemas.microsoft.com/office/drawing/2014/main" id="{6BBC815C-2AC7-A202-CF1A-A08C93633EC4}"/>
+              </a:ext>
+            </a:extLst>
+          </p:cNvPr>
+          <p:cNvSpPr txBox="1"/>
+          <p:nvPr/>
+        </p:nvSpPr>
+        <p:spPr>
+          <a:xfrm>
+            <a:off x="7295537" y="953729"/>
+            <a:ext cx="4237702" cy="5560497"/>
+          </a:xfrm>
+          <a:prstGeom prst="rect">
+            <a:avLst/>
+          </a:prstGeom>
+          <a:noFill/>
+        </p:spPr>
+        <p:txBody>
+          <a:bodyPr wrap="square" rtlCol="0">
+            <a:spAutoFit/>
+          </a:bodyPr>
+          <a:lstStyle/>
+          <a:p>
+            <a:pPr>
+              <a:spcBef>
+                <a:spcPts val="400"/>
+              </a:spcBef>
+            </a:pPr>
+            <a:r>
+              <a:rPr kumimoji="1" lang="en-US" sz="1800" dirty="0">
+                <a:solidFill>
+                  <a:schemeClr val="tx2"/>
+                </a:solidFill>
+                <a:latin typeface="+mn-ea"/>
+                <a:ea typeface="+mn-ea"/>
+                <a:cs typeface="メイリオ" panose="020B0604030504040204" pitchFamily="50" charset="-128"/>
+              </a:rPr>
+              <a:t>The MISC Tab has a multiplier for the Flow Rate, and number of Poles for the RPM. Now the multiplier will be remembered </a:t>
+            </a:r>
+            <a:r>
+              <a:rPr lang="en-US" dirty="0">
+                <a:solidFill>
+                  <a:schemeClr val="tx2"/>
+                </a:solidFill>
+                <a:latin typeface="+mn-ea"/>
+                <a:cs typeface="メイリオ" panose="020B0604030504040204" pitchFamily="50" charset="-128"/>
+              </a:rPr>
+              <a:t>from session to session.</a:t>
+            </a:r>
+          </a:p>
+          <a:p>
+            <a:pPr>
+              <a:spcBef>
+                <a:spcPts val="400"/>
+              </a:spcBef>
+            </a:pPr>
+            <a:endParaRPr kumimoji="1" lang="en-US" sz="1800" dirty="0">
+              <a:solidFill>
+                <a:schemeClr val="tx2"/>
+              </a:solidFill>
+              <a:latin typeface="+mn-ea"/>
+              <a:ea typeface="+mn-ea"/>
+              <a:cs typeface="メイリオ" panose="020B0604030504040204" pitchFamily="50" charset="-128"/>
+            </a:endParaRPr>
+          </a:p>
+          <a:p>
+            <a:pPr>
+              <a:spcBef>
+                <a:spcPts val="400"/>
+              </a:spcBef>
+            </a:pPr>
+            <a:r>
+              <a:rPr lang="en-US" dirty="0">
+                <a:solidFill>
+                  <a:schemeClr val="tx2"/>
+                </a:solidFill>
+                <a:latin typeface="+mn-ea"/>
+                <a:cs typeface="メイリオ" panose="020B0604030504040204" pitchFamily="50" charset="-128"/>
+              </a:rPr>
+              <a:t>The value reported on the Flow Rate in the Main Tab are pulse counted from Arduino and multiplied by the ratio in the MISC Tab. Similarly the RPM is adjusted based on the entered number of Poles.</a:t>
+            </a:r>
+          </a:p>
+          <a:p>
+            <a:pPr>
+              <a:spcBef>
+                <a:spcPts val="400"/>
+              </a:spcBef>
+            </a:pPr>
+            <a:endParaRPr lang="en-US" dirty="0">
+              <a:solidFill>
+                <a:schemeClr val="tx2"/>
+              </a:solidFill>
+              <a:latin typeface="+mn-ea"/>
+              <a:cs typeface="メイリオ" panose="020B0604030504040204" pitchFamily="50" charset="-128"/>
+            </a:endParaRPr>
+          </a:p>
+          <a:p>
+            <a:pPr>
+              <a:spcBef>
+                <a:spcPts val="400"/>
+              </a:spcBef>
+            </a:pPr>
+            <a:r>
+              <a:rPr kumimoji="1" lang="en-US" sz="1800" dirty="0">
+                <a:solidFill>
+                  <a:schemeClr val="tx2"/>
+                </a:solidFill>
+                <a:latin typeface="+mn-ea"/>
+                <a:ea typeface="+mn-ea"/>
+                <a:cs typeface="メイリオ" panose="020B0604030504040204" pitchFamily="50" charset="-128"/>
+              </a:rPr>
+              <a:t>Change the number in MISC Tab, to adjust accordingly to get the correct conversion from pulses (Hz) to L/min and RPM shown in Main Tab</a:t>
+            </a:r>
+          </a:p>
+        </p:txBody>
+      </p:sp>
+      <p:sp>
+        <p:nvSpPr>
+          <p:cNvPr id="27" name="Rectangle: Rounded Corners 26">
+            <a:extLst>
+              <a:ext uri="{FF2B5EF4-FFF2-40B4-BE49-F238E27FC236}">
+                <a16:creationId xmlns:a16="http://schemas.microsoft.com/office/drawing/2014/main" id="{3CAB54F4-F106-0E19-5DC9-5E03548FEE89}"/>
+              </a:ext>
+            </a:extLst>
+          </p:cNvPr>
+          <p:cNvSpPr/>
+          <p:nvPr/>
+        </p:nvSpPr>
+        <p:spPr>
+          <a:xfrm>
+            <a:off x="766916" y="1209368"/>
+            <a:ext cx="589935" cy="255639"/>
+          </a:xfrm>
+          <a:prstGeom prst="roundRect">
+            <a:avLst/>
+          </a:prstGeom>
+          <a:noFill/>
+          <a:ln w="57150">
+            <a:solidFill>
+              <a:srgbClr val="FF0000"/>
+            </a:solidFill>
+          </a:ln>
+        </p:spPr>
+        <p:style>
+          <a:lnRef idx="2">
+            <a:schemeClr val="accent1">
+              <a:shade val="50000"/>
+            </a:schemeClr>
+          </a:lnRef>
+          <a:fillRef idx="1">
+            <a:schemeClr val="accent1"/>
+          </a:fillRef>
+          <a:effectRef idx="0">
+            <a:schemeClr val="accent1"/>
+          </a:effectRef>
+          <a:fontRef idx="minor">
+            <a:schemeClr val="lt1"/>
+          </a:fontRef>
+        </p:style>
+        <p:txBody>
+          <a:bodyPr rot="0" spcFirstLastPara="0" vertOverflow="overflow" horzOverflow="overflow" vert="horz" wrap="square" lIns="91440" tIns="45720" rIns="91440" bIns="45720" numCol="1" spcCol="0" rtlCol="0" fromWordArt="0" anchor="t" anchorCtr="0" forceAA="0" compatLnSpc="1">
+            <a:prstTxWarp prst="textNoShape">
+              <a:avLst/>
+            </a:prstTxWarp>
+            <a:noAutofit/>
+          </a:bodyPr>
+          <a:lstStyle/>
+          <a:p>
+            <a:pPr algn="ctr">
+              <a:spcBef>
+                <a:spcPts val="400"/>
+              </a:spcBef>
+            </a:pPr>
+            <a:endParaRPr kumimoji="1" lang="en-US" sz="1400" dirty="0">
+              <a:solidFill>
+                <a:schemeClr val="tx2"/>
+              </a:solidFill>
+              <a:latin typeface="+mn-ea"/>
+              <a:cs typeface="メイリオ" panose="020B0604030504040204" pitchFamily="50" charset="-128"/>
+            </a:endParaRPr>
+          </a:p>
+        </p:txBody>
+      </p:sp>
+      <p:sp>
+        <p:nvSpPr>
+          <p:cNvPr id="28" name="Rectangle: Rounded Corners 27">
+            <a:extLst>
+              <a:ext uri="{FF2B5EF4-FFF2-40B4-BE49-F238E27FC236}">
+                <a16:creationId xmlns:a16="http://schemas.microsoft.com/office/drawing/2014/main" id="{F4840324-A71B-A359-ED83-C05C67F44A42}"/>
+              </a:ext>
+            </a:extLst>
+          </p:cNvPr>
+          <p:cNvSpPr/>
+          <p:nvPr/>
+        </p:nvSpPr>
+        <p:spPr>
+          <a:xfrm>
+            <a:off x="1814052" y="4272116"/>
+            <a:ext cx="589935" cy="255639"/>
+          </a:xfrm>
+          <a:prstGeom prst="roundRect">
+            <a:avLst/>
+          </a:prstGeom>
+          <a:noFill/>
+          <a:ln w="57150">
+            <a:solidFill>
+              <a:srgbClr val="FF0000"/>
+            </a:solidFill>
+          </a:ln>
+        </p:spPr>
+        <p:style>
+          <a:lnRef idx="2">
+            <a:schemeClr val="accent1">
+              <a:shade val="50000"/>
+            </a:schemeClr>
+          </a:lnRef>
+          <a:fillRef idx="1">
+            <a:schemeClr val="accent1"/>
+          </a:fillRef>
+          <a:effectRef idx="0">
+            <a:schemeClr val="accent1"/>
+          </a:effectRef>
+          <a:fontRef idx="minor">
+            <a:schemeClr val="lt1"/>
+          </a:fontRef>
+        </p:style>
+        <p:txBody>
+          <a:bodyPr rot="0" spcFirstLastPara="0" vertOverflow="overflow" horzOverflow="overflow" vert="horz" wrap="square" lIns="91440" tIns="45720" rIns="91440" bIns="45720" numCol="1" spcCol="0" rtlCol="0" fromWordArt="0" anchor="t" anchorCtr="0" forceAA="0" compatLnSpc="1">
+            <a:prstTxWarp prst="textNoShape">
+              <a:avLst/>
+            </a:prstTxWarp>
+            <a:noAutofit/>
+          </a:bodyPr>
+          <a:lstStyle/>
+          <a:p>
+            <a:pPr algn="ctr">
+              <a:spcBef>
+                <a:spcPts val="400"/>
+              </a:spcBef>
+            </a:pPr>
+            <a:endParaRPr kumimoji="1" lang="en-US" sz="1400" dirty="0">
+              <a:solidFill>
+                <a:schemeClr val="tx2"/>
+              </a:solidFill>
+              <a:latin typeface="+mn-ea"/>
+              <a:cs typeface="メイリオ" panose="020B0604030504040204" pitchFamily="50" charset="-128"/>
+            </a:endParaRPr>
+          </a:p>
+        </p:txBody>
+      </p:sp>
+    </p:spTree>
+    <p:extLst>
+      <p:ext uri="{BB962C8B-B14F-4D97-AF65-F5344CB8AC3E}">
+        <p14:creationId xmlns:p14="http://schemas.microsoft.com/office/powerpoint/2010/main" val="208232504"/>
+      </p:ext>
+    </p:extLst>
+  </p:cSld>
+  <p:clrMapOvr>
+    <a:masterClrMapping/>
+  </p:clrMapOvr>
+</p:sld>
+</file>
+
+<file path=ppt/slides/slide6.xml><?xml version="1.0" encoding="utf-8"?>
+<p:sld xmlns:a="http://schemas.openxmlformats.org/drawingml/2006/main" xmlns:r="http://schemas.openxmlformats.org/officeDocument/2006/relationships" xmlns:p="http://schemas.openxmlformats.org/presentationml/2006/main">
+  <p:cSld>
+    <p:spTree>
+      <p:nvGrpSpPr>
+        <p:cNvPr id="1" name="">
+          <a:extLst>
+            <a:ext uri="{FF2B5EF4-FFF2-40B4-BE49-F238E27FC236}">
               <a16:creationId xmlns:a16="http://schemas.microsoft.com/office/drawing/2014/main" id="{0433405B-0211-C85C-16C3-406094397376}"/>
             </a:ext>
           </a:extLst>
@@ -7560,7 +7946,7 @@
 </p:sld>
 </file>
 
-<file path=ppt/slides/slide6.xml><?xml version="1.0" encoding="utf-8"?>
+<file path=ppt/slides/slide7.xml><?xml version="1.0" encoding="utf-8"?>
 <p:sld xmlns:a="http://schemas.openxmlformats.org/drawingml/2006/main" xmlns:r="http://schemas.openxmlformats.org/officeDocument/2006/relationships" xmlns:p="http://schemas.openxmlformats.org/presentationml/2006/main">
   <p:cSld>
     <p:spTree>
@@ -8444,7 +8830,7 @@
 </p:sld>
 </file>
 
-<file path=ppt/slides/slide7.xml><?xml version="1.0" encoding="utf-8"?>
+<file path=ppt/slides/slide8.xml><?xml version="1.0" encoding="utf-8"?>
 <p:sld xmlns:a="http://schemas.openxmlformats.org/drawingml/2006/main" xmlns:r="http://schemas.openxmlformats.org/officeDocument/2006/relationships" xmlns:p="http://schemas.openxmlformats.org/presentationml/2006/main">
   <p:cSld>
     <p:spTree>
@@ -8943,768 +9329,6 @@
     <p:extLst>
       <p:ext uri="{BB962C8B-B14F-4D97-AF65-F5344CB8AC3E}">
         <p14:creationId xmlns:p14="http://schemas.microsoft.com/office/powerpoint/2010/main" val="2371463180"/>
-      </p:ext>
-    </p:extLst>
-  </p:cSld>
-  <p:clrMapOvr>
-    <a:masterClrMapping/>
-  </p:clrMapOvr>
-</p:sld>
-</file>
-
-<file path=ppt/slides/slide8.xml><?xml version="1.0" encoding="utf-8"?>
-<p:sld xmlns:a="http://schemas.openxmlformats.org/drawingml/2006/main" xmlns:r="http://schemas.openxmlformats.org/officeDocument/2006/relationships" xmlns:p="http://schemas.openxmlformats.org/presentationml/2006/main">
-  <p:cSld>
-    <p:spTree>
-      <p:nvGrpSpPr>
-        <p:cNvPr id="1" name="">
-          <a:extLst>
-            <a:ext uri="{FF2B5EF4-FFF2-40B4-BE49-F238E27FC236}">
-              <a16:creationId xmlns:a16="http://schemas.microsoft.com/office/drawing/2014/main" id="{5A67EB2B-071C-BE99-5361-62EEA1268B5C}"/>
-            </a:ext>
-          </a:extLst>
-        </p:cNvPr>
-        <p:cNvGrpSpPr/>
-        <p:nvPr/>
-      </p:nvGrpSpPr>
-      <p:grpSpPr>
-        <a:xfrm>
-          <a:off x="0" y="0"/>
-          <a:ext cx="0" cy="0"/>
-          <a:chOff x="0" y="0"/>
-          <a:chExt cx="0" cy="0"/>
-        </a:xfrm>
-      </p:grpSpPr>
-      <p:pic>
-        <p:nvPicPr>
-          <p:cNvPr id="10" name="Picture 9">
-            <a:extLst>
-              <a:ext uri="{FF2B5EF4-FFF2-40B4-BE49-F238E27FC236}">
-                <a16:creationId xmlns:a16="http://schemas.microsoft.com/office/drawing/2014/main" id="{5ED0079E-1CAC-E276-2D02-8205761130D1}"/>
-              </a:ext>
-            </a:extLst>
-          </p:cNvPr>
-          <p:cNvPicPr>
-            <a:picLocks noChangeAspect="1"/>
-          </p:cNvPicPr>
-          <p:nvPr/>
-        </p:nvPicPr>
-        <p:blipFill>
-          <a:blip r:embed="rId2"/>
-          <a:stretch>
-            <a:fillRect/>
-          </a:stretch>
-        </p:blipFill>
-        <p:spPr>
-          <a:xfrm>
-            <a:off x="702703" y="848248"/>
-            <a:ext cx="5796420" cy="2966487"/>
-          </a:xfrm>
-          <a:prstGeom prst="rect">
-            <a:avLst/>
-          </a:prstGeom>
-        </p:spPr>
-      </p:pic>
-      <p:pic>
-        <p:nvPicPr>
-          <p:cNvPr id="6" name="Picture 5">
-            <a:extLst>
-              <a:ext uri="{FF2B5EF4-FFF2-40B4-BE49-F238E27FC236}">
-                <a16:creationId xmlns:a16="http://schemas.microsoft.com/office/drawing/2014/main" id="{F86E19F3-C24D-8ABA-168C-6E4844D64370}"/>
-              </a:ext>
-            </a:extLst>
-          </p:cNvPr>
-          <p:cNvPicPr>
-            <a:picLocks noChangeAspect="1"/>
-          </p:cNvPicPr>
-          <p:nvPr/>
-        </p:nvPicPr>
-        <p:blipFill>
-          <a:blip r:embed="rId3"/>
-          <a:stretch>
-            <a:fillRect/>
-          </a:stretch>
-        </p:blipFill>
-        <p:spPr>
-          <a:xfrm>
-            <a:off x="745207" y="3906195"/>
-            <a:ext cx="5753915" cy="2951805"/>
-          </a:xfrm>
-          <a:prstGeom prst="rect">
-            <a:avLst/>
-          </a:prstGeom>
-        </p:spPr>
-      </p:pic>
-      <p:sp>
-        <p:nvSpPr>
-          <p:cNvPr id="2" name="Title 1">
-            <a:extLst>
-              <a:ext uri="{FF2B5EF4-FFF2-40B4-BE49-F238E27FC236}">
-                <a16:creationId xmlns:a16="http://schemas.microsoft.com/office/drawing/2014/main" id="{29363A13-4002-A891-1FB1-A716AE9764A3}"/>
-              </a:ext>
-            </a:extLst>
-          </p:cNvPr>
-          <p:cNvSpPr>
-            <a:spLocks noGrp="1"/>
-          </p:cNvSpPr>
-          <p:nvPr>
-            <p:ph type="title"/>
-          </p:nvPr>
-        </p:nvSpPr>
-        <p:spPr/>
-        <p:txBody>
-          <a:bodyPr/>
-          <a:lstStyle/>
-          <a:p>
-            <a:r>
-              <a:rPr lang="en-US" dirty="0"/>
-              <a:t>GUI: MISC Control Tab</a:t>
-            </a:r>
-          </a:p>
-        </p:txBody>
-      </p:sp>
-      <p:sp>
-        <p:nvSpPr>
-          <p:cNvPr id="7" name="TextBox 6">
-            <a:extLst>
-              <a:ext uri="{FF2B5EF4-FFF2-40B4-BE49-F238E27FC236}">
-                <a16:creationId xmlns:a16="http://schemas.microsoft.com/office/drawing/2014/main" id="{0D06B1EE-082A-209E-9716-1D4B5E60F804}"/>
-              </a:ext>
-            </a:extLst>
-          </p:cNvPr>
-          <p:cNvSpPr txBox="1"/>
-          <p:nvPr/>
-        </p:nvSpPr>
-        <p:spPr>
-          <a:xfrm>
-            <a:off x="658761" y="757084"/>
-            <a:ext cx="1188339" cy="369332"/>
-          </a:xfrm>
-          <a:prstGeom prst="rect">
-            <a:avLst/>
-          </a:prstGeom>
-          <a:noFill/>
-        </p:spPr>
-        <p:txBody>
-          <a:bodyPr wrap="none" rtlCol="0">
-            <a:spAutoFit/>
-          </a:bodyPr>
-          <a:lstStyle/>
-          <a:p>
-            <a:pPr>
-              <a:spcBef>
-                <a:spcPts val="400"/>
-              </a:spcBef>
-            </a:pPr>
-            <a:r>
-              <a:rPr lang="en-US" dirty="0">
-                <a:solidFill>
-                  <a:schemeClr val="tx2"/>
-                </a:solidFill>
-                <a:latin typeface="+mn-ea"/>
-                <a:cs typeface="メイリオ" panose="020B0604030504040204" pitchFamily="50" charset="-128"/>
-              </a:rPr>
-              <a:t>Main Tab</a:t>
-            </a:r>
-            <a:endParaRPr kumimoji="1" lang="en-US" sz="1800" dirty="0">
-              <a:solidFill>
-                <a:schemeClr val="tx2"/>
-              </a:solidFill>
-              <a:latin typeface="+mn-ea"/>
-              <a:ea typeface="+mn-ea"/>
-              <a:cs typeface="メイリオ" panose="020B0604030504040204" pitchFamily="50" charset="-128"/>
-            </a:endParaRPr>
-          </a:p>
-        </p:txBody>
-      </p:sp>
-      <p:sp>
-        <p:nvSpPr>
-          <p:cNvPr id="5" name="Rectangle 4">
-            <a:extLst>
-              <a:ext uri="{FF2B5EF4-FFF2-40B4-BE49-F238E27FC236}">
-                <a16:creationId xmlns:a16="http://schemas.microsoft.com/office/drawing/2014/main" id="{19EE73C8-D819-8B55-60C8-8DB89892D618}"/>
-              </a:ext>
-            </a:extLst>
-          </p:cNvPr>
-          <p:cNvSpPr/>
-          <p:nvPr/>
-        </p:nvSpPr>
-        <p:spPr>
-          <a:xfrm>
-            <a:off x="2212258" y="2054943"/>
-            <a:ext cx="3913239" cy="294968"/>
-          </a:xfrm>
-          <a:prstGeom prst="rect">
-            <a:avLst/>
-          </a:prstGeom>
-          <a:noFill/>
-          <a:ln w="38100">
-            <a:solidFill>
-              <a:srgbClr val="00B050"/>
-            </a:solidFill>
-          </a:ln>
-        </p:spPr>
-        <p:style>
-          <a:lnRef idx="2">
-            <a:schemeClr val="accent1">
-              <a:shade val="50000"/>
-            </a:schemeClr>
-          </a:lnRef>
-          <a:fillRef idx="1">
-            <a:schemeClr val="accent1"/>
-          </a:fillRef>
-          <a:effectRef idx="0">
-            <a:schemeClr val="accent1"/>
-          </a:effectRef>
-          <a:fontRef idx="minor">
-            <a:schemeClr val="lt1"/>
-          </a:fontRef>
-        </p:style>
-        <p:txBody>
-          <a:bodyPr rot="0" spcFirstLastPara="0" vertOverflow="overflow" horzOverflow="overflow" vert="horz" wrap="square" lIns="91440" tIns="45720" rIns="91440" bIns="45720" numCol="1" spcCol="0" rtlCol="0" fromWordArt="0" anchor="t" anchorCtr="0" forceAA="0" compatLnSpc="1">
-            <a:prstTxWarp prst="textNoShape">
-              <a:avLst/>
-            </a:prstTxWarp>
-            <a:noAutofit/>
-          </a:bodyPr>
-          <a:lstStyle/>
-          <a:p>
-            <a:pPr algn="ctr">
-              <a:spcBef>
-                <a:spcPts val="400"/>
-              </a:spcBef>
-            </a:pPr>
-            <a:endParaRPr kumimoji="1" lang="en-US" sz="1400" dirty="0">
-              <a:solidFill>
-                <a:schemeClr val="tx2"/>
-              </a:solidFill>
-              <a:latin typeface="+mn-ea"/>
-              <a:cs typeface="メイリオ" panose="020B0604030504040204" pitchFamily="50" charset="-128"/>
-            </a:endParaRPr>
-          </a:p>
-        </p:txBody>
-      </p:sp>
-      <p:sp>
-        <p:nvSpPr>
-          <p:cNvPr id="11" name="TextBox 10">
-            <a:extLst>
-              <a:ext uri="{FF2B5EF4-FFF2-40B4-BE49-F238E27FC236}">
-                <a16:creationId xmlns:a16="http://schemas.microsoft.com/office/drawing/2014/main" id="{2A0C8B57-675C-1DB0-7662-70EDC635D666}"/>
-              </a:ext>
-            </a:extLst>
-          </p:cNvPr>
-          <p:cNvSpPr txBox="1"/>
-          <p:nvPr/>
-        </p:nvSpPr>
-        <p:spPr>
-          <a:xfrm>
-            <a:off x="742335" y="3908322"/>
-            <a:ext cx="1246047" cy="369332"/>
-          </a:xfrm>
-          <a:prstGeom prst="rect">
-            <a:avLst/>
-          </a:prstGeom>
-          <a:noFill/>
-        </p:spPr>
-        <p:txBody>
-          <a:bodyPr wrap="none" rtlCol="0">
-            <a:spAutoFit/>
-          </a:bodyPr>
-          <a:lstStyle/>
-          <a:p>
-            <a:pPr>
-              <a:spcBef>
-                <a:spcPts val="400"/>
-              </a:spcBef>
-            </a:pPr>
-            <a:r>
-              <a:rPr lang="en-US" dirty="0">
-                <a:solidFill>
-                  <a:schemeClr val="tx2"/>
-                </a:solidFill>
-                <a:latin typeface="+mn-ea"/>
-                <a:cs typeface="メイリオ" panose="020B0604030504040204" pitchFamily="50" charset="-128"/>
-              </a:rPr>
-              <a:t>MISC Tab</a:t>
-            </a:r>
-            <a:endParaRPr kumimoji="1" lang="en-US" sz="1800" dirty="0">
-              <a:solidFill>
-                <a:schemeClr val="tx2"/>
-              </a:solidFill>
-              <a:latin typeface="+mn-ea"/>
-              <a:ea typeface="+mn-ea"/>
-              <a:cs typeface="メイリオ" panose="020B0604030504040204" pitchFamily="50" charset="-128"/>
-            </a:endParaRPr>
-          </a:p>
-        </p:txBody>
-      </p:sp>
-      <p:sp>
-        <p:nvSpPr>
-          <p:cNvPr id="13" name="Rectangle 12">
-            <a:extLst>
-              <a:ext uri="{FF2B5EF4-FFF2-40B4-BE49-F238E27FC236}">
-                <a16:creationId xmlns:a16="http://schemas.microsoft.com/office/drawing/2014/main" id="{2E1D9537-265B-1388-9A22-9F99FDC70F46}"/>
-              </a:ext>
-            </a:extLst>
-          </p:cNvPr>
-          <p:cNvSpPr/>
-          <p:nvPr/>
-        </p:nvSpPr>
-        <p:spPr>
-          <a:xfrm>
-            <a:off x="1174955" y="4989871"/>
-            <a:ext cx="4272116" cy="294968"/>
-          </a:xfrm>
-          <a:prstGeom prst="rect">
-            <a:avLst/>
-          </a:prstGeom>
-          <a:noFill/>
-          <a:ln w="38100">
-            <a:solidFill>
-              <a:srgbClr val="00B050"/>
-            </a:solidFill>
-          </a:ln>
-        </p:spPr>
-        <p:style>
-          <a:lnRef idx="2">
-            <a:schemeClr val="accent1">
-              <a:shade val="50000"/>
-            </a:schemeClr>
-          </a:lnRef>
-          <a:fillRef idx="1">
-            <a:schemeClr val="accent1"/>
-          </a:fillRef>
-          <a:effectRef idx="0">
-            <a:schemeClr val="accent1"/>
-          </a:effectRef>
-          <a:fontRef idx="minor">
-            <a:schemeClr val="lt1"/>
-          </a:fontRef>
-        </p:style>
-        <p:txBody>
-          <a:bodyPr rot="0" spcFirstLastPara="0" vertOverflow="overflow" horzOverflow="overflow" vert="horz" wrap="square" lIns="91440" tIns="45720" rIns="91440" bIns="45720" numCol="1" spcCol="0" rtlCol="0" fromWordArt="0" anchor="t" anchorCtr="0" forceAA="0" compatLnSpc="1">
-            <a:prstTxWarp prst="textNoShape">
-              <a:avLst/>
-            </a:prstTxWarp>
-            <a:noAutofit/>
-          </a:bodyPr>
-          <a:lstStyle/>
-          <a:p>
-            <a:pPr algn="ctr">
-              <a:spcBef>
-                <a:spcPts val="400"/>
-              </a:spcBef>
-            </a:pPr>
-            <a:endParaRPr kumimoji="1" lang="en-US" sz="1400" dirty="0">
-              <a:solidFill>
-                <a:schemeClr val="tx2"/>
-              </a:solidFill>
-              <a:latin typeface="+mn-ea"/>
-              <a:cs typeface="メイリオ" panose="020B0604030504040204" pitchFamily="50" charset="-128"/>
-            </a:endParaRPr>
-          </a:p>
-        </p:txBody>
-      </p:sp>
-      <p:sp>
-        <p:nvSpPr>
-          <p:cNvPr id="15" name="Rectangle 14">
-            <a:extLst>
-              <a:ext uri="{FF2B5EF4-FFF2-40B4-BE49-F238E27FC236}">
-                <a16:creationId xmlns:a16="http://schemas.microsoft.com/office/drawing/2014/main" id="{8F92EF18-82BF-1E5B-46AD-90CE9BBEA5A7}"/>
-              </a:ext>
-            </a:extLst>
-          </p:cNvPr>
-          <p:cNvSpPr/>
-          <p:nvPr/>
-        </p:nvSpPr>
-        <p:spPr>
-          <a:xfrm>
-            <a:off x="1160207" y="5624052"/>
-            <a:ext cx="4272116" cy="294968"/>
-          </a:xfrm>
-          <a:prstGeom prst="rect">
-            <a:avLst/>
-          </a:prstGeom>
-          <a:noFill/>
-          <a:ln w="38100">
-            <a:solidFill>
-              <a:srgbClr val="FFC000"/>
-            </a:solidFill>
-          </a:ln>
-        </p:spPr>
-        <p:style>
-          <a:lnRef idx="2">
-            <a:schemeClr val="accent1">
-              <a:shade val="50000"/>
-            </a:schemeClr>
-          </a:lnRef>
-          <a:fillRef idx="1">
-            <a:schemeClr val="accent1"/>
-          </a:fillRef>
-          <a:effectRef idx="0">
-            <a:schemeClr val="accent1"/>
-          </a:effectRef>
-          <a:fontRef idx="minor">
-            <a:schemeClr val="lt1"/>
-          </a:fontRef>
-        </p:style>
-        <p:txBody>
-          <a:bodyPr rot="0" spcFirstLastPara="0" vertOverflow="overflow" horzOverflow="overflow" vert="horz" wrap="square" lIns="91440" tIns="45720" rIns="91440" bIns="45720" numCol="1" spcCol="0" rtlCol="0" fromWordArt="0" anchor="t" anchorCtr="0" forceAA="0" compatLnSpc="1">
-            <a:prstTxWarp prst="textNoShape">
-              <a:avLst/>
-            </a:prstTxWarp>
-            <a:noAutofit/>
-          </a:bodyPr>
-          <a:lstStyle/>
-          <a:p>
-            <a:pPr algn="ctr">
-              <a:spcBef>
-                <a:spcPts val="400"/>
-              </a:spcBef>
-            </a:pPr>
-            <a:endParaRPr kumimoji="1" lang="en-US" sz="1400" dirty="0">
-              <a:solidFill>
-                <a:schemeClr val="tx2"/>
-              </a:solidFill>
-              <a:latin typeface="+mn-ea"/>
-              <a:cs typeface="メイリオ" panose="020B0604030504040204" pitchFamily="50" charset="-128"/>
-            </a:endParaRPr>
-          </a:p>
-        </p:txBody>
-      </p:sp>
-      <p:sp>
-        <p:nvSpPr>
-          <p:cNvPr id="17" name="Rectangle 16">
-            <a:extLst>
-              <a:ext uri="{FF2B5EF4-FFF2-40B4-BE49-F238E27FC236}">
-                <a16:creationId xmlns:a16="http://schemas.microsoft.com/office/drawing/2014/main" id="{AEFE8A87-C3D1-80C9-269E-2BE37DF4FB9F}"/>
-              </a:ext>
-            </a:extLst>
-          </p:cNvPr>
-          <p:cNvSpPr/>
-          <p:nvPr/>
-        </p:nvSpPr>
-        <p:spPr>
-          <a:xfrm>
-            <a:off x="2187679" y="2993923"/>
-            <a:ext cx="3878825" cy="294968"/>
-          </a:xfrm>
-          <a:prstGeom prst="rect">
-            <a:avLst/>
-          </a:prstGeom>
-          <a:noFill/>
-          <a:ln w="38100">
-            <a:solidFill>
-              <a:srgbClr val="FFC000"/>
-            </a:solidFill>
-          </a:ln>
-        </p:spPr>
-        <p:style>
-          <a:lnRef idx="2">
-            <a:schemeClr val="accent1">
-              <a:shade val="50000"/>
-            </a:schemeClr>
-          </a:lnRef>
-          <a:fillRef idx="1">
-            <a:schemeClr val="accent1"/>
-          </a:fillRef>
-          <a:effectRef idx="0">
-            <a:schemeClr val="accent1"/>
-          </a:effectRef>
-          <a:fontRef idx="minor">
-            <a:schemeClr val="lt1"/>
-          </a:fontRef>
-        </p:style>
-        <p:txBody>
-          <a:bodyPr rot="0" spcFirstLastPara="0" vertOverflow="overflow" horzOverflow="overflow" vert="horz" wrap="square" lIns="91440" tIns="45720" rIns="91440" bIns="45720" numCol="1" spcCol="0" rtlCol="0" fromWordArt="0" anchor="t" anchorCtr="0" forceAA="0" compatLnSpc="1">
-            <a:prstTxWarp prst="textNoShape">
-              <a:avLst/>
-            </a:prstTxWarp>
-            <a:noAutofit/>
-          </a:bodyPr>
-          <a:lstStyle/>
-          <a:p>
-            <a:pPr algn="ctr">
-              <a:spcBef>
-                <a:spcPts val="400"/>
-              </a:spcBef>
-            </a:pPr>
-            <a:endParaRPr kumimoji="1" lang="en-US" sz="1400" dirty="0">
-              <a:solidFill>
-                <a:schemeClr val="tx2"/>
-              </a:solidFill>
-              <a:latin typeface="+mn-ea"/>
-              <a:cs typeface="メイリオ" panose="020B0604030504040204" pitchFamily="50" charset="-128"/>
-            </a:endParaRPr>
-          </a:p>
-        </p:txBody>
-      </p:sp>
-      <p:sp>
-        <p:nvSpPr>
-          <p:cNvPr id="18" name="TextBox 17">
-            <a:extLst>
-              <a:ext uri="{FF2B5EF4-FFF2-40B4-BE49-F238E27FC236}">
-                <a16:creationId xmlns:a16="http://schemas.microsoft.com/office/drawing/2014/main" id="{6BBC815C-2AC7-A202-CF1A-A08C93633EC4}"/>
-              </a:ext>
-            </a:extLst>
-          </p:cNvPr>
-          <p:cNvSpPr txBox="1"/>
-          <p:nvPr/>
-        </p:nvSpPr>
-        <p:spPr>
-          <a:xfrm>
-            <a:off x="7295537" y="953729"/>
-            <a:ext cx="4237702" cy="5611793"/>
-          </a:xfrm>
-          <a:prstGeom prst="rect">
-            <a:avLst/>
-          </a:prstGeom>
-          <a:noFill/>
-        </p:spPr>
-        <p:txBody>
-          <a:bodyPr wrap="square" rtlCol="0">
-            <a:spAutoFit/>
-          </a:bodyPr>
-          <a:lstStyle/>
-          <a:p>
-            <a:pPr>
-              <a:spcBef>
-                <a:spcPts val="400"/>
-              </a:spcBef>
-            </a:pPr>
-            <a:r>
-              <a:rPr kumimoji="1" lang="en-US" sz="1800" dirty="0">
-                <a:solidFill>
-                  <a:schemeClr val="tx2"/>
-                </a:solidFill>
-                <a:latin typeface="+mn-ea"/>
-                <a:ea typeface="+mn-ea"/>
-                <a:cs typeface="メイリオ" panose="020B0604030504040204" pitchFamily="50" charset="-128"/>
-              </a:rPr>
-              <a:t>The MISC Tab has a multiplier for the Flow Rate, and number of Poles for the RPM.</a:t>
-            </a:r>
-          </a:p>
-          <a:p>
-            <a:pPr>
-              <a:spcBef>
-                <a:spcPts val="400"/>
-              </a:spcBef>
-            </a:pPr>
-            <a:r>
-              <a:rPr lang="en-US" dirty="0">
-                <a:solidFill>
-                  <a:schemeClr val="tx2"/>
-                </a:solidFill>
-                <a:latin typeface="+mn-ea"/>
-                <a:cs typeface="メイリオ" panose="020B0604030504040204" pitchFamily="50" charset="-128"/>
-              </a:rPr>
-              <a:t>This is mainly used during initial development.</a:t>
-            </a:r>
-          </a:p>
-          <a:p>
-            <a:pPr>
-              <a:spcBef>
-                <a:spcPts val="400"/>
-              </a:spcBef>
-            </a:pPr>
-            <a:endParaRPr kumimoji="1" lang="en-US" sz="1800" dirty="0">
-              <a:solidFill>
-                <a:schemeClr val="tx2"/>
-              </a:solidFill>
-              <a:latin typeface="+mn-ea"/>
-              <a:ea typeface="+mn-ea"/>
-              <a:cs typeface="メイリオ" panose="020B0604030504040204" pitchFamily="50" charset="-128"/>
-            </a:endParaRPr>
-          </a:p>
-          <a:p>
-            <a:pPr>
-              <a:spcBef>
-                <a:spcPts val="400"/>
-              </a:spcBef>
-            </a:pPr>
-            <a:r>
-              <a:rPr lang="en-US" dirty="0">
-                <a:solidFill>
-                  <a:schemeClr val="tx2"/>
-                </a:solidFill>
-                <a:latin typeface="+mn-ea"/>
-                <a:cs typeface="メイリオ" panose="020B0604030504040204" pitchFamily="50" charset="-128"/>
-              </a:rPr>
-              <a:t>The value reported on the Flow Rate in the Main Tab are pulse counted from Arduino and multiplied by the ratio in the MISC Tab. Similarly the RPM is adjusted based on the entered number of Poles.</a:t>
-            </a:r>
-          </a:p>
-          <a:p>
-            <a:pPr>
-              <a:spcBef>
-                <a:spcPts val="400"/>
-              </a:spcBef>
-            </a:pPr>
-            <a:endParaRPr lang="en-US" dirty="0">
-              <a:solidFill>
-                <a:schemeClr val="tx2"/>
-              </a:solidFill>
-              <a:latin typeface="+mn-ea"/>
-              <a:cs typeface="メイリオ" panose="020B0604030504040204" pitchFamily="50" charset="-128"/>
-            </a:endParaRPr>
-          </a:p>
-          <a:p>
-            <a:pPr>
-              <a:spcBef>
-                <a:spcPts val="400"/>
-              </a:spcBef>
-            </a:pPr>
-            <a:r>
-              <a:rPr kumimoji="1" lang="en-US" sz="1800" dirty="0">
-                <a:solidFill>
-                  <a:schemeClr val="tx2"/>
-                </a:solidFill>
-                <a:latin typeface="+mn-ea"/>
-                <a:ea typeface="+mn-ea"/>
-                <a:cs typeface="メイリオ" panose="020B0604030504040204" pitchFamily="50" charset="-128"/>
-              </a:rPr>
-              <a:t>Change the number in MISC Tab, to adjust accordingly to get the correct conversion from pulses (Hz) to L/min and RPM shown in Main Tab</a:t>
-            </a:r>
-          </a:p>
-        </p:txBody>
-      </p:sp>
-      <p:sp>
-        <p:nvSpPr>
-          <p:cNvPr id="27" name="Rectangle: Rounded Corners 26">
-            <a:extLst>
-              <a:ext uri="{FF2B5EF4-FFF2-40B4-BE49-F238E27FC236}">
-                <a16:creationId xmlns:a16="http://schemas.microsoft.com/office/drawing/2014/main" id="{3CAB54F4-F106-0E19-5DC9-5E03548FEE89}"/>
-              </a:ext>
-            </a:extLst>
-          </p:cNvPr>
-          <p:cNvSpPr/>
-          <p:nvPr/>
-        </p:nvSpPr>
-        <p:spPr>
-          <a:xfrm>
-            <a:off x="766916" y="1209368"/>
-            <a:ext cx="589935" cy="255639"/>
-          </a:xfrm>
-          <a:prstGeom prst="roundRect">
-            <a:avLst/>
-          </a:prstGeom>
-          <a:noFill/>
-          <a:ln w="57150">
-            <a:solidFill>
-              <a:srgbClr val="FF0000"/>
-            </a:solidFill>
-          </a:ln>
-        </p:spPr>
-        <p:style>
-          <a:lnRef idx="2">
-            <a:schemeClr val="accent1">
-              <a:shade val="50000"/>
-            </a:schemeClr>
-          </a:lnRef>
-          <a:fillRef idx="1">
-            <a:schemeClr val="accent1"/>
-          </a:fillRef>
-          <a:effectRef idx="0">
-            <a:schemeClr val="accent1"/>
-          </a:effectRef>
-          <a:fontRef idx="minor">
-            <a:schemeClr val="lt1"/>
-          </a:fontRef>
-        </p:style>
-        <p:txBody>
-          <a:bodyPr rot="0" spcFirstLastPara="0" vertOverflow="overflow" horzOverflow="overflow" vert="horz" wrap="square" lIns="91440" tIns="45720" rIns="91440" bIns="45720" numCol="1" spcCol="0" rtlCol="0" fromWordArt="0" anchor="t" anchorCtr="0" forceAA="0" compatLnSpc="1">
-            <a:prstTxWarp prst="textNoShape">
-              <a:avLst/>
-            </a:prstTxWarp>
-            <a:noAutofit/>
-          </a:bodyPr>
-          <a:lstStyle/>
-          <a:p>
-            <a:pPr algn="ctr">
-              <a:spcBef>
-                <a:spcPts val="400"/>
-              </a:spcBef>
-            </a:pPr>
-            <a:endParaRPr kumimoji="1" lang="en-US" sz="1400" dirty="0">
-              <a:solidFill>
-                <a:schemeClr val="tx2"/>
-              </a:solidFill>
-              <a:latin typeface="+mn-ea"/>
-              <a:cs typeface="メイリオ" panose="020B0604030504040204" pitchFamily="50" charset="-128"/>
-            </a:endParaRPr>
-          </a:p>
-        </p:txBody>
-      </p:sp>
-      <p:sp>
-        <p:nvSpPr>
-          <p:cNvPr id="28" name="Rectangle: Rounded Corners 27">
-            <a:extLst>
-              <a:ext uri="{FF2B5EF4-FFF2-40B4-BE49-F238E27FC236}">
-                <a16:creationId xmlns:a16="http://schemas.microsoft.com/office/drawing/2014/main" id="{F4840324-A71B-A359-ED83-C05C67F44A42}"/>
-              </a:ext>
-            </a:extLst>
-          </p:cNvPr>
-          <p:cNvSpPr/>
-          <p:nvPr/>
-        </p:nvSpPr>
-        <p:spPr>
-          <a:xfrm>
-            <a:off x="1814052" y="4272116"/>
-            <a:ext cx="589935" cy="255639"/>
-          </a:xfrm>
-          <a:prstGeom prst="roundRect">
-            <a:avLst/>
-          </a:prstGeom>
-          <a:noFill/>
-          <a:ln w="57150">
-            <a:solidFill>
-              <a:srgbClr val="FF0000"/>
-            </a:solidFill>
-          </a:ln>
-        </p:spPr>
-        <p:style>
-          <a:lnRef idx="2">
-            <a:schemeClr val="accent1">
-              <a:shade val="50000"/>
-            </a:schemeClr>
-          </a:lnRef>
-          <a:fillRef idx="1">
-            <a:schemeClr val="accent1"/>
-          </a:fillRef>
-          <a:effectRef idx="0">
-            <a:schemeClr val="accent1"/>
-          </a:effectRef>
-          <a:fontRef idx="minor">
-            <a:schemeClr val="lt1"/>
-          </a:fontRef>
-        </p:style>
-        <p:txBody>
-          <a:bodyPr rot="0" spcFirstLastPara="0" vertOverflow="overflow" horzOverflow="overflow" vert="horz" wrap="square" lIns="91440" tIns="45720" rIns="91440" bIns="45720" numCol="1" spcCol="0" rtlCol="0" fromWordArt="0" anchor="t" anchorCtr="0" forceAA="0" compatLnSpc="1">
-            <a:prstTxWarp prst="textNoShape">
-              <a:avLst/>
-            </a:prstTxWarp>
-            <a:noAutofit/>
-          </a:bodyPr>
-          <a:lstStyle/>
-          <a:p>
-            <a:pPr algn="ctr">
-              <a:spcBef>
-                <a:spcPts val="400"/>
-              </a:spcBef>
-            </a:pPr>
-            <a:endParaRPr kumimoji="1" lang="en-US" sz="1400" dirty="0">
-              <a:solidFill>
-                <a:schemeClr val="tx2"/>
-              </a:solidFill>
-              <a:latin typeface="+mn-ea"/>
-              <a:cs typeface="メイリオ" panose="020B0604030504040204" pitchFamily="50" charset="-128"/>
-            </a:endParaRPr>
-          </a:p>
-        </p:txBody>
-      </p:sp>
-    </p:spTree>
-    <p:extLst>
-      <p:ext uri="{BB962C8B-B14F-4D97-AF65-F5344CB8AC3E}">
-        <p14:creationId xmlns:p14="http://schemas.microsoft.com/office/powerpoint/2010/main" val="208232504"/>
       </p:ext>
     </p:extLst>
   </p:cSld>

</xml_diff>

<commit_message>
update Arduino for RGB blink LED strip and update PPT
</commit_message>
<xml_diff>
--- a/Water Pump Demo Arduino and Gui instructions.pptx
+++ b/Water Pump Demo Arduino and Gui instructions.pptx
@@ -121,8 +121,166 @@
 </p:presentation>
 </file>
 
+<file path=ppt/revisionInfo.xml><?xml version="1.0" encoding="utf-8"?>
+<p1510:revInfo xmlns:a="http://schemas.openxmlformats.org/drawingml/2006/main" xmlns:r="http://schemas.openxmlformats.org/officeDocument/2006/relationships" xmlns:p1510="http://schemas.microsoft.com/office/powerpoint/2015/10/main">
+  <p1510:revLst>
+    <p1510:client id="{7E05247A-D919-4851-ADA6-893D25B40627}" v="3" dt="2025-10-10T18:32:49.632"/>
+  </p1510:revLst>
+</p1510:revInfo>
+</file>
+
 <file path=ppt/changesInfos/changesInfo1.xml><?xml version="1.0" encoding="utf-8"?>
 <pc:chgInfo xmlns:a="http://schemas.openxmlformats.org/drawingml/2006/main" xmlns:r="http://schemas.openxmlformats.org/officeDocument/2006/relationships" xmlns:ac="http://schemas.microsoft.com/office/drawing/2013/main/command" xmlns:pc="http://schemas.microsoft.com/office/powerpoint/2013/main/command">
+  <pc:docChgLst>
+    <pc:chgData name="George Hariman" userId="944226f4-c0bd-444e-8152-728ae792d6b1" providerId="ADAL" clId="{34122976-1B0B-468B-BAB7-AAB8F0B58991}"/>
+    <pc:docChg chg="custSel addSld delSld modSld">
+      <pc:chgData name="George Hariman" userId="944226f4-c0bd-444e-8152-728ae792d6b1" providerId="ADAL" clId="{34122976-1B0B-468B-BAB7-AAB8F0B58991}" dt="2025-10-10T18:35:54.979" v="117" actId="47"/>
+      <pc:docMkLst>
+        <pc:docMk/>
+      </pc:docMkLst>
+      <pc:sldChg chg="addSp delSp modSp mod">
+        <pc:chgData name="George Hariman" userId="944226f4-c0bd-444e-8152-728ae792d6b1" providerId="ADAL" clId="{34122976-1B0B-468B-BAB7-AAB8F0B58991}" dt="2025-10-10T18:33:37.641" v="80" actId="20577"/>
+        <pc:sldMkLst>
+          <pc:docMk/>
+          <pc:sldMk cId="1800593104" sldId="256"/>
+        </pc:sldMkLst>
+        <pc:spChg chg="add mod">
+          <ac:chgData name="George Hariman" userId="944226f4-c0bd-444e-8152-728ae792d6b1" providerId="ADAL" clId="{34122976-1B0B-468B-BAB7-AAB8F0B58991}" dt="2025-10-10T18:33:16.666" v="65" actId="1076"/>
+          <ac:spMkLst>
+            <pc:docMk/>
+            <pc:sldMk cId="1800593104" sldId="256"/>
+            <ac:spMk id="10" creationId="{173DEA60-0228-00FA-E8EA-D350458F9D23}"/>
+          </ac:spMkLst>
+        </pc:spChg>
+        <pc:spChg chg="mod topLvl">
+          <ac:chgData name="George Hariman" userId="944226f4-c0bd-444e-8152-728ae792d6b1" providerId="ADAL" clId="{34122976-1B0B-468B-BAB7-AAB8F0B58991}" dt="2025-10-10T18:32:31.642" v="0" actId="165"/>
+          <ac:spMkLst>
+            <pc:docMk/>
+            <pc:sldMk cId="1800593104" sldId="256"/>
+            <ac:spMk id="15" creationId="{00D293E9-91A6-D1CF-792E-84A40E0F368F}"/>
+          </ac:spMkLst>
+        </pc:spChg>
+        <pc:spChg chg="mod topLvl">
+          <ac:chgData name="George Hariman" userId="944226f4-c0bd-444e-8152-728ae792d6b1" providerId="ADAL" clId="{34122976-1B0B-468B-BAB7-AAB8F0B58991}" dt="2025-10-10T18:32:40.898" v="4" actId="20577"/>
+          <ac:spMkLst>
+            <pc:docMk/>
+            <pc:sldMk cId="1800593104" sldId="256"/>
+            <ac:spMk id="31" creationId="{E1509700-B293-3F55-F55C-F3701790459F}"/>
+          </ac:spMkLst>
+        </pc:spChg>
+        <pc:spChg chg="mod topLvl">
+          <ac:chgData name="George Hariman" userId="944226f4-c0bd-444e-8152-728ae792d6b1" providerId="ADAL" clId="{34122976-1B0B-468B-BAB7-AAB8F0B58991}" dt="2025-10-10T18:32:31.642" v="0" actId="165"/>
+          <ac:spMkLst>
+            <pc:docMk/>
+            <pc:sldMk cId="1800593104" sldId="256"/>
+            <ac:spMk id="32" creationId="{D4361B2B-C269-6504-E428-1B94844EB182}"/>
+          </ac:spMkLst>
+        </pc:spChg>
+        <pc:spChg chg="mod topLvl">
+          <ac:chgData name="George Hariman" userId="944226f4-c0bd-444e-8152-728ae792d6b1" providerId="ADAL" clId="{34122976-1B0B-468B-BAB7-AAB8F0B58991}" dt="2025-10-10T18:33:37.641" v="80" actId="20577"/>
+          <ac:spMkLst>
+            <pc:docMk/>
+            <pc:sldMk cId="1800593104" sldId="256"/>
+            <ac:spMk id="33" creationId="{4C12D5DA-E102-F6FA-3EF8-B1463E1BBA05}"/>
+          </ac:spMkLst>
+        </pc:spChg>
+        <pc:spChg chg="mod topLvl">
+          <ac:chgData name="George Hariman" userId="944226f4-c0bd-444e-8152-728ae792d6b1" providerId="ADAL" clId="{34122976-1B0B-468B-BAB7-AAB8F0B58991}" dt="2025-10-10T18:32:31.642" v="0" actId="165"/>
+          <ac:spMkLst>
+            <pc:docMk/>
+            <pc:sldMk cId="1800593104" sldId="256"/>
+            <ac:spMk id="35" creationId="{EC3C011E-0D3F-8E74-1F48-907C8470B1E2}"/>
+          </ac:spMkLst>
+        </pc:spChg>
+        <pc:spChg chg="mod topLvl">
+          <ac:chgData name="George Hariman" userId="944226f4-c0bd-444e-8152-728ae792d6b1" providerId="ADAL" clId="{34122976-1B0B-468B-BAB7-AAB8F0B58991}" dt="2025-10-10T18:32:31.642" v="0" actId="165"/>
+          <ac:spMkLst>
+            <pc:docMk/>
+            <pc:sldMk cId="1800593104" sldId="256"/>
+            <ac:spMk id="36" creationId="{EA64A9E9-A333-6437-3863-AED0AEECE158}"/>
+          </ac:spMkLst>
+        </pc:spChg>
+        <pc:grpChg chg="del">
+          <ac:chgData name="George Hariman" userId="944226f4-c0bd-444e-8152-728ae792d6b1" providerId="ADAL" clId="{34122976-1B0B-468B-BAB7-AAB8F0B58991}" dt="2025-10-10T18:32:31.642" v="0" actId="165"/>
+          <ac:grpSpMkLst>
+            <pc:docMk/>
+            <pc:sldMk cId="1800593104" sldId="256"/>
+            <ac:grpSpMk id="38" creationId="{49BE9925-0CF5-CDE9-A59C-BE856EC70DAB}"/>
+          </ac:grpSpMkLst>
+        </pc:grpChg>
+        <pc:picChg chg="mod topLvl">
+          <ac:chgData name="George Hariman" userId="944226f4-c0bd-444e-8152-728ae792d6b1" providerId="ADAL" clId="{34122976-1B0B-468B-BAB7-AAB8F0B58991}" dt="2025-10-10T18:32:31.642" v="0" actId="165"/>
+          <ac:picMkLst>
+            <pc:docMk/>
+            <pc:sldMk cId="1800593104" sldId="256"/>
+            <ac:picMk id="6" creationId="{8AAD5153-AFC0-8523-9C2E-0C261C5B4D41}"/>
+          </ac:picMkLst>
+        </pc:picChg>
+        <pc:picChg chg="mod topLvl">
+          <ac:chgData name="George Hariman" userId="944226f4-c0bd-444e-8152-728ae792d6b1" providerId="ADAL" clId="{34122976-1B0B-468B-BAB7-AAB8F0B58991}" dt="2025-10-10T18:32:31.642" v="0" actId="165"/>
+          <ac:picMkLst>
+            <pc:docMk/>
+            <pc:sldMk cId="1800593104" sldId="256"/>
+            <ac:picMk id="1026" creationId="{31E0B8E7-5AAF-5314-AEE2-A82B6163324E}"/>
+          </ac:picMkLst>
+        </pc:picChg>
+        <pc:cxnChg chg="add mod">
+          <ac:chgData name="George Hariman" userId="944226f4-c0bd-444e-8152-728ae792d6b1" providerId="ADAL" clId="{34122976-1B0B-468B-BAB7-AAB8F0B58991}" dt="2025-10-10T18:33:18.240" v="66" actId="1076"/>
+          <ac:cxnSpMkLst>
+            <pc:docMk/>
+            <pc:sldMk cId="1800593104" sldId="256"/>
+            <ac:cxnSpMk id="5" creationId="{B9461225-7722-93A7-82C6-EDDF6936815E}"/>
+          </ac:cxnSpMkLst>
+        </pc:cxnChg>
+        <pc:cxnChg chg="mod topLvl">
+          <ac:chgData name="George Hariman" userId="944226f4-c0bd-444e-8152-728ae792d6b1" providerId="ADAL" clId="{34122976-1B0B-468B-BAB7-AAB8F0B58991}" dt="2025-10-10T18:32:31.642" v="0" actId="165"/>
+          <ac:cxnSpMkLst>
+            <pc:docMk/>
+            <pc:sldMk cId="1800593104" sldId="256"/>
+            <ac:cxnSpMk id="24" creationId="{D2306F76-99C2-8DF4-2071-FACD58F635F4}"/>
+          </ac:cxnSpMkLst>
+        </pc:cxnChg>
+        <pc:cxnChg chg="mod">
+          <ac:chgData name="George Hariman" userId="944226f4-c0bd-444e-8152-728ae792d6b1" providerId="ADAL" clId="{34122976-1B0B-468B-BAB7-AAB8F0B58991}" dt="2025-10-10T18:32:39.578" v="3" actId="14100"/>
+          <ac:cxnSpMkLst>
+            <pc:docMk/>
+            <pc:sldMk cId="1800593104" sldId="256"/>
+            <ac:cxnSpMk id="29" creationId="{7A82C5DF-9BE8-5D12-86E4-A699752CF43D}"/>
+          </ac:cxnSpMkLst>
+        </pc:cxnChg>
+      </pc:sldChg>
+      <pc:sldChg chg="modSp mod">
+        <pc:chgData name="George Hariman" userId="944226f4-c0bd-444e-8152-728ae792d6b1" providerId="ADAL" clId="{34122976-1B0B-468B-BAB7-AAB8F0B58991}" dt="2025-10-10T18:33:45.581" v="99" actId="20577"/>
+        <pc:sldMkLst>
+          <pc:docMk/>
+          <pc:sldMk cId="1793599662" sldId="264"/>
+        </pc:sldMkLst>
+        <pc:spChg chg="mod">
+          <ac:chgData name="George Hariman" userId="944226f4-c0bd-444e-8152-728ae792d6b1" providerId="ADAL" clId="{34122976-1B0B-468B-BAB7-AAB8F0B58991}" dt="2025-10-10T18:33:45.581" v="99" actId="20577"/>
+          <ac:spMkLst>
+            <pc:docMk/>
+            <pc:sldMk cId="1793599662" sldId="264"/>
+            <ac:spMk id="3" creationId="{9D9A9121-AF12-1969-1F1A-0B296611702E}"/>
+          </ac:spMkLst>
+        </pc:spChg>
+      </pc:sldChg>
+      <pc:sldChg chg="modSp add del mod">
+        <pc:chgData name="George Hariman" userId="944226f4-c0bd-444e-8152-728ae792d6b1" providerId="ADAL" clId="{34122976-1B0B-468B-BAB7-AAB8F0B58991}" dt="2025-10-10T18:35:54.979" v="117" actId="47"/>
+        <pc:sldMkLst>
+          <pc:docMk/>
+          <pc:sldMk cId="145276391" sldId="266"/>
+        </pc:sldMkLst>
+        <pc:spChg chg="mod">
+          <ac:chgData name="George Hariman" userId="944226f4-c0bd-444e-8152-728ae792d6b1" providerId="ADAL" clId="{34122976-1B0B-468B-BAB7-AAB8F0B58991}" dt="2025-10-10T18:34:44.547" v="116" actId="20577"/>
+          <ac:spMkLst>
+            <pc:docMk/>
+            <pc:sldMk cId="145276391" sldId="266"/>
+            <ac:spMk id="2" creationId="{89D5221F-8571-F8CA-085B-EAA234C1AC89}"/>
+          </ac:spMkLst>
+        </pc:spChg>
+      </pc:sldChg>
+    </pc:docChg>
+  </pc:docChgLst>
   <pc:docChgLst>
     <pc:chgData name="George Hariman" userId="944226f4-c0bd-444e-8152-728ae792d6b1" providerId="ADAL" clId="{2574B24F-E2A1-49B4-965A-816A9A283E65}"/>
     <pc:docChg chg="undo custSel addSld delSld modSld sldOrd">
@@ -136,126 +294,6 @@
           <pc:docMk/>
           <pc:sldMk cId="1800593104" sldId="256"/>
         </pc:sldMkLst>
-        <pc:spChg chg="add mod ord">
-          <ac:chgData name="George Hariman" userId="944226f4-c0bd-444e-8152-728ae792d6b1" providerId="ADAL" clId="{2574B24F-E2A1-49B4-965A-816A9A283E65}" dt="2025-06-17T22:37:59.576" v="2071" actId="20577"/>
-          <ac:spMkLst>
-            <pc:docMk/>
-            <pc:sldMk cId="1800593104" sldId="256"/>
-            <ac:spMk id="4" creationId="{4B4D2160-B5AB-E2DC-2564-260BBF12622E}"/>
-          </ac:spMkLst>
-        </pc:spChg>
-        <pc:spChg chg="add mod topLvl">
-          <ac:chgData name="George Hariman" userId="944226f4-c0bd-444e-8152-728ae792d6b1" providerId="ADAL" clId="{2574B24F-E2A1-49B4-965A-816A9A283E65}" dt="2025-06-17T23:09:20.247" v="2422" actId="1076"/>
-          <ac:spMkLst>
-            <pc:docMk/>
-            <pc:sldMk cId="1800593104" sldId="256"/>
-            <ac:spMk id="15" creationId="{00D293E9-91A6-D1CF-792E-84A40E0F368F}"/>
-          </ac:spMkLst>
-        </pc:spChg>
-        <pc:spChg chg="add mod topLvl">
-          <ac:chgData name="George Hariman" userId="944226f4-c0bd-444e-8152-728ae792d6b1" providerId="ADAL" clId="{2574B24F-E2A1-49B4-965A-816A9A283E65}" dt="2025-06-17T23:09:20.247" v="2422" actId="1076"/>
-          <ac:spMkLst>
-            <pc:docMk/>
-            <pc:sldMk cId="1800593104" sldId="256"/>
-            <ac:spMk id="31" creationId="{E1509700-B293-3F55-F55C-F3701790459F}"/>
-          </ac:spMkLst>
-        </pc:spChg>
-        <pc:spChg chg="add mod topLvl">
-          <ac:chgData name="George Hariman" userId="944226f4-c0bd-444e-8152-728ae792d6b1" providerId="ADAL" clId="{2574B24F-E2A1-49B4-965A-816A9A283E65}" dt="2025-06-17T23:09:20.247" v="2422" actId="1076"/>
-          <ac:spMkLst>
-            <pc:docMk/>
-            <pc:sldMk cId="1800593104" sldId="256"/>
-            <ac:spMk id="32" creationId="{D4361B2B-C269-6504-E428-1B94844EB182}"/>
-          </ac:spMkLst>
-        </pc:spChg>
-        <pc:spChg chg="add mod topLvl">
-          <ac:chgData name="George Hariman" userId="944226f4-c0bd-444e-8152-728ae792d6b1" providerId="ADAL" clId="{2574B24F-E2A1-49B4-965A-816A9A283E65}" dt="2025-06-17T23:09:20.247" v="2422" actId="1076"/>
-          <ac:spMkLst>
-            <pc:docMk/>
-            <pc:sldMk cId="1800593104" sldId="256"/>
-            <ac:spMk id="33" creationId="{4C12D5DA-E102-F6FA-3EF8-B1463E1BBA05}"/>
-          </ac:spMkLst>
-        </pc:spChg>
-        <pc:spChg chg="add mod topLvl">
-          <ac:chgData name="George Hariman" userId="944226f4-c0bd-444e-8152-728ae792d6b1" providerId="ADAL" clId="{2574B24F-E2A1-49B4-965A-816A9A283E65}" dt="2025-06-17T23:09:20.247" v="2422" actId="1076"/>
-          <ac:spMkLst>
-            <pc:docMk/>
-            <pc:sldMk cId="1800593104" sldId="256"/>
-            <ac:spMk id="35" creationId="{EC3C011E-0D3F-8E74-1F48-907C8470B1E2}"/>
-          </ac:spMkLst>
-        </pc:spChg>
-        <pc:spChg chg="add mod topLvl">
-          <ac:chgData name="George Hariman" userId="944226f4-c0bd-444e-8152-728ae792d6b1" providerId="ADAL" clId="{2574B24F-E2A1-49B4-965A-816A9A283E65}" dt="2025-06-17T23:09:39.035" v="2429" actId="1076"/>
-          <ac:spMkLst>
-            <pc:docMk/>
-            <pc:sldMk cId="1800593104" sldId="256"/>
-            <ac:spMk id="36" creationId="{EA64A9E9-A333-6437-3863-AED0AEECE158}"/>
-          </ac:spMkLst>
-        </pc:spChg>
-        <pc:grpChg chg="add mod">
-          <ac:chgData name="George Hariman" userId="944226f4-c0bd-444e-8152-728ae792d6b1" providerId="ADAL" clId="{2574B24F-E2A1-49B4-965A-816A9A283E65}" dt="2025-06-17T23:09:20.247" v="2422" actId="1076"/>
-          <ac:grpSpMkLst>
-            <pc:docMk/>
-            <pc:sldMk cId="1800593104" sldId="256"/>
-            <ac:grpSpMk id="38" creationId="{49BE9925-0CF5-CDE9-A59C-BE856EC70DAB}"/>
-          </ac:grpSpMkLst>
-        </pc:grpChg>
-        <pc:picChg chg="add mod topLvl">
-          <ac:chgData name="George Hariman" userId="944226f4-c0bd-444e-8152-728ae792d6b1" providerId="ADAL" clId="{2574B24F-E2A1-49B4-965A-816A9A283E65}" dt="2025-06-17T23:09:20.247" v="2422" actId="1076"/>
-          <ac:picMkLst>
-            <pc:docMk/>
-            <pc:sldMk cId="1800593104" sldId="256"/>
-            <ac:picMk id="6" creationId="{8AAD5153-AFC0-8523-9C2E-0C261C5B4D41}"/>
-          </ac:picMkLst>
-        </pc:picChg>
-        <pc:picChg chg="add mod">
-          <ac:chgData name="George Hariman" userId="944226f4-c0bd-444e-8152-728ae792d6b1" providerId="ADAL" clId="{2574B24F-E2A1-49B4-965A-816A9A283E65}" dt="2025-06-17T23:09:20.247" v="2422" actId="1076"/>
-          <ac:picMkLst>
-            <pc:docMk/>
-            <pc:sldMk cId="1800593104" sldId="256"/>
-            <ac:picMk id="1026" creationId="{31E0B8E7-5AAF-5314-AEE2-A82B6163324E}"/>
-          </ac:picMkLst>
-        </pc:picChg>
-        <pc:cxnChg chg="add mod">
-          <ac:chgData name="George Hariman" userId="944226f4-c0bd-444e-8152-728ae792d6b1" providerId="ADAL" clId="{2574B24F-E2A1-49B4-965A-816A9A283E65}" dt="2025-06-17T21:59:01.554" v="278" actId="1582"/>
-          <ac:cxnSpMkLst>
-            <pc:docMk/>
-            <pc:sldMk cId="1800593104" sldId="256"/>
-            <ac:cxnSpMk id="8" creationId="{5BAC6693-3255-95F7-21DA-824391F87B6D}"/>
-          </ac:cxnSpMkLst>
-        </pc:cxnChg>
-        <pc:cxnChg chg="add mod topLvl">
-          <ac:chgData name="George Hariman" userId="944226f4-c0bd-444e-8152-728ae792d6b1" providerId="ADAL" clId="{2574B24F-E2A1-49B4-965A-816A9A283E65}" dt="2025-06-17T22:38:18.300" v="2076" actId="165"/>
-          <ac:cxnSpMkLst>
-            <pc:docMk/>
-            <pc:sldMk cId="1800593104" sldId="256"/>
-            <ac:cxnSpMk id="11" creationId="{1AD40D1C-B744-3257-22B7-43950B349E78}"/>
-          </ac:cxnSpMkLst>
-        </pc:cxnChg>
-        <pc:cxnChg chg="add mod topLvl">
-          <ac:chgData name="George Hariman" userId="944226f4-c0bd-444e-8152-728ae792d6b1" providerId="ADAL" clId="{2574B24F-E2A1-49B4-965A-816A9A283E65}" dt="2025-06-17T22:38:18.300" v="2076" actId="165"/>
-          <ac:cxnSpMkLst>
-            <pc:docMk/>
-            <pc:sldMk cId="1800593104" sldId="256"/>
-            <ac:cxnSpMk id="18" creationId="{2682BF95-1F5D-DCF8-03E2-FE7549D6119E}"/>
-          </ac:cxnSpMkLst>
-        </pc:cxnChg>
-        <pc:cxnChg chg="add mod topLvl">
-          <ac:chgData name="George Hariman" userId="944226f4-c0bd-444e-8152-728ae792d6b1" providerId="ADAL" clId="{2574B24F-E2A1-49B4-965A-816A9A283E65}" dt="2025-06-17T22:39:13.622" v="2154" actId="165"/>
-          <ac:cxnSpMkLst>
-            <pc:docMk/>
-            <pc:sldMk cId="1800593104" sldId="256"/>
-            <ac:cxnSpMk id="24" creationId="{D2306F76-99C2-8DF4-2071-FACD58F635F4}"/>
-          </ac:cxnSpMkLst>
-        </pc:cxnChg>
-        <pc:cxnChg chg="add mod topLvl">
-          <ac:chgData name="George Hariman" userId="944226f4-c0bd-444e-8152-728ae792d6b1" providerId="ADAL" clId="{2574B24F-E2A1-49B4-965A-816A9A283E65}" dt="2025-06-17T23:09:20.247" v="2422" actId="1076"/>
-          <ac:cxnSpMkLst>
-            <pc:docMk/>
-            <pc:sldMk cId="1800593104" sldId="256"/>
-            <ac:cxnSpMk id="29" creationId="{7A82C5DF-9BE8-5D12-86E4-A699752CF43D}"/>
-          </ac:cxnSpMkLst>
-        </pc:cxnChg>
       </pc:sldChg>
       <pc:sldChg chg="addSp delSp modSp new mod">
         <pc:chgData name="George Hariman" userId="944226f4-c0bd-444e-8152-728ae792d6b1" providerId="ADAL" clId="{2574B24F-E2A1-49B4-965A-816A9A283E65}" dt="2025-06-17T22:39:51.415" v="2185" actId="164"/>
@@ -263,94 +301,6 @@
           <pc:docMk/>
           <pc:sldMk cId="2969960632" sldId="257"/>
         </pc:sldMkLst>
-        <pc:spChg chg="mod">
-          <ac:chgData name="George Hariman" userId="944226f4-c0bd-444e-8152-728ae792d6b1" providerId="ADAL" clId="{2574B24F-E2A1-49B4-965A-816A9A283E65}" dt="2025-06-17T22:00:42.359" v="423" actId="20577"/>
-          <ac:spMkLst>
-            <pc:docMk/>
-            <pc:sldMk cId="2969960632" sldId="257"/>
-            <ac:spMk id="2" creationId="{23AC7BDC-BFED-4A2D-45A7-38DF244D2DC8}"/>
-          </ac:spMkLst>
-        </pc:spChg>
-        <pc:spChg chg="add mod">
-          <ac:chgData name="George Hariman" userId="944226f4-c0bd-444e-8152-728ae792d6b1" providerId="ADAL" clId="{2574B24F-E2A1-49B4-965A-816A9A283E65}" dt="2025-06-17T22:39:51.415" v="2185" actId="164"/>
-          <ac:spMkLst>
-            <pc:docMk/>
-            <pc:sldMk cId="2969960632" sldId="257"/>
-            <ac:spMk id="6" creationId="{29575C94-4CB1-0F07-83D9-F3D9824B1A83}"/>
-          </ac:spMkLst>
-        </pc:spChg>
-        <pc:spChg chg="add mod">
-          <ac:chgData name="George Hariman" userId="944226f4-c0bd-444e-8152-728ae792d6b1" providerId="ADAL" clId="{2574B24F-E2A1-49B4-965A-816A9A283E65}" dt="2025-06-17T22:39:51.415" v="2185" actId="164"/>
-          <ac:spMkLst>
-            <pc:docMk/>
-            <pc:sldMk cId="2969960632" sldId="257"/>
-            <ac:spMk id="9" creationId="{B27607DC-D63B-C2FB-0A98-398A783AF4D3}"/>
-          </ac:spMkLst>
-        </pc:spChg>
-        <pc:spChg chg="add mod">
-          <ac:chgData name="George Hariman" userId="944226f4-c0bd-444e-8152-728ae792d6b1" providerId="ADAL" clId="{2574B24F-E2A1-49B4-965A-816A9A283E65}" dt="2025-06-17T22:39:51.415" v="2185" actId="164"/>
-          <ac:spMkLst>
-            <pc:docMk/>
-            <pc:sldMk cId="2969960632" sldId="257"/>
-            <ac:spMk id="12" creationId="{53C19DD8-6935-7535-8472-C3E194E59CDD}"/>
-          </ac:spMkLst>
-        </pc:spChg>
-        <pc:spChg chg="add mod">
-          <ac:chgData name="George Hariman" userId="944226f4-c0bd-444e-8152-728ae792d6b1" providerId="ADAL" clId="{2574B24F-E2A1-49B4-965A-816A9A283E65}" dt="2025-06-17T22:39:51.415" v="2185" actId="164"/>
-          <ac:spMkLst>
-            <pc:docMk/>
-            <pc:sldMk cId="2969960632" sldId="257"/>
-            <ac:spMk id="13" creationId="{84A1639D-F9AF-1635-40C3-F8AC65BCDA26}"/>
-          </ac:spMkLst>
-        </pc:spChg>
-        <pc:spChg chg="add mod">
-          <ac:chgData name="George Hariman" userId="944226f4-c0bd-444e-8152-728ae792d6b1" providerId="ADAL" clId="{2574B24F-E2A1-49B4-965A-816A9A283E65}" dt="2025-06-17T22:39:51.415" v="2185" actId="164"/>
-          <ac:spMkLst>
-            <pc:docMk/>
-            <pc:sldMk cId="2969960632" sldId="257"/>
-            <ac:spMk id="14" creationId="{70B28D93-A226-720E-3E31-06CECCE7601C}"/>
-          </ac:spMkLst>
-        </pc:spChg>
-        <pc:spChg chg="add mod">
-          <ac:chgData name="George Hariman" userId="944226f4-c0bd-444e-8152-728ae792d6b1" providerId="ADAL" clId="{2574B24F-E2A1-49B4-965A-816A9A283E65}" dt="2025-06-17T22:39:51.415" v="2185" actId="164"/>
-          <ac:spMkLst>
-            <pc:docMk/>
-            <pc:sldMk cId="2969960632" sldId="257"/>
-            <ac:spMk id="15" creationId="{C8E73DF3-538C-FACE-EF86-1BC71A9A772B}"/>
-          </ac:spMkLst>
-        </pc:spChg>
-        <pc:grpChg chg="add mod">
-          <ac:chgData name="George Hariman" userId="944226f4-c0bd-444e-8152-728ae792d6b1" providerId="ADAL" clId="{2574B24F-E2A1-49B4-965A-816A9A283E65}" dt="2025-06-17T22:39:51.415" v="2185" actId="164"/>
-          <ac:grpSpMkLst>
-            <pc:docMk/>
-            <pc:sldMk cId="2969960632" sldId="257"/>
-            <ac:grpSpMk id="16" creationId="{CF085448-7C76-D6D6-12B7-BD1847371D56}"/>
-          </ac:grpSpMkLst>
-        </pc:grpChg>
-        <pc:picChg chg="add mod">
-          <ac:chgData name="George Hariman" userId="944226f4-c0bd-444e-8152-728ae792d6b1" providerId="ADAL" clId="{2574B24F-E2A1-49B4-965A-816A9A283E65}" dt="2025-06-17T22:39:51.415" v="2185" actId="164"/>
-          <ac:picMkLst>
-            <pc:docMk/>
-            <pc:sldMk cId="2969960632" sldId="257"/>
-            <ac:picMk id="5" creationId="{A601B528-92B5-CC83-E56D-A6A0941F8BA9}"/>
-          </ac:picMkLst>
-        </pc:picChg>
-        <pc:picChg chg="add mod">
-          <ac:chgData name="George Hariman" userId="944226f4-c0bd-444e-8152-728ae792d6b1" providerId="ADAL" clId="{2574B24F-E2A1-49B4-965A-816A9A283E65}" dt="2025-06-17T22:39:51.415" v="2185" actId="164"/>
-          <ac:picMkLst>
-            <pc:docMk/>
-            <pc:sldMk cId="2969960632" sldId="257"/>
-            <ac:picMk id="8" creationId="{2E2E6F67-6B81-E911-4D27-7A300CE5CE2A}"/>
-          </ac:picMkLst>
-        </pc:picChg>
-        <pc:picChg chg="add mod">
-          <ac:chgData name="George Hariman" userId="944226f4-c0bd-444e-8152-728ae792d6b1" providerId="ADAL" clId="{2574B24F-E2A1-49B4-965A-816A9A283E65}" dt="2025-06-17T22:39:51.415" v="2185" actId="164"/>
-          <ac:picMkLst>
-            <pc:docMk/>
-            <pc:sldMk cId="2969960632" sldId="257"/>
-            <ac:picMk id="11" creationId="{375541AD-D2C8-D280-7DE7-BA5DD684B961}"/>
-          </ac:picMkLst>
-        </pc:picChg>
       </pc:sldChg>
       <pc:sldChg chg="addSp delSp modSp new mod">
         <pc:chgData name="George Hariman" userId="944226f4-c0bd-444e-8152-728ae792d6b1" providerId="ADAL" clId="{2574B24F-E2A1-49B4-965A-816A9A283E65}" dt="2025-06-18T21:38:57.210" v="2851" actId="164"/>
@@ -358,134 +308,6 @@
           <pc:docMk/>
           <pc:sldMk cId="3341469045" sldId="258"/>
         </pc:sldMkLst>
-        <pc:spChg chg="mod">
-          <ac:chgData name="George Hariman" userId="944226f4-c0bd-444e-8152-728ae792d6b1" providerId="ADAL" clId="{2574B24F-E2A1-49B4-965A-816A9A283E65}" dt="2025-06-17T22:07:56.204" v="831" actId="20577"/>
-          <ac:spMkLst>
-            <pc:docMk/>
-            <pc:sldMk cId="3341469045" sldId="258"/>
-            <ac:spMk id="2" creationId="{B0A9A127-E455-3462-7B68-E892CA0DF85A}"/>
-          </ac:spMkLst>
-        </pc:spChg>
-        <pc:spChg chg="add mod topLvl">
-          <ac:chgData name="George Hariman" userId="944226f4-c0bd-444e-8152-728ae792d6b1" providerId="ADAL" clId="{2574B24F-E2A1-49B4-965A-816A9A283E65}" dt="2025-06-18T21:38:57.210" v="2851" actId="164"/>
-          <ac:spMkLst>
-            <pc:docMk/>
-            <pc:sldMk cId="3341469045" sldId="258"/>
-            <ac:spMk id="7" creationId="{929F6ABB-78E4-0763-4A74-62C2DF12DF44}"/>
-          </ac:spMkLst>
-        </pc:spChg>
-        <pc:spChg chg="add mod ord topLvl">
-          <ac:chgData name="George Hariman" userId="944226f4-c0bd-444e-8152-728ae792d6b1" providerId="ADAL" clId="{2574B24F-E2A1-49B4-965A-816A9A283E65}" dt="2025-06-18T21:38:57.210" v="2851" actId="164"/>
-          <ac:spMkLst>
-            <pc:docMk/>
-            <pc:sldMk cId="3341469045" sldId="258"/>
-            <ac:spMk id="8" creationId="{86F1D908-0535-46A6-2615-0F72D87469BA}"/>
-          </ac:spMkLst>
-        </pc:spChg>
-        <pc:spChg chg="add mod">
-          <ac:chgData name="George Hariman" userId="944226f4-c0bd-444e-8152-728ae792d6b1" providerId="ADAL" clId="{2574B24F-E2A1-49B4-965A-816A9A283E65}" dt="2025-06-18T21:38:57.210" v="2851" actId="164"/>
-          <ac:spMkLst>
-            <pc:docMk/>
-            <pc:sldMk cId="3341469045" sldId="258"/>
-            <ac:spMk id="18" creationId="{D6A37C3E-DE5C-329D-BE66-117E6C1C406C}"/>
-          </ac:spMkLst>
-        </pc:spChg>
-        <pc:spChg chg="add mod topLvl">
-          <ac:chgData name="George Hariman" userId="944226f4-c0bd-444e-8152-728ae792d6b1" providerId="ADAL" clId="{2574B24F-E2A1-49B4-965A-816A9A283E65}" dt="2025-06-18T21:38:57.210" v="2851" actId="164"/>
-          <ac:spMkLst>
-            <pc:docMk/>
-            <pc:sldMk cId="3341469045" sldId="258"/>
-            <ac:spMk id="21" creationId="{EB16D86F-0232-3913-18F9-2A16A1CE4D9D}"/>
-          </ac:spMkLst>
-        </pc:spChg>
-        <pc:spChg chg="add mod topLvl">
-          <ac:chgData name="George Hariman" userId="944226f4-c0bd-444e-8152-728ae792d6b1" providerId="ADAL" clId="{2574B24F-E2A1-49B4-965A-816A9A283E65}" dt="2025-06-18T21:38:57.210" v="2851" actId="164"/>
-          <ac:spMkLst>
-            <pc:docMk/>
-            <pc:sldMk cId="3341469045" sldId="258"/>
-            <ac:spMk id="23" creationId="{17AA000F-B524-6980-28DC-32037312051B}"/>
-          </ac:spMkLst>
-        </pc:spChg>
-        <pc:spChg chg="add mod topLvl">
-          <ac:chgData name="George Hariman" userId="944226f4-c0bd-444e-8152-728ae792d6b1" providerId="ADAL" clId="{2574B24F-E2A1-49B4-965A-816A9A283E65}" dt="2025-06-18T21:38:57.210" v="2851" actId="164"/>
-          <ac:spMkLst>
-            <pc:docMk/>
-            <pc:sldMk cId="3341469045" sldId="258"/>
-            <ac:spMk id="34" creationId="{FEFDF549-EAFF-3F16-7D50-7F032E831F32}"/>
-          </ac:spMkLst>
-        </pc:spChg>
-        <pc:spChg chg="add mod topLvl">
-          <ac:chgData name="George Hariman" userId="944226f4-c0bd-444e-8152-728ae792d6b1" providerId="ADAL" clId="{2574B24F-E2A1-49B4-965A-816A9A283E65}" dt="2025-06-18T21:38:57.210" v="2851" actId="164"/>
-          <ac:spMkLst>
-            <pc:docMk/>
-            <pc:sldMk cId="3341469045" sldId="258"/>
-            <ac:spMk id="35" creationId="{F3ECA9D0-22C8-CA8E-AC32-9FB4E5C13DE4}"/>
-          </ac:spMkLst>
-        </pc:spChg>
-        <pc:spChg chg="add mod topLvl">
-          <ac:chgData name="George Hariman" userId="944226f4-c0bd-444e-8152-728ae792d6b1" providerId="ADAL" clId="{2574B24F-E2A1-49B4-965A-816A9A283E65}" dt="2025-06-18T21:38:57.210" v="2851" actId="164"/>
-          <ac:spMkLst>
-            <pc:docMk/>
-            <pc:sldMk cId="3341469045" sldId="258"/>
-            <ac:spMk id="37" creationId="{B993709A-08EF-B4F0-E3E4-B02E703C1C79}"/>
-          </ac:spMkLst>
-        </pc:spChg>
-        <pc:picChg chg="add mod ord">
-          <ac:chgData name="George Hariman" userId="944226f4-c0bd-444e-8152-728ae792d6b1" providerId="ADAL" clId="{2574B24F-E2A1-49B4-965A-816A9A283E65}" dt="2025-06-18T21:35:42.557" v="2731" actId="1076"/>
-          <ac:picMkLst>
-            <pc:docMk/>
-            <pc:sldMk cId="3341469045" sldId="258"/>
-            <ac:picMk id="6" creationId="{562F4C93-91CC-D9F9-5BB5-4E88D0ED11C7}"/>
-          </ac:picMkLst>
-        </pc:picChg>
-        <pc:picChg chg="add mod ord topLvl">
-          <ac:chgData name="George Hariman" userId="944226f4-c0bd-444e-8152-728ae792d6b1" providerId="ADAL" clId="{2574B24F-E2A1-49B4-965A-816A9A283E65}" dt="2025-06-18T21:38:43.486" v="2849" actId="165"/>
-          <ac:picMkLst>
-            <pc:docMk/>
-            <pc:sldMk cId="3341469045" sldId="258"/>
-            <ac:picMk id="11" creationId="{9E3FBE24-06F3-51DC-0B08-AACA26EC054D}"/>
-          </ac:picMkLst>
-        </pc:picChg>
-        <pc:picChg chg="add mod topLvl">
-          <ac:chgData name="George Hariman" userId="944226f4-c0bd-444e-8152-728ae792d6b1" providerId="ADAL" clId="{2574B24F-E2A1-49B4-965A-816A9A283E65}" dt="2025-06-18T21:38:57.210" v="2851" actId="164"/>
-          <ac:picMkLst>
-            <pc:docMk/>
-            <pc:sldMk cId="3341469045" sldId="258"/>
-            <ac:picMk id="12" creationId="{3254E32B-B86D-AD1B-D308-F777E823F06B}"/>
-          </ac:picMkLst>
-        </pc:picChg>
-        <pc:picChg chg="add mod topLvl">
-          <ac:chgData name="George Hariman" userId="944226f4-c0bd-444e-8152-728ae792d6b1" providerId="ADAL" clId="{2574B24F-E2A1-49B4-965A-816A9A283E65}" dt="2025-06-18T21:38:57.210" v="2851" actId="164"/>
-          <ac:picMkLst>
-            <pc:docMk/>
-            <pc:sldMk cId="3341469045" sldId="258"/>
-            <ac:picMk id="14" creationId="{78097711-6AA8-A566-49D0-8DB889328F84}"/>
-          </ac:picMkLst>
-        </pc:picChg>
-        <pc:cxnChg chg="add mod topLvl">
-          <ac:chgData name="George Hariman" userId="944226f4-c0bd-444e-8152-728ae792d6b1" providerId="ADAL" clId="{2574B24F-E2A1-49B4-965A-816A9A283E65}" dt="2025-06-18T21:35:45.601" v="2732" actId="478"/>
-          <ac:cxnSpMkLst>
-            <pc:docMk/>
-            <pc:sldMk cId="3341469045" sldId="258"/>
-            <ac:cxnSpMk id="16" creationId="{3509523A-E161-175B-BE0F-1A676FA6F20D}"/>
-          </ac:cxnSpMkLst>
-        </pc:cxnChg>
-        <pc:cxnChg chg="add mod topLvl">
-          <ac:chgData name="George Hariman" userId="944226f4-c0bd-444e-8152-728ae792d6b1" providerId="ADAL" clId="{2574B24F-E2A1-49B4-965A-816A9A283E65}" dt="2025-06-18T21:38:05.235" v="2759" actId="14100"/>
-          <ac:cxnSpMkLst>
-            <pc:docMk/>
-            <pc:sldMk cId="3341469045" sldId="258"/>
-            <ac:cxnSpMk id="27" creationId="{3E3063A8-3E02-6202-3853-803E036DF5E0}"/>
-          </ac:cxnSpMkLst>
-        </pc:cxnChg>
-        <pc:cxnChg chg="add mod">
-          <ac:chgData name="George Hariman" userId="944226f4-c0bd-444e-8152-728ae792d6b1" providerId="ADAL" clId="{2574B24F-E2A1-49B4-965A-816A9A283E65}" dt="2025-06-18T21:38:07.334" v="2760" actId="14100"/>
-          <ac:cxnSpMkLst>
-            <pc:docMk/>
-            <pc:sldMk cId="3341469045" sldId="258"/>
-            <ac:cxnSpMk id="29" creationId="{3D231C14-5C29-C10E-4A57-A2E9C451D820}"/>
-          </ac:cxnSpMkLst>
-        </pc:cxnChg>
       </pc:sldChg>
       <pc:sldChg chg="addSp delSp modSp add mod ord">
         <pc:chgData name="George Hariman" userId="944226f4-c0bd-444e-8152-728ae792d6b1" providerId="ADAL" clId="{2574B24F-E2A1-49B4-965A-816A9A283E65}" dt="2025-06-18T21:37:49.265" v="2757" actId="165"/>
@@ -493,62 +315,6 @@
           <pc:docMk/>
           <pc:sldMk cId="1143546009" sldId="259"/>
         </pc:sldMkLst>
-        <pc:spChg chg="mod">
-          <ac:chgData name="George Hariman" userId="944226f4-c0bd-444e-8152-728ae792d6b1" providerId="ADAL" clId="{2574B24F-E2A1-49B4-965A-816A9A283E65}" dt="2025-06-17T23:21:38.778" v="2486" actId="20577"/>
-          <ac:spMkLst>
-            <pc:docMk/>
-            <pc:sldMk cId="1143546009" sldId="259"/>
-            <ac:spMk id="2" creationId="{12FC13A1-51AE-D5EB-EF9A-25B3F58208D5}"/>
-          </ac:spMkLst>
-        </pc:spChg>
-        <pc:spChg chg="mod topLvl">
-          <ac:chgData name="George Hariman" userId="944226f4-c0bd-444e-8152-728ae792d6b1" providerId="ADAL" clId="{2574B24F-E2A1-49B4-965A-816A9A283E65}" dt="2025-06-18T21:37:49.265" v="2757" actId="165"/>
-          <ac:spMkLst>
-            <pc:docMk/>
-            <pc:sldMk cId="1143546009" sldId="259"/>
-            <ac:spMk id="7" creationId="{2BD12CFA-1CD3-95F8-A967-E49813C5EA33}"/>
-          </ac:spMkLst>
-        </pc:spChg>
-        <pc:spChg chg="add mod topLvl">
-          <ac:chgData name="George Hariman" userId="944226f4-c0bd-444e-8152-728ae792d6b1" providerId="ADAL" clId="{2574B24F-E2A1-49B4-965A-816A9A283E65}" dt="2025-06-18T21:37:49.265" v="2757" actId="165"/>
-          <ac:spMkLst>
-            <pc:docMk/>
-            <pc:sldMk cId="1143546009" sldId="259"/>
-            <ac:spMk id="13" creationId="{806DD5E2-6A89-A0A6-B3A0-7603EF3685B1}"/>
-          </ac:spMkLst>
-        </pc:spChg>
-        <pc:spChg chg="add mod topLvl">
-          <ac:chgData name="George Hariman" userId="944226f4-c0bd-444e-8152-728ae792d6b1" providerId="ADAL" clId="{2574B24F-E2A1-49B4-965A-816A9A283E65}" dt="2025-06-18T21:37:49.265" v="2757" actId="165"/>
-          <ac:spMkLst>
-            <pc:docMk/>
-            <pc:sldMk cId="1143546009" sldId="259"/>
-            <ac:spMk id="20" creationId="{D0602795-57C0-E3D1-95CA-F5FA1C3D1CCF}"/>
-          </ac:spMkLst>
-        </pc:spChg>
-        <pc:grpChg chg="add del mod">
-          <ac:chgData name="George Hariman" userId="944226f4-c0bd-444e-8152-728ae792d6b1" providerId="ADAL" clId="{2574B24F-E2A1-49B4-965A-816A9A283E65}" dt="2025-06-18T21:37:49.265" v="2757" actId="165"/>
-          <ac:grpSpMkLst>
-            <pc:docMk/>
-            <pc:sldMk cId="1143546009" sldId="259"/>
-            <ac:grpSpMk id="22" creationId="{8B4793E7-34A5-4A47-ECC1-84B6F0CD910E}"/>
-          </ac:grpSpMkLst>
-        </pc:grpChg>
-        <pc:picChg chg="add del mod topLvl">
-          <ac:chgData name="George Hariman" userId="944226f4-c0bd-444e-8152-728ae792d6b1" providerId="ADAL" clId="{2574B24F-E2A1-49B4-965A-816A9A283E65}" dt="2025-06-18T21:37:49.265" v="2757" actId="165"/>
-          <ac:picMkLst>
-            <pc:docMk/>
-            <pc:sldMk cId="1143546009" sldId="259"/>
-            <ac:picMk id="4" creationId="{80C8457A-CCB9-6D4D-1D55-A087DCFA8D43}"/>
-          </ac:picMkLst>
-        </pc:picChg>
-        <pc:cxnChg chg="add mod topLvl">
-          <ac:chgData name="George Hariman" userId="944226f4-c0bd-444e-8152-728ae792d6b1" providerId="ADAL" clId="{2574B24F-E2A1-49B4-965A-816A9A283E65}" dt="2025-06-18T21:37:49.265" v="2757" actId="165"/>
-          <ac:cxnSpMkLst>
-            <pc:docMk/>
-            <pc:sldMk cId="1143546009" sldId="259"/>
-            <ac:cxnSpMk id="14" creationId="{C74670F0-D53F-AC51-EF4E-3FE6D1AB4C86}"/>
-          </ac:cxnSpMkLst>
-        </pc:cxnChg>
       </pc:sldChg>
       <pc:sldChg chg="addSp delSp modSp add mod">
         <pc:chgData name="George Hariman" userId="944226f4-c0bd-444e-8152-728ae792d6b1" providerId="ADAL" clId="{2574B24F-E2A1-49B4-965A-816A9A283E65}" dt="2025-06-18T21:34:39.350" v="2714" actId="1076"/>
@@ -556,102 +322,6 @@
           <pc:docMk/>
           <pc:sldMk cId="208232504" sldId="260"/>
         </pc:sldMkLst>
-        <pc:spChg chg="mod">
-          <ac:chgData name="George Hariman" userId="944226f4-c0bd-444e-8152-728ae792d6b1" providerId="ADAL" clId="{2574B24F-E2A1-49B4-965A-816A9A283E65}" dt="2025-06-17T22:36:57.353" v="2060" actId="20577"/>
-          <ac:spMkLst>
-            <pc:docMk/>
-            <pc:sldMk cId="208232504" sldId="260"/>
-            <ac:spMk id="2" creationId="{29363A13-4002-A891-1FB1-A716AE9764A3}"/>
-          </ac:spMkLst>
-        </pc:spChg>
-        <pc:spChg chg="add mod topLvl">
-          <ac:chgData name="George Hariman" userId="944226f4-c0bd-444e-8152-728ae792d6b1" providerId="ADAL" clId="{2574B24F-E2A1-49B4-965A-816A9A283E65}" dt="2025-06-18T21:34:34.070" v="2712" actId="1076"/>
-          <ac:spMkLst>
-            <pc:docMk/>
-            <pc:sldMk cId="208232504" sldId="260"/>
-            <ac:spMk id="5" creationId="{19EE73C8-D819-8B55-60C8-8DB89892D618}"/>
-          </ac:spMkLst>
-        </pc:spChg>
-        <pc:spChg chg="mod topLvl">
-          <ac:chgData name="George Hariman" userId="944226f4-c0bd-444e-8152-728ae792d6b1" providerId="ADAL" clId="{2574B24F-E2A1-49B4-965A-816A9A283E65}" dt="2025-06-18T21:32:30.751" v="2694" actId="165"/>
-          <ac:spMkLst>
-            <pc:docMk/>
-            <pc:sldMk cId="208232504" sldId="260"/>
-            <ac:spMk id="7" creationId="{0D06B1EE-082A-209E-9716-1D4B5E60F804}"/>
-          </ac:spMkLst>
-        </pc:spChg>
-        <pc:spChg chg="add mod topLvl">
-          <ac:chgData name="George Hariman" userId="944226f4-c0bd-444e-8152-728ae792d6b1" providerId="ADAL" clId="{2574B24F-E2A1-49B4-965A-816A9A283E65}" dt="2025-06-18T21:32:30.751" v="2694" actId="165"/>
-          <ac:spMkLst>
-            <pc:docMk/>
-            <pc:sldMk cId="208232504" sldId="260"/>
-            <ac:spMk id="11" creationId="{2A0C8B57-675C-1DB0-7662-70EDC635D666}"/>
-          </ac:spMkLst>
-        </pc:spChg>
-        <pc:spChg chg="add mod topLvl">
-          <ac:chgData name="George Hariman" userId="944226f4-c0bd-444e-8152-728ae792d6b1" providerId="ADAL" clId="{2574B24F-E2A1-49B4-965A-816A9A283E65}" dt="2025-06-18T21:33:40.921" v="2705" actId="1076"/>
-          <ac:spMkLst>
-            <pc:docMk/>
-            <pc:sldMk cId="208232504" sldId="260"/>
-            <ac:spMk id="13" creationId="{2E1D9537-265B-1388-9A22-9F99FDC70F46}"/>
-          </ac:spMkLst>
-        </pc:spChg>
-        <pc:spChg chg="add mod topLvl">
-          <ac:chgData name="George Hariman" userId="944226f4-c0bd-444e-8152-728ae792d6b1" providerId="ADAL" clId="{2574B24F-E2A1-49B4-965A-816A9A283E65}" dt="2025-06-18T21:32:30.751" v="2694" actId="165"/>
-          <ac:spMkLst>
-            <pc:docMk/>
-            <pc:sldMk cId="208232504" sldId="260"/>
-            <ac:spMk id="15" creationId="{8F92EF18-82BF-1E5B-46AD-90CE9BBEA5A7}"/>
-          </ac:spMkLst>
-        </pc:spChg>
-        <pc:spChg chg="add mod topLvl">
-          <ac:chgData name="George Hariman" userId="944226f4-c0bd-444e-8152-728ae792d6b1" providerId="ADAL" clId="{2574B24F-E2A1-49B4-965A-816A9A283E65}" dt="2025-06-18T21:34:36.469" v="2713" actId="1076"/>
-          <ac:spMkLst>
-            <pc:docMk/>
-            <pc:sldMk cId="208232504" sldId="260"/>
-            <ac:spMk id="17" creationId="{AEFE8A87-C3D1-80C9-269E-2BE37DF4FB9F}"/>
-          </ac:spMkLst>
-        </pc:spChg>
-        <pc:spChg chg="add mod topLvl">
-          <ac:chgData name="George Hariman" userId="944226f4-c0bd-444e-8152-728ae792d6b1" providerId="ADAL" clId="{2574B24F-E2A1-49B4-965A-816A9A283E65}" dt="2025-06-18T21:32:30.751" v="2694" actId="165"/>
-          <ac:spMkLst>
-            <pc:docMk/>
-            <pc:sldMk cId="208232504" sldId="260"/>
-            <ac:spMk id="18" creationId="{6BBC815C-2AC7-A202-CF1A-A08C93633EC4}"/>
-          </ac:spMkLst>
-        </pc:spChg>
-        <pc:spChg chg="add mod topLvl">
-          <ac:chgData name="George Hariman" userId="944226f4-c0bd-444e-8152-728ae792d6b1" providerId="ADAL" clId="{2574B24F-E2A1-49B4-965A-816A9A283E65}" dt="2025-06-18T21:34:39.350" v="2714" actId="1076"/>
-          <ac:spMkLst>
-            <pc:docMk/>
-            <pc:sldMk cId="208232504" sldId="260"/>
-            <ac:spMk id="27" creationId="{3CAB54F4-F106-0E19-5DC9-5E03548FEE89}"/>
-          </ac:spMkLst>
-        </pc:spChg>
-        <pc:spChg chg="add mod topLvl">
-          <ac:chgData name="George Hariman" userId="944226f4-c0bd-444e-8152-728ae792d6b1" providerId="ADAL" clId="{2574B24F-E2A1-49B4-965A-816A9A283E65}" dt="2025-06-18T21:32:30.751" v="2694" actId="165"/>
-          <ac:spMkLst>
-            <pc:docMk/>
-            <pc:sldMk cId="208232504" sldId="260"/>
-            <ac:spMk id="28" creationId="{F4840324-A71B-A359-ED83-C05C67F44A42}"/>
-          </ac:spMkLst>
-        </pc:spChg>
-        <pc:picChg chg="add mod ord">
-          <ac:chgData name="George Hariman" userId="944226f4-c0bd-444e-8152-728ae792d6b1" providerId="ADAL" clId="{2574B24F-E2A1-49B4-965A-816A9A283E65}" dt="2025-06-18T21:33:38.922" v="2704" actId="1076"/>
-          <ac:picMkLst>
-            <pc:docMk/>
-            <pc:sldMk cId="208232504" sldId="260"/>
-            <ac:picMk id="6" creationId="{F86E19F3-C24D-8ABA-168C-6E4844D64370}"/>
-          </ac:picMkLst>
-        </pc:picChg>
-        <pc:picChg chg="add mod ord">
-          <ac:chgData name="George Hariman" userId="944226f4-c0bd-444e-8152-728ae792d6b1" providerId="ADAL" clId="{2574B24F-E2A1-49B4-965A-816A9A283E65}" dt="2025-06-18T21:34:31.092" v="2711" actId="14100"/>
-          <ac:picMkLst>
-            <pc:docMk/>
-            <pc:sldMk cId="208232504" sldId="260"/>
-            <ac:picMk id="10" creationId="{5ED0079E-1CAC-E276-2D02-8205761130D1}"/>
-          </ac:picMkLst>
-        </pc:picChg>
       </pc:sldChg>
       <pc:sldChg chg="addSp delSp modSp add mod">
         <pc:chgData name="George Hariman" userId="944226f4-c0bd-444e-8152-728ae792d6b1" providerId="ADAL" clId="{2574B24F-E2A1-49B4-965A-816A9A283E65}" dt="2025-06-17T23:03:55.904" v="2339" actId="1076"/>
@@ -659,134 +329,6 @@
           <pc:docMk/>
           <pc:sldMk cId="657922982" sldId="261"/>
         </pc:sldMkLst>
-        <pc:spChg chg="mod">
-          <ac:chgData name="George Hariman" userId="944226f4-c0bd-444e-8152-728ae792d6b1" providerId="ADAL" clId="{2574B24F-E2A1-49B4-965A-816A9A283E65}" dt="2025-06-17T22:34:36.339" v="1930" actId="20577"/>
-          <ac:spMkLst>
-            <pc:docMk/>
-            <pc:sldMk cId="657922982" sldId="261"/>
-            <ac:spMk id="2" creationId="{10BE49AF-1203-C464-4B22-0188C8E1C6BC}"/>
-          </ac:spMkLst>
-        </pc:spChg>
-        <pc:spChg chg="mod topLvl">
-          <ac:chgData name="George Hariman" userId="944226f4-c0bd-444e-8152-728ae792d6b1" providerId="ADAL" clId="{2574B24F-E2A1-49B4-965A-816A9A283E65}" dt="2025-06-17T22:36:46.723" v="2056" actId="164"/>
-          <ac:spMkLst>
-            <pc:docMk/>
-            <pc:sldMk cId="657922982" sldId="261"/>
-            <ac:spMk id="6" creationId="{E39EE8FB-4D22-0182-9EB7-B6590F79C61F}"/>
-          </ac:spMkLst>
-        </pc:spChg>
-        <pc:spChg chg="mod topLvl">
-          <ac:chgData name="George Hariman" userId="944226f4-c0bd-444e-8152-728ae792d6b1" providerId="ADAL" clId="{2574B24F-E2A1-49B4-965A-816A9A283E65}" dt="2025-06-17T22:36:46.723" v="2056" actId="164"/>
-          <ac:spMkLst>
-            <pc:docMk/>
-            <pc:sldMk cId="657922982" sldId="261"/>
-            <ac:spMk id="9" creationId="{DE1EB251-EB96-1295-F856-BF3F54C9AE8F}"/>
-          </ac:spMkLst>
-        </pc:spChg>
-        <pc:spChg chg="mod topLvl">
-          <ac:chgData name="George Hariman" userId="944226f4-c0bd-444e-8152-728ae792d6b1" providerId="ADAL" clId="{2574B24F-E2A1-49B4-965A-816A9A283E65}" dt="2025-06-17T22:36:46.723" v="2056" actId="164"/>
-          <ac:spMkLst>
-            <pc:docMk/>
-            <pc:sldMk cId="657922982" sldId="261"/>
-            <ac:spMk id="12" creationId="{6B3D20D0-4F7F-66BD-8868-54E2E9B2FC01}"/>
-          </ac:spMkLst>
-        </pc:spChg>
-        <pc:spChg chg="mod topLvl">
-          <ac:chgData name="George Hariman" userId="944226f4-c0bd-444e-8152-728ae792d6b1" providerId="ADAL" clId="{2574B24F-E2A1-49B4-965A-816A9A283E65}" dt="2025-06-17T22:36:46.723" v="2056" actId="164"/>
-          <ac:spMkLst>
-            <pc:docMk/>
-            <pc:sldMk cId="657922982" sldId="261"/>
-            <ac:spMk id="13" creationId="{7332EAD3-F05D-CDB8-5A99-E2D5083AD7FF}"/>
-          </ac:spMkLst>
-        </pc:spChg>
-        <pc:spChg chg="mod topLvl">
-          <ac:chgData name="George Hariman" userId="944226f4-c0bd-444e-8152-728ae792d6b1" providerId="ADAL" clId="{2574B24F-E2A1-49B4-965A-816A9A283E65}" dt="2025-06-17T22:36:46.723" v="2056" actId="164"/>
-          <ac:spMkLst>
-            <pc:docMk/>
-            <pc:sldMk cId="657922982" sldId="261"/>
-            <ac:spMk id="14" creationId="{4420996F-22E7-00BB-0143-22CCC5FC5C7E}"/>
-          </ac:spMkLst>
-        </pc:spChg>
-        <pc:spChg chg="mod topLvl">
-          <ac:chgData name="George Hariman" userId="944226f4-c0bd-444e-8152-728ae792d6b1" providerId="ADAL" clId="{2574B24F-E2A1-49B4-965A-816A9A283E65}" dt="2025-06-17T22:36:46.723" v="2056" actId="164"/>
-          <ac:spMkLst>
-            <pc:docMk/>
-            <pc:sldMk cId="657922982" sldId="261"/>
-            <ac:spMk id="15" creationId="{0327E7F0-D882-2310-8BDA-3BD7F8A5035A}"/>
-          </ac:spMkLst>
-        </pc:spChg>
-        <pc:spChg chg="add mod">
-          <ac:chgData name="George Hariman" userId="944226f4-c0bd-444e-8152-728ae792d6b1" providerId="ADAL" clId="{2574B24F-E2A1-49B4-965A-816A9A283E65}" dt="2025-06-17T23:03:50.172" v="2338" actId="207"/>
-          <ac:spMkLst>
-            <pc:docMk/>
-            <pc:sldMk cId="657922982" sldId="261"/>
-            <ac:spMk id="21" creationId="{D369C16B-9452-9C00-36F9-FF97754C8B00}"/>
-          </ac:spMkLst>
-        </pc:spChg>
-        <pc:spChg chg="add mod">
-          <ac:chgData name="George Hariman" userId="944226f4-c0bd-444e-8152-728ae792d6b1" providerId="ADAL" clId="{2574B24F-E2A1-49B4-965A-816A9A283E65}" dt="2025-06-17T22:36:46.723" v="2056" actId="164"/>
-          <ac:spMkLst>
-            <pc:docMk/>
-            <pc:sldMk cId="657922982" sldId="261"/>
-            <ac:spMk id="25" creationId="{4C06EE02-F8E5-55CD-4C16-CD396E80FFA1}"/>
-          </ac:spMkLst>
-        </pc:spChg>
-        <pc:spChg chg="add mod">
-          <ac:chgData name="George Hariman" userId="944226f4-c0bd-444e-8152-728ae792d6b1" providerId="ADAL" clId="{2574B24F-E2A1-49B4-965A-816A9A283E65}" dt="2025-06-17T22:36:46.723" v="2056" actId="164"/>
-          <ac:spMkLst>
-            <pc:docMk/>
-            <pc:sldMk cId="657922982" sldId="261"/>
-            <ac:spMk id="26" creationId="{713D6C6B-791E-5B61-CF7B-8D6BFA37C6B6}"/>
-          </ac:spMkLst>
-        </pc:spChg>
-        <pc:spChg chg="add mod">
-          <ac:chgData name="George Hariman" userId="944226f4-c0bd-444e-8152-728ae792d6b1" providerId="ADAL" clId="{2574B24F-E2A1-49B4-965A-816A9A283E65}" dt="2025-06-17T22:36:46.723" v="2056" actId="164"/>
-          <ac:spMkLst>
-            <pc:docMk/>
-            <pc:sldMk cId="657922982" sldId="261"/>
-            <ac:spMk id="27" creationId="{B2A7AB0B-58DF-F439-4A48-3A5F19EAB296}"/>
-          </ac:spMkLst>
-        </pc:spChg>
-        <pc:grpChg chg="mod">
-          <ac:chgData name="George Hariman" userId="944226f4-c0bd-444e-8152-728ae792d6b1" providerId="ADAL" clId="{2574B24F-E2A1-49B4-965A-816A9A283E65}" dt="2025-06-17T23:03:55.904" v="2339" actId="1076"/>
-          <ac:grpSpMkLst>
-            <pc:docMk/>
-            <pc:sldMk cId="657922982" sldId="261"/>
-            <ac:grpSpMk id="31" creationId="{B3FC59B0-8C06-7A25-ADBC-FE49EFB47561}"/>
-          </ac:grpSpMkLst>
-        </pc:grpChg>
-        <pc:picChg chg="add mod ord topLvl">
-          <ac:chgData name="George Hariman" userId="944226f4-c0bd-444e-8152-728ae792d6b1" providerId="ADAL" clId="{2574B24F-E2A1-49B4-965A-816A9A283E65}" dt="2025-06-17T22:36:46.723" v="2056" actId="164"/>
-          <ac:picMkLst>
-            <pc:docMk/>
-            <pc:sldMk cId="657922982" sldId="261"/>
-            <ac:picMk id="10" creationId="{0519A932-252A-326C-7683-A84E9C6CF331}"/>
-          </ac:picMkLst>
-        </pc:picChg>
-        <pc:picChg chg="add mod">
-          <ac:chgData name="George Hariman" userId="944226f4-c0bd-444e-8152-728ae792d6b1" providerId="ADAL" clId="{2574B24F-E2A1-49B4-965A-816A9A283E65}" dt="2025-06-17T22:36:29.265" v="2049" actId="1076"/>
-          <ac:picMkLst>
-            <pc:docMk/>
-            <pc:sldMk cId="657922982" sldId="261"/>
-            <ac:picMk id="23" creationId="{3746EB9D-0BE7-4E21-69E1-BEF8A1F89078}"/>
-          </ac:picMkLst>
-        </pc:picChg>
-        <pc:cxnChg chg="add mod topLvl">
-          <ac:chgData name="George Hariman" userId="944226f4-c0bd-444e-8152-728ae792d6b1" providerId="ADAL" clId="{2574B24F-E2A1-49B4-965A-816A9A283E65}" dt="2025-06-17T22:35:56.016" v="2031" actId="165"/>
-          <ac:cxnSpMkLst>
-            <pc:docMk/>
-            <pc:sldMk cId="657922982" sldId="261"/>
-            <ac:cxnSpMk id="19" creationId="{8E99C28C-3941-660C-D1C8-48DBDC58869E}"/>
-          </ac:cxnSpMkLst>
-        </pc:cxnChg>
-        <pc:cxnChg chg="add mod">
-          <ac:chgData name="George Hariman" userId="944226f4-c0bd-444e-8152-728ae792d6b1" providerId="ADAL" clId="{2574B24F-E2A1-49B4-965A-816A9A283E65}" dt="2025-06-17T22:36:40.894" v="2055" actId="14100"/>
-          <ac:cxnSpMkLst>
-            <pc:docMk/>
-            <pc:sldMk cId="657922982" sldId="261"/>
-            <ac:cxnSpMk id="29" creationId="{46CF9E1B-B5CD-D452-6E2F-8FACAA82B43F}"/>
-          </ac:cxnSpMkLst>
-        </pc:cxnChg>
       </pc:sldChg>
       <pc:sldChg chg="add del">
         <pc:chgData name="George Hariman" userId="944226f4-c0bd-444e-8152-728ae792d6b1" providerId="ADAL" clId="{2574B24F-E2A1-49B4-965A-816A9A283E65}" dt="2025-06-17T23:00:27.462" v="2187" actId="2696"/>
@@ -801,78 +343,6 @@
           <pc:docMk/>
           <pc:sldMk cId="1382637432" sldId="262"/>
         </pc:sldMkLst>
-        <pc:spChg chg="mod">
-          <ac:chgData name="George Hariman" userId="944226f4-c0bd-444e-8152-728ae792d6b1" providerId="ADAL" clId="{2574B24F-E2A1-49B4-965A-816A9A283E65}" dt="2025-06-17T23:11:01.501" v="2436" actId="207"/>
-          <ac:spMkLst>
-            <pc:docMk/>
-            <pc:sldMk cId="1382637432" sldId="262"/>
-            <ac:spMk id="2" creationId="{E5107369-7280-2E2C-2D0A-5978DCE55FB3}"/>
-          </ac:spMkLst>
-        </pc:spChg>
-        <pc:spChg chg="add mod">
-          <ac:chgData name="George Hariman" userId="944226f4-c0bd-444e-8152-728ae792d6b1" providerId="ADAL" clId="{2574B24F-E2A1-49B4-965A-816A9A283E65}" dt="2025-06-17T23:11:24.529" v="2450" actId="164"/>
-          <ac:spMkLst>
-            <pc:docMk/>
-            <pc:sldMk cId="1382637432" sldId="262"/>
-            <ac:spMk id="4" creationId="{6AE3EB9B-7EAC-921A-E8B6-B98D0E730A19}"/>
-          </ac:spMkLst>
-        </pc:spChg>
-        <pc:spChg chg="add mod">
-          <ac:chgData name="George Hariman" userId="944226f4-c0bd-444e-8152-728ae792d6b1" providerId="ADAL" clId="{2574B24F-E2A1-49B4-965A-816A9A283E65}" dt="2025-06-17T23:11:24.529" v="2450" actId="164"/>
-          <ac:spMkLst>
-            <pc:docMk/>
-            <pc:sldMk cId="1382637432" sldId="262"/>
-            <ac:spMk id="5" creationId="{96268986-1BFF-6601-1070-76B81FA96572}"/>
-          </ac:spMkLst>
-        </pc:spChg>
-        <pc:spChg chg="add mod">
-          <ac:chgData name="George Hariman" userId="944226f4-c0bd-444e-8152-728ae792d6b1" providerId="ADAL" clId="{2574B24F-E2A1-49B4-965A-816A9A283E65}" dt="2025-06-17T23:11:24.529" v="2450" actId="164"/>
-          <ac:spMkLst>
-            <pc:docMk/>
-            <pc:sldMk cId="1382637432" sldId="262"/>
-            <ac:spMk id="6" creationId="{C3F20E03-91E4-AE2A-CD7D-6836D2A5E002}"/>
-          </ac:spMkLst>
-        </pc:spChg>
-        <pc:spChg chg="add mod">
-          <ac:chgData name="George Hariman" userId="944226f4-c0bd-444e-8152-728ae792d6b1" providerId="ADAL" clId="{2574B24F-E2A1-49B4-965A-816A9A283E65}" dt="2025-06-17T23:11:24.529" v="2450" actId="164"/>
-          <ac:spMkLst>
-            <pc:docMk/>
-            <pc:sldMk cId="1382637432" sldId="262"/>
-            <ac:spMk id="8" creationId="{4E26E74E-D16A-78E3-D1F5-50EC9CD11DB4}"/>
-          </ac:spMkLst>
-        </pc:spChg>
-        <pc:spChg chg="add mod">
-          <ac:chgData name="George Hariman" userId="944226f4-c0bd-444e-8152-728ae792d6b1" providerId="ADAL" clId="{2574B24F-E2A1-49B4-965A-816A9A283E65}" dt="2025-06-17T23:11:47.258" v="2466" actId="1076"/>
-          <ac:spMkLst>
-            <pc:docMk/>
-            <pc:sldMk cId="1382637432" sldId="262"/>
-            <ac:spMk id="10" creationId="{74170F05-7A1C-FCDE-3694-267718638800}"/>
-          </ac:spMkLst>
-        </pc:spChg>
-        <pc:grpChg chg="add mod">
-          <ac:chgData name="George Hariman" userId="944226f4-c0bd-444e-8152-728ae792d6b1" providerId="ADAL" clId="{2574B24F-E2A1-49B4-965A-816A9A283E65}" dt="2025-06-17T23:11:24.529" v="2450" actId="164"/>
-          <ac:grpSpMkLst>
-            <pc:docMk/>
-            <pc:sldMk cId="1382637432" sldId="262"/>
-            <ac:grpSpMk id="9" creationId="{61888DED-3346-1250-183A-4AE2E99AF78A}"/>
-          </ac:grpSpMkLst>
-        </pc:grpChg>
-        <pc:picChg chg="add mod">
-          <ac:chgData name="George Hariman" userId="944226f4-c0bd-444e-8152-728ae792d6b1" providerId="ADAL" clId="{2574B24F-E2A1-49B4-965A-816A9A283E65}" dt="2025-06-17T23:11:24.529" v="2450" actId="164"/>
-          <ac:picMkLst>
-            <pc:docMk/>
-            <pc:sldMk cId="1382637432" sldId="262"/>
-            <ac:picMk id="2050" creationId="{D3C9AFC5-B76C-BE6A-4653-7F148138FC46}"/>
-          </ac:picMkLst>
-        </pc:picChg>
-        <pc:picChg chg="add mod">
-          <ac:chgData name="George Hariman" userId="944226f4-c0bd-444e-8152-728ae792d6b1" providerId="ADAL" clId="{2574B24F-E2A1-49B4-965A-816A9A283E65}" dt="2025-06-17T23:11:24.529" v="2450" actId="164"/>
-          <ac:picMkLst>
-            <pc:docMk/>
-            <pc:sldMk cId="1382637432" sldId="262"/>
-            <ac:picMk id="2052" creationId="{589C0BD9-2778-11DB-5CBE-A5A7B59F63A1}"/>
-          </ac:picMkLst>
-        </pc:picChg>
       </pc:sldChg>
       <pc:sldChg chg="new">
         <pc:chgData name="George Hariman" userId="944226f4-c0bd-444e-8152-728ae792d6b1" providerId="ADAL" clId="{2574B24F-E2A1-49B4-965A-816A9A283E65}" dt="2025-06-17T23:02:34.838" v="2267" actId="680"/>
@@ -887,22 +357,6 @@
           <pc:docMk/>
           <pc:sldMk cId="1793599662" sldId="264"/>
         </pc:sldMkLst>
-        <pc:spChg chg="mod">
-          <ac:chgData name="George Hariman" userId="944226f4-c0bd-444e-8152-728ae792d6b1" providerId="ADAL" clId="{2574B24F-E2A1-49B4-965A-816A9A283E65}" dt="2025-06-17T23:02:50.962" v="2320" actId="20577"/>
-          <ac:spMkLst>
-            <pc:docMk/>
-            <pc:sldMk cId="1793599662" sldId="264"/>
-            <ac:spMk id="2" creationId="{3E13B0F8-0D51-D02B-3682-F9C2AABB54B0}"/>
-          </ac:spMkLst>
-        </pc:spChg>
-        <pc:spChg chg="mod">
-          <ac:chgData name="George Hariman" userId="944226f4-c0bd-444e-8152-728ae792d6b1" providerId="ADAL" clId="{2574B24F-E2A1-49B4-965A-816A9A283E65}" dt="2025-06-17T23:02:58.774" v="2332" actId="20577"/>
-          <ac:spMkLst>
-            <pc:docMk/>
-            <pc:sldMk cId="1793599662" sldId="264"/>
-            <ac:spMk id="3" creationId="{9D9A9121-AF12-1969-1F1A-0B296611702E}"/>
-          </ac:spMkLst>
-        </pc:spChg>
       </pc:sldChg>
       <pc:sldChg chg="addSp delSp modSp add mod ord">
         <pc:chgData name="George Hariman" userId="944226f4-c0bd-444e-8152-728ae792d6b1" providerId="ADAL" clId="{2574B24F-E2A1-49B4-965A-816A9A283E65}" dt="2025-06-18T21:40:18.985" v="2863" actId="164"/>
@@ -910,78 +364,6 @@
           <pc:docMk/>
           <pc:sldMk cId="2371463180" sldId="265"/>
         </pc:sldMkLst>
-        <pc:spChg chg="mod">
-          <ac:chgData name="George Hariman" userId="944226f4-c0bd-444e-8152-728ae792d6b1" providerId="ADAL" clId="{2574B24F-E2A1-49B4-965A-816A9A283E65}" dt="2025-06-17T23:22:17.564" v="2524" actId="20577"/>
-          <ac:spMkLst>
-            <pc:docMk/>
-            <pc:sldMk cId="2371463180" sldId="265"/>
-            <ac:spMk id="2" creationId="{5E4BF864-D7E8-6A70-DEA3-B1BA9BA87E87}"/>
-          </ac:spMkLst>
-        </pc:spChg>
-        <pc:spChg chg="mod topLvl">
-          <ac:chgData name="George Hariman" userId="944226f4-c0bd-444e-8152-728ae792d6b1" providerId="ADAL" clId="{2574B24F-E2A1-49B4-965A-816A9A283E65}" dt="2025-06-18T21:40:18.985" v="2863" actId="164"/>
-          <ac:spMkLst>
-            <pc:docMk/>
-            <pc:sldMk cId="2371463180" sldId="265"/>
-            <ac:spMk id="3" creationId="{5C11C663-907F-081C-F270-A1DF46F7C474}"/>
-          </ac:spMkLst>
-        </pc:spChg>
-        <pc:spChg chg="mod topLvl">
-          <ac:chgData name="George Hariman" userId="944226f4-c0bd-444e-8152-728ae792d6b1" providerId="ADAL" clId="{2574B24F-E2A1-49B4-965A-816A9A283E65}" dt="2025-06-18T21:40:18.985" v="2863" actId="164"/>
-          <ac:spMkLst>
-            <pc:docMk/>
-            <pc:sldMk cId="2371463180" sldId="265"/>
-            <ac:spMk id="8" creationId="{DAE24CCC-84AE-1B01-D170-2100AE80576D}"/>
-          </ac:spMkLst>
-        </pc:spChg>
-        <pc:spChg chg="mod topLvl">
-          <ac:chgData name="George Hariman" userId="944226f4-c0bd-444e-8152-728ae792d6b1" providerId="ADAL" clId="{2574B24F-E2A1-49B4-965A-816A9A283E65}" dt="2025-06-18T21:40:18.985" v="2863" actId="164"/>
-          <ac:spMkLst>
-            <pc:docMk/>
-            <pc:sldMk cId="2371463180" sldId="265"/>
-            <ac:spMk id="11" creationId="{CF63C8C7-05FC-947B-8C0D-BFAC1B61180E}"/>
-          </ac:spMkLst>
-        </pc:spChg>
-        <pc:spChg chg="mod topLvl">
-          <ac:chgData name="George Hariman" userId="944226f4-c0bd-444e-8152-728ae792d6b1" providerId="ADAL" clId="{2574B24F-E2A1-49B4-965A-816A9A283E65}" dt="2025-06-18T21:40:18.985" v="2863" actId="164"/>
-          <ac:spMkLst>
-            <pc:docMk/>
-            <pc:sldMk cId="2371463180" sldId="265"/>
-            <ac:spMk id="12" creationId="{6BB596CD-5F8C-5A7E-F7A2-6842AAF565A8}"/>
-          </ac:spMkLst>
-        </pc:spChg>
-        <pc:spChg chg="mod topLvl">
-          <ac:chgData name="George Hariman" userId="944226f4-c0bd-444e-8152-728ae792d6b1" providerId="ADAL" clId="{2574B24F-E2A1-49B4-965A-816A9A283E65}" dt="2025-06-18T21:40:18.985" v="2863" actId="164"/>
-          <ac:spMkLst>
-            <pc:docMk/>
-            <pc:sldMk cId="2371463180" sldId="265"/>
-            <ac:spMk id="21" creationId="{2E6ABB5A-9541-8B5D-A825-B71EBE6D9DEB}"/>
-          </ac:spMkLst>
-        </pc:spChg>
-        <pc:grpChg chg="add mod">
-          <ac:chgData name="George Hariman" userId="944226f4-c0bd-444e-8152-728ae792d6b1" providerId="ADAL" clId="{2574B24F-E2A1-49B4-965A-816A9A283E65}" dt="2025-06-18T21:40:18.985" v="2863" actId="164"/>
-          <ac:grpSpMkLst>
-            <pc:docMk/>
-            <pc:sldMk cId="2371463180" sldId="265"/>
-            <ac:grpSpMk id="7" creationId="{9634B18E-F8DB-F3E7-CEFF-C3936B83DBA3}"/>
-          </ac:grpSpMkLst>
-        </pc:grpChg>
-        <pc:picChg chg="add mod ord">
-          <ac:chgData name="George Hariman" userId="944226f4-c0bd-444e-8152-728ae792d6b1" providerId="ADAL" clId="{2574B24F-E2A1-49B4-965A-816A9A283E65}" dt="2025-06-18T21:40:18.985" v="2863" actId="164"/>
-          <ac:picMkLst>
-            <pc:docMk/>
-            <pc:sldMk cId="2371463180" sldId="265"/>
-            <ac:picMk id="5" creationId="{380AE12E-7E03-2B74-D97C-6B664C3A3C33}"/>
-          </ac:picMkLst>
-        </pc:picChg>
-        <pc:cxnChg chg="mod topLvl">
-          <ac:chgData name="George Hariman" userId="944226f4-c0bd-444e-8152-728ae792d6b1" providerId="ADAL" clId="{2574B24F-E2A1-49B4-965A-816A9A283E65}" dt="2025-06-18T21:40:18.985" v="2863" actId="164"/>
-          <ac:cxnSpMkLst>
-            <pc:docMk/>
-            <pc:sldMk cId="2371463180" sldId="265"/>
-            <ac:cxnSpMk id="9" creationId="{32E6A42F-7E8F-F533-4C0E-578BCCD4C635}"/>
-          </ac:cxnSpMkLst>
-        </pc:cxnChg>
       </pc:sldChg>
     </pc:docChg>
   </pc:docChgLst>
@@ -998,22 +380,6 @@
           <pc:docMk/>
           <pc:sldMk cId="208232504" sldId="260"/>
         </pc:sldMkLst>
-        <pc:spChg chg="mod">
-          <ac:chgData name="George Hariman" userId="944226f4-c0bd-444e-8152-728ae792d6b1" providerId="ADAL" clId="{A654A3A0-7EF7-4D79-935B-1C606555E407}" dt="2025-07-09T17:47:02.555" v="117" actId="13926"/>
-          <ac:spMkLst>
-            <pc:docMk/>
-            <pc:sldMk cId="208232504" sldId="260"/>
-            <ac:spMk id="2" creationId="{29363A13-4002-A891-1FB1-A716AE9764A3}"/>
-          </ac:spMkLst>
-        </pc:spChg>
-        <pc:spChg chg="mod">
-          <ac:chgData name="George Hariman" userId="944226f4-c0bd-444e-8152-728ae792d6b1" providerId="ADAL" clId="{A654A3A0-7EF7-4D79-935B-1C606555E407}" dt="2025-07-09T17:46:58.417" v="115" actId="20577"/>
-          <ac:spMkLst>
-            <pc:docMk/>
-            <pc:sldMk cId="208232504" sldId="260"/>
-            <ac:spMk id="18" creationId="{6BBC815C-2AC7-A202-CF1A-A08C93633EC4}"/>
-          </ac:spMkLst>
-        </pc:spChg>
       </pc:sldChg>
     </pc:docChg>
   </pc:docChgLst>
@@ -2978,7 +2344,7 @@
           <a:p>
             <a:fld id="{2B0A73C7-85E1-4631-82BB-A7046A93EA7F}" type="datetimeFigureOut">
               <a:rPr lang="en-US" smtClean="0"/>
-              <a:t>7/9/2025</a:t>
+              <a:t>10/10/2025</a:t>
             </a:fld>
             <a:endParaRPr lang="en-US"/>
           </a:p>
@@ -4436,7 +3802,7 @@
           <a:p>
             <a:r>
               <a:rPr lang="en-US" dirty="0"/>
-              <a:t>6/17/25</a:t>
+              <a:t>Updated 10/10/25</a:t>
             </a:r>
           </a:p>
         </p:txBody>
@@ -4529,942 +3895,1017 @@
           </a:p>
         </p:txBody>
       </p:sp>
-      <p:grpSp>
-        <p:nvGrpSpPr>
-          <p:cNvPr id="38" name="Group 37">
+      <p:pic>
+        <p:nvPicPr>
+          <p:cNvPr id="6" name="Picture 5">
             <a:extLst>
               <a:ext uri="{FF2B5EF4-FFF2-40B4-BE49-F238E27FC236}">
-                <a16:creationId xmlns:a16="http://schemas.microsoft.com/office/drawing/2014/main" id="{49BE9925-0CF5-CDE9-A59C-BE856EC70DAB}"/>
+                <a16:creationId xmlns:a16="http://schemas.microsoft.com/office/drawing/2014/main" id="{8AAD5153-AFC0-8523-9C2E-0C261C5B4D41}"/>
               </a:ext>
             </a:extLst>
           </p:cNvPr>
-          <p:cNvGrpSpPr/>
+          <p:cNvPicPr>
+            <a:picLocks noChangeAspect="1"/>
+          </p:cNvPicPr>
           <p:nvPr/>
-        </p:nvGrpSpPr>
-        <p:grpSpPr>
+        </p:nvPicPr>
+        <p:blipFill>
+          <a:blip r:embed="rId2" cstate="email">
+            <a:extLst>
+              <a:ext uri="{28A0092B-C50C-407E-A947-70E740481C1C}">
+                <a14:useLocalDpi xmlns:a14="http://schemas.microsoft.com/office/drawing/2010/main"/>
+              </a:ext>
+            </a:extLst>
+          </a:blip>
+          <a:stretch>
+            <a:fillRect/>
+          </a:stretch>
+        </p:blipFill>
+        <p:spPr>
+          <a:xfrm rot="5400000">
+            <a:off x="4448612" y="1487534"/>
+            <a:ext cx="2921150" cy="4197566"/>
+          </a:xfrm>
+          <a:prstGeom prst="rect">
+            <a:avLst/>
+          </a:prstGeom>
+        </p:spPr>
+      </p:pic>
+      <p:cxnSp>
+        <p:nvCxnSpPr>
+          <p:cNvPr id="8" name="Connector: Elbow 7">
+            <a:extLst>
+              <a:ext uri="{FF2B5EF4-FFF2-40B4-BE49-F238E27FC236}">
+                <a16:creationId xmlns:a16="http://schemas.microsoft.com/office/drawing/2014/main" id="{5BAC6693-3255-95F7-21DA-824391F87B6D}"/>
+              </a:ext>
+            </a:extLst>
+          </p:cNvPr>
+          <p:cNvCxnSpPr>
+            <a:cxnSpLocks/>
+          </p:cNvCxnSpPr>
+          <p:nvPr/>
+        </p:nvCxnSpPr>
+        <p:spPr>
+          <a:xfrm flipV="1">
+            <a:off x="2782528" y="5083278"/>
+            <a:ext cx="1602658" cy="501445"/>
+          </a:xfrm>
+          <a:prstGeom prst="bentConnector3">
+            <a:avLst>
+              <a:gd name="adj1" fmla="val 99693"/>
+            </a:avLst>
+          </a:prstGeom>
+          <a:ln w="38100">
+            <a:solidFill>
+              <a:schemeClr val="tx2"/>
+            </a:solidFill>
+            <a:tailEnd type="triangle"/>
+          </a:ln>
+        </p:spPr>
+        <p:style>
+          <a:lnRef idx="1">
+            <a:schemeClr val="accent1"/>
+          </a:lnRef>
+          <a:fillRef idx="0">
+            <a:schemeClr val="accent1"/>
+          </a:fillRef>
+          <a:effectRef idx="0">
+            <a:schemeClr val="accent1"/>
+          </a:effectRef>
+          <a:fontRef idx="minor">
+            <a:schemeClr val="tx1"/>
+          </a:fontRef>
+        </p:style>
+      </p:cxnSp>
+      <p:cxnSp>
+        <p:nvCxnSpPr>
+          <p:cNvPr id="11" name="Connector: Elbow 10">
+            <a:extLst>
+              <a:ext uri="{FF2B5EF4-FFF2-40B4-BE49-F238E27FC236}">
+                <a16:creationId xmlns:a16="http://schemas.microsoft.com/office/drawing/2014/main" id="{1AD40D1C-B744-3257-22B7-43950B349E78}"/>
+              </a:ext>
+            </a:extLst>
+          </p:cNvPr>
+          <p:cNvCxnSpPr>
+            <a:cxnSpLocks/>
+          </p:cNvCxnSpPr>
+          <p:nvPr/>
+        </p:nvCxnSpPr>
+        <p:spPr>
+          <a:xfrm flipV="1">
+            <a:off x="2812026" y="5102943"/>
+            <a:ext cx="1691148" cy="776748"/>
+          </a:xfrm>
+          <a:prstGeom prst="bentConnector3">
+            <a:avLst>
+              <a:gd name="adj1" fmla="val 100000"/>
+            </a:avLst>
+          </a:prstGeom>
+          <a:ln w="38100">
+            <a:solidFill>
+              <a:schemeClr val="tx2"/>
+            </a:solidFill>
+            <a:tailEnd type="triangle"/>
+          </a:ln>
+        </p:spPr>
+        <p:style>
+          <a:lnRef idx="1">
+            <a:schemeClr val="accent1"/>
+          </a:lnRef>
+          <a:fillRef idx="0">
+            <a:schemeClr val="accent1"/>
+          </a:fillRef>
+          <a:effectRef idx="0">
+            <a:schemeClr val="accent1"/>
+          </a:effectRef>
+          <a:fontRef idx="minor">
+            <a:schemeClr val="tx1"/>
+          </a:fontRef>
+        </p:style>
+      </p:cxnSp>
+      <p:sp>
+        <p:nvSpPr>
+          <p:cNvPr id="15" name="TextBox 14">
+            <a:extLst>
+              <a:ext uri="{FF2B5EF4-FFF2-40B4-BE49-F238E27FC236}">
+                <a16:creationId xmlns:a16="http://schemas.microsoft.com/office/drawing/2014/main" id="{00D293E9-91A6-D1CF-792E-84A40E0F368F}"/>
+              </a:ext>
+            </a:extLst>
+          </p:cNvPr>
+          <p:cNvSpPr txBox="1"/>
+          <p:nvPr/>
+        </p:nvSpPr>
+        <p:spPr>
           <a:xfrm>
-            <a:off x="78658" y="943898"/>
-            <a:ext cx="12752438" cy="5659832"/>
-            <a:chOff x="294968" y="953730"/>
-            <a:chExt cx="12752438" cy="5659832"/>
+            <a:off x="78658" y="4090221"/>
+            <a:ext cx="2963375" cy="2513509"/>
           </a:xfrm>
-        </p:grpSpPr>
-        <p:pic>
-          <p:nvPicPr>
-            <p:cNvPr id="6" name="Picture 5">
-              <a:extLst>
-                <a:ext uri="{FF2B5EF4-FFF2-40B4-BE49-F238E27FC236}">
-                  <a16:creationId xmlns:a16="http://schemas.microsoft.com/office/drawing/2014/main" id="{8AAD5153-AFC0-8523-9C2E-0C261C5B4D41}"/>
-                </a:ext>
-              </a:extLst>
-            </p:cNvPr>
-            <p:cNvPicPr>
-              <a:picLocks noChangeAspect="1"/>
-            </p:cNvPicPr>
-            <p:nvPr/>
-          </p:nvPicPr>
-          <p:blipFill>
-            <a:blip r:embed="rId2" cstate="email">
-              <a:extLst>
-                <a:ext uri="{28A0092B-C50C-407E-A947-70E740481C1C}">
-                  <a14:useLocalDpi xmlns:a14="http://schemas.microsoft.com/office/drawing/2010/main"/>
-                </a:ext>
-              </a:extLst>
-            </a:blip>
-            <a:stretch>
-              <a:fillRect/>
-            </a:stretch>
-          </p:blipFill>
-          <p:spPr>
-            <a:xfrm rot="5400000">
-              <a:off x="4664922" y="1497366"/>
-              <a:ext cx="2921150" cy="4197566"/>
-            </a:xfrm>
-            <a:prstGeom prst="rect">
-              <a:avLst/>
-            </a:prstGeom>
-          </p:spPr>
-        </p:pic>
-        <p:cxnSp>
-          <p:nvCxnSpPr>
-            <p:cNvPr id="8" name="Connector: Elbow 7">
-              <a:extLst>
-                <a:ext uri="{FF2B5EF4-FFF2-40B4-BE49-F238E27FC236}">
-                  <a16:creationId xmlns:a16="http://schemas.microsoft.com/office/drawing/2014/main" id="{5BAC6693-3255-95F7-21DA-824391F87B6D}"/>
-                </a:ext>
-              </a:extLst>
-            </p:cNvPr>
-            <p:cNvCxnSpPr>
-              <a:cxnSpLocks/>
-            </p:cNvCxnSpPr>
-            <p:nvPr/>
-          </p:nvCxnSpPr>
-          <p:spPr>
-            <a:xfrm flipV="1">
-              <a:off x="2998838" y="5093110"/>
-              <a:ext cx="1602658" cy="501445"/>
-            </a:xfrm>
-            <a:prstGeom prst="bentConnector3">
-              <a:avLst>
-                <a:gd name="adj1" fmla="val 99693"/>
-              </a:avLst>
-            </a:prstGeom>
-            <a:ln w="38100">
+          <a:prstGeom prst="rect">
+            <a:avLst/>
+          </a:prstGeom>
+          <a:noFill/>
+        </p:spPr>
+        <p:txBody>
+          <a:bodyPr wrap="none" rtlCol="0">
+            <a:spAutoFit/>
+          </a:bodyPr>
+          <a:lstStyle/>
+          <a:p>
+            <a:pPr>
+              <a:spcBef>
+                <a:spcPts val="400"/>
+              </a:spcBef>
+            </a:pPr>
+            <a:r>
+              <a:rPr kumimoji="1" lang="en-US" sz="1800" dirty="0">
+                <a:solidFill>
+                  <a:schemeClr val="tx2"/>
+                </a:solidFill>
+                <a:latin typeface="+mn-ea"/>
+                <a:ea typeface="+mn-ea"/>
+                <a:cs typeface="メイリオ" panose="020B0604030504040204" pitchFamily="50" charset="-128"/>
+              </a:rPr>
+              <a:t>Pin2: From Flow Meter</a:t>
+            </a:r>
+            <a:br>
+              <a:rPr kumimoji="1" lang="en-US" sz="1800" dirty="0">
+                <a:solidFill>
+                  <a:schemeClr val="tx2"/>
+                </a:solidFill>
+                <a:latin typeface="+mn-ea"/>
+                <a:ea typeface="+mn-ea"/>
+                <a:cs typeface="メイリオ" panose="020B0604030504040204" pitchFamily="50" charset="-128"/>
+              </a:rPr>
+            </a:br>
+            <a:r>
+              <a:rPr kumimoji="1" lang="en-US" sz="1800" dirty="0">
+                <a:solidFill>
+                  <a:schemeClr val="tx2"/>
+                </a:solidFill>
+                <a:latin typeface="+mn-ea"/>
+                <a:ea typeface="+mn-ea"/>
+                <a:cs typeface="メイリオ" panose="020B0604030504040204" pitchFamily="50" charset="-128"/>
+              </a:rPr>
+              <a:t>(counting pulses)</a:t>
+            </a:r>
+          </a:p>
+          <a:p>
+            <a:pPr>
+              <a:spcBef>
+                <a:spcPts val="400"/>
+              </a:spcBef>
+            </a:pPr>
+            <a:r>
+              <a:rPr lang="en-US" dirty="0">
+                <a:solidFill>
+                  <a:schemeClr val="tx2"/>
+                </a:solidFill>
+                <a:latin typeface="+mn-ea"/>
+                <a:cs typeface="メイリオ" panose="020B0604030504040204" pitchFamily="50" charset="-128"/>
+              </a:rPr>
+              <a:t>Pin 3: From EVK “SOUT”</a:t>
+            </a:r>
+          </a:p>
+          <a:p>
+            <a:pPr>
+              <a:spcBef>
+                <a:spcPts val="400"/>
+              </a:spcBef>
+            </a:pPr>
+            <a:r>
+              <a:rPr lang="en-US" dirty="0">
+                <a:solidFill>
+                  <a:schemeClr val="tx2"/>
+                </a:solidFill>
+                <a:latin typeface="+mn-ea"/>
+                <a:cs typeface="メイリオ" panose="020B0604030504040204" pitchFamily="50" charset="-128"/>
+              </a:rPr>
+              <a:t>(counting pulses)</a:t>
+            </a:r>
+          </a:p>
+          <a:p>
+            <a:pPr>
+              <a:spcBef>
+                <a:spcPts val="400"/>
+              </a:spcBef>
+            </a:pPr>
+            <a:r>
+              <a:rPr kumimoji="1" lang="en-US" sz="1800" dirty="0">
+                <a:solidFill>
+                  <a:schemeClr val="tx2"/>
+                </a:solidFill>
+                <a:latin typeface="+mn-ea"/>
+                <a:ea typeface="+mn-ea"/>
+                <a:cs typeface="メイリオ" panose="020B0604030504040204" pitchFamily="50" charset="-128"/>
+              </a:rPr>
+              <a:t>Pin 4: From </a:t>
+            </a:r>
+            <a:r>
+              <a:rPr lang="en-US" dirty="0">
+                <a:solidFill>
+                  <a:schemeClr val="tx2"/>
+                </a:solidFill>
+                <a:latin typeface="+mn-ea"/>
+                <a:cs typeface="メイリオ" panose="020B0604030504040204" pitchFamily="50" charset="-128"/>
+              </a:rPr>
+              <a:t>DS12B80</a:t>
+            </a:r>
+            <a:br>
+              <a:rPr lang="en-US" dirty="0">
+                <a:solidFill>
+                  <a:schemeClr val="tx2"/>
+                </a:solidFill>
+                <a:latin typeface="+mn-ea"/>
+                <a:cs typeface="メイリオ" panose="020B0604030504040204" pitchFamily="50" charset="-128"/>
+              </a:rPr>
+            </a:br>
+            <a:r>
+              <a:rPr lang="en-US" dirty="0">
+                <a:solidFill>
+                  <a:schemeClr val="tx2"/>
+                </a:solidFill>
+                <a:latin typeface="+mn-ea"/>
+                <a:cs typeface="メイリオ" panose="020B0604030504040204" pitchFamily="50" charset="-128"/>
+              </a:rPr>
+              <a:t>(Inlet Temp)</a:t>
+            </a:r>
+            <a:br>
+              <a:rPr lang="en-US" dirty="0">
+                <a:solidFill>
+                  <a:schemeClr val="tx2"/>
+                </a:solidFill>
+                <a:latin typeface="+mn-ea"/>
+                <a:cs typeface="メイリオ" panose="020B0604030504040204" pitchFamily="50" charset="-128"/>
+              </a:rPr>
+            </a:br>
+            <a:r>
+              <a:rPr lang="en-US" dirty="0">
+                <a:solidFill>
+                  <a:schemeClr val="tx2"/>
+                </a:solidFill>
+                <a:latin typeface="+mn-ea"/>
+                <a:cs typeface="メイリオ" panose="020B0604030504040204" pitchFamily="50" charset="-128"/>
+              </a:rPr>
+              <a:t>Pin 5: From DS12B80</a:t>
+            </a:r>
+          </a:p>
+          <a:p>
+            <a:pPr>
+              <a:spcBef>
+                <a:spcPts val="400"/>
+              </a:spcBef>
+            </a:pPr>
+            <a:r>
+              <a:rPr lang="en-US" dirty="0">
+                <a:solidFill>
+                  <a:schemeClr val="tx2"/>
+                </a:solidFill>
+                <a:latin typeface="+mn-ea"/>
+                <a:cs typeface="メイリオ" panose="020B0604030504040204" pitchFamily="50" charset="-128"/>
+              </a:rPr>
+              <a:t>(Outlet Temp)</a:t>
+            </a:r>
+            <a:endParaRPr kumimoji="1" lang="en-US" sz="1800" dirty="0">
               <a:solidFill>
                 <a:schemeClr val="tx2"/>
               </a:solidFill>
-              <a:tailEnd type="triangle"/>
-            </a:ln>
-          </p:spPr>
-          <p:style>
-            <a:lnRef idx="1">
-              <a:schemeClr val="accent1"/>
-            </a:lnRef>
-            <a:fillRef idx="0">
-              <a:schemeClr val="accent1"/>
-            </a:fillRef>
-            <a:effectRef idx="0">
-              <a:schemeClr val="accent1"/>
-            </a:effectRef>
-            <a:fontRef idx="minor">
-              <a:schemeClr val="tx1"/>
-            </a:fontRef>
-          </p:style>
-        </p:cxnSp>
-        <p:cxnSp>
-          <p:nvCxnSpPr>
-            <p:cNvPr id="11" name="Connector: Elbow 10">
-              <a:extLst>
-                <a:ext uri="{FF2B5EF4-FFF2-40B4-BE49-F238E27FC236}">
-                  <a16:creationId xmlns:a16="http://schemas.microsoft.com/office/drawing/2014/main" id="{1AD40D1C-B744-3257-22B7-43950B349E78}"/>
-                </a:ext>
-              </a:extLst>
-            </p:cNvPr>
-            <p:cNvCxnSpPr>
-              <a:cxnSpLocks/>
-            </p:cNvCxnSpPr>
-            <p:nvPr/>
-          </p:nvCxnSpPr>
-          <p:spPr>
-            <a:xfrm flipV="1">
-              <a:off x="3028336" y="5112775"/>
-              <a:ext cx="1691148" cy="776748"/>
-            </a:xfrm>
-            <a:prstGeom prst="bentConnector3">
-              <a:avLst>
-                <a:gd name="adj1" fmla="val 100000"/>
-              </a:avLst>
-            </a:prstGeom>
-            <a:ln w="38100">
+              <a:latin typeface="+mn-ea"/>
+              <a:ea typeface="+mn-ea"/>
+              <a:cs typeface="メイリオ" panose="020B0604030504040204" pitchFamily="50" charset="-128"/>
+            </a:endParaRPr>
+          </a:p>
+        </p:txBody>
+      </p:sp>
+      <p:cxnSp>
+        <p:nvCxnSpPr>
+          <p:cNvPr id="18" name="Connector: Elbow 17">
+            <a:extLst>
+              <a:ext uri="{FF2B5EF4-FFF2-40B4-BE49-F238E27FC236}">
+                <a16:creationId xmlns:a16="http://schemas.microsoft.com/office/drawing/2014/main" id="{2682BF95-1F5D-DCF8-03E2-FE7549D6119E}"/>
+              </a:ext>
+            </a:extLst>
+          </p:cNvPr>
+          <p:cNvCxnSpPr>
+            <a:cxnSpLocks/>
+          </p:cNvCxnSpPr>
+          <p:nvPr/>
+        </p:nvCxnSpPr>
+        <p:spPr>
+          <a:xfrm flipV="1">
+            <a:off x="2861187" y="5083277"/>
+            <a:ext cx="1789471" cy="1061884"/>
+          </a:xfrm>
+          <a:prstGeom prst="bentConnector3">
+            <a:avLst>
+              <a:gd name="adj1" fmla="val 100000"/>
+            </a:avLst>
+          </a:prstGeom>
+          <a:ln w="38100">
+            <a:solidFill>
+              <a:schemeClr val="tx2"/>
+            </a:solidFill>
+            <a:tailEnd type="triangle"/>
+          </a:ln>
+        </p:spPr>
+        <p:style>
+          <a:lnRef idx="1">
+            <a:schemeClr val="accent1"/>
+          </a:lnRef>
+          <a:fillRef idx="0">
+            <a:schemeClr val="accent1"/>
+          </a:fillRef>
+          <a:effectRef idx="0">
+            <a:schemeClr val="accent1"/>
+          </a:effectRef>
+          <a:fontRef idx="minor">
+            <a:schemeClr val="tx1"/>
+          </a:fontRef>
+        </p:style>
+      </p:cxnSp>
+      <p:cxnSp>
+        <p:nvCxnSpPr>
+          <p:cNvPr id="24" name="Connector: Elbow 23">
+            <a:extLst>
+              <a:ext uri="{FF2B5EF4-FFF2-40B4-BE49-F238E27FC236}">
+                <a16:creationId xmlns:a16="http://schemas.microsoft.com/office/drawing/2014/main" id="{D2306F76-99C2-8DF4-2071-FACD58F635F4}"/>
+              </a:ext>
+            </a:extLst>
+          </p:cNvPr>
+          <p:cNvCxnSpPr>
+            <a:cxnSpLocks/>
+          </p:cNvCxnSpPr>
+          <p:nvPr/>
+        </p:nvCxnSpPr>
+        <p:spPr>
+          <a:xfrm flipV="1">
+            <a:off x="2826774" y="5112775"/>
+            <a:ext cx="1971367" cy="1361767"/>
+          </a:xfrm>
+          <a:prstGeom prst="bentConnector3">
+            <a:avLst>
+              <a:gd name="adj1" fmla="val 99875"/>
+            </a:avLst>
+          </a:prstGeom>
+          <a:ln w="38100">
+            <a:solidFill>
+              <a:schemeClr val="tx2"/>
+            </a:solidFill>
+            <a:tailEnd type="triangle"/>
+          </a:ln>
+        </p:spPr>
+        <p:style>
+          <a:lnRef idx="1">
+            <a:schemeClr val="accent1"/>
+          </a:lnRef>
+          <a:fillRef idx="0">
+            <a:schemeClr val="accent1"/>
+          </a:fillRef>
+          <a:effectRef idx="0">
+            <a:schemeClr val="accent1"/>
+          </a:effectRef>
+          <a:fontRef idx="minor">
+            <a:schemeClr val="tx1"/>
+          </a:fontRef>
+        </p:style>
+      </p:cxnSp>
+      <p:cxnSp>
+        <p:nvCxnSpPr>
+          <p:cNvPr id="29" name="Connector: Elbow 28">
+            <a:extLst>
+              <a:ext uri="{FF2B5EF4-FFF2-40B4-BE49-F238E27FC236}">
+                <a16:creationId xmlns:a16="http://schemas.microsoft.com/office/drawing/2014/main" id="{7A82C5DF-9BE8-5D12-86E4-A699752CF43D}"/>
+              </a:ext>
+            </a:extLst>
+          </p:cNvPr>
+          <p:cNvCxnSpPr>
+            <a:cxnSpLocks/>
+            <a:endCxn id="31" idx="1"/>
+          </p:cNvCxnSpPr>
+          <p:nvPr/>
+        </p:nvCxnSpPr>
+        <p:spPr>
+          <a:xfrm>
+            <a:off x="5624051" y="5083277"/>
+            <a:ext cx="2171713" cy="452902"/>
+          </a:xfrm>
+          <a:prstGeom prst="bentConnector3">
+            <a:avLst>
+              <a:gd name="adj1" fmla="val 1104"/>
+            </a:avLst>
+          </a:prstGeom>
+          <a:ln w="38100">
+            <a:solidFill>
+              <a:schemeClr val="tx2"/>
+            </a:solidFill>
+            <a:tailEnd type="triangle"/>
+          </a:ln>
+        </p:spPr>
+        <p:style>
+          <a:lnRef idx="1">
+            <a:schemeClr val="accent1"/>
+          </a:lnRef>
+          <a:fillRef idx="0">
+            <a:schemeClr val="accent1"/>
+          </a:fillRef>
+          <a:effectRef idx="0">
+            <a:schemeClr val="accent1"/>
+          </a:effectRef>
+          <a:fontRef idx="minor">
+            <a:schemeClr val="tx1"/>
+          </a:fontRef>
+        </p:style>
+      </p:cxnSp>
+      <p:sp>
+        <p:nvSpPr>
+          <p:cNvPr id="31" name="TextBox 30">
+            <a:extLst>
+              <a:ext uri="{FF2B5EF4-FFF2-40B4-BE49-F238E27FC236}">
+                <a16:creationId xmlns:a16="http://schemas.microsoft.com/office/drawing/2014/main" id="{E1509700-B293-3F55-F55C-F3701790459F}"/>
+              </a:ext>
+            </a:extLst>
+          </p:cNvPr>
+          <p:cNvSpPr txBox="1"/>
+          <p:nvPr/>
+        </p:nvSpPr>
+        <p:spPr>
+          <a:xfrm>
+            <a:off x="7795764" y="5048866"/>
+            <a:ext cx="3908058" cy="974626"/>
+          </a:xfrm>
+          <a:prstGeom prst="rect">
+            <a:avLst/>
+          </a:prstGeom>
+          <a:noFill/>
+        </p:spPr>
+        <p:txBody>
+          <a:bodyPr wrap="none" rtlCol="0">
+            <a:spAutoFit/>
+          </a:bodyPr>
+          <a:lstStyle/>
+          <a:p>
+            <a:pPr>
+              <a:spcBef>
+                <a:spcPts val="400"/>
+              </a:spcBef>
+            </a:pPr>
+            <a:r>
+              <a:rPr kumimoji="1" lang="en-US" sz="1800" dirty="0">
+                <a:solidFill>
+                  <a:schemeClr val="tx2"/>
+                </a:solidFill>
+                <a:latin typeface="+mn-ea"/>
+                <a:ea typeface="+mn-ea"/>
+                <a:cs typeface="メイリオ" panose="020B0604030504040204" pitchFamily="50" charset="-128"/>
+              </a:rPr>
+              <a:t>Pin 10: PWM out</a:t>
+            </a:r>
+            <a:br>
+              <a:rPr kumimoji="1" lang="en-US" sz="1800" dirty="0">
+                <a:solidFill>
+                  <a:schemeClr val="tx2"/>
+                </a:solidFill>
+                <a:latin typeface="+mn-ea"/>
+                <a:ea typeface="+mn-ea"/>
+                <a:cs typeface="メイリオ" panose="020B0604030504040204" pitchFamily="50" charset="-128"/>
+              </a:rPr>
+            </a:br>
+            <a:r>
+              <a:rPr kumimoji="1" lang="en-US" sz="1800" dirty="0">
+                <a:solidFill>
+                  <a:schemeClr val="tx2"/>
+                </a:solidFill>
+                <a:latin typeface="+mn-ea"/>
+                <a:ea typeface="+mn-ea"/>
+                <a:cs typeface="メイリオ" panose="020B0604030504040204" pitchFamily="50" charset="-128"/>
+              </a:rPr>
+              <a:t>(to EVK “PWMINB”)</a:t>
+            </a:r>
+          </a:p>
+          <a:p>
+            <a:pPr>
+              <a:spcBef>
+                <a:spcPts val="400"/>
+              </a:spcBef>
+            </a:pPr>
+            <a:r>
+              <a:rPr lang="en-US" dirty="0">
+                <a:solidFill>
+                  <a:schemeClr val="tx2"/>
+                </a:solidFill>
+                <a:latin typeface="+mn-ea"/>
+                <a:cs typeface="メイリオ" panose="020B0604030504040204" pitchFamily="50" charset="-128"/>
+              </a:rPr>
+              <a:t>490Hz fixed, changing duty cycle</a:t>
+            </a:r>
+            <a:endParaRPr kumimoji="1" lang="en-US" sz="1800" dirty="0">
               <a:solidFill>
                 <a:schemeClr val="tx2"/>
               </a:solidFill>
-              <a:tailEnd type="triangle"/>
-            </a:ln>
-          </p:spPr>
-          <p:style>
-            <a:lnRef idx="1">
-              <a:schemeClr val="accent1"/>
-            </a:lnRef>
-            <a:fillRef idx="0">
-              <a:schemeClr val="accent1"/>
-            </a:fillRef>
-            <a:effectRef idx="0">
-              <a:schemeClr val="accent1"/>
-            </a:effectRef>
-            <a:fontRef idx="minor">
-              <a:schemeClr val="tx1"/>
-            </a:fontRef>
-          </p:style>
-        </p:cxnSp>
-        <p:sp>
-          <p:nvSpPr>
-            <p:cNvPr id="15" name="TextBox 14">
-              <a:extLst>
-                <a:ext uri="{FF2B5EF4-FFF2-40B4-BE49-F238E27FC236}">
-                  <a16:creationId xmlns:a16="http://schemas.microsoft.com/office/drawing/2014/main" id="{00D293E9-91A6-D1CF-792E-84A40E0F368F}"/>
-                </a:ext>
-              </a:extLst>
-            </p:cNvPr>
-            <p:cNvSpPr txBox="1"/>
-            <p:nvPr/>
-          </p:nvSpPr>
-          <p:spPr>
-            <a:xfrm>
-              <a:off x="294968" y="4100053"/>
-              <a:ext cx="2963375" cy="2513509"/>
-            </a:xfrm>
-            <a:prstGeom prst="rect">
-              <a:avLst/>
-            </a:prstGeom>
-            <a:noFill/>
-          </p:spPr>
-          <p:txBody>
-            <a:bodyPr wrap="none" rtlCol="0">
-              <a:spAutoFit/>
-            </a:bodyPr>
-            <a:lstStyle/>
-            <a:p>
-              <a:pPr>
-                <a:spcBef>
-                  <a:spcPts val="400"/>
-                </a:spcBef>
-              </a:pPr>
-              <a:r>
-                <a:rPr kumimoji="1" lang="en-US" sz="1800" dirty="0">
-                  <a:solidFill>
-                    <a:schemeClr val="tx2"/>
-                  </a:solidFill>
-                  <a:latin typeface="+mn-ea"/>
-                  <a:ea typeface="+mn-ea"/>
-                  <a:cs typeface="メイリオ" panose="020B0604030504040204" pitchFamily="50" charset="-128"/>
-                </a:rPr>
-                <a:t>Pin2: From Flow Meter</a:t>
-              </a:r>
-              <a:br>
-                <a:rPr kumimoji="1" lang="en-US" sz="1800" dirty="0">
-                  <a:solidFill>
-                    <a:schemeClr val="tx2"/>
-                  </a:solidFill>
-                  <a:latin typeface="+mn-ea"/>
-                  <a:ea typeface="+mn-ea"/>
-                  <a:cs typeface="メイリオ" panose="020B0604030504040204" pitchFamily="50" charset="-128"/>
-                </a:rPr>
-              </a:br>
-              <a:r>
-                <a:rPr kumimoji="1" lang="en-US" sz="1800" dirty="0">
-                  <a:solidFill>
-                    <a:schemeClr val="tx2"/>
-                  </a:solidFill>
-                  <a:latin typeface="+mn-ea"/>
-                  <a:ea typeface="+mn-ea"/>
-                  <a:cs typeface="メイリオ" panose="020B0604030504040204" pitchFamily="50" charset="-128"/>
-                </a:rPr>
-                <a:t>(counting pulses)</a:t>
-              </a:r>
-            </a:p>
-            <a:p>
-              <a:pPr>
-                <a:spcBef>
-                  <a:spcPts val="400"/>
-                </a:spcBef>
-              </a:pPr>
-              <a:r>
-                <a:rPr lang="en-US" dirty="0">
-                  <a:solidFill>
-                    <a:schemeClr val="tx2"/>
-                  </a:solidFill>
-                  <a:latin typeface="+mn-ea"/>
-                  <a:cs typeface="メイリオ" panose="020B0604030504040204" pitchFamily="50" charset="-128"/>
-                </a:rPr>
-                <a:t>Pin 3: From EVK “SOUT”</a:t>
-              </a:r>
-            </a:p>
-            <a:p>
-              <a:pPr>
-                <a:spcBef>
-                  <a:spcPts val="400"/>
-                </a:spcBef>
-              </a:pPr>
-              <a:r>
-                <a:rPr lang="en-US" dirty="0">
-                  <a:solidFill>
-                    <a:schemeClr val="tx2"/>
-                  </a:solidFill>
-                  <a:latin typeface="+mn-ea"/>
-                  <a:cs typeface="メイリオ" panose="020B0604030504040204" pitchFamily="50" charset="-128"/>
-                </a:rPr>
-                <a:t>(counting pulses)</a:t>
-              </a:r>
-            </a:p>
-            <a:p>
-              <a:pPr>
-                <a:spcBef>
-                  <a:spcPts val="400"/>
-                </a:spcBef>
-              </a:pPr>
-              <a:r>
-                <a:rPr kumimoji="1" lang="en-US" sz="1800" dirty="0">
-                  <a:solidFill>
-                    <a:schemeClr val="tx2"/>
-                  </a:solidFill>
-                  <a:latin typeface="+mn-ea"/>
-                  <a:ea typeface="+mn-ea"/>
-                  <a:cs typeface="メイリオ" panose="020B0604030504040204" pitchFamily="50" charset="-128"/>
-                </a:rPr>
-                <a:t>Pin 4: From </a:t>
-              </a:r>
-              <a:r>
-                <a:rPr lang="en-US" dirty="0">
-                  <a:solidFill>
-                    <a:schemeClr val="tx2"/>
-                  </a:solidFill>
-                  <a:latin typeface="+mn-ea"/>
-                  <a:cs typeface="メイリオ" panose="020B0604030504040204" pitchFamily="50" charset="-128"/>
-                </a:rPr>
-                <a:t>DS12B80</a:t>
-              </a:r>
-              <a:br>
-                <a:rPr lang="en-US" dirty="0">
-                  <a:solidFill>
-                    <a:schemeClr val="tx2"/>
-                  </a:solidFill>
-                  <a:latin typeface="+mn-ea"/>
-                  <a:cs typeface="メイリオ" panose="020B0604030504040204" pitchFamily="50" charset="-128"/>
-                </a:rPr>
-              </a:br>
-              <a:r>
-                <a:rPr lang="en-US" dirty="0">
-                  <a:solidFill>
-                    <a:schemeClr val="tx2"/>
-                  </a:solidFill>
-                  <a:latin typeface="+mn-ea"/>
-                  <a:cs typeface="メイリオ" panose="020B0604030504040204" pitchFamily="50" charset="-128"/>
-                </a:rPr>
-                <a:t>(Inlet Temp)</a:t>
-              </a:r>
-              <a:br>
-                <a:rPr lang="en-US" dirty="0">
-                  <a:solidFill>
-                    <a:schemeClr val="tx2"/>
-                  </a:solidFill>
-                  <a:latin typeface="+mn-ea"/>
-                  <a:cs typeface="メイリオ" panose="020B0604030504040204" pitchFamily="50" charset="-128"/>
-                </a:rPr>
-              </a:br>
-              <a:r>
-                <a:rPr lang="en-US" dirty="0">
-                  <a:solidFill>
-                    <a:schemeClr val="tx2"/>
-                  </a:solidFill>
-                  <a:latin typeface="+mn-ea"/>
-                  <a:cs typeface="メイリオ" panose="020B0604030504040204" pitchFamily="50" charset="-128"/>
-                </a:rPr>
-                <a:t>Pin 5: From DS12B80</a:t>
-              </a:r>
-            </a:p>
-            <a:p>
-              <a:pPr>
-                <a:spcBef>
-                  <a:spcPts val="400"/>
-                </a:spcBef>
-              </a:pPr>
-              <a:r>
-                <a:rPr lang="en-US" dirty="0">
-                  <a:solidFill>
-                    <a:schemeClr val="tx2"/>
-                  </a:solidFill>
-                  <a:latin typeface="+mn-ea"/>
-                  <a:cs typeface="メイリオ" panose="020B0604030504040204" pitchFamily="50" charset="-128"/>
-                </a:rPr>
-                <a:t>(Outlet Temp)</a:t>
-              </a:r>
-              <a:endParaRPr kumimoji="1" lang="en-US" sz="1800" dirty="0">
+              <a:latin typeface="+mn-ea"/>
+              <a:ea typeface="+mn-ea"/>
+              <a:cs typeface="メイリオ" panose="020B0604030504040204" pitchFamily="50" charset="-128"/>
+            </a:endParaRPr>
+          </a:p>
+        </p:txBody>
+      </p:sp>
+      <p:sp>
+        <p:nvSpPr>
+          <p:cNvPr id="32" name="Right Brace 31">
+            <a:extLst>
+              <a:ext uri="{FF2B5EF4-FFF2-40B4-BE49-F238E27FC236}">
+                <a16:creationId xmlns:a16="http://schemas.microsoft.com/office/drawing/2014/main" id="{D4361B2B-C269-6504-E428-1B94844EB182}"/>
+              </a:ext>
+            </a:extLst>
+          </p:cNvPr>
+          <p:cNvSpPr/>
+          <p:nvPr/>
+        </p:nvSpPr>
+        <p:spPr>
+          <a:xfrm rot="16200000">
+            <a:off x="5147190" y="1617407"/>
+            <a:ext cx="436601" cy="438470"/>
+          </a:xfrm>
+          <a:prstGeom prst="rightBrace">
+            <a:avLst/>
+          </a:prstGeom>
+          <a:ln w="38100">
+            <a:solidFill>
+              <a:schemeClr val="tx2"/>
+            </a:solidFill>
+          </a:ln>
+        </p:spPr>
+        <p:style>
+          <a:lnRef idx="1">
+            <a:schemeClr val="accent1"/>
+          </a:lnRef>
+          <a:fillRef idx="0">
+            <a:schemeClr val="accent1"/>
+          </a:fillRef>
+          <a:effectRef idx="0">
+            <a:schemeClr val="accent1"/>
+          </a:effectRef>
+          <a:fontRef idx="minor">
+            <a:schemeClr val="tx1"/>
+          </a:fontRef>
+        </p:style>
+        <p:txBody>
+          <a:bodyPr rtlCol="0" anchor="ctr"/>
+          <a:lstStyle/>
+          <a:p>
+            <a:pPr algn="ctr"/>
+            <a:endParaRPr lang="en-US"/>
+          </a:p>
+        </p:txBody>
+      </p:sp>
+      <p:sp>
+        <p:nvSpPr>
+          <p:cNvPr id="33" name="TextBox 32">
+            <a:extLst>
+              <a:ext uri="{FF2B5EF4-FFF2-40B4-BE49-F238E27FC236}">
+                <a16:creationId xmlns:a16="http://schemas.microsoft.com/office/drawing/2014/main" id="{4C12D5DA-E102-F6FA-3EF8-B1463E1BBA05}"/>
+              </a:ext>
+            </a:extLst>
+          </p:cNvPr>
+          <p:cNvSpPr txBox="1"/>
+          <p:nvPr/>
+        </p:nvSpPr>
+        <p:spPr>
+          <a:xfrm>
+            <a:off x="3952567" y="943898"/>
+            <a:ext cx="6330516" cy="646331"/>
+          </a:xfrm>
+          <a:prstGeom prst="rect">
+            <a:avLst/>
+          </a:prstGeom>
+          <a:noFill/>
+        </p:spPr>
+        <p:txBody>
+          <a:bodyPr wrap="none" rtlCol="0">
+            <a:spAutoFit/>
+          </a:bodyPr>
+          <a:lstStyle/>
+          <a:p>
+            <a:pPr>
+              <a:spcBef>
+                <a:spcPts val="400"/>
+              </a:spcBef>
+            </a:pPr>
+            <a:r>
+              <a:rPr kumimoji="1" lang="en-US" sz="1800" dirty="0">
                 <a:solidFill>
                   <a:schemeClr val="tx2"/>
                 </a:solidFill>
                 <a:latin typeface="+mn-ea"/>
                 <a:ea typeface="+mn-ea"/>
                 <a:cs typeface="メイリオ" panose="020B0604030504040204" pitchFamily="50" charset="-128"/>
-              </a:endParaRPr>
-            </a:p>
-          </p:txBody>
-        </p:sp>
-        <p:cxnSp>
-          <p:nvCxnSpPr>
-            <p:cNvPr id="18" name="Connector: Elbow 17">
-              <a:extLst>
-                <a:ext uri="{FF2B5EF4-FFF2-40B4-BE49-F238E27FC236}">
-                  <a16:creationId xmlns:a16="http://schemas.microsoft.com/office/drawing/2014/main" id="{2682BF95-1F5D-DCF8-03E2-FE7549D6119E}"/>
-                </a:ext>
-              </a:extLst>
-            </p:cNvPr>
-            <p:cNvCxnSpPr>
-              <a:cxnSpLocks/>
-            </p:cNvCxnSpPr>
-            <p:nvPr/>
-          </p:nvCxnSpPr>
-          <p:spPr>
-            <a:xfrm flipV="1">
-              <a:off x="3077497" y="5093109"/>
-              <a:ext cx="1789471" cy="1061884"/>
-            </a:xfrm>
-            <a:prstGeom prst="bentConnector3">
-              <a:avLst>
-                <a:gd name="adj1" fmla="val 100000"/>
-              </a:avLst>
-            </a:prstGeom>
-            <a:ln w="38100">
+              </a:rPr>
+              <a:t>GND and 5V: use to power up DS12B80 Temp sensors</a:t>
+            </a:r>
+            <a:br>
+              <a:rPr kumimoji="1" lang="en-US" sz="1800" dirty="0">
+                <a:solidFill>
+                  <a:schemeClr val="tx2"/>
+                </a:solidFill>
+                <a:latin typeface="+mn-ea"/>
+                <a:ea typeface="+mn-ea"/>
+                <a:cs typeface="メイリオ" panose="020B0604030504040204" pitchFamily="50" charset="-128"/>
+              </a:rPr>
+            </a:br>
+            <a:r>
+              <a:rPr kumimoji="1" lang="en-US" sz="1800" dirty="0">
+                <a:solidFill>
+                  <a:schemeClr val="tx2"/>
+                </a:solidFill>
+                <a:latin typeface="+mn-ea"/>
+                <a:ea typeface="+mn-ea"/>
+                <a:cs typeface="メイリオ" panose="020B0604030504040204" pitchFamily="50" charset="-128"/>
+              </a:rPr>
+              <a:t>And other Flow Meter and LED strip</a:t>
+            </a:r>
+          </a:p>
+        </p:txBody>
+      </p:sp>
+      <p:sp>
+        <p:nvSpPr>
+          <p:cNvPr id="35" name="Arrow: Up-Down 34">
+            <a:extLst>
+              <a:ext uri="{FF2B5EF4-FFF2-40B4-BE49-F238E27FC236}">
+                <a16:creationId xmlns:a16="http://schemas.microsoft.com/office/drawing/2014/main" id="{EC3C011E-0D3F-8E74-1F48-907C8470B1E2}"/>
+              </a:ext>
+            </a:extLst>
+          </p:cNvPr>
+          <p:cNvSpPr/>
+          <p:nvPr/>
+        </p:nvSpPr>
+        <p:spPr>
+          <a:xfrm rot="16200000">
+            <a:off x="8767965" y="3640344"/>
+            <a:ext cx="484632" cy="1407980"/>
+          </a:xfrm>
+          <a:prstGeom prst="upDownArrow">
+            <a:avLst/>
+          </a:prstGeom>
+          <a:noFill/>
+          <a:ln w="9525">
+            <a:solidFill>
+              <a:schemeClr val="tx2"/>
+            </a:solidFill>
+          </a:ln>
+        </p:spPr>
+        <p:style>
+          <a:lnRef idx="2">
+            <a:schemeClr val="accent1">
+              <a:shade val="50000"/>
+            </a:schemeClr>
+          </a:lnRef>
+          <a:fillRef idx="1">
+            <a:schemeClr val="accent1"/>
+          </a:fillRef>
+          <a:effectRef idx="0">
+            <a:schemeClr val="accent1"/>
+          </a:effectRef>
+          <a:fontRef idx="minor">
+            <a:schemeClr val="lt1"/>
+          </a:fontRef>
+        </p:style>
+        <p:txBody>
+          <a:bodyPr rot="0" spcFirstLastPara="0" vertOverflow="overflow" horzOverflow="overflow" vert="horz" wrap="square" lIns="91440" tIns="45720" rIns="91440" bIns="45720" numCol="1" spcCol="0" rtlCol="0" fromWordArt="0" anchor="t" anchorCtr="0" forceAA="0" compatLnSpc="1">
+            <a:prstTxWarp prst="textNoShape">
+              <a:avLst/>
+            </a:prstTxWarp>
+            <a:noAutofit/>
+          </a:bodyPr>
+          <a:lstStyle/>
+          <a:p>
+            <a:pPr algn="ctr">
+              <a:spcBef>
+                <a:spcPts val="400"/>
+              </a:spcBef>
+            </a:pPr>
+            <a:endParaRPr kumimoji="1" lang="en-US" sz="1400" dirty="0">
               <a:solidFill>
                 <a:schemeClr val="tx2"/>
               </a:solidFill>
-              <a:tailEnd type="triangle"/>
-            </a:ln>
-          </p:spPr>
-          <p:style>
-            <a:lnRef idx="1">
-              <a:schemeClr val="accent1"/>
-            </a:lnRef>
-            <a:fillRef idx="0">
-              <a:schemeClr val="accent1"/>
-            </a:fillRef>
-            <a:effectRef idx="0">
-              <a:schemeClr val="accent1"/>
-            </a:effectRef>
-            <a:fontRef idx="minor">
-              <a:schemeClr val="tx1"/>
-            </a:fontRef>
-          </p:style>
-        </p:cxnSp>
-        <p:cxnSp>
-          <p:nvCxnSpPr>
-            <p:cNvPr id="24" name="Connector: Elbow 23">
-              <a:extLst>
-                <a:ext uri="{FF2B5EF4-FFF2-40B4-BE49-F238E27FC236}">
-                  <a16:creationId xmlns:a16="http://schemas.microsoft.com/office/drawing/2014/main" id="{D2306F76-99C2-8DF4-2071-FACD58F635F4}"/>
-                </a:ext>
-              </a:extLst>
-            </p:cNvPr>
-            <p:cNvCxnSpPr>
-              <a:cxnSpLocks/>
-            </p:cNvCxnSpPr>
-            <p:nvPr/>
-          </p:nvCxnSpPr>
-          <p:spPr>
-            <a:xfrm flipV="1">
-              <a:off x="3043084" y="5122607"/>
-              <a:ext cx="1971367" cy="1361767"/>
-            </a:xfrm>
-            <a:prstGeom prst="bentConnector3">
-              <a:avLst>
-                <a:gd name="adj1" fmla="val 99875"/>
-              </a:avLst>
-            </a:prstGeom>
-            <a:ln w="38100">
-              <a:solidFill>
-                <a:schemeClr val="tx2"/>
-              </a:solidFill>
-              <a:tailEnd type="triangle"/>
-            </a:ln>
-          </p:spPr>
-          <p:style>
-            <a:lnRef idx="1">
-              <a:schemeClr val="accent1"/>
-            </a:lnRef>
-            <a:fillRef idx="0">
-              <a:schemeClr val="accent1"/>
-            </a:fillRef>
-            <a:effectRef idx="0">
-              <a:schemeClr val="accent1"/>
-            </a:effectRef>
-            <a:fontRef idx="minor">
-              <a:schemeClr val="tx1"/>
-            </a:fontRef>
-          </p:style>
-        </p:cxnSp>
-        <p:cxnSp>
-          <p:nvCxnSpPr>
-            <p:cNvPr id="29" name="Connector: Elbow 28">
-              <a:extLst>
-                <a:ext uri="{FF2B5EF4-FFF2-40B4-BE49-F238E27FC236}">
-                  <a16:creationId xmlns:a16="http://schemas.microsoft.com/office/drawing/2014/main" id="{7A82C5DF-9BE8-5D12-86E4-A699752CF43D}"/>
-                </a:ext>
-              </a:extLst>
-            </p:cNvPr>
-            <p:cNvCxnSpPr/>
-            <p:nvPr/>
-          </p:nvCxnSpPr>
-          <p:spPr>
-            <a:xfrm>
-              <a:off x="5840361" y="5093109"/>
-              <a:ext cx="2222090" cy="825910"/>
-            </a:xfrm>
-            <a:prstGeom prst="bentConnector3">
-              <a:avLst>
-                <a:gd name="adj1" fmla="val 0"/>
-              </a:avLst>
-            </a:prstGeom>
-            <a:ln w="38100">
-              <a:solidFill>
-                <a:schemeClr val="tx2"/>
-              </a:solidFill>
-              <a:tailEnd type="triangle"/>
-            </a:ln>
-          </p:spPr>
-          <p:style>
-            <a:lnRef idx="1">
-              <a:schemeClr val="accent1"/>
-            </a:lnRef>
-            <a:fillRef idx="0">
-              <a:schemeClr val="accent1"/>
-            </a:fillRef>
-            <a:effectRef idx="0">
-              <a:schemeClr val="accent1"/>
-            </a:effectRef>
-            <a:fontRef idx="minor">
-              <a:schemeClr val="tx1"/>
-            </a:fontRef>
-          </p:style>
-        </p:cxnSp>
-        <p:sp>
-          <p:nvSpPr>
-            <p:cNvPr id="31" name="TextBox 30">
-              <a:extLst>
-                <a:ext uri="{FF2B5EF4-FFF2-40B4-BE49-F238E27FC236}">
-                  <a16:creationId xmlns:a16="http://schemas.microsoft.com/office/drawing/2014/main" id="{E1509700-B293-3F55-F55C-F3701790459F}"/>
-                </a:ext>
-              </a:extLst>
-            </p:cNvPr>
-            <p:cNvSpPr txBox="1"/>
-            <p:nvPr/>
-          </p:nvSpPr>
-          <p:spPr>
-            <a:xfrm>
-              <a:off x="7953081" y="5530646"/>
-              <a:ext cx="3908058" cy="974626"/>
-            </a:xfrm>
-            <a:prstGeom prst="rect">
-              <a:avLst/>
-            </a:prstGeom>
-            <a:noFill/>
-          </p:spPr>
-          <p:txBody>
-            <a:bodyPr wrap="none" rtlCol="0">
-              <a:spAutoFit/>
-            </a:bodyPr>
-            <a:lstStyle/>
-            <a:p>
-              <a:pPr>
-                <a:spcBef>
-                  <a:spcPts val="400"/>
-                </a:spcBef>
-              </a:pPr>
-              <a:r>
-                <a:rPr kumimoji="1" lang="en-US" sz="1800" dirty="0">
-                  <a:solidFill>
-                    <a:schemeClr val="tx2"/>
-                  </a:solidFill>
-                  <a:latin typeface="+mn-ea"/>
-                  <a:ea typeface="+mn-ea"/>
-                  <a:cs typeface="メイリオ" panose="020B0604030504040204" pitchFamily="50" charset="-128"/>
-                </a:rPr>
-                <a:t>Pin 10: PWM out</a:t>
-              </a:r>
-              <a:br>
-                <a:rPr kumimoji="1" lang="en-US" sz="1800" dirty="0">
-                  <a:solidFill>
-                    <a:schemeClr val="tx2"/>
-                  </a:solidFill>
-                  <a:latin typeface="+mn-ea"/>
-                  <a:ea typeface="+mn-ea"/>
-                  <a:cs typeface="メイリオ" panose="020B0604030504040204" pitchFamily="50" charset="-128"/>
-                </a:rPr>
-              </a:br>
-              <a:r>
-                <a:rPr kumimoji="1" lang="en-US" sz="1800" dirty="0">
-                  <a:solidFill>
-                    <a:schemeClr val="tx2"/>
-                  </a:solidFill>
-                  <a:latin typeface="+mn-ea"/>
-                  <a:ea typeface="+mn-ea"/>
-                  <a:cs typeface="メイリオ" panose="020B0604030504040204" pitchFamily="50" charset="-128"/>
-                </a:rPr>
-                <a:t>(to EVK “PWMIN”)</a:t>
-              </a:r>
-            </a:p>
-            <a:p>
-              <a:pPr>
-                <a:spcBef>
-                  <a:spcPts val="400"/>
-                </a:spcBef>
-              </a:pPr>
-              <a:r>
-                <a:rPr lang="en-US" dirty="0">
-                  <a:solidFill>
-                    <a:schemeClr val="tx2"/>
-                  </a:solidFill>
-                  <a:latin typeface="+mn-ea"/>
-                  <a:cs typeface="メイリオ" panose="020B0604030504040204" pitchFamily="50" charset="-128"/>
-                </a:rPr>
-                <a:t>490Hz fixed, changing duty cycle</a:t>
-              </a:r>
-              <a:endParaRPr kumimoji="1" lang="en-US" sz="1800" dirty="0">
+              <a:latin typeface="+mn-ea"/>
+              <a:cs typeface="メイリオ" panose="020B0604030504040204" pitchFamily="50" charset="-128"/>
+            </a:endParaRPr>
+          </a:p>
+        </p:txBody>
+      </p:sp>
+      <p:sp>
+        <p:nvSpPr>
+          <p:cNvPr id="36" name="TextBox 35">
+            <a:extLst>
+              <a:ext uri="{FF2B5EF4-FFF2-40B4-BE49-F238E27FC236}">
+                <a16:creationId xmlns:a16="http://schemas.microsoft.com/office/drawing/2014/main" id="{EA64A9E9-A333-6437-3863-AED0AEECE158}"/>
+              </a:ext>
+            </a:extLst>
+          </p:cNvPr>
+          <p:cNvSpPr txBox="1"/>
+          <p:nvPr/>
+        </p:nvSpPr>
+        <p:spPr>
+          <a:xfrm>
+            <a:off x="7737988" y="3175820"/>
+            <a:ext cx="5093108" cy="646331"/>
+          </a:xfrm>
+          <a:prstGeom prst="rect">
+            <a:avLst/>
+          </a:prstGeom>
+          <a:noFill/>
+        </p:spPr>
+        <p:txBody>
+          <a:bodyPr wrap="square" rtlCol="0">
+            <a:spAutoFit/>
+          </a:bodyPr>
+          <a:lstStyle/>
+          <a:p>
+            <a:pPr>
+              <a:spcBef>
+                <a:spcPts val="400"/>
+              </a:spcBef>
+            </a:pPr>
+            <a:r>
+              <a:rPr kumimoji="1" lang="en-US" sz="1800" dirty="0">
                 <a:solidFill>
                   <a:schemeClr val="tx2"/>
                 </a:solidFill>
                 <a:latin typeface="+mn-ea"/>
                 <a:ea typeface="+mn-ea"/>
                 <a:cs typeface="メイリオ" panose="020B0604030504040204" pitchFamily="50" charset="-128"/>
-              </a:endParaRPr>
-            </a:p>
-          </p:txBody>
-        </p:sp>
-        <p:sp>
-          <p:nvSpPr>
-            <p:cNvPr id="32" name="Right Brace 31">
-              <a:extLst>
-                <a:ext uri="{FF2B5EF4-FFF2-40B4-BE49-F238E27FC236}">
-                  <a16:creationId xmlns:a16="http://schemas.microsoft.com/office/drawing/2014/main" id="{D4361B2B-C269-6504-E428-1B94844EB182}"/>
-                </a:ext>
-              </a:extLst>
-            </p:cNvPr>
-            <p:cNvSpPr/>
-            <p:nvPr/>
-          </p:nvSpPr>
-          <p:spPr>
-            <a:xfrm rot="16200000">
-              <a:off x="5363500" y="1627239"/>
-              <a:ext cx="436601" cy="438470"/>
-            </a:xfrm>
-            <a:prstGeom prst="rightBrace">
-              <a:avLst/>
-            </a:prstGeom>
-            <a:ln w="38100">
-              <a:solidFill>
-                <a:schemeClr val="tx2"/>
-              </a:solidFill>
-            </a:ln>
-          </p:spPr>
-          <p:style>
-            <a:lnRef idx="1">
-              <a:schemeClr val="accent1"/>
-            </a:lnRef>
-            <a:fillRef idx="0">
-              <a:schemeClr val="accent1"/>
-            </a:fillRef>
-            <a:effectRef idx="0">
-              <a:schemeClr val="accent1"/>
-            </a:effectRef>
-            <a:fontRef idx="minor">
-              <a:schemeClr val="tx1"/>
-            </a:fontRef>
-          </p:style>
-          <p:txBody>
-            <a:bodyPr rtlCol="0" anchor="ctr"/>
-            <a:lstStyle/>
-            <a:p>
-              <a:pPr algn="ctr"/>
-              <a:endParaRPr lang="en-US"/>
-            </a:p>
-          </p:txBody>
-        </p:sp>
-        <p:sp>
-          <p:nvSpPr>
-            <p:cNvPr id="33" name="TextBox 32">
-              <a:extLst>
-                <a:ext uri="{FF2B5EF4-FFF2-40B4-BE49-F238E27FC236}">
-                  <a16:creationId xmlns:a16="http://schemas.microsoft.com/office/drawing/2014/main" id="{4C12D5DA-E102-F6FA-3EF8-B1463E1BBA05}"/>
-                </a:ext>
-              </a:extLst>
-            </p:cNvPr>
-            <p:cNvSpPr txBox="1"/>
-            <p:nvPr/>
-          </p:nvSpPr>
-          <p:spPr>
-            <a:xfrm>
-              <a:off x="4168877" y="953730"/>
-              <a:ext cx="6330516" cy="646331"/>
-            </a:xfrm>
-            <a:prstGeom prst="rect">
-              <a:avLst/>
-            </a:prstGeom>
-            <a:noFill/>
-          </p:spPr>
-          <p:txBody>
-            <a:bodyPr wrap="none" rtlCol="0">
-              <a:spAutoFit/>
-            </a:bodyPr>
-            <a:lstStyle/>
-            <a:p>
-              <a:pPr>
-                <a:spcBef>
-                  <a:spcPts val="400"/>
-                </a:spcBef>
-              </a:pPr>
-              <a:r>
-                <a:rPr kumimoji="1" lang="en-US" sz="1800" dirty="0">
-                  <a:solidFill>
-                    <a:schemeClr val="tx2"/>
-                  </a:solidFill>
-                  <a:latin typeface="+mn-ea"/>
-                  <a:ea typeface="+mn-ea"/>
-                  <a:cs typeface="メイリオ" panose="020B0604030504040204" pitchFamily="50" charset="-128"/>
-                </a:rPr>
-                <a:t>GND and 5V: use to power up DS12B80 Temp sensors</a:t>
-              </a:r>
-              <a:br>
-                <a:rPr kumimoji="1" lang="en-US" sz="1800" dirty="0">
-                  <a:solidFill>
-                    <a:schemeClr val="tx2"/>
-                  </a:solidFill>
-                  <a:latin typeface="+mn-ea"/>
-                  <a:ea typeface="+mn-ea"/>
-                  <a:cs typeface="メイリオ" panose="020B0604030504040204" pitchFamily="50" charset="-128"/>
-                </a:rPr>
-              </a:br>
-              <a:r>
-                <a:rPr kumimoji="1" lang="en-US" sz="1800" dirty="0">
-                  <a:solidFill>
-                    <a:schemeClr val="tx2"/>
-                  </a:solidFill>
-                  <a:latin typeface="+mn-ea"/>
-                  <a:ea typeface="+mn-ea"/>
-                  <a:cs typeface="メイリオ" panose="020B0604030504040204" pitchFamily="50" charset="-128"/>
-                </a:rPr>
-                <a:t>And other Flow Meter</a:t>
-              </a:r>
-            </a:p>
-          </p:txBody>
-        </p:sp>
-        <p:sp>
-          <p:nvSpPr>
-            <p:cNvPr id="35" name="Arrow: Up-Down 34">
-              <a:extLst>
-                <a:ext uri="{FF2B5EF4-FFF2-40B4-BE49-F238E27FC236}">
-                  <a16:creationId xmlns:a16="http://schemas.microsoft.com/office/drawing/2014/main" id="{EC3C011E-0D3F-8E74-1F48-907C8470B1E2}"/>
-                </a:ext>
-              </a:extLst>
-            </p:cNvPr>
-            <p:cNvSpPr/>
-            <p:nvPr/>
-          </p:nvSpPr>
-          <p:spPr>
-            <a:xfrm rot="16200000">
-              <a:off x="8984275" y="3650176"/>
-              <a:ext cx="484632" cy="1407980"/>
-            </a:xfrm>
-            <a:prstGeom prst="upDownArrow">
-              <a:avLst/>
-            </a:prstGeom>
-            <a:noFill/>
-            <a:ln w="9525">
-              <a:solidFill>
-                <a:schemeClr val="tx2"/>
-              </a:solidFill>
-            </a:ln>
-          </p:spPr>
-          <p:style>
-            <a:lnRef idx="2">
-              <a:schemeClr val="accent1">
-                <a:shade val="50000"/>
-              </a:schemeClr>
-            </a:lnRef>
-            <a:fillRef idx="1">
-              <a:schemeClr val="accent1"/>
-            </a:fillRef>
-            <a:effectRef idx="0">
-              <a:schemeClr val="accent1"/>
-            </a:effectRef>
-            <a:fontRef idx="minor">
-              <a:schemeClr val="lt1"/>
-            </a:fontRef>
-          </p:style>
-          <p:txBody>
-            <a:bodyPr rot="0" spcFirstLastPara="0" vertOverflow="overflow" horzOverflow="overflow" vert="horz" wrap="square" lIns="91440" tIns="45720" rIns="91440" bIns="45720" numCol="1" spcCol="0" rtlCol="0" fromWordArt="0" anchor="t" anchorCtr="0" forceAA="0" compatLnSpc="1">
-              <a:prstTxWarp prst="textNoShape">
-                <a:avLst/>
-              </a:prstTxWarp>
-              <a:noAutofit/>
-            </a:bodyPr>
-            <a:lstStyle/>
-            <a:p>
-              <a:pPr algn="ctr">
-                <a:spcBef>
-                  <a:spcPts val="400"/>
-                </a:spcBef>
-              </a:pPr>
-              <a:endParaRPr kumimoji="1" lang="en-US" sz="1400" dirty="0">
+              </a:rPr>
+              <a:t>To LAPTOP</a:t>
+            </a:r>
+            <a:br>
+              <a:rPr kumimoji="1" lang="en-US" sz="1800" dirty="0">
                 <a:solidFill>
                   <a:schemeClr val="tx2"/>
                 </a:solidFill>
                 <a:latin typeface="+mn-ea"/>
+                <a:ea typeface="+mn-ea"/>
                 <a:cs typeface="メイリオ" panose="020B0604030504040204" pitchFamily="50" charset="-128"/>
-              </a:endParaRPr>
-            </a:p>
-          </p:txBody>
-        </p:sp>
-        <p:sp>
-          <p:nvSpPr>
-            <p:cNvPr id="36" name="TextBox 35">
-              <a:extLst>
-                <a:ext uri="{FF2B5EF4-FFF2-40B4-BE49-F238E27FC236}">
-                  <a16:creationId xmlns:a16="http://schemas.microsoft.com/office/drawing/2014/main" id="{EA64A9E9-A333-6437-3863-AED0AEECE158}"/>
-                </a:ext>
-              </a:extLst>
-            </p:cNvPr>
-            <p:cNvSpPr txBox="1"/>
-            <p:nvPr/>
-          </p:nvSpPr>
-          <p:spPr>
-            <a:xfrm>
-              <a:off x="7954298" y="3185652"/>
-              <a:ext cx="5093108" cy="646331"/>
-            </a:xfrm>
-            <a:prstGeom prst="rect">
-              <a:avLst/>
-            </a:prstGeom>
-            <a:noFill/>
-          </p:spPr>
-          <p:txBody>
-            <a:bodyPr wrap="square" rtlCol="0">
-              <a:spAutoFit/>
-            </a:bodyPr>
-            <a:lstStyle/>
-            <a:p>
-              <a:pPr>
-                <a:spcBef>
-                  <a:spcPts val="400"/>
-                </a:spcBef>
-              </a:pPr>
-              <a:r>
-                <a:rPr kumimoji="1" lang="en-US" sz="1800" dirty="0">
-                  <a:solidFill>
-                    <a:schemeClr val="tx2"/>
-                  </a:solidFill>
-                  <a:latin typeface="+mn-ea"/>
-                  <a:ea typeface="+mn-ea"/>
-                  <a:cs typeface="メイリオ" panose="020B0604030504040204" pitchFamily="50" charset="-128"/>
-                </a:rPr>
-                <a:t>To LAPTOP</a:t>
-              </a:r>
-              <a:br>
-                <a:rPr kumimoji="1" lang="en-US" sz="1800" dirty="0">
-                  <a:solidFill>
-                    <a:schemeClr val="tx2"/>
-                  </a:solidFill>
-                  <a:latin typeface="+mn-ea"/>
-                  <a:ea typeface="+mn-ea"/>
-                  <a:cs typeface="メイリオ" panose="020B0604030504040204" pitchFamily="50" charset="-128"/>
-                </a:rPr>
-              </a:br>
-              <a:r>
-                <a:rPr kumimoji="1" lang="en-US" sz="1800" dirty="0">
-                  <a:solidFill>
-                    <a:schemeClr val="tx2"/>
-                  </a:solidFill>
-                  <a:latin typeface="+mn-ea"/>
-                  <a:ea typeface="+mn-ea"/>
-                  <a:cs typeface="メイリオ" panose="020B0604030504040204" pitchFamily="50" charset="-128"/>
-                </a:rPr>
-                <a:t>(</a:t>
-              </a:r>
-              <a:r>
-                <a:rPr kumimoji="1" lang="en-US" sz="1800" b="1" dirty="0">
-                  <a:solidFill>
-                    <a:schemeClr val="tx2"/>
-                  </a:solidFill>
-                  <a:effectLst>
-                    <a:outerShdw blurRad="38100" dist="38100" dir="2700000" algn="tl">
-                      <a:srgbClr val="000000">
-                        <a:alpha val="43137"/>
-                      </a:srgbClr>
-                    </a:outerShdw>
-                  </a:effectLst>
-                  <a:latin typeface="+mn-ea"/>
-                  <a:ea typeface="+mn-ea"/>
-                  <a:cs typeface="メイリオ" panose="020B0604030504040204" pitchFamily="50" charset="-128"/>
-                </a:rPr>
-                <a:t>always needed for GUI </a:t>
-              </a:r>
-              <a:r>
-                <a:rPr kumimoji="1" lang="en-US" sz="1800" b="1" dirty="0">
-                  <a:solidFill>
-                    <a:schemeClr val="tx2"/>
-                  </a:solidFill>
-                  <a:effectLst>
-                    <a:outerShdw blurRad="38100" dist="38100" dir="2700000" algn="tl">
-                      <a:srgbClr val="000000">
-                        <a:alpha val="43137"/>
-                      </a:srgbClr>
-                    </a:outerShdw>
-                  </a:effectLst>
-                  <a:latin typeface="+mn-ea"/>
-                  <a:ea typeface="+mn-ea"/>
-                  <a:cs typeface="メイリオ" panose="020B0604030504040204" pitchFamily="50" charset="-128"/>
-                  <a:sym typeface="Wingdings" panose="05000000000000000000" pitchFamily="2" charset="2"/>
-                </a:rPr>
-                <a:t></a:t>
-              </a:r>
-              <a:r>
-                <a:rPr kumimoji="1" lang="en-US" sz="1800" b="1" dirty="0">
-                  <a:solidFill>
-                    <a:schemeClr val="tx2"/>
-                  </a:solidFill>
-                  <a:effectLst>
-                    <a:outerShdw blurRad="38100" dist="38100" dir="2700000" algn="tl">
-                      <a:srgbClr val="000000">
-                        <a:alpha val="43137"/>
-                      </a:srgbClr>
-                    </a:outerShdw>
-                  </a:effectLst>
-                  <a:latin typeface="+mn-ea"/>
-                  <a:ea typeface="+mn-ea"/>
-                  <a:cs typeface="メイリオ" panose="020B0604030504040204" pitchFamily="50" charset="-128"/>
-                </a:rPr>
-                <a:t>Arduino</a:t>
-              </a:r>
-              <a:r>
-                <a:rPr kumimoji="1" lang="en-US" sz="1800" dirty="0">
-                  <a:solidFill>
-                    <a:schemeClr val="tx2"/>
-                  </a:solidFill>
-                  <a:latin typeface="+mn-ea"/>
-                  <a:ea typeface="+mn-ea"/>
-                  <a:cs typeface="メイリオ" panose="020B0604030504040204" pitchFamily="50" charset="-128"/>
-                </a:rPr>
-                <a:t>)</a:t>
-              </a:r>
-            </a:p>
-          </p:txBody>
-        </p:sp>
-        <p:pic>
-          <p:nvPicPr>
-            <p:cNvPr id="1026" name="Picture 2" descr="Surface Laptop Go 3">
-              <a:extLst>
-                <a:ext uri="{FF2B5EF4-FFF2-40B4-BE49-F238E27FC236}">
-                  <a16:creationId xmlns:a16="http://schemas.microsoft.com/office/drawing/2014/main" id="{31E0B8E7-5AAF-5314-AEE2-A82B6163324E}"/>
-                </a:ext>
-              </a:extLst>
-            </p:cNvPr>
-            <p:cNvPicPr>
-              <a:picLocks noChangeAspect="1" noChangeArrowheads="1"/>
-            </p:cNvPicPr>
-            <p:nvPr/>
-          </p:nvPicPr>
-          <p:blipFill>
-            <a:blip r:embed="rId3" cstate="email">
-              <a:extLst>
-                <a:ext uri="{28A0092B-C50C-407E-A947-70E740481C1C}">
-                  <a14:useLocalDpi xmlns:a14="http://schemas.microsoft.com/office/drawing/2010/main"/>
-                </a:ext>
-              </a:extLst>
-            </a:blip>
-            <a:srcRect/>
-            <a:stretch>
-              <a:fillRect/>
-            </a:stretch>
-          </p:blipFill>
-          <p:spPr bwMode="auto">
-            <a:xfrm>
-              <a:off x="10020914" y="3920613"/>
-              <a:ext cx="1454713" cy="1369142"/>
-            </a:xfrm>
-            <a:prstGeom prst="rect">
-              <a:avLst/>
-            </a:prstGeom>
-            <a:noFill/>
+              </a:rPr>
+            </a:br>
+            <a:r>
+              <a:rPr kumimoji="1" lang="en-US" sz="1800" dirty="0">
+                <a:solidFill>
+                  <a:schemeClr val="tx2"/>
+                </a:solidFill>
+                <a:latin typeface="+mn-ea"/>
+                <a:ea typeface="+mn-ea"/>
+                <a:cs typeface="メイリオ" panose="020B0604030504040204" pitchFamily="50" charset="-128"/>
+              </a:rPr>
+              <a:t>(</a:t>
+            </a:r>
+            <a:r>
+              <a:rPr kumimoji="1" lang="en-US" sz="1800" b="1" dirty="0">
+                <a:solidFill>
+                  <a:schemeClr val="tx2"/>
+                </a:solidFill>
+                <a:effectLst>
+                  <a:outerShdw blurRad="38100" dist="38100" dir="2700000" algn="tl">
+                    <a:srgbClr val="000000">
+                      <a:alpha val="43137"/>
+                    </a:srgbClr>
+                  </a:outerShdw>
+                </a:effectLst>
+                <a:latin typeface="+mn-ea"/>
+                <a:ea typeface="+mn-ea"/>
+                <a:cs typeface="メイリオ" panose="020B0604030504040204" pitchFamily="50" charset="-128"/>
+              </a:rPr>
+              <a:t>always needed for GUI </a:t>
+            </a:r>
+            <a:r>
+              <a:rPr kumimoji="1" lang="en-US" sz="1800" b="1" dirty="0">
+                <a:solidFill>
+                  <a:schemeClr val="tx2"/>
+                </a:solidFill>
+                <a:effectLst>
+                  <a:outerShdw blurRad="38100" dist="38100" dir="2700000" algn="tl">
+                    <a:srgbClr val="000000">
+                      <a:alpha val="43137"/>
+                    </a:srgbClr>
+                  </a:outerShdw>
+                </a:effectLst>
+                <a:latin typeface="+mn-ea"/>
+                <a:ea typeface="+mn-ea"/>
+                <a:cs typeface="メイリオ" panose="020B0604030504040204" pitchFamily="50" charset="-128"/>
+                <a:sym typeface="Wingdings" panose="05000000000000000000" pitchFamily="2" charset="2"/>
+              </a:rPr>
+              <a:t></a:t>
+            </a:r>
+            <a:r>
+              <a:rPr kumimoji="1" lang="en-US" sz="1800" b="1" dirty="0">
+                <a:solidFill>
+                  <a:schemeClr val="tx2"/>
+                </a:solidFill>
+                <a:effectLst>
+                  <a:outerShdw blurRad="38100" dist="38100" dir="2700000" algn="tl">
+                    <a:srgbClr val="000000">
+                      <a:alpha val="43137"/>
+                    </a:srgbClr>
+                  </a:outerShdw>
+                </a:effectLst>
+                <a:latin typeface="+mn-ea"/>
+                <a:ea typeface="+mn-ea"/>
+                <a:cs typeface="メイリオ" panose="020B0604030504040204" pitchFamily="50" charset="-128"/>
+              </a:rPr>
+              <a:t>Arduino</a:t>
+            </a:r>
+            <a:r>
+              <a:rPr kumimoji="1" lang="en-US" sz="1800" dirty="0">
+                <a:solidFill>
+                  <a:schemeClr val="tx2"/>
+                </a:solidFill>
+                <a:latin typeface="+mn-ea"/>
+                <a:ea typeface="+mn-ea"/>
+                <a:cs typeface="メイリオ" panose="020B0604030504040204" pitchFamily="50" charset="-128"/>
+              </a:rPr>
+              <a:t>)</a:t>
+            </a:r>
+          </a:p>
+        </p:txBody>
+      </p:sp>
+      <p:pic>
+        <p:nvPicPr>
+          <p:cNvPr id="1026" name="Picture 2" descr="Surface Laptop Go 3">
             <a:extLst>
-              <a:ext uri="{909E8E84-426E-40DD-AFC4-6F175D3DCCD1}">
-                <a14:hiddenFill xmlns:a14="http://schemas.microsoft.com/office/drawing/2010/main">
-                  <a:solidFill>
-                    <a:srgbClr val="FFFFFF"/>
-                  </a:solidFill>
-                </a14:hiddenFill>
+              <a:ext uri="{FF2B5EF4-FFF2-40B4-BE49-F238E27FC236}">
+                <a16:creationId xmlns:a16="http://schemas.microsoft.com/office/drawing/2014/main" id="{31E0B8E7-5AAF-5314-AEE2-A82B6163324E}"/>
               </a:ext>
             </a:extLst>
-          </p:spPr>
-        </p:pic>
-      </p:grpSp>
+          </p:cNvPr>
+          <p:cNvPicPr>
+            <a:picLocks noChangeAspect="1" noChangeArrowheads="1"/>
+          </p:cNvPicPr>
+          <p:nvPr/>
+        </p:nvPicPr>
+        <p:blipFill>
+          <a:blip r:embed="rId3" cstate="email">
+            <a:extLst>
+              <a:ext uri="{28A0092B-C50C-407E-A947-70E740481C1C}">
+                <a14:useLocalDpi xmlns:a14="http://schemas.microsoft.com/office/drawing/2010/main"/>
+              </a:ext>
+            </a:extLst>
+          </a:blip>
+          <a:srcRect/>
+          <a:stretch>
+            <a:fillRect/>
+          </a:stretch>
+        </p:blipFill>
+        <p:spPr bwMode="auto">
+          <a:xfrm>
+            <a:off x="9804604" y="3910781"/>
+            <a:ext cx="1454713" cy="1369142"/>
+          </a:xfrm>
+          <a:prstGeom prst="rect">
+            <a:avLst/>
+          </a:prstGeom>
+          <a:noFill/>
+          <a:extLst>
+            <a:ext uri="{909E8E84-426E-40DD-AFC4-6F175D3DCCD1}">
+              <a14:hiddenFill xmlns:a14="http://schemas.microsoft.com/office/drawing/2010/main">
+                <a:solidFill>
+                  <a:srgbClr val="FFFFFF"/>
+                </a:solidFill>
+              </a14:hiddenFill>
+            </a:ext>
+          </a:extLst>
+        </p:spPr>
+      </p:pic>
+      <p:cxnSp>
+        <p:nvCxnSpPr>
+          <p:cNvPr id="5" name="Connector: Elbow 4">
+            <a:extLst>
+              <a:ext uri="{FF2B5EF4-FFF2-40B4-BE49-F238E27FC236}">
+                <a16:creationId xmlns:a16="http://schemas.microsoft.com/office/drawing/2014/main" id="{B9461225-7722-93A7-82C6-EDDF6936815E}"/>
+              </a:ext>
+            </a:extLst>
+          </p:cNvPr>
+          <p:cNvCxnSpPr>
+            <a:cxnSpLocks/>
+          </p:cNvCxnSpPr>
+          <p:nvPr/>
+        </p:nvCxnSpPr>
+        <p:spPr>
+          <a:xfrm>
+            <a:off x="4950542" y="5098025"/>
+            <a:ext cx="2089355" cy="1391265"/>
+          </a:xfrm>
+          <a:prstGeom prst="bentConnector3">
+            <a:avLst>
+              <a:gd name="adj1" fmla="val -353"/>
+            </a:avLst>
+          </a:prstGeom>
+          <a:ln w="38100">
+            <a:solidFill>
+              <a:schemeClr val="tx2"/>
+            </a:solidFill>
+            <a:tailEnd type="triangle"/>
+          </a:ln>
+        </p:spPr>
+        <p:style>
+          <a:lnRef idx="1">
+            <a:schemeClr val="accent1"/>
+          </a:lnRef>
+          <a:fillRef idx="0">
+            <a:schemeClr val="accent1"/>
+          </a:fillRef>
+          <a:effectRef idx="0">
+            <a:schemeClr val="accent1"/>
+          </a:effectRef>
+          <a:fontRef idx="minor">
+            <a:schemeClr val="tx1"/>
+          </a:fontRef>
+        </p:style>
+      </p:cxnSp>
+      <p:sp>
+        <p:nvSpPr>
+          <p:cNvPr id="10" name="TextBox 9">
+            <a:extLst>
+              <a:ext uri="{FF2B5EF4-FFF2-40B4-BE49-F238E27FC236}">
+                <a16:creationId xmlns:a16="http://schemas.microsoft.com/office/drawing/2014/main" id="{173DEA60-0228-00FA-E8EA-D350458F9D23}"/>
+              </a:ext>
+            </a:extLst>
+          </p:cNvPr>
+          <p:cNvSpPr txBox="1"/>
+          <p:nvPr/>
+        </p:nvSpPr>
+        <p:spPr>
+          <a:xfrm>
+            <a:off x="6994435" y="6243485"/>
+            <a:ext cx="5021888" cy="369332"/>
+          </a:xfrm>
+          <a:prstGeom prst="rect">
+            <a:avLst/>
+          </a:prstGeom>
+          <a:noFill/>
+        </p:spPr>
+        <p:txBody>
+          <a:bodyPr wrap="none" rtlCol="0">
+            <a:spAutoFit/>
+          </a:bodyPr>
+          <a:lstStyle/>
+          <a:p>
+            <a:pPr>
+              <a:spcBef>
+                <a:spcPts val="400"/>
+              </a:spcBef>
+            </a:pPr>
+            <a:r>
+              <a:rPr kumimoji="1" lang="en-US" sz="1800" dirty="0">
+                <a:solidFill>
+                  <a:schemeClr val="tx2"/>
+                </a:solidFill>
+                <a:latin typeface="+mn-ea"/>
+                <a:ea typeface="+mn-ea"/>
+                <a:cs typeface="メイリオ" panose="020B0604030504040204" pitchFamily="50" charset="-128"/>
+              </a:rPr>
+              <a:t>Pin 6: To GREEN wire of WS2815 LED strip</a:t>
+            </a:r>
+          </a:p>
+        </p:txBody>
+      </p:sp>
     </p:spTree>
     <p:extLst>
       <p:ext uri="{BB962C8B-B14F-4D97-AF65-F5344CB8AC3E}">

</xml_diff>

<commit_message>
update Arduino to include pin 11 fixed 490Hz 25% PWM
</commit_message>
<xml_diff>
--- a/Water Pump Demo Arduino and Gui instructions.pptx
+++ b/Water Pump Demo Arduino and Gui instructions.pptx
@@ -124,7 +124,7 @@
 <file path=ppt/revisionInfo.xml><?xml version="1.0" encoding="utf-8"?>
 <p1510:revInfo xmlns:a="http://schemas.openxmlformats.org/drawingml/2006/main" xmlns:r="http://schemas.openxmlformats.org/officeDocument/2006/relationships" xmlns:p1510="http://schemas.microsoft.com/office/powerpoint/2015/10/main">
   <p1510:revLst>
-    <p1510:client id="{7E05247A-D919-4851-ADA6-893D25B40627}" v="3" dt="2025-10-10T18:32:49.632"/>
+    <p1510:client id="{6C2247A7-8F9B-488B-BDEC-6B17CD374A53}" v="5" dt="2025-11-11T21:21:14.427"/>
   </p1510:revLst>
 </p1510:revInfo>
 </file>
@@ -134,90 +134,58 @@
   <pc:docChgLst>
     <pc:chgData name="George Hariman" userId="944226f4-c0bd-444e-8152-728ae792d6b1" providerId="ADAL" clId="{34122976-1B0B-468B-BAB7-AAB8F0B58991}"/>
     <pc:docChg chg="custSel addSld delSld modSld">
-      <pc:chgData name="George Hariman" userId="944226f4-c0bd-444e-8152-728ae792d6b1" providerId="ADAL" clId="{34122976-1B0B-468B-BAB7-AAB8F0B58991}" dt="2025-10-10T18:35:54.979" v="117" actId="47"/>
+      <pc:chgData name="George Hariman" userId="944226f4-c0bd-444e-8152-728ae792d6b1" providerId="ADAL" clId="{34122976-1B0B-468B-BAB7-AAB8F0B58991}" dt="2025-11-11T21:21:26.748" v="151" actId="1076"/>
       <pc:docMkLst>
         <pc:docMk/>
       </pc:docMkLst>
       <pc:sldChg chg="addSp delSp modSp mod">
-        <pc:chgData name="George Hariman" userId="944226f4-c0bd-444e-8152-728ae792d6b1" providerId="ADAL" clId="{34122976-1B0B-468B-BAB7-AAB8F0B58991}" dt="2025-10-10T18:33:37.641" v="80" actId="20577"/>
+        <pc:chgData name="George Hariman" userId="944226f4-c0bd-444e-8152-728ae792d6b1" providerId="ADAL" clId="{34122976-1B0B-468B-BAB7-AAB8F0B58991}" dt="2025-11-11T21:21:26.748" v="151" actId="1076"/>
         <pc:sldMkLst>
           <pc:docMk/>
           <pc:sldMk cId="1800593104" sldId="256"/>
         </pc:sldMkLst>
         <pc:spChg chg="add mod">
-          <ac:chgData name="George Hariman" userId="944226f4-c0bd-444e-8152-728ae792d6b1" providerId="ADAL" clId="{34122976-1B0B-468B-BAB7-AAB8F0B58991}" dt="2025-10-10T18:33:16.666" v="65" actId="1076"/>
+          <ac:chgData name="George Hariman" userId="944226f4-c0bd-444e-8152-728ae792d6b1" providerId="ADAL" clId="{34122976-1B0B-468B-BAB7-AAB8F0B58991}" dt="2025-11-11T21:21:11.286" v="143" actId="1076"/>
           <ac:spMkLst>
             <pc:docMk/>
             <pc:sldMk cId="1800593104" sldId="256"/>
-            <ac:spMk id="10" creationId="{173DEA60-0228-00FA-E8EA-D350458F9D23}"/>
+            <ac:spMk id="7" creationId="{ED3A4E5F-EFA4-59E8-6B89-5F40F1C70717}"/>
+          </ac:spMkLst>
+        </pc:spChg>
+        <pc:spChg chg="add mod">
+          <ac:chgData name="George Hariman" userId="944226f4-c0bd-444e-8152-728ae792d6b1" providerId="ADAL" clId="{34122976-1B0B-468B-BAB7-AAB8F0B58991}" dt="2025-11-11T21:21:12.537" v="144"/>
+          <ac:spMkLst>
+            <pc:docMk/>
+            <pc:sldMk cId="1800593104" sldId="256"/>
+            <ac:spMk id="9" creationId="{278AE9A6-6BEC-AAEE-D2AA-98A5E1F5655E}"/>
           </ac:spMkLst>
         </pc:spChg>
         <pc:spChg chg="mod topLvl">
-          <ac:chgData name="George Hariman" userId="944226f4-c0bd-444e-8152-728ae792d6b1" providerId="ADAL" clId="{34122976-1B0B-468B-BAB7-AAB8F0B58991}" dt="2025-10-10T18:32:31.642" v="0" actId="165"/>
-          <ac:spMkLst>
-            <pc:docMk/>
-            <pc:sldMk cId="1800593104" sldId="256"/>
-            <ac:spMk id="15" creationId="{00D293E9-91A6-D1CF-792E-84A40E0F368F}"/>
-          </ac:spMkLst>
-        </pc:spChg>
-        <pc:spChg chg="mod topLvl">
-          <ac:chgData name="George Hariman" userId="944226f4-c0bd-444e-8152-728ae792d6b1" providerId="ADAL" clId="{34122976-1B0B-468B-BAB7-AAB8F0B58991}" dt="2025-10-10T18:32:40.898" v="4" actId="20577"/>
+          <ac:chgData name="George Hariman" userId="944226f4-c0bd-444e-8152-728ae792d6b1" providerId="ADAL" clId="{34122976-1B0B-468B-BAB7-AAB8F0B58991}" dt="2025-11-11T21:20:52.303" v="120" actId="1076"/>
           <ac:spMkLst>
             <pc:docMk/>
             <pc:sldMk cId="1800593104" sldId="256"/>
             <ac:spMk id="31" creationId="{E1509700-B293-3F55-F55C-F3701790459F}"/>
           </ac:spMkLst>
         </pc:spChg>
-        <pc:spChg chg="mod topLvl">
-          <ac:chgData name="George Hariman" userId="944226f4-c0bd-444e-8152-728ae792d6b1" providerId="ADAL" clId="{34122976-1B0B-468B-BAB7-AAB8F0B58991}" dt="2025-10-10T18:32:31.642" v="0" actId="165"/>
-          <ac:spMkLst>
-            <pc:docMk/>
-            <pc:sldMk cId="1800593104" sldId="256"/>
-            <ac:spMk id="32" creationId="{D4361B2B-C269-6504-E428-1B94844EB182}"/>
-          </ac:spMkLst>
-        </pc:spChg>
-        <pc:spChg chg="mod topLvl">
-          <ac:chgData name="George Hariman" userId="944226f4-c0bd-444e-8152-728ae792d6b1" providerId="ADAL" clId="{34122976-1B0B-468B-BAB7-AAB8F0B58991}" dt="2025-10-10T18:33:37.641" v="80" actId="20577"/>
-          <ac:spMkLst>
-            <pc:docMk/>
-            <pc:sldMk cId="1800593104" sldId="256"/>
-            <ac:spMk id="33" creationId="{4C12D5DA-E102-F6FA-3EF8-B1463E1BBA05}"/>
-          </ac:spMkLst>
-        </pc:spChg>
-        <pc:spChg chg="mod topLvl">
-          <ac:chgData name="George Hariman" userId="944226f4-c0bd-444e-8152-728ae792d6b1" providerId="ADAL" clId="{34122976-1B0B-468B-BAB7-AAB8F0B58991}" dt="2025-10-10T18:32:31.642" v="0" actId="165"/>
+        <pc:spChg chg="mod">
+          <ac:chgData name="George Hariman" userId="944226f4-c0bd-444e-8152-728ae792d6b1" providerId="ADAL" clId="{34122976-1B0B-468B-BAB7-AAB8F0B58991}" dt="2025-11-11T21:20:58.342" v="121" actId="1076"/>
           <ac:spMkLst>
             <pc:docMk/>
             <pc:sldMk cId="1800593104" sldId="256"/>
             <ac:spMk id="35" creationId="{EC3C011E-0D3F-8E74-1F48-907C8470B1E2}"/>
           </ac:spMkLst>
         </pc:spChg>
-        <pc:spChg chg="mod topLvl">
-          <ac:chgData name="George Hariman" userId="944226f4-c0bd-444e-8152-728ae792d6b1" providerId="ADAL" clId="{34122976-1B0B-468B-BAB7-AAB8F0B58991}" dt="2025-10-10T18:32:31.642" v="0" actId="165"/>
+        <pc:spChg chg="mod">
+          <ac:chgData name="George Hariman" userId="944226f4-c0bd-444e-8152-728ae792d6b1" providerId="ADAL" clId="{34122976-1B0B-468B-BAB7-AAB8F0B58991}" dt="2025-11-11T21:20:58.342" v="121" actId="1076"/>
           <ac:spMkLst>
             <pc:docMk/>
             <pc:sldMk cId="1800593104" sldId="256"/>
             <ac:spMk id="36" creationId="{EA64A9E9-A333-6437-3863-AED0AEECE158}"/>
           </ac:spMkLst>
         </pc:spChg>
-        <pc:grpChg chg="del">
-          <ac:chgData name="George Hariman" userId="944226f4-c0bd-444e-8152-728ae792d6b1" providerId="ADAL" clId="{34122976-1B0B-468B-BAB7-AAB8F0B58991}" dt="2025-10-10T18:32:31.642" v="0" actId="165"/>
-          <ac:grpSpMkLst>
-            <pc:docMk/>
-            <pc:sldMk cId="1800593104" sldId="256"/>
-            <ac:grpSpMk id="38" creationId="{49BE9925-0CF5-CDE9-A59C-BE856EC70DAB}"/>
-          </ac:grpSpMkLst>
-        </pc:grpChg>
-        <pc:picChg chg="mod topLvl">
-          <ac:chgData name="George Hariman" userId="944226f4-c0bd-444e-8152-728ae792d6b1" providerId="ADAL" clId="{34122976-1B0B-468B-BAB7-AAB8F0B58991}" dt="2025-10-10T18:32:31.642" v="0" actId="165"/>
-          <ac:picMkLst>
-            <pc:docMk/>
-            <pc:sldMk cId="1800593104" sldId="256"/>
-            <ac:picMk id="6" creationId="{8AAD5153-AFC0-8523-9C2E-0C261C5B4D41}"/>
-          </ac:picMkLst>
-        </pc:picChg>
-        <pc:picChg chg="mod topLvl">
-          <ac:chgData name="George Hariman" userId="944226f4-c0bd-444e-8152-728ae792d6b1" providerId="ADAL" clId="{34122976-1B0B-468B-BAB7-AAB8F0B58991}" dt="2025-10-10T18:32:31.642" v="0" actId="165"/>
+        <pc:picChg chg="mod">
+          <ac:chgData name="George Hariman" userId="944226f4-c0bd-444e-8152-728ae792d6b1" providerId="ADAL" clId="{34122976-1B0B-468B-BAB7-AAB8F0B58991}" dt="2025-11-11T21:20:58.342" v="121" actId="1076"/>
           <ac:picMkLst>
             <pc:docMk/>
             <pc:sldMk cId="1800593104" sldId="256"/>
@@ -225,161 +193,21 @@
           </ac:picMkLst>
         </pc:picChg>
         <pc:cxnChg chg="add mod">
-          <ac:chgData name="George Hariman" userId="944226f4-c0bd-444e-8152-728ae792d6b1" providerId="ADAL" clId="{34122976-1B0B-468B-BAB7-AAB8F0B58991}" dt="2025-10-10T18:33:18.240" v="66" actId="1076"/>
+          <ac:chgData name="George Hariman" userId="944226f4-c0bd-444e-8152-728ae792d6b1" providerId="ADAL" clId="{34122976-1B0B-468B-BAB7-AAB8F0B58991}" dt="2025-11-11T21:21:26.748" v="151" actId="1076"/>
           <ac:cxnSpMkLst>
             <pc:docMk/>
             <pc:sldMk cId="1800593104" sldId="256"/>
-            <ac:cxnSpMk id="5" creationId="{B9461225-7722-93A7-82C6-EDDF6936815E}"/>
-          </ac:cxnSpMkLst>
-        </pc:cxnChg>
-        <pc:cxnChg chg="mod topLvl">
-          <ac:chgData name="George Hariman" userId="944226f4-c0bd-444e-8152-728ae792d6b1" providerId="ADAL" clId="{34122976-1B0B-468B-BAB7-AAB8F0B58991}" dt="2025-10-10T18:32:31.642" v="0" actId="165"/>
-          <ac:cxnSpMkLst>
-            <pc:docMk/>
-            <pc:sldMk cId="1800593104" sldId="256"/>
-            <ac:cxnSpMk id="24" creationId="{D2306F76-99C2-8DF4-2071-FACD58F635F4}"/>
+            <ac:cxnSpMk id="12" creationId="{B8AD187D-3728-BEBC-7383-A497F1047194}"/>
           </ac:cxnSpMkLst>
         </pc:cxnChg>
         <pc:cxnChg chg="mod">
-          <ac:chgData name="George Hariman" userId="944226f4-c0bd-444e-8152-728ae792d6b1" providerId="ADAL" clId="{34122976-1B0B-468B-BAB7-AAB8F0B58991}" dt="2025-10-10T18:32:39.578" v="3" actId="14100"/>
+          <ac:chgData name="George Hariman" userId="944226f4-c0bd-444e-8152-728ae792d6b1" providerId="ADAL" clId="{34122976-1B0B-468B-BAB7-AAB8F0B58991}" dt="2025-11-11T21:20:50.300" v="119" actId="14100"/>
           <ac:cxnSpMkLst>
             <pc:docMk/>
             <pc:sldMk cId="1800593104" sldId="256"/>
             <ac:cxnSpMk id="29" creationId="{7A82C5DF-9BE8-5D12-86E4-A699752CF43D}"/>
           </ac:cxnSpMkLst>
         </pc:cxnChg>
-      </pc:sldChg>
-      <pc:sldChg chg="modSp mod">
-        <pc:chgData name="George Hariman" userId="944226f4-c0bd-444e-8152-728ae792d6b1" providerId="ADAL" clId="{34122976-1B0B-468B-BAB7-AAB8F0B58991}" dt="2025-10-10T18:33:45.581" v="99" actId="20577"/>
-        <pc:sldMkLst>
-          <pc:docMk/>
-          <pc:sldMk cId="1793599662" sldId="264"/>
-        </pc:sldMkLst>
-        <pc:spChg chg="mod">
-          <ac:chgData name="George Hariman" userId="944226f4-c0bd-444e-8152-728ae792d6b1" providerId="ADAL" clId="{34122976-1B0B-468B-BAB7-AAB8F0B58991}" dt="2025-10-10T18:33:45.581" v="99" actId="20577"/>
-          <ac:spMkLst>
-            <pc:docMk/>
-            <pc:sldMk cId="1793599662" sldId="264"/>
-            <ac:spMk id="3" creationId="{9D9A9121-AF12-1969-1F1A-0B296611702E}"/>
-          </ac:spMkLst>
-        </pc:spChg>
-      </pc:sldChg>
-      <pc:sldChg chg="modSp add del mod">
-        <pc:chgData name="George Hariman" userId="944226f4-c0bd-444e-8152-728ae792d6b1" providerId="ADAL" clId="{34122976-1B0B-468B-BAB7-AAB8F0B58991}" dt="2025-10-10T18:35:54.979" v="117" actId="47"/>
-        <pc:sldMkLst>
-          <pc:docMk/>
-          <pc:sldMk cId="145276391" sldId="266"/>
-        </pc:sldMkLst>
-        <pc:spChg chg="mod">
-          <ac:chgData name="George Hariman" userId="944226f4-c0bd-444e-8152-728ae792d6b1" providerId="ADAL" clId="{34122976-1B0B-468B-BAB7-AAB8F0B58991}" dt="2025-10-10T18:34:44.547" v="116" actId="20577"/>
-          <ac:spMkLst>
-            <pc:docMk/>
-            <pc:sldMk cId="145276391" sldId="266"/>
-            <ac:spMk id="2" creationId="{89D5221F-8571-F8CA-085B-EAA234C1AC89}"/>
-          </ac:spMkLst>
-        </pc:spChg>
-      </pc:sldChg>
-    </pc:docChg>
-  </pc:docChgLst>
-  <pc:docChgLst>
-    <pc:chgData name="George Hariman" userId="944226f4-c0bd-444e-8152-728ae792d6b1" providerId="ADAL" clId="{2574B24F-E2A1-49B4-965A-816A9A283E65}"/>
-    <pc:docChg chg="undo custSel addSld delSld modSld sldOrd">
-      <pc:chgData name="George Hariman" userId="944226f4-c0bd-444e-8152-728ae792d6b1" providerId="ADAL" clId="{2574B24F-E2A1-49B4-965A-816A9A283E65}" dt="2025-06-18T21:40:18.985" v="2863" actId="164"/>
-      <pc:docMkLst>
-        <pc:docMk/>
-      </pc:docMkLst>
-      <pc:sldChg chg="addSp delSp modSp new mod modClrScheme chgLayout">
-        <pc:chgData name="George Hariman" userId="944226f4-c0bd-444e-8152-728ae792d6b1" providerId="ADAL" clId="{2574B24F-E2A1-49B4-965A-816A9A283E65}" dt="2025-06-17T23:09:39.035" v="2429" actId="1076"/>
-        <pc:sldMkLst>
-          <pc:docMk/>
-          <pc:sldMk cId="1800593104" sldId="256"/>
-        </pc:sldMkLst>
-      </pc:sldChg>
-      <pc:sldChg chg="addSp delSp modSp new mod">
-        <pc:chgData name="George Hariman" userId="944226f4-c0bd-444e-8152-728ae792d6b1" providerId="ADAL" clId="{2574B24F-E2A1-49B4-965A-816A9A283E65}" dt="2025-06-17T22:39:51.415" v="2185" actId="164"/>
-        <pc:sldMkLst>
-          <pc:docMk/>
-          <pc:sldMk cId="2969960632" sldId="257"/>
-        </pc:sldMkLst>
-      </pc:sldChg>
-      <pc:sldChg chg="addSp delSp modSp new mod">
-        <pc:chgData name="George Hariman" userId="944226f4-c0bd-444e-8152-728ae792d6b1" providerId="ADAL" clId="{2574B24F-E2A1-49B4-965A-816A9A283E65}" dt="2025-06-18T21:38:57.210" v="2851" actId="164"/>
-        <pc:sldMkLst>
-          <pc:docMk/>
-          <pc:sldMk cId="3341469045" sldId="258"/>
-        </pc:sldMkLst>
-      </pc:sldChg>
-      <pc:sldChg chg="addSp delSp modSp add mod ord">
-        <pc:chgData name="George Hariman" userId="944226f4-c0bd-444e-8152-728ae792d6b1" providerId="ADAL" clId="{2574B24F-E2A1-49B4-965A-816A9A283E65}" dt="2025-06-18T21:37:49.265" v="2757" actId="165"/>
-        <pc:sldMkLst>
-          <pc:docMk/>
-          <pc:sldMk cId="1143546009" sldId="259"/>
-        </pc:sldMkLst>
-      </pc:sldChg>
-      <pc:sldChg chg="addSp delSp modSp add mod">
-        <pc:chgData name="George Hariman" userId="944226f4-c0bd-444e-8152-728ae792d6b1" providerId="ADAL" clId="{2574B24F-E2A1-49B4-965A-816A9A283E65}" dt="2025-06-18T21:34:39.350" v="2714" actId="1076"/>
-        <pc:sldMkLst>
-          <pc:docMk/>
-          <pc:sldMk cId="208232504" sldId="260"/>
-        </pc:sldMkLst>
-      </pc:sldChg>
-      <pc:sldChg chg="addSp delSp modSp add mod">
-        <pc:chgData name="George Hariman" userId="944226f4-c0bd-444e-8152-728ae792d6b1" providerId="ADAL" clId="{2574B24F-E2A1-49B4-965A-816A9A283E65}" dt="2025-06-17T23:03:55.904" v="2339" actId="1076"/>
-        <pc:sldMkLst>
-          <pc:docMk/>
-          <pc:sldMk cId="657922982" sldId="261"/>
-        </pc:sldMkLst>
-      </pc:sldChg>
-      <pc:sldChg chg="add del">
-        <pc:chgData name="George Hariman" userId="944226f4-c0bd-444e-8152-728ae792d6b1" providerId="ADAL" clId="{2574B24F-E2A1-49B4-965A-816A9A283E65}" dt="2025-06-17T23:00:27.462" v="2187" actId="2696"/>
-        <pc:sldMkLst>
-          <pc:docMk/>
-          <pc:sldMk cId="1060339108" sldId="262"/>
-        </pc:sldMkLst>
-      </pc:sldChg>
-      <pc:sldChg chg="addSp delSp modSp new mod">
-        <pc:chgData name="George Hariman" userId="944226f4-c0bd-444e-8152-728ae792d6b1" providerId="ADAL" clId="{2574B24F-E2A1-49B4-965A-816A9A283E65}" dt="2025-06-17T23:11:47.258" v="2466" actId="1076"/>
-        <pc:sldMkLst>
-          <pc:docMk/>
-          <pc:sldMk cId="1382637432" sldId="262"/>
-        </pc:sldMkLst>
-      </pc:sldChg>
-      <pc:sldChg chg="new">
-        <pc:chgData name="George Hariman" userId="944226f4-c0bd-444e-8152-728ae792d6b1" providerId="ADAL" clId="{2574B24F-E2A1-49B4-965A-816A9A283E65}" dt="2025-06-17T23:02:34.838" v="2267" actId="680"/>
-        <pc:sldMkLst>
-          <pc:docMk/>
-          <pc:sldMk cId="828892827" sldId="263"/>
-        </pc:sldMkLst>
-      </pc:sldChg>
-      <pc:sldChg chg="modSp new mod ord">
-        <pc:chgData name="George Hariman" userId="944226f4-c0bd-444e-8152-728ae792d6b1" providerId="ADAL" clId="{2574B24F-E2A1-49B4-965A-816A9A283E65}" dt="2025-06-17T23:03:01.222" v="2334"/>
-        <pc:sldMkLst>
-          <pc:docMk/>
-          <pc:sldMk cId="1793599662" sldId="264"/>
-        </pc:sldMkLst>
-      </pc:sldChg>
-      <pc:sldChg chg="addSp delSp modSp add mod ord">
-        <pc:chgData name="George Hariman" userId="944226f4-c0bd-444e-8152-728ae792d6b1" providerId="ADAL" clId="{2574B24F-E2A1-49B4-965A-816A9A283E65}" dt="2025-06-18T21:40:18.985" v="2863" actId="164"/>
-        <pc:sldMkLst>
-          <pc:docMk/>
-          <pc:sldMk cId="2371463180" sldId="265"/>
-        </pc:sldMkLst>
-      </pc:sldChg>
-    </pc:docChg>
-  </pc:docChgLst>
-  <pc:docChgLst>
-    <pc:chgData name="George Hariman" userId="944226f4-c0bd-444e-8152-728ae792d6b1" providerId="ADAL" clId="{A654A3A0-7EF7-4D79-935B-1C606555E407}"/>
-    <pc:docChg chg="modSld sldOrd">
-      <pc:chgData name="George Hariman" userId="944226f4-c0bd-444e-8152-728ae792d6b1" providerId="ADAL" clId="{A654A3A0-7EF7-4D79-935B-1C606555E407}" dt="2025-07-09T17:47:02.555" v="117" actId="13926"/>
-      <pc:docMkLst>
-        <pc:docMk/>
-      </pc:docMkLst>
-      <pc:sldChg chg="modSp mod ord">
-        <pc:chgData name="George Hariman" userId="944226f4-c0bd-444e-8152-728ae792d6b1" providerId="ADAL" clId="{A654A3A0-7EF7-4D79-935B-1C606555E407}" dt="2025-07-09T17:47:02.555" v="117" actId="13926"/>
-        <pc:sldMkLst>
-          <pc:docMk/>
-          <pc:sldMk cId="208232504" sldId="260"/>
-        </pc:sldMkLst>
       </pc:sldChg>
     </pc:docChg>
   </pc:docChgLst>
@@ -2344,7 +2172,7 @@
           <a:p>
             <a:fld id="{2B0A73C7-85E1-4631-82BB-A7046A93EA7F}" type="datetimeFigureOut">
               <a:rPr lang="en-US" smtClean="0"/>
-              <a:t>10/10/2025</a:t>
+              <a:t>11/11/2025</a:t>
             </a:fld>
             <a:endParaRPr lang="en-US"/>
           </a:p>
@@ -4319,18 +4147,17 @@
           </p:cNvPr>
           <p:cNvCxnSpPr>
             <a:cxnSpLocks/>
-            <a:endCxn id="31" idx="1"/>
           </p:cNvCxnSpPr>
           <p:nvPr/>
         </p:nvCxnSpPr>
         <p:spPr>
           <a:xfrm>
             <a:off x="5624051" y="5083277"/>
-            <a:ext cx="2171713" cy="452902"/>
+            <a:ext cx="2182037" cy="1057641"/>
           </a:xfrm>
           <a:prstGeom prst="bentConnector3">
             <a:avLst>
-              <a:gd name="adj1" fmla="val 1104"/>
+              <a:gd name="adj1" fmla="val 595"/>
             </a:avLst>
           </a:prstGeom>
           <a:ln w="38100">
@@ -4369,7 +4196,7 @@
         </p:nvSpPr>
         <p:spPr>
           <a:xfrm>
-            <a:off x="7795764" y="5048866"/>
+            <a:off x="7882392" y="5308748"/>
             <a:ext cx="3908058" cy="974626"/>
           </a:xfrm>
           <a:prstGeom prst="rect">
@@ -4579,7 +4406,7 @@
         </p:nvSpPr>
         <p:spPr>
           <a:xfrm rot="16200000">
-            <a:off x="8767965" y="3640344"/>
+            <a:off x="8941220" y="3072454"/>
             <a:ext cx="484632" cy="1407980"/>
           </a:xfrm>
           <a:prstGeom prst="upDownArrow">
@@ -4646,7 +4473,7 @@
         </p:nvSpPr>
         <p:spPr>
           <a:xfrm>
-            <a:off x="7737988" y="3175820"/>
+            <a:off x="7911243" y="2607930"/>
             <a:ext cx="5093108" cy="646331"/>
           </a:xfrm>
           <a:prstGeom prst="rect">
@@ -4795,7 +4622,7 @@
         </p:blipFill>
         <p:spPr bwMode="auto">
           <a:xfrm>
-            <a:off x="9804604" y="3910781"/>
+            <a:off x="9977859" y="3342891"/>
             <a:ext cx="1454713" cy="1369142"/>
           </a:xfrm>
           <a:prstGeom prst="rect">
@@ -4906,6 +4733,99 @@
           </a:p>
         </p:txBody>
       </p:sp>
+      <p:sp>
+        <p:nvSpPr>
+          <p:cNvPr id="7" name="TextBox 6">
+            <a:extLst>
+              <a:ext uri="{FF2B5EF4-FFF2-40B4-BE49-F238E27FC236}">
+                <a16:creationId xmlns:a16="http://schemas.microsoft.com/office/drawing/2014/main" id="{ED3A4E5F-EFA4-59E8-6B89-5F40F1C70717}"/>
+              </a:ext>
+            </a:extLst>
+          </p:cNvPr>
+          <p:cNvSpPr txBox="1"/>
+          <p:nvPr/>
+        </p:nvSpPr>
+        <p:spPr>
+          <a:xfrm>
+            <a:off x="7880788" y="4931759"/>
+            <a:ext cx="3025187" cy="369332"/>
+          </a:xfrm>
+          <a:prstGeom prst="rect">
+            <a:avLst/>
+          </a:prstGeom>
+          <a:noFill/>
+        </p:spPr>
+        <p:txBody>
+          <a:bodyPr wrap="none" rtlCol="0">
+            <a:spAutoFit/>
+          </a:bodyPr>
+          <a:lstStyle/>
+          <a:p>
+            <a:pPr>
+              <a:spcBef>
+                <a:spcPts val="400"/>
+              </a:spcBef>
+            </a:pPr>
+            <a:r>
+              <a:rPr kumimoji="1" lang="en-US" sz="1800" dirty="0">
+                <a:solidFill>
+                  <a:schemeClr val="tx2"/>
+                </a:solidFill>
+                <a:latin typeface="+mn-ea"/>
+                <a:ea typeface="+mn-ea"/>
+                <a:cs typeface="メイリオ" panose="020B0604030504040204" pitchFamily="50" charset="-128"/>
+              </a:rPr>
+              <a:t>Pin 11: 25% 490Hz PWM</a:t>
+            </a:r>
+          </a:p>
+        </p:txBody>
+      </p:sp>
+      <p:cxnSp>
+        <p:nvCxnSpPr>
+          <p:cNvPr id="12" name="Connector: Elbow 11">
+            <a:extLst>
+              <a:ext uri="{FF2B5EF4-FFF2-40B4-BE49-F238E27FC236}">
+                <a16:creationId xmlns:a16="http://schemas.microsoft.com/office/drawing/2014/main" id="{B8AD187D-3728-BEBC-7383-A497F1047194}"/>
+              </a:ext>
+            </a:extLst>
+          </p:cNvPr>
+          <p:cNvCxnSpPr>
+            <a:cxnSpLocks/>
+          </p:cNvCxnSpPr>
+          <p:nvPr/>
+        </p:nvCxnSpPr>
+        <p:spPr>
+          <a:xfrm>
+            <a:off x="5805327" y="5052797"/>
+            <a:ext cx="2113962" cy="140630"/>
+          </a:xfrm>
+          <a:prstGeom prst="bentConnector3">
+            <a:avLst>
+              <a:gd name="adj1" fmla="val -996"/>
+            </a:avLst>
+          </a:prstGeom>
+          <a:ln w="38100">
+            <a:solidFill>
+              <a:schemeClr val="tx2"/>
+            </a:solidFill>
+            <a:tailEnd type="triangle"/>
+          </a:ln>
+        </p:spPr>
+        <p:style>
+          <a:lnRef idx="1">
+            <a:schemeClr val="accent1"/>
+          </a:lnRef>
+          <a:fillRef idx="0">
+            <a:schemeClr val="accent1"/>
+          </a:fillRef>
+          <a:effectRef idx="0">
+            <a:schemeClr val="accent1"/>
+          </a:effectRef>
+          <a:fontRef idx="minor">
+            <a:schemeClr val="tx1"/>
+          </a:fontRef>
+        </p:style>
+      </p:cxnSp>
     </p:spTree>
     <p:extLst>
       <p:ext uri="{BB962C8B-B14F-4D97-AF65-F5344CB8AC3E}">

</xml_diff>

<commit_message>
updated Arduino to ver4.4.0.0 to make pin 10 be 15kHz 25% and pin 11 be the Motor PWM. Also updated PPT file.
</commit_message>
<xml_diff>
--- a/Water Pump Demo Arduino and Gui instructions.pptx
+++ b/Water Pump Demo Arduino and Gui instructions.pptx
@@ -124,7 +124,7 @@
 <file path=ppt/revisionInfo.xml><?xml version="1.0" encoding="utf-8"?>
 <p1510:revInfo xmlns:a="http://schemas.openxmlformats.org/drawingml/2006/main" xmlns:r="http://schemas.openxmlformats.org/officeDocument/2006/relationships" xmlns:p1510="http://schemas.microsoft.com/office/powerpoint/2015/10/main">
   <p1510:revLst>
-    <p1510:client id="{6C2247A7-8F9B-488B-BDEC-6B17CD374A53}" v="5" dt="2025-11-11T21:21:14.427"/>
+    <p1510:client id="{6C2247A7-8F9B-488B-BDEC-6B17CD374A53}" v="8" dt="2025-11-17T17:09:47.850"/>
   </p1510:revLst>
 </p1510:revInfo>
 </file>
@@ -134,34 +134,34 @@
   <pc:docChgLst>
     <pc:chgData name="George Hariman" userId="944226f4-c0bd-444e-8152-728ae792d6b1" providerId="ADAL" clId="{34122976-1B0B-468B-BAB7-AAB8F0B58991}"/>
     <pc:docChg chg="custSel addSld delSld modSld">
-      <pc:chgData name="George Hariman" userId="944226f4-c0bd-444e-8152-728ae792d6b1" providerId="ADAL" clId="{34122976-1B0B-468B-BAB7-AAB8F0B58991}" dt="2025-11-11T21:21:26.748" v="151" actId="1076"/>
+      <pc:chgData name="George Hariman" userId="944226f4-c0bd-444e-8152-728ae792d6b1" providerId="ADAL" clId="{34122976-1B0B-468B-BAB7-AAB8F0B58991}" dt="2025-11-17T17:09:56.609" v="210" actId="14100"/>
       <pc:docMkLst>
         <pc:docMk/>
       </pc:docMkLst>
       <pc:sldChg chg="addSp delSp modSp mod">
-        <pc:chgData name="George Hariman" userId="944226f4-c0bd-444e-8152-728ae792d6b1" providerId="ADAL" clId="{34122976-1B0B-468B-BAB7-AAB8F0B58991}" dt="2025-11-11T21:21:26.748" v="151" actId="1076"/>
+        <pc:chgData name="George Hariman" userId="944226f4-c0bd-444e-8152-728ae792d6b1" providerId="ADAL" clId="{34122976-1B0B-468B-BAB7-AAB8F0B58991}" dt="2025-11-17T17:09:56.609" v="210" actId="14100"/>
         <pc:sldMkLst>
           <pc:docMk/>
           <pc:sldMk cId="1800593104" sldId="256"/>
         </pc:sldMkLst>
         <pc:spChg chg="add mod">
-          <ac:chgData name="George Hariman" userId="944226f4-c0bd-444e-8152-728ae792d6b1" providerId="ADAL" clId="{34122976-1B0B-468B-BAB7-AAB8F0B58991}" dt="2025-11-11T21:21:11.286" v="143" actId="1076"/>
+          <ac:chgData name="George Hariman" userId="944226f4-c0bd-444e-8152-728ae792d6b1" providerId="ADAL" clId="{34122976-1B0B-468B-BAB7-AAB8F0B58991}" dt="2025-11-17T17:09:45.992" v="206" actId="1076"/>
+          <ac:spMkLst>
+            <pc:docMk/>
+            <pc:sldMk cId="1800593104" sldId="256"/>
+            <ac:spMk id="2" creationId="{27F087EB-B7CA-302D-B1BC-8A93ECBBBF28}"/>
+          </ac:spMkLst>
+        </pc:spChg>
+        <pc:spChg chg="add mod">
+          <ac:chgData name="George Hariman" userId="944226f4-c0bd-444e-8152-728ae792d6b1" providerId="ADAL" clId="{34122976-1B0B-468B-BAB7-AAB8F0B58991}" dt="2025-11-17T17:09:23.085" v="153"/>
           <ac:spMkLst>
             <pc:docMk/>
             <pc:sldMk cId="1800593104" sldId="256"/>
             <ac:spMk id="7" creationId="{ED3A4E5F-EFA4-59E8-6B89-5F40F1C70717}"/>
           </ac:spMkLst>
         </pc:spChg>
-        <pc:spChg chg="add mod">
-          <ac:chgData name="George Hariman" userId="944226f4-c0bd-444e-8152-728ae792d6b1" providerId="ADAL" clId="{34122976-1B0B-468B-BAB7-AAB8F0B58991}" dt="2025-11-11T21:21:12.537" v="144"/>
-          <ac:spMkLst>
-            <pc:docMk/>
-            <pc:sldMk cId="1800593104" sldId="256"/>
-            <ac:spMk id="9" creationId="{278AE9A6-6BEC-AAEE-D2AA-98A5E1F5655E}"/>
-          </ac:spMkLst>
-        </pc:spChg>
-        <pc:spChg chg="mod topLvl">
-          <ac:chgData name="George Hariman" userId="944226f4-c0bd-444e-8152-728ae792d6b1" providerId="ADAL" clId="{34122976-1B0B-468B-BAB7-AAB8F0B58991}" dt="2025-11-11T21:20:52.303" v="120" actId="1076"/>
+        <pc:spChg chg="del mod topLvl">
+          <ac:chgData name="George Hariman" userId="944226f4-c0bd-444e-8152-728ae792d6b1" providerId="ADAL" clId="{34122976-1B0B-468B-BAB7-AAB8F0B58991}" dt="2025-11-17T17:09:24.621" v="155"/>
           <ac:spMkLst>
             <pc:docMk/>
             <pc:sldMk cId="1800593104" sldId="256"/>
@@ -192,6 +192,14 @@
             <ac:picMk id="1026" creationId="{31E0B8E7-5AAF-5314-AEE2-A82B6163324E}"/>
           </ac:picMkLst>
         </pc:picChg>
+        <pc:cxnChg chg="add mod">
+          <ac:chgData name="George Hariman" userId="944226f4-c0bd-444e-8152-728ae792d6b1" providerId="ADAL" clId="{34122976-1B0B-468B-BAB7-AAB8F0B58991}" dt="2025-11-17T17:09:56.609" v="210" actId="14100"/>
+          <ac:cxnSpMkLst>
+            <pc:docMk/>
+            <pc:sldMk cId="1800593104" sldId="256"/>
+            <ac:cxnSpMk id="3" creationId="{380E2C1A-0F08-461E-6A8C-56A4425AF116}"/>
+          </ac:cxnSpMkLst>
+        </pc:cxnChg>
         <pc:cxnChg chg="add mod">
           <ac:chgData name="George Hariman" userId="944226f4-c0bd-444e-8152-728ae792d6b1" providerId="ADAL" clId="{34122976-1B0B-468B-BAB7-AAB8F0B58991}" dt="2025-11-11T21:21:26.748" v="151" actId="1076"/>
           <ac:cxnSpMkLst>
@@ -2172,7 +2180,7 @@
           <a:p>
             <a:fld id="{2B0A73C7-85E1-4631-82BB-A7046A93EA7F}" type="datetimeFigureOut">
               <a:rPr lang="en-US" smtClean="0"/>
-              <a:t>11/11/2025</a:t>
+              <a:t>11/17/2025</a:t>
             </a:fld>
             <a:endParaRPr lang="en-US"/>
           </a:p>
@@ -4184,99 +4192,6 @@
       </p:cxnSp>
       <p:sp>
         <p:nvSpPr>
-          <p:cNvPr id="31" name="TextBox 30">
-            <a:extLst>
-              <a:ext uri="{FF2B5EF4-FFF2-40B4-BE49-F238E27FC236}">
-                <a16:creationId xmlns:a16="http://schemas.microsoft.com/office/drawing/2014/main" id="{E1509700-B293-3F55-F55C-F3701790459F}"/>
-              </a:ext>
-            </a:extLst>
-          </p:cNvPr>
-          <p:cNvSpPr txBox="1"/>
-          <p:nvPr/>
-        </p:nvSpPr>
-        <p:spPr>
-          <a:xfrm>
-            <a:off x="7882392" y="5308748"/>
-            <a:ext cx="3908058" cy="974626"/>
-          </a:xfrm>
-          <a:prstGeom prst="rect">
-            <a:avLst/>
-          </a:prstGeom>
-          <a:noFill/>
-        </p:spPr>
-        <p:txBody>
-          <a:bodyPr wrap="none" rtlCol="0">
-            <a:spAutoFit/>
-          </a:bodyPr>
-          <a:lstStyle/>
-          <a:p>
-            <a:pPr>
-              <a:spcBef>
-                <a:spcPts val="400"/>
-              </a:spcBef>
-            </a:pPr>
-            <a:r>
-              <a:rPr kumimoji="1" lang="en-US" sz="1800" dirty="0">
-                <a:solidFill>
-                  <a:schemeClr val="tx2"/>
-                </a:solidFill>
-                <a:latin typeface="+mn-ea"/>
-                <a:ea typeface="+mn-ea"/>
-                <a:cs typeface="メイリオ" panose="020B0604030504040204" pitchFamily="50" charset="-128"/>
-              </a:rPr>
-              <a:t>Pin 10: PWM out</a:t>
-            </a:r>
-            <a:br>
-              <a:rPr kumimoji="1" lang="en-US" sz="1800" dirty="0">
-                <a:solidFill>
-                  <a:schemeClr val="tx2"/>
-                </a:solidFill>
-                <a:latin typeface="+mn-ea"/>
-                <a:ea typeface="+mn-ea"/>
-                <a:cs typeface="メイリオ" panose="020B0604030504040204" pitchFamily="50" charset="-128"/>
-              </a:rPr>
-            </a:br>
-            <a:r>
-              <a:rPr kumimoji="1" lang="en-US" sz="1800" dirty="0">
-                <a:solidFill>
-                  <a:schemeClr val="tx2"/>
-                </a:solidFill>
-                <a:latin typeface="+mn-ea"/>
-                <a:ea typeface="+mn-ea"/>
-                <a:cs typeface="メイリオ" panose="020B0604030504040204" pitchFamily="50" charset="-128"/>
-              </a:rPr>
-              <a:t>(to EVK “PWMINB”)</a:t>
-            </a:r>
-          </a:p>
-          <a:p>
-            <a:pPr>
-              <a:spcBef>
-                <a:spcPts val="400"/>
-              </a:spcBef>
-            </a:pPr>
-            <a:r>
-              <a:rPr lang="en-US" dirty="0">
-                <a:solidFill>
-                  <a:schemeClr val="tx2"/>
-                </a:solidFill>
-                <a:latin typeface="+mn-ea"/>
-                <a:cs typeface="メイリオ" panose="020B0604030504040204" pitchFamily="50" charset="-128"/>
-              </a:rPr>
-              <a:t>490Hz fixed, changing duty cycle</a:t>
-            </a:r>
-            <a:endParaRPr kumimoji="1" lang="en-US" sz="1800" dirty="0">
-              <a:solidFill>
-                <a:schemeClr val="tx2"/>
-              </a:solidFill>
-              <a:latin typeface="+mn-ea"/>
-              <a:ea typeface="+mn-ea"/>
-              <a:cs typeface="メイリオ" panose="020B0604030504040204" pitchFamily="50" charset="-128"/>
-            </a:endParaRPr>
-          </a:p>
-        </p:txBody>
-      </p:sp>
-      <p:sp>
-        <p:nvSpPr>
           <p:cNvPr id="32" name="Right Brace 31">
             <a:extLst>
               <a:ext uri="{FF2B5EF4-FFF2-40B4-BE49-F238E27FC236}">
@@ -4748,7 +4663,7 @@
         <p:spPr>
           <a:xfrm>
             <a:off x="7880788" y="4931759"/>
-            <a:ext cx="3025187" cy="369332"/>
+            <a:ext cx="3908058" cy="974626"/>
           </a:xfrm>
           <a:prstGeom prst="rect">
             <a:avLst/>
@@ -4767,15 +4682,50 @@
               </a:spcBef>
             </a:pPr>
             <a:r>
-              <a:rPr kumimoji="1" lang="en-US" sz="1800" dirty="0">
+              <a:rPr lang="en-US" dirty="0">
                 <a:solidFill>
                   <a:schemeClr val="tx2"/>
                 </a:solidFill>
                 <a:latin typeface="+mn-ea"/>
-                <a:ea typeface="+mn-ea"/>
                 <a:cs typeface="メイリオ" panose="020B0604030504040204" pitchFamily="50" charset="-128"/>
               </a:rPr>
-              <a:t>Pin 11: 25% 490Hz PWM</a:t>
+              <a:t>Pin 10: PWM out</a:t>
+            </a:r>
+            <a:br>
+              <a:rPr lang="en-US" dirty="0">
+                <a:solidFill>
+                  <a:schemeClr val="tx2"/>
+                </a:solidFill>
+                <a:latin typeface="+mn-ea"/>
+                <a:cs typeface="メイリオ" panose="020B0604030504040204" pitchFamily="50" charset="-128"/>
+              </a:rPr>
+            </a:br>
+            <a:r>
+              <a:rPr lang="en-US" dirty="0">
+                <a:solidFill>
+                  <a:schemeClr val="tx2"/>
+                </a:solidFill>
+                <a:latin typeface="+mn-ea"/>
+                <a:cs typeface="メイリオ" panose="020B0604030504040204" pitchFamily="50" charset="-128"/>
+              </a:rPr>
+              <a:t>(to EVK “PWMINB”)</a:t>
+            </a:r>
+          </a:p>
+          <a:p>
+            <a:pPr>
+              <a:spcBef>
+                <a:spcPts val="400"/>
+              </a:spcBef>
+            </a:pPr>
+            <a:r>
+              <a:rPr lang="en-US" dirty="0">
+                <a:solidFill>
+                  <a:schemeClr val="tx2"/>
+                </a:solidFill>
+                <a:latin typeface="+mn-ea"/>
+                <a:cs typeface="メイリオ" panose="020B0604030504040204" pitchFamily="50" charset="-128"/>
+              </a:rPr>
+              <a:t>490Hz fixed, changing duty cycle</a:t>
             </a:r>
           </a:p>
         </p:txBody>
@@ -4802,6 +4752,99 @@
           <a:prstGeom prst="bentConnector3">
             <a:avLst>
               <a:gd name="adj1" fmla="val -996"/>
+            </a:avLst>
+          </a:prstGeom>
+          <a:ln w="38100">
+            <a:solidFill>
+              <a:schemeClr val="tx2"/>
+            </a:solidFill>
+            <a:tailEnd type="triangle"/>
+          </a:ln>
+        </p:spPr>
+        <p:style>
+          <a:lnRef idx="1">
+            <a:schemeClr val="accent1"/>
+          </a:lnRef>
+          <a:fillRef idx="0">
+            <a:schemeClr val="accent1"/>
+          </a:fillRef>
+          <a:effectRef idx="0">
+            <a:schemeClr val="accent1"/>
+          </a:effectRef>
+          <a:fontRef idx="minor">
+            <a:schemeClr val="tx1"/>
+          </a:fontRef>
+        </p:style>
+      </p:cxnSp>
+      <p:sp>
+        <p:nvSpPr>
+          <p:cNvPr id="2" name="TextBox 1">
+            <a:extLst>
+              <a:ext uri="{FF2B5EF4-FFF2-40B4-BE49-F238E27FC236}">
+                <a16:creationId xmlns:a16="http://schemas.microsoft.com/office/drawing/2014/main" id="{27F087EB-B7CA-302D-B1BC-8A93ECBBBF28}"/>
+              </a:ext>
+            </a:extLst>
+          </p:cNvPr>
+          <p:cNvSpPr txBox="1"/>
+          <p:nvPr/>
+        </p:nvSpPr>
+        <p:spPr>
+          <a:xfrm>
+            <a:off x="7875639" y="5869858"/>
+            <a:ext cx="4560864" cy="369332"/>
+          </a:xfrm>
+          <a:prstGeom prst="rect">
+            <a:avLst/>
+          </a:prstGeom>
+          <a:noFill/>
+        </p:spPr>
+        <p:txBody>
+          <a:bodyPr wrap="none" rtlCol="0">
+            <a:spAutoFit/>
+          </a:bodyPr>
+          <a:lstStyle/>
+          <a:p>
+            <a:pPr>
+              <a:spcBef>
+                <a:spcPts val="400"/>
+              </a:spcBef>
+            </a:pPr>
+            <a:r>
+              <a:rPr kumimoji="1" lang="en-US" sz="1800" dirty="0">
+                <a:solidFill>
+                  <a:schemeClr val="tx2"/>
+                </a:solidFill>
+                <a:latin typeface="+mn-ea"/>
+                <a:ea typeface="+mn-ea"/>
+                <a:cs typeface="メイリオ" panose="020B0604030504040204" pitchFamily="50" charset="-128"/>
+              </a:rPr>
+              <a:t>Pin 10 50%, pin 9 25% at 15.625kHz</a:t>
+            </a:r>
+          </a:p>
+        </p:txBody>
+      </p:sp>
+      <p:cxnSp>
+        <p:nvCxnSpPr>
+          <p:cNvPr id="3" name="Connector: Elbow 2">
+            <a:extLst>
+              <a:ext uri="{FF2B5EF4-FFF2-40B4-BE49-F238E27FC236}">
+                <a16:creationId xmlns:a16="http://schemas.microsoft.com/office/drawing/2014/main" id="{380E2C1A-0F08-461E-6A8C-56A4425AF116}"/>
+              </a:ext>
+            </a:extLst>
+          </p:cNvPr>
+          <p:cNvCxnSpPr>
+            <a:cxnSpLocks/>
+          </p:cNvCxnSpPr>
+          <p:nvPr/>
+        </p:nvCxnSpPr>
+        <p:spPr>
+          <a:xfrm>
+            <a:off x="5471651" y="5137355"/>
+            <a:ext cx="2276168" cy="1076632"/>
+          </a:xfrm>
+          <a:prstGeom prst="bentConnector3">
+            <a:avLst>
+              <a:gd name="adj1" fmla="val -972"/>
             </a:avLst>
           </a:prstGeom>
           <a:ln w="38100">

</xml_diff>

<commit_message>
update fan PWM to 5kHz. Update PPT.
</commit_message>
<xml_diff>
--- a/Water Pump Demo Arduino and Gui instructions.pptx
+++ b/Water Pump Demo Arduino and Gui instructions.pptx
@@ -121,31 +121,23 @@
 </p:presentation>
 </file>
 
-<file path=ppt/revisionInfo.xml><?xml version="1.0" encoding="utf-8"?>
-<p1510:revInfo xmlns:a="http://schemas.openxmlformats.org/drawingml/2006/main" xmlns:r="http://schemas.openxmlformats.org/officeDocument/2006/relationships" xmlns:p1510="http://schemas.microsoft.com/office/powerpoint/2015/10/main">
-  <p1510:revLst>
-    <p1510:client id="{6C2247A7-8F9B-488B-BDEC-6B17CD374A53}" v="8" dt="2025-11-17T17:09:47.850"/>
-  </p1510:revLst>
-</p1510:revInfo>
-</file>
-
 <file path=ppt/changesInfos/changesInfo1.xml><?xml version="1.0" encoding="utf-8"?>
 <pc:chgInfo xmlns:a="http://schemas.openxmlformats.org/drawingml/2006/main" xmlns:r="http://schemas.openxmlformats.org/officeDocument/2006/relationships" xmlns:ac="http://schemas.microsoft.com/office/drawing/2013/main/command" xmlns:pc="http://schemas.microsoft.com/office/powerpoint/2013/main/command">
   <pc:docChgLst>
     <pc:chgData name="George Hariman" userId="944226f4-c0bd-444e-8152-728ae792d6b1" providerId="ADAL" clId="{34122976-1B0B-468B-BAB7-AAB8F0B58991}"/>
     <pc:docChg chg="custSel addSld delSld modSld">
-      <pc:chgData name="George Hariman" userId="944226f4-c0bd-444e-8152-728ae792d6b1" providerId="ADAL" clId="{34122976-1B0B-468B-BAB7-AAB8F0B58991}" dt="2025-11-17T17:18:44.283" v="217" actId="20577"/>
+      <pc:chgData name="George Hariman" userId="944226f4-c0bd-444e-8152-728ae792d6b1" providerId="ADAL" clId="{34122976-1B0B-468B-BAB7-AAB8F0B58991}" dt="2025-11-18T17:49:03.402" v="256" actId="20577"/>
       <pc:docMkLst>
         <pc:docMk/>
       </pc:docMkLst>
       <pc:sldChg chg="addSp delSp modSp mod">
-        <pc:chgData name="George Hariman" userId="944226f4-c0bd-444e-8152-728ae792d6b1" providerId="ADAL" clId="{34122976-1B0B-468B-BAB7-AAB8F0B58991}" dt="2025-11-17T17:18:44.283" v="217" actId="20577"/>
+        <pc:chgData name="George Hariman" userId="944226f4-c0bd-444e-8152-728ae792d6b1" providerId="ADAL" clId="{34122976-1B0B-468B-BAB7-AAB8F0B58991}" dt="2025-11-18T17:48:29.739" v="249" actId="20577"/>
         <pc:sldMkLst>
           <pc:docMk/>
           <pc:sldMk cId="1800593104" sldId="256"/>
         </pc:sldMkLst>
         <pc:spChg chg="add mod">
-          <ac:chgData name="George Hariman" userId="944226f4-c0bd-444e-8152-728ae792d6b1" providerId="ADAL" clId="{34122976-1B0B-468B-BAB7-AAB8F0B58991}" dt="2025-11-17T17:18:44.283" v="217" actId="20577"/>
+          <ac:chgData name="George Hariman" userId="944226f4-c0bd-444e-8152-728ae792d6b1" providerId="ADAL" clId="{34122976-1B0B-468B-BAB7-AAB8F0B58991}" dt="2025-11-18T17:48:04.907" v="218" actId="20577"/>
           <ac:spMkLst>
             <pc:docMk/>
             <pc:sldMk cId="1800593104" sldId="256"/>
@@ -158,6 +150,14 @@
             <pc:docMk/>
             <pc:sldMk cId="1800593104" sldId="256"/>
             <ac:spMk id="7" creationId="{ED3A4E5F-EFA4-59E8-6B89-5F40F1C70717}"/>
+          </ac:spMkLst>
+        </pc:spChg>
+        <pc:spChg chg="mod">
+          <ac:chgData name="George Hariman" userId="944226f4-c0bd-444e-8152-728ae792d6b1" providerId="ADAL" clId="{34122976-1B0B-468B-BAB7-AAB8F0B58991}" dt="2025-11-18T17:48:29.739" v="249" actId="20577"/>
+          <ac:spMkLst>
+            <pc:docMk/>
+            <pc:sldMk cId="1800593104" sldId="256"/>
+            <ac:spMk id="10" creationId="{173DEA60-0228-00FA-E8EA-D350458F9D23}"/>
           </ac:spMkLst>
         </pc:spChg>
         <pc:spChg chg="del mod topLvl">
@@ -216,6 +216,21 @@
             <ac:cxnSpMk id="29" creationId="{7A82C5DF-9BE8-5D12-86E4-A699752CF43D}"/>
           </ac:cxnSpMkLst>
         </pc:cxnChg>
+      </pc:sldChg>
+      <pc:sldChg chg="modSp mod">
+        <pc:chgData name="George Hariman" userId="944226f4-c0bd-444e-8152-728ae792d6b1" providerId="ADAL" clId="{34122976-1B0B-468B-BAB7-AAB8F0B58991}" dt="2025-11-18T17:49:03.402" v="256" actId="20577"/>
+        <pc:sldMkLst>
+          <pc:docMk/>
+          <pc:sldMk cId="1793599662" sldId="264"/>
+        </pc:sldMkLst>
+        <pc:spChg chg="mod">
+          <ac:chgData name="George Hariman" userId="944226f4-c0bd-444e-8152-728ae792d6b1" providerId="ADAL" clId="{34122976-1B0B-468B-BAB7-AAB8F0B58991}" dt="2025-11-18T17:49:03.402" v="256" actId="20577"/>
+          <ac:spMkLst>
+            <pc:docMk/>
+            <pc:sldMk cId="1793599662" sldId="264"/>
+            <ac:spMk id="3" creationId="{9D9A9121-AF12-1969-1F1A-0B296611702E}"/>
+          </ac:spMkLst>
+        </pc:spChg>
       </pc:sldChg>
     </pc:docChg>
   </pc:docChgLst>
@@ -2180,7 +2195,7 @@
           <a:p>
             <a:fld id="{2B0A73C7-85E1-4631-82BB-A7046A93EA7F}" type="datetimeFigureOut">
               <a:rPr lang="en-US" smtClean="0"/>
-              <a:t>11/17/2025</a:t>
+              <a:t>11/18/2025</a:t>
             </a:fld>
             <a:endParaRPr lang="en-US"/>
           </a:p>
@@ -3637,9 +3652,10 @@
           </a:p>
           <a:p>
             <a:r>
-              <a:rPr lang="en-US" dirty="0"/>
-              <a:t>Updated 10/10/25</a:t>
-            </a:r>
+              <a:rPr lang="en-US"/>
+              <a:t>Updated 11/18/25</a:t>
+            </a:r>
+            <a:endParaRPr lang="en-US" dirty="0"/>
           </a:p>
         </p:txBody>
       </p:sp>
@@ -4616,7 +4632,7 @@
         <p:spPr>
           <a:xfrm>
             <a:off x="6994435" y="6243485"/>
-            <a:ext cx="5021888" cy="369332"/>
+            <a:ext cx="5021888" cy="697627"/>
           </a:xfrm>
           <a:prstGeom prst="rect">
             <a:avLst/>
@@ -4645,6 +4661,31 @@
               </a:rPr>
               <a:t>Pin 6: To GREEN wire of WS2815 LED strip</a:t>
             </a:r>
+          </a:p>
+          <a:p>
+            <a:pPr>
+              <a:spcBef>
+                <a:spcPts val="400"/>
+              </a:spcBef>
+            </a:pPr>
+            <a:r>
+              <a:rPr lang="en-US" dirty="0">
+                <a:solidFill>
+                  <a:schemeClr val="tx2"/>
+                </a:solidFill>
+                <a:latin typeface="+mn-ea"/>
+                <a:cs typeface="メイリオ" panose="020B0604030504040204" pitchFamily="50" charset="-128"/>
+              </a:rPr>
+              <a:t>Red = +12V. Blue=White=GND</a:t>
+            </a:r>
+            <a:endParaRPr kumimoji="1" lang="en-US" sz="1800" dirty="0">
+              <a:solidFill>
+                <a:schemeClr val="tx2"/>
+              </a:solidFill>
+              <a:latin typeface="+mn-ea"/>
+              <a:ea typeface="+mn-ea"/>
+              <a:cs typeface="メイリオ" panose="020B0604030504040204" pitchFamily="50" charset="-128"/>
+            </a:endParaRPr>
           </a:p>
         </p:txBody>
       </p:sp>
@@ -4791,7 +4832,7 @@
         <p:spPr>
           <a:xfrm>
             <a:off x="7875639" y="5869858"/>
-            <a:ext cx="4405373" cy="369332"/>
+            <a:ext cx="3754554" cy="369332"/>
           </a:xfrm>
           <a:prstGeom prst="rect">
             <a:avLst/>
@@ -4810,7 +4851,7 @@
               </a:spcBef>
             </a:pPr>
             <a:r>
-              <a:rPr kumimoji="1" lang="en-US" sz="1800">
+              <a:rPr kumimoji="1" lang="en-US" sz="1800" dirty="0">
                 <a:solidFill>
                   <a:schemeClr val="tx2"/>
                 </a:solidFill>
@@ -4821,7 +4862,7 @@
               <a:t>Pin </a:t>
             </a:r>
             <a:r>
-              <a:rPr lang="en-US">
+              <a:rPr lang="en-US" dirty="0">
                 <a:solidFill>
                   <a:schemeClr val="tx2"/>
                 </a:solidFill>
@@ -4831,7 +4872,7 @@
               <a:t>9</a:t>
             </a:r>
             <a:r>
-              <a:rPr kumimoji="1" lang="en-US" sz="1800">
+              <a:rPr kumimoji="1" lang="en-US" sz="1800" dirty="0">
                 <a:solidFill>
                   <a:schemeClr val="tx2"/>
                 </a:solidFill>
@@ -4839,40 +4880,7 @@
                 <a:ea typeface="+mn-ea"/>
                 <a:cs typeface="メイリオ" panose="020B0604030504040204" pitchFamily="50" charset="-128"/>
               </a:rPr>
-              <a:t> </a:t>
-            </a:r>
-            <a:r>
-              <a:rPr kumimoji="1" lang="en-US" sz="1800" dirty="0">
-                <a:solidFill>
-                  <a:schemeClr val="tx2"/>
-                </a:solidFill>
-                <a:latin typeface="+mn-ea"/>
-                <a:ea typeface="+mn-ea"/>
-                <a:cs typeface="メイリオ" panose="020B0604030504040204" pitchFamily="50" charset="-128"/>
-              </a:rPr>
-              <a:t>50%, </a:t>
-            </a:r>
-            <a:r>
-              <a:rPr kumimoji="1" lang="en-US" sz="1800">
-                <a:solidFill>
-                  <a:schemeClr val="tx2"/>
-                </a:solidFill>
-                <a:latin typeface="+mn-ea"/>
-                <a:ea typeface="+mn-ea"/>
-                <a:cs typeface="メイリオ" panose="020B0604030504040204" pitchFamily="50" charset="-128"/>
-              </a:rPr>
-              <a:t>pin 10 </a:t>
-            </a:r>
-            <a:r>
-              <a:rPr kumimoji="1" lang="en-US" sz="1800" dirty="0">
-                <a:solidFill>
-                  <a:schemeClr val="tx2"/>
-                </a:solidFill>
-                <a:latin typeface="+mn-ea"/>
-                <a:ea typeface="+mn-ea"/>
-                <a:cs typeface="メイリオ" panose="020B0604030504040204" pitchFamily="50" charset="-128"/>
-              </a:rPr>
-              <a:t>25% at 15.625kHz</a:t>
+              <a:t> 50%, pin 10 25% at 5kHz</a:t>
             </a:r>
           </a:p>
         </p:txBody>

</xml_diff>

<commit_message>
update Arduino, GUI and PPT for new Fan PWM with GUI control
</commit_message>
<xml_diff>
--- a/Water Pump Demo Arduino and Gui instructions.pptx
+++ b/Water Pump Demo Arduino and Gui instructions.pptx
@@ -126,18 +126,18 @@
   <pc:docChgLst>
     <pc:chgData name="George Hariman" userId="944226f4-c0bd-444e-8152-728ae792d6b1" providerId="ADAL" clId="{34122976-1B0B-468B-BAB7-AAB8F0B58991}"/>
     <pc:docChg chg="custSel addSld delSld modSld">
-      <pc:chgData name="George Hariman" userId="944226f4-c0bd-444e-8152-728ae792d6b1" providerId="ADAL" clId="{34122976-1B0B-468B-BAB7-AAB8F0B58991}" dt="2025-11-18T17:49:03.402" v="256" actId="20577"/>
+      <pc:chgData name="George Hariman" userId="944226f4-c0bd-444e-8152-728ae792d6b1" providerId="ADAL" clId="{34122976-1B0B-468B-BAB7-AAB8F0B58991}" dt="2025-12-01T23:20:36.561" v="276" actId="20577"/>
       <pc:docMkLst>
         <pc:docMk/>
       </pc:docMkLst>
       <pc:sldChg chg="addSp delSp modSp mod">
-        <pc:chgData name="George Hariman" userId="944226f4-c0bd-444e-8152-728ae792d6b1" providerId="ADAL" clId="{34122976-1B0B-468B-BAB7-AAB8F0B58991}" dt="2025-11-18T17:48:29.739" v="249" actId="20577"/>
+        <pc:chgData name="George Hariman" userId="944226f4-c0bd-444e-8152-728ae792d6b1" providerId="ADAL" clId="{34122976-1B0B-468B-BAB7-AAB8F0B58991}" dt="2025-12-01T23:20:36.561" v="276" actId="20577"/>
         <pc:sldMkLst>
           <pc:docMk/>
           <pc:sldMk cId="1800593104" sldId="256"/>
         </pc:sldMkLst>
         <pc:spChg chg="add mod">
-          <ac:chgData name="George Hariman" userId="944226f4-c0bd-444e-8152-728ae792d6b1" providerId="ADAL" clId="{34122976-1B0B-468B-BAB7-AAB8F0B58991}" dt="2025-11-18T17:48:04.907" v="218" actId="20577"/>
+          <ac:chgData name="George Hariman" userId="944226f4-c0bd-444e-8152-728ae792d6b1" providerId="ADAL" clId="{34122976-1B0B-468B-BAB7-AAB8F0B58991}" dt="2025-12-01T23:20:36.561" v="276" actId="20577"/>
           <ac:spMkLst>
             <pc:docMk/>
             <pc:sldMk cId="1800593104" sldId="256"/>
@@ -158,14 +158,6 @@
             <pc:docMk/>
             <pc:sldMk cId="1800593104" sldId="256"/>
             <ac:spMk id="10" creationId="{173DEA60-0228-00FA-E8EA-D350458F9D23}"/>
-          </ac:spMkLst>
-        </pc:spChg>
-        <pc:spChg chg="del mod topLvl">
-          <ac:chgData name="George Hariman" userId="944226f4-c0bd-444e-8152-728ae792d6b1" providerId="ADAL" clId="{34122976-1B0B-468B-BAB7-AAB8F0B58991}" dt="2025-11-17T17:09:24.621" v="155"/>
-          <ac:spMkLst>
-            <pc:docMk/>
-            <pc:sldMk cId="1800593104" sldId="256"/>
-            <ac:spMk id="31" creationId="{E1509700-B293-3F55-F55C-F3701790459F}"/>
           </ac:spMkLst>
         </pc:spChg>
         <pc:spChg chg="mod">
@@ -2195,7 +2187,7 @@
           <a:p>
             <a:fld id="{2B0A73C7-85E1-4631-82BB-A7046A93EA7F}" type="datetimeFigureOut">
               <a:rPr lang="en-US" smtClean="0"/>
-              <a:t>11/18/2025</a:t>
+              <a:t>12/1/2025</a:t>
             </a:fld>
             <a:endParaRPr lang="en-US"/>
           </a:p>
@@ -4832,7 +4824,7 @@
         <p:spPr>
           <a:xfrm>
             <a:off x="7875639" y="5869858"/>
-            <a:ext cx="3754554" cy="369332"/>
+            <a:ext cx="3783665" cy="369332"/>
           </a:xfrm>
           <a:prstGeom prst="rect">
             <a:avLst/>
@@ -4859,28 +4851,7 @@
                 <a:ea typeface="+mn-ea"/>
                 <a:cs typeface="メイリオ" panose="020B0604030504040204" pitchFamily="50" charset="-128"/>
               </a:rPr>
-              <a:t>Pin </a:t>
-            </a:r>
-            <a:r>
-              <a:rPr lang="en-US" dirty="0">
-                <a:solidFill>
-                  <a:schemeClr val="tx2"/>
-                </a:solidFill>
-                <a:latin typeface="+mn-ea"/>
-                <a:cs typeface="メイリオ" panose="020B0604030504040204" pitchFamily="50" charset="-128"/>
-              </a:rPr>
-              <a:t>9</a:t>
-            </a:r>
-            <a:r>
-              <a:rPr kumimoji="1" lang="en-US" sz="1800" dirty="0">
-                <a:solidFill>
-                  <a:schemeClr val="tx2"/>
-                </a:solidFill>
-                <a:latin typeface="+mn-ea"/>
-                <a:ea typeface="+mn-ea"/>
-                <a:cs typeface="メイリオ" panose="020B0604030504040204" pitchFamily="50" charset="-128"/>
-              </a:rPr>
-              <a:t> 50%, pin 10 25% at 5kHz</a:t>
+              <a:t>pin 10 at 5kHz, duty ctrl by GUI</a:t>
             </a:r>
           </a:p>
         </p:txBody>

</xml_diff>